<commit_message>
models for overlapping coverage problem
</commit_message>
<xml_diff>
--- a/figures.pptx
+++ b/figures.pptx
@@ -4253,7 +4253,7 @@
         </p:nvGrpSpPr>
         <p:grpSpPr>
           <a:xfrm>
-            <a:off x="2777292" y="2328112"/>
+            <a:off x="3041987" y="5083344"/>
             <a:ext cx="818146" cy="1509962"/>
             <a:chOff x="697832" y="980575"/>
             <a:chExt cx="818146" cy="1509962"/>
@@ -4460,7 +4460,7 @@
         </p:nvGrpSpPr>
         <p:grpSpPr>
           <a:xfrm>
-            <a:off x="7709736" y="2328112"/>
+            <a:off x="7974431" y="5083344"/>
             <a:ext cx="818146" cy="1509962"/>
             <a:chOff x="697832" y="980575"/>
             <a:chExt cx="818146" cy="1509962"/>
@@ -4667,7 +4667,7 @@
         </p:nvSpPr>
         <p:spPr>
           <a:xfrm>
-            <a:off x="0" y="2586790"/>
+            <a:off x="264695" y="5342022"/>
             <a:ext cx="7300663" cy="2343149"/>
           </a:xfrm>
           <a:prstGeom prst="ellipse">
@@ -4717,7 +4717,7 @@
         </p:nvSpPr>
         <p:spPr>
           <a:xfrm>
-            <a:off x="4209047" y="2586789"/>
+            <a:off x="4473742" y="5342021"/>
             <a:ext cx="7300663" cy="2343149"/>
           </a:xfrm>
           <a:prstGeom prst="ellipse">
@@ -4767,7 +4767,7 @@
         </p:nvSpPr>
         <p:spPr>
           <a:xfrm>
-            <a:off x="8140365" y="1215194"/>
+            <a:off x="8405060" y="3970426"/>
             <a:ext cx="493295" cy="902369"/>
           </a:xfrm>
           <a:custGeom>
@@ -4886,7 +4886,7 @@
         </p:nvSpPr>
         <p:spPr>
           <a:xfrm>
-            <a:off x="3229478" y="1275349"/>
+            <a:off x="3494173" y="4030581"/>
             <a:ext cx="493295" cy="902369"/>
           </a:xfrm>
           <a:custGeom>
@@ -5005,7 +5005,7 @@
         </p:nvCxnSpPr>
         <p:spPr>
           <a:xfrm flipH="1">
-            <a:off x="5943600" y="1997242"/>
+            <a:off x="6208295" y="4752474"/>
             <a:ext cx="372979" cy="1467852"/>
           </a:xfrm>
           <a:prstGeom prst="straightConnector1">
@@ -5041,7 +5041,7 @@
         </p:nvSpPr>
         <p:spPr>
           <a:xfrm>
-            <a:off x="5966620" y="1666378"/>
+            <a:off x="6231315" y="4421610"/>
             <a:ext cx="1326389" cy="369332"/>
           </a:xfrm>
           <a:prstGeom prst="rect">
@@ -5071,6 +5071,596 @@
           </a:p>
         </p:txBody>
       </p:sp>
+      <p:sp>
+        <p:nvSpPr>
+          <p:cNvPr id="24" name="Rectangle 23"/>
+          <p:cNvSpPr/>
+          <p:nvPr/>
+        </p:nvSpPr>
+        <p:spPr>
+          <a:xfrm>
+            <a:off x="2110542" y="122323"/>
+            <a:ext cx="1515979" cy="661737"/>
+          </a:xfrm>
+          <a:prstGeom prst="rect">
+            <a:avLst/>
+          </a:prstGeom>
+          <a:noFill/>
+          <a:ln w="25400">
+            <a:solidFill>
+              <a:schemeClr val="tx1"/>
+            </a:solidFill>
+          </a:ln>
+        </p:spPr>
+        <p:style>
+          <a:lnRef idx="2">
+            <a:schemeClr val="accent1">
+              <a:shade val="50000"/>
+            </a:schemeClr>
+          </a:lnRef>
+          <a:fillRef idx="1">
+            <a:schemeClr val="accent1"/>
+          </a:fillRef>
+          <a:effectRef idx="0">
+            <a:schemeClr val="accent1"/>
+          </a:effectRef>
+          <a:fontRef idx="minor">
+            <a:schemeClr val="lt1"/>
+          </a:fontRef>
+        </p:style>
+        <p:txBody>
+          <a:bodyPr rtlCol="0" anchor="ctr"/>
+          <a:lstStyle/>
+          <a:p>
+            <a:pPr algn="ctr"/>
+            <a:r>
+              <a:rPr kumimoji="1" lang="en-US" altLang="zh-CN" sz="2800" dirty="0" smtClean="0">
+                <a:solidFill>
+                  <a:schemeClr val="tx1"/>
+                </a:solidFill>
+              </a:rPr>
+              <a:t>Server</a:t>
+            </a:r>
+            <a:endParaRPr kumimoji="1" lang="zh-CN" altLang="en-US" sz="2800" dirty="0">
+              <a:solidFill>
+                <a:schemeClr val="tx1"/>
+              </a:solidFill>
+            </a:endParaRPr>
+          </a:p>
+        </p:txBody>
+      </p:sp>
+      <p:sp>
+        <p:nvSpPr>
+          <p:cNvPr id="27" name="Rectangle 26"/>
+          <p:cNvSpPr/>
+          <p:nvPr/>
+        </p:nvSpPr>
+        <p:spPr>
+          <a:xfrm>
+            <a:off x="898360" y="2401304"/>
+            <a:ext cx="1515979" cy="661737"/>
+          </a:xfrm>
+          <a:prstGeom prst="rect">
+            <a:avLst/>
+          </a:prstGeom>
+          <a:noFill/>
+          <a:ln w="25400">
+            <a:solidFill>
+              <a:schemeClr val="tx1"/>
+            </a:solidFill>
+          </a:ln>
+        </p:spPr>
+        <p:style>
+          <a:lnRef idx="2">
+            <a:schemeClr val="accent1">
+              <a:shade val="50000"/>
+            </a:schemeClr>
+          </a:lnRef>
+          <a:fillRef idx="1">
+            <a:schemeClr val="accent1"/>
+          </a:fillRef>
+          <a:effectRef idx="0">
+            <a:schemeClr val="accent1"/>
+          </a:effectRef>
+          <a:fontRef idx="minor">
+            <a:schemeClr val="lt1"/>
+          </a:fontRef>
+        </p:style>
+        <p:txBody>
+          <a:bodyPr rtlCol="0" anchor="ctr"/>
+          <a:lstStyle/>
+          <a:p>
+            <a:pPr algn="ctr"/>
+            <a:r>
+              <a:rPr kumimoji="1" lang="en-US" altLang="zh-CN" sz="2800" dirty="0" smtClean="0">
+                <a:solidFill>
+                  <a:schemeClr val="tx1"/>
+                </a:solidFill>
+              </a:rPr>
+              <a:t>Cache 1</a:t>
+            </a:r>
+            <a:endParaRPr kumimoji="1" lang="zh-CN" altLang="en-US" sz="2800" dirty="0">
+              <a:solidFill>
+                <a:schemeClr val="tx1"/>
+              </a:solidFill>
+            </a:endParaRPr>
+          </a:p>
+        </p:txBody>
+      </p:sp>
+      <p:sp>
+        <p:nvSpPr>
+          <p:cNvPr id="28" name="Rectangle 27"/>
+          <p:cNvSpPr/>
+          <p:nvPr/>
+        </p:nvSpPr>
+        <p:spPr>
+          <a:xfrm>
+            <a:off x="3408949" y="2401304"/>
+            <a:ext cx="1515979" cy="661737"/>
+          </a:xfrm>
+          <a:prstGeom prst="rect">
+            <a:avLst/>
+          </a:prstGeom>
+          <a:noFill/>
+          <a:ln w="25400">
+            <a:solidFill>
+              <a:schemeClr val="tx1"/>
+            </a:solidFill>
+          </a:ln>
+        </p:spPr>
+        <p:style>
+          <a:lnRef idx="2">
+            <a:schemeClr val="accent1">
+              <a:shade val="50000"/>
+            </a:schemeClr>
+          </a:lnRef>
+          <a:fillRef idx="1">
+            <a:schemeClr val="accent1"/>
+          </a:fillRef>
+          <a:effectRef idx="0">
+            <a:schemeClr val="accent1"/>
+          </a:effectRef>
+          <a:fontRef idx="minor">
+            <a:schemeClr val="lt1"/>
+          </a:fontRef>
+        </p:style>
+        <p:txBody>
+          <a:bodyPr rtlCol="0" anchor="ctr"/>
+          <a:lstStyle/>
+          <a:p>
+            <a:pPr algn="ctr"/>
+            <a:r>
+              <a:rPr kumimoji="1" lang="en-US" altLang="zh-CN" sz="2800" dirty="0" smtClean="0">
+                <a:solidFill>
+                  <a:schemeClr val="tx1"/>
+                </a:solidFill>
+              </a:rPr>
+              <a:t>Cache 2</a:t>
+            </a:r>
+            <a:endParaRPr kumimoji="1" lang="zh-CN" altLang="en-US" sz="2800" dirty="0">
+              <a:solidFill>
+                <a:schemeClr val="tx1"/>
+              </a:solidFill>
+            </a:endParaRPr>
+          </a:p>
+        </p:txBody>
+      </p:sp>
+      <p:sp>
+        <p:nvSpPr>
+          <p:cNvPr id="29" name="Rectangle 28"/>
+          <p:cNvSpPr/>
+          <p:nvPr/>
+        </p:nvSpPr>
+        <p:spPr>
+          <a:xfrm>
+            <a:off x="5919538" y="2401304"/>
+            <a:ext cx="1515979" cy="661737"/>
+          </a:xfrm>
+          <a:prstGeom prst="rect">
+            <a:avLst/>
+          </a:prstGeom>
+          <a:noFill/>
+          <a:ln w="25400">
+            <a:solidFill>
+              <a:schemeClr val="tx1"/>
+            </a:solidFill>
+          </a:ln>
+        </p:spPr>
+        <p:style>
+          <a:lnRef idx="2">
+            <a:schemeClr val="accent1">
+              <a:shade val="50000"/>
+            </a:schemeClr>
+          </a:lnRef>
+          <a:fillRef idx="1">
+            <a:schemeClr val="accent1"/>
+          </a:fillRef>
+          <a:effectRef idx="0">
+            <a:schemeClr val="accent1"/>
+          </a:effectRef>
+          <a:fontRef idx="minor">
+            <a:schemeClr val="lt1"/>
+          </a:fontRef>
+        </p:style>
+        <p:txBody>
+          <a:bodyPr rtlCol="0" anchor="ctr"/>
+          <a:lstStyle/>
+          <a:p>
+            <a:pPr algn="ctr"/>
+            <a:r>
+              <a:rPr kumimoji="1" lang="en-US" altLang="zh-CN" sz="2800" dirty="0" smtClean="0">
+                <a:solidFill>
+                  <a:schemeClr val="tx1"/>
+                </a:solidFill>
+              </a:rPr>
+              <a:t>Cache3</a:t>
+            </a:r>
+            <a:endParaRPr kumimoji="1" lang="zh-CN" altLang="en-US" sz="2800" dirty="0">
+              <a:solidFill>
+                <a:schemeClr val="tx1"/>
+              </a:solidFill>
+            </a:endParaRPr>
+          </a:p>
+        </p:txBody>
+      </p:sp>
+      <p:sp>
+        <p:nvSpPr>
+          <p:cNvPr id="30" name="Rectangle 29"/>
+          <p:cNvSpPr/>
+          <p:nvPr/>
+        </p:nvSpPr>
+        <p:spPr>
+          <a:xfrm>
+            <a:off x="8430127" y="2401304"/>
+            <a:ext cx="1515979" cy="661737"/>
+          </a:xfrm>
+          <a:prstGeom prst="rect">
+            <a:avLst/>
+          </a:prstGeom>
+          <a:noFill/>
+          <a:ln w="25400">
+            <a:solidFill>
+              <a:schemeClr val="tx1"/>
+            </a:solidFill>
+          </a:ln>
+        </p:spPr>
+        <p:style>
+          <a:lnRef idx="2">
+            <a:schemeClr val="accent1">
+              <a:shade val="50000"/>
+            </a:schemeClr>
+          </a:lnRef>
+          <a:fillRef idx="1">
+            <a:schemeClr val="accent1"/>
+          </a:fillRef>
+          <a:effectRef idx="0">
+            <a:schemeClr val="accent1"/>
+          </a:effectRef>
+          <a:fontRef idx="minor">
+            <a:schemeClr val="lt1"/>
+          </a:fontRef>
+        </p:style>
+        <p:txBody>
+          <a:bodyPr rtlCol="0" anchor="ctr"/>
+          <a:lstStyle/>
+          <a:p>
+            <a:pPr algn="ctr"/>
+            <a:r>
+              <a:rPr kumimoji="1" lang="en-US" altLang="zh-CN" sz="2800" dirty="0" smtClean="0">
+                <a:solidFill>
+                  <a:schemeClr val="tx1"/>
+                </a:solidFill>
+              </a:rPr>
+              <a:t>Cache </a:t>
+            </a:r>
+            <a:r>
+              <a:rPr kumimoji="1" lang="en-US" altLang="zh-CN" sz="2800" dirty="0" smtClean="0">
+                <a:solidFill>
+                  <a:schemeClr val="tx1"/>
+                </a:solidFill>
+              </a:rPr>
+              <a:t>4</a:t>
+            </a:r>
+            <a:endParaRPr kumimoji="1" lang="zh-CN" altLang="en-US" sz="2800" dirty="0">
+              <a:solidFill>
+                <a:schemeClr val="tx1"/>
+              </a:solidFill>
+            </a:endParaRPr>
+          </a:p>
+        </p:txBody>
+      </p:sp>
+      <p:sp>
+        <p:nvSpPr>
+          <p:cNvPr id="36" name="Rectangle 35"/>
+          <p:cNvSpPr/>
+          <p:nvPr/>
+        </p:nvSpPr>
+        <p:spPr>
+          <a:xfrm>
+            <a:off x="7276598" y="122322"/>
+            <a:ext cx="1515979" cy="661737"/>
+          </a:xfrm>
+          <a:prstGeom prst="rect">
+            <a:avLst/>
+          </a:prstGeom>
+          <a:noFill/>
+          <a:ln w="25400">
+            <a:solidFill>
+              <a:schemeClr val="accent1"/>
+            </a:solidFill>
+          </a:ln>
+        </p:spPr>
+        <p:style>
+          <a:lnRef idx="2">
+            <a:schemeClr val="accent1">
+              <a:shade val="50000"/>
+            </a:schemeClr>
+          </a:lnRef>
+          <a:fillRef idx="1">
+            <a:schemeClr val="accent1"/>
+          </a:fillRef>
+          <a:effectRef idx="0">
+            <a:schemeClr val="accent1"/>
+          </a:effectRef>
+          <a:fontRef idx="minor">
+            <a:schemeClr val="lt1"/>
+          </a:fontRef>
+        </p:style>
+        <p:txBody>
+          <a:bodyPr rtlCol="0" anchor="ctr"/>
+          <a:lstStyle/>
+          <a:p>
+            <a:pPr algn="ctr"/>
+            <a:r>
+              <a:rPr kumimoji="1" lang="en-US" altLang="zh-CN" sz="2800" dirty="0" smtClean="0">
+                <a:solidFill>
+                  <a:srgbClr val="0070C0"/>
+                </a:solidFill>
+              </a:rPr>
+              <a:t>Server</a:t>
+            </a:r>
+            <a:endParaRPr kumimoji="1" lang="zh-CN" altLang="en-US" sz="2800" dirty="0">
+              <a:solidFill>
+                <a:srgbClr val="0070C0"/>
+              </a:solidFill>
+            </a:endParaRPr>
+          </a:p>
+        </p:txBody>
+      </p:sp>
+      <p:cxnSp>
+        <p:nvCxnSpPr>
+          <p:cNvPr id="3" name="Straight Arrow Connector 2"/>
+          <p:cNvCxnSpPr>
+            <a:stCxn id="24" idx="2"/>
+            <a:endCxn id="27" idx="0"/>
+          </p:cNvCxnSpPr>
+          <p:nvPr/>
+        </p:nvCxnSpPr>
+        <p:spPr>
+          <a:xfrm flipH="1">
+            <a:off x="1656350" y="784060"/>
+            <a:ext cx="1212182" cy="1617244"/>
+          </a:xfrm>
+          <a:prstGeom prst="straightConnector1">
+            <a:avLst/>
+          </a:prstGeom>
+          <a:ln w="25400">
+            <a:solidFill>
+              <a:schemeClr val="tx1"/>
+            </a:solidFill>
+            <a:tailEnd type="triangle"/>
+          </a:ln>
+        </p:spPr>
+        <p:style>
+          <a:lnRef idx="1">
+            <a:schemeClr val="accent1"/>
+          </a:lnRef>
+          <a:fillRef idx="0">
+            <a:schemeClr val="accent1"/>
+          </a:fillRef>
+          <a:effectRef idx="0">
+            <a:schemeClr val="accent1"/>
+          </a:effectRef>
+          <a:fontRef idx="minor">
+            <a:schemeClr val="tx1"/>
+          </a:fontRef>
+        </p:style>
+      </p:cxnSp>
+      <p:cxnSp>
+        <p:nvCxnSpPr>
+          <p:cNvPr id="42" name="Straight Arrow Connector 41"/>
+          <p:cNvCxnSpPr>
+            <a:stCxn id="24" idx="2"/>
+            <a:endCxn id="28" idx="0"/>
+          </p:cNvCxnSpPr>
+          <p:nvPr/>
+        </p:nvCxnSpPr>
+        <p:spPr>
+          <a:xfrm>
+            <a:off x="2868532" y="784060"/>
+            <a:ext cx="1298407" cy="1617244"/>
+          </a:xfrm>
+          <a:prstGeom prst="straightConnector1">
+            <a:avLst/>
+          </a:prstGeom>
+          <a:ln w="25400">
+            <a:solidFill>
+              <a:schemeClr val="tx1"/>
+            </a:solidFill>
+            <a:tailEnd type="triangle"/>
+          </a:ln>
+        </p:spPr>
+        <p:style>
+          <a:lnRef idx="1">
+            <a:schemeClr val="accent1"/>
+          </a:lnRef>
+          <a:fillRef idx="0">
+            <a:schemeClr val="accent1"/>
+          </a:fillRef>
+          <a:effectRef idx="0">
+            <a:schemeClr val="accent1"/>
+          </a:effectRef>
+          <a:fontRef idx="minor">
+            <a:schemeClr val="tx1"/>
+          </a:fontRef>
+        </p:style>
+      </p:cxnSp>
+      <p:cxnSp>
+        <p:nvCxnSpPr>
+          <p:cNvPr id="43" name="Straight Arrow Connector 42"/>
+          <p:cNvCxnSpPr>
+            <a:stCxn id="24" idx="2"/>
+            <a:endCxn id="29" idx="0"/>
+          </p:cNvCxnSpPr>
+          <p:nvPr/>
+        </p:nvCxnSpPr>
+        <p:spPr>
+          <a:xfrm>
+            <a:off x="2868532" y="784060"/>
+            <a:ext cx="3808996" cy="1617244"/>
+          </a:xfrm>
+          <a:prstGeom prst="straightConnector1">
+            <a:avLst/>
+          </a:prstGeom>
+          <a:ln w="25400">
+            <a:solidFill>
+              <a:schemeClr val="tx1"/>
+            </a:solidFill>
+            <a:tailEnd type="triangle"/>
+          </a:ln>
+        </p:spPr>
+        <p:style>
+          <a:lnRef idx="1">
+            <a:schemeClr val="accent1"/>
+          </a:lnRef>
+          <a:fillRef idx="0">
+            <a:schemeClr val="accent1"/>
+          </a:fillRef>
+          <a:effectRef idx="0">
+            <a:schemeClr val="accent1"/>
+          </a:effectRef>
+          <a:fontRef idx="minor">
+            <a:schemeClr val="tx1"/>
+          </a:fontRef>
+        </p:style>
+      </p:cxnSp>
+      <p:cxnSp>
+        <p:nvCxnSpPr>
+          <p:cNvPr id="44" name="Straight Arrow Connector 43"/>
+          <p:cNvCxnSpPr>
+            <a:stCxn id="36" idx="2"/>
+            <a:endCxn id="28" idx="0"/>
+          </p:cNvCxnSpPr>
+          <p:nvPr/>
+        </p:nvCxnSpPr>
+        <p:spPr>
+          <a:xfrm flipH="1">
+            <a:off x="4166939" y="784059"/>
+            <a:ext cx="3867649" cy="1617245"/>
+          </a:xfrm>
+          <a:prstGeom prst="straightConnector1">
+            <a:avLst/>
+          </a:prstGeom>
+          <a:ln w="25400">
+            <a:solidFill>
+              <a:schemeClr val="accent1"/>
+            </a:solidFill>
+            <a:tailEnd type="triangle"/>
+          </a:ln>
+        </p:spPr>
+        <p:style>
+          <a:lnRef idx="1">
+            <a:schemeClr val="accent1"/>
+          </a:lnRef>
+          <a:fillRef idx="0">
+            <a:schemeClr val="accent1"/>
+          </a:fillRef>
+          <a:effectRef idx="0">
+            <a:schemeClr val="accent1"/>
+          </a:effectRef>
+          <a:fontRef idx="minor">
+            <a:schemeClr val="tx1"/>
+          </a:fontRef>
+        </p:style>
+      </p:cxnSp>
+      <p:cxnSp>
+        <p:nvCxnSpPr>
+          <p:cNvPr id="47" name="Straight Arrow Connector 46"/>
+          <p:cNvCxnSpPr>
+            <a:stCxn id="36" idx="2"/>
+            <a:endCxn id="29" idx="0"/>
+          </p:cNvCxnSpPr>
+          <p:nvPr/>
+        </p:nvCxnSpPr>
+        <p:spPr>
+          <a:xfrm flipH="1">
+            <a:off x="6677528" y="784059"/>
+            <a:ext cx="1357060" cy="1617245"/>
+          </a:xfrm>
+          <a:prstGeom prst="straightConnector1">
+            <a:avLst/>
+          </a:prstGeom>
+          <a:ln w="25400">
+            <a:solidFill>
+              <a:schemeClr val="accent1"/>
+            </a:solidFill>
+            <a:tailEnd type="triangle"/>
+          </a:ln>
+        </p:spPr>
+        <p:style>
+          <a:lnRef idx="1">
+            <a:schemeClr val="accent1"/>
+          </a:lnRef>
+          <a:fillRef idx="0">
+            <a:schemeClr val="accent1"/>
+          </a:fillRef>
+          <a:effectRef idx="0">
+            <a:schemeClr val="accent1"/>
+          </a:effectRef>
+          <a:fontRef idx="minor">
+            <a:schemeClr val="tx1"/>
+          </a:fontRef>
+        </p:style>
+      </p:cxnSp>
+      <p:cxnSp>
+        <p:nvCxnSpPr>
+          <p:cNvPr id="50" name="Straight Arrow Connector 49"/>
+          <p:cNvCxnSpPr>
+            <a:stCxn id="36" idx="2"/>
+            <a:endCxn id="30" idx="0"/>
+          </p:cNvCxnSpPr>
+          <p:nvPr/>
+        </p:nvCxnSpPr>
+        <p:spPr>
+          <a:xfrm>
+            <a:off x="8034588" y="784059"/>
+            <a:ext cx="1153529" cy="1617245"/>
+          </a:xfrm>
+          <a:prstGeom prst="straightConnector1">
+            <a:avLst/>
+          </a:prstGeom>
+          <a:ln w="25400">
+            <a:solidFill>
+              <a:schemeClr val="accent1"/>
+            </a:solidFill>
+            <a:tailEnd type="triangle"/>
+          </a:ln>
+        </p:spPr>
+        <p:style>
+          <a:lnRef idx="1">
+            <a:schemeClr val="accent1"/>
+          </a:lnRef>
+          <a:fillRef idx="0">
+            <a:schemeClr val="accent1"/>
+          </a:fillRef>
+          <a:effectRef idx="0">
+            <a:schemeClr val="accent1"/>
+          </a:effectRef>
+          <a:fontRef idx="minor">
+            <a:schemeClr val="tx1"/>
+          </a:fontRef>
+        </p:style>
+      </p:cxnSp>
     </p:spTree>
     <p:extLst>
       <p:ext uri="{BB962C8B-B14F-4D97-AF65-F5344CB8AC3E}">

</xml_diff>

<commit_message>
all possible cases for requests
</commit_message>
<xml_diff>
--- a/figures.pptx
+++ b/figures.pptx
@@ -8,6 +8,8 @@
     <p:sldId id="256" r:id="rId2"/>
     <p:sldId id="257" r:id="rId3"/>
     <p:sldId id="258" r:id="rId4"/>
+    <p:sldId id="259" r:id="rId5"/>
+    <p:sldId id="260" r:id="rId6"/>
   </p:sldIdLst>
   <p:sldSz cx="12192000" cy="6858000"/>
   <p:notesSz cx="6858000" cy="9144000"/>
@@ -107,6 +109,23 @@
     </a:lvl9pPr>
   </p:defaultTextStyle>
   <p:extLst>
+    <p:ext uri="{521415D9-36F7-43E2-AB2F-B90AF26B5E84}">
+      <p14:sectionLst xmlns:p14="http://schemas.microsoft.com/office/powerpoint/2010/main">
+        <p14:section name="Default Section" id="{C3A48B59-0E88-E442-B9F1-38C060CB89E9}">
+          <p14:sldIdLst>
+            <p14:sldId id="256"/>
+            <p14:sldId id="257"/>
+            <p14:sldId id="258"/>
+            <p14:sldId id="259"/>
+          </p14:sldIdLst>
+        </p14:section>
+        <p14:section name="Predict Network Status" id="{FEC046B3-1D1B-C84E-8634-F011F0A428EB}">
+          <p14:sldIdLst>
+            <p14:sldId id="260"/>
+          </p14:sldIdLst>
+        </p14:section>
+      </p14:sectionLst>
+    </p:ext>
     <p:ext uri="{EFAFB233-063F-42B5-8137-9DF3F51BA10A}">
       <p15:sldGuideLst xmlns:p15="http://schemas.microsoft.com/office/powerpoint/2012/main"/>
     </p:ext>
@@ -245,7 +264,7 @@
           <a:p>
             <a:fld id="{5386D14C-7C63-454A-9FEB-090854700008}" type="datetimeFigureOut">
               <a:rPr kumimoji="1" lang="zh-CN" altLang="en-US" smtClean="0"/>
-              <a:t>2017/10/12</a:t>
+              <a:t>2017/10/25</a:t>
             </a:fld>
             <a:endParaRPr kumimoji="1" lang="zh-CN" altLang="en-US"/>
           </a:p>
@@ -415,7 +434,7 @@
           <a:p>
             <a:fld id="{5386D14C-7C63-454A-9FEB-090854700008}" type="datetimeFigureOut">
               <a:rPr kumimoji="1" lang="zh-CN" altLang="en-US" smtClean="0"/>
-              <a:t>2017/10/12</a:t>
+              <a:t>2017/10/25</a:t>
             </a:fld>
             <a:endParaRPr kumimoji="1" lang="zh-CN" altLang="en-US"/>
           </a:p>
@@ -595,7 +614,7 @@
           <a:p>
             <a:fld id="{5386D14C-7C63-454A-9FEB-090854700008}" type="datetimeFigureOut">
               <a:rPr kumimoji="1" lang="zh-CN" altLang="en-US" smtClean="0"/>
-              <a:t>2017/10/12</a:t>
+              <a:t>2017/10/25</a:t>
             </a:fld>
             <a:endParaRPr kumimoji="1" lang="zh-CN" altLang="en-US"/>
           </a:p>
@@ -765,7 +784,7 @@
           <a:p>
             <a:fld id="{5386D14C-7C63-454A-9FEB-090854700008}" type="datetimeFigureOut">
               <a:rPr kumimoji="1" lang="zh-CN" altLang="en-US" smtClean="0"/>
-              <a:t>2017/10/12</a:t>
+              <a:t>2017/10/25</a:t>
             </a:fld>
             <a:endParaRPr kumimoji="1" lang="zh-CN" altLang="en-US"/>
           </a:p>
@@ -1011,7 +1030,7 @@
           <a:p>
             <a:fld id="{5386D14C-7C63-454A-9FEB-090854700008}" type="datetimeFigureOut">
               <a:rPr kumimoji="1" lang="zh-CN" altLang="en-US" smtClean="0"/>
-              <a:t>2017/10/12</a:t>
+              <a:t>2017/10/25</a:t>
             </a:fld>
             <a:endParaRPr kumimoji="1" lang="zh-CN" altLang="en-US"/>
           </a:p>
@@ -1243,7 +1262,7 @@
           <a:p>
             <a:fld id="{5386D14C-7C63-454A-9FEB-090854700008}" type="datetimeFigureOut">
               <a:rPr kumimoji="1" lang="zh-CN" altLang="en-US" smtClean="0"/>
-              <a:t>2017/10/12</a:t>
+              <a:t>2017/10/25</a:t>
             </a:fld>
             <a:endParaRPr kumimoji="1" lang="zh-CN" altLang="en-US"/>
           </a:p>
@@ -1610,7 +1629,7 @@
           <a:p>
             <a:fld id="{5386D14C-7C63-454A-9FEB-090854700008}" type="datetimeFigureOut">
               <a:rPr kumimoji="1" lang="zh-CN" altLang="en-US" smtClean="0"/>
-              <a:t>2017/10/12</a:t>
+              <a:t>2017/10/25</a:t>
             </a:fld>
             <a:endParaRPr kumimoji="1" lang="zh-CN" altLang="en-US"/>
           </a:p>
@@ -1728,7 +1747,7 @@
           <a:p>
             <a:fld id="{5386D14C-7C63-454A-9FEB-090854700008}" type="datetimeFigureOut">
               <a:rPr kumimoji="1" lang="zh-CN" altLang="en-US" smtClean="0"/>
-              <a:t>2017/10/12</a:t>
+              <a:t>2017/10/25</a:t>
             </a:fld>
             <a:endParaRPr kumimoji="1" lang="zh-CN" altLang="en-US"/>
           </a:p>
@@ -1823,7 +1842,7 @@
           <a:p>
             <a:fld id="{5386D14C-7C63-454A-9FEB-090854700008}" type="datetimeFigureOut">
               <a:rPr kumimoji="1" lang="zh-CN" altLang="en-US" smtClean="0"/>
-              <a:t>2017/10/12</a:t>
+              <a:t>2017/10/25</a:t>
             </a:fld>
             <a:endParaRPr kumimoji="1" lang="zh-CN" altLang="en-US"/>
           </a:p>
@@ -2100,7 +2119,7 @@
           <a:p>
             <a:fld id="{5386D14C-7C63-454A-9FEB-090854700008}" type="datetimeFigureOut">
               <a:rPr kumimoji="1" lang="zh-CN" altLang="en-US" smtClean="0"/>
-              <a:t>2017/10/12</a:t>
+              <a:t>2017/10/25</a:t>
             </a:fld>
             <a:endParaRPr kumimoji="1" lang="zh-CN" altLang="en-US"/>
           </a:p>
@@ -2353,7 +2372,7 @@
           <a:p>
             <a:fld id="{5386D14C-7C63-454A-9FEB-090854700008}" type="datetimeFigureOut">
               <a:rPr kumimoji="1" lang="zh-CN" altLang="en-US" smtClean="0"/>
-              <a:t>2017/10/12</a:t>
+              <a:t>2017/10/25</a:t>
             </a:fld>
             <a:endParaRPr kumimoji="1" lang="zh-CN" altLang="en-US"/>
           </a:p>
@@ -2566,7 +2585,7 @@
           <a:p>
             <a:fld id="{5386D14C-7C63-454A-9FEB-090854700008}" type="datetimeFigureOut">
               <a:rPr kumimoji="1" lang="zh-CN" altLang="en-US" smtClean="0"/>
-              <a:t>2017/10/12</a:t>
+              <a:t>2017/10/25</a:t>
             </a:fld>
             <a:endParaRPr kumimoji="1" lang="zh-CN" altLang="en-US"/>
           </a:p>
@@ -5351,15 +5370,7 @@
                   <a:schemeClr val="tx1"/>
                 </a:solidFill>
               </a:rPr>
-              <a:t>Cache </a:t>
-            </a:r>
-            <a:r>
-              <a:rPr kumimoji="1" lang="en-US" altLang="zh-CN" sz="2800" dirty="0" smtClean="0">
-                <a:solidFill>
-                  <a:schemeClr val="tx1"/>
-                </a:solidFill>
-              </a:rPr>
-              <a:t>4</a:t>
+              <a:t>Cache 4</a:t>
             </a:r>
             <a:endParaRPr kumimoji="1" lang="zh-CN" altLang="en-US" sz="2800" dirty="0">
               <a:solidFill>
@@ -7438,6 +7449,4037 @@
 </p:sld>
 </file>
 
+<file path=ppt/slides/slide4.xml><?xml version="1.0" encoding="utf-8"?>
+<p:sld xmlns:a="http://schemas.openxmlformats.org/drawingml/2006/main" xmlns:r="http://schemas.openxmlformats.org/officeDocument/2006/relationships" xmlns:p="http://schemas.openxmlformats.org/presentationml/2006/main">
+  <p:cSld>
+    <p:spTree>
+      <p:nvGrpSpPr>
+        <p:cNvPr id="1" name=""/>
+        <p:cNvGrpSpPr/>
+        <p:nvPr/>
+      </p:nvGrpSpPr>
+      <p:grpSpPr>
+        <a:xfrm>
+          <a:off x="0" y="0"/>
+          <a:ext cx="0" cy="0"/>
+          <a:chOff x="0" y="0"/>
+          <a:chExt cx="0" cy="0"/>
+        </a:xfrm>
+      </p:grpSpPr>
+      <p:sp>
+        <p:nvSpPr>
+          <p:cNvPr id="4" name="Rectangle 3"/>
+          <p:cNvSpPr/>
+          <p:nvPr/>
+        </p:nvSpPr>
+        <p:spPr>
+          <a:xfrm>
+            <a:off x="2051384" y="1544055"/>
+            <a:ext cx="1515979" cy="661737"/>
+          </a:xfrm>
+          <a:prstGeom prst="rect">
+            <a:avLst/>
+          </a:prstGeom>
+          <a:noFill/>
+          <a:ln w="25400">
+            <a:solidFill>
+              <a:schemeClr val="tx1"/>
+            </a:solidFill>
+          </a:ln>
+        </p:spPr>
+        <p:style>
+          <a:lnRef idx="2">
+            <a:schemeClr val="accent1">
+              <a:shade val="50000"/>
+            </a:schemeClr>
+          </a:lnRef>
+          <a:fillRef idx="1">
+            <a:schemeClr val="accent1"/>
+          </a:fillRef>
+          <a:effectRef idx="0">
+            <a:schemeClr val="accent1"/>
+          </a:effectRef>
+          <a:fontRef idx="minor">
+            <a:schemeClr val="lt1"/>
+          </a:fontRef>
+        </p:style>
+        <p:txBody>
+          <a:bodyPr rtlCol="0" anchor="ctr"/>
+          <a:lstStyle/>
+          <a:p>
+            <a:pPr algn="ctr"/>
+            <a:r>
+              <a:rPr kumimoji="1" lang="en-US" altLang="zh-CN" sz="2800" dirty="0" smtClean="0">
+                <a:solidFill>
+                  <a:schemeClr val="tx1"/>
+                </a:solidFill>
+              </a:rPr>
+              <a:t>Server</a:t>
+            </a:r>
+            <a:endParaRPr kumimoji="1" lang="zh-CN" altLang="en-US" sz="2800" dirty="0">
+              <a:solidFill>
+                <a:schemeClr val="tx1"/>
+              </a:solidFill>
+            </a:endParaRPr>
+          </a:p>
+        </p:txBody>
+      </p:sp>
+      <p:sp>
+        <p:nvSpPr>
+          <p:cNvPr id="5" name="Rectangle 4"/>
+          <p:cNvSpPr/>
+          <p:nvPr/>
+        </p:nvSpPr>
+        <p:spPr>
+          <a:xfrm>
+            <a:off x="796090" y="4231107"/>
+            <a:ext cx="1515979" cy="661737"/>
+          </a:xfrm>
+          <a:prstGeom prst="rect">
+            <a:avLst/>
+          </a:prstGeom>
+          <a:noFill/>
+          <a:ln w="25400">
+            <a:solidFill>
+              <a:schemeClr val="tx1"/>
+            </a:solidFill>
+          </a:ln>
+        </p:spPr>
+        <p:style>
+          <a:lnRef idx="2">
+            <a:schemeClr val="accent1">
+              <a:shade val="50000"/>
+            </a:schemeClr>
+          </a:lnRef>
+          <a:fillRef idx="1">
+            <a:schemeClr val="accent1"/>
+          </a:fillRef>
+          <a:effectRef idx="0">
+            <a:schemeClr val="accent1"/>
+          </a:effectRef>
+          <a:fontRef idx="minor">
+            <a:schemeClr val="lt1"/>
+          </a:fontRef>
+        </p:style>
+        <p:txBody>
+          <a:bodyPr rtlCol="0" anchor="ctr"/>
+          <a:lstStyle/>
+          <a:p>
+            <a:pPr algn="ctr"/>
+            <a:r>
+              <a:rPr kumimoji="1" lang="en-US" altLang="zh-CN" sz="2800" dirty="0" smtClean="0">
+                <a:solidFill>
+                  <a:schemeClr val="tx1"/>
+                </a:solidFill>
+              </a:rPr>
+              <a:t>Cache 1</a:t>
+            </a:r>
+            <a:endParaRPr kumimoji="1" lang="zh-CN" altLang="en-US" sz="2800" dirty="0">
+              <a:solidFill>
+                <a:schemeClr val="tx1"/>
+              </a:solidFill>
+            </a:endParaRPr>
+          </a:p>
+        </p:txBody>
+      </p:sp>
+      <p:sp>
+        <p:nvSpPr>
+          <p:cNvPr id="6" name="Rectangle 5"/>
+          <p:cNvSpPr/>
+          <p:nvPr/>
+        </p:nvSpPr>
+        <p:spPr>
+          <a:xfrm>
+            <a:off x="3306679" y="4231107"/>
+            <a:ext cx="1515979" cy="661737"/>
+          </a:xfrm>
+          <a:prstGeom prst="rect">
+            <a:avLst/>
+          </a:prstGeom>
+          <a:noFill/>
+          <a:ln w="25400">
+            <a:solidFill>
+              <a:schemeClr val="tx1"/>
+            </a:solidFill>
+          </a:ln>
+        </p:spPr>
+        <p:style>
+          <a:lnRef idx="2">
+            <a:schemeClr val="accent1">
+              <a:shade val="50000"/>
+            </a:schemeClr>
+          </a:lnRef>
+          <a:fillRef idx="1">
+            <a:schemeClr val="accent1"/>
+          </a:fillRef>
+          <a:effectRef idx="0">
+            <a:schemeClr val="accent1"/>
+          </a:effectRef>
+          <a:fontRef idx="minor">
+            <a:schemeClr val="lt1"/>
+          </a:fontRef>
+        </p:style>
+        <p:txBody>
+          <a:bodyPr rtlCol="0" anchor="ctr"/>
+          <a:lstStyle/>
+          <a:p>
+            <a:pPr algn="ctr"/>
+            <a:r>
+              <a:rPr kumimoji="1" lang="en-US" altLang="zh-CN" sz="2800" dirty="0" smtClean="0">
+                <a:solidFill>
+                  <a:schemeClr val="tx1"/>
+                </a:solidFill>
+              </a:rPr>
+              <a:t>Cache 2</a:t>
+            </a:r>
+            <a:endParaRPr kumimoji="1" lang="zh-CN" altLang="en-US" sz="2800" dirty="0">
+              <a:solidFill>
+                <a:schemeClr val="tx1"/>
+              </a:solidFill>
+            </a:endParaRPr>
+          </a:p>
+        </p:txBody>
+      </p:sp>
+      <p:cxnSp>
+        <p:nvCxnSpPr>
+          <p:cNvPr id="9" name="Straight Connector 8"/>
+          <p:cNvCxnSpPr/>
+          <p:nvPr/>
+        </p:nvCxnSpPr>
+        <p:spPr>
+          <a:xfrm flipH="1">
+            <a:off x="2809373" y="2205792"/>
+            <a:ext cx="3" cy="1012656"/>
+          </a:xfrm>
+          <a:prstGeom prst="line">
+            <a:avLst/>
+          </a:prstGeom>
+          <a:ln w="101600">
+            <a:solidFill>
+              <a:schemeClr val="tx1"/>
+            </a:solidFill>
+          </a:ln>
+        </p:spPr>
+        <p:style>
+          <a:lnRef idx="1">
+            <a:schemeClr val="accent1"/>
+          </a:lnRef>
+          <a:fillRef idx="0">
+            <a:schemeClr val="accent1"/>
+          </a:fillRef>
+          <a:effectRef idx="0">
+            <a:schemeClr val="accent1"/>
+          </a:effectRef>
+          <a:fontRef idx="minor">
+            <a:schemeClr val="tx1"/>
+          </a:fontRef>
+        </p:style>
+      </p:cxnSp>
+      <p:cxnSp>
+        <p:nvCxnSpPr>
+          <p:cNvPr id="11" name="Elbow Connector 10"/>
+          <p:cNvCxnSpPr>
+            <a:stCxn id="4" idx="2"/>
+          </p:cNvCxnSpPr>
+          <p:nvPr/>
+        </p:nvCxnSpPr>
+        <p:spPr>
+          <a:xfrm rot="16200000" flipH="1">
+            <a:off x="2424364" y="2590801"/>
+            <a:ext cx="2025315" cy="1255295"/>
+          </a:xfrm>
+          <a:prstGeom prst="bentConnector3">
+            <a:avLst>
+              <a:gd name="adj1" fmla="val 50000"/>
+            </a:avLst>
+          </a:prstGeom>
+          <a:ln w="25400">
+            <a:solidFill>
+              <a:schemeClr val="tx1"/>
+            </a:solidFill>
+            <a:tailEnd type="triangle"/>
+          </a:ln>
+        </p:spPr>
+        <p:style>
+          <a:lnRef idx="1">
+            <a:schemeClr val="accent1"/>
+          </a:lnRef>
+          <a:fillRef idx="0">
+            <a:schemeClr val="accent1"/>
+          </a:fillRef>
+          <a:effectRef idx="0">
+            <a:schemeClr val="accent1"/>
+          </a:effectRef>
+          <a:fontRef idx="minor">
+            <a:schemeClr val="tx1"/>
+          </a:fontRef>
+        </p:style>
+      </p:cxnSp>
+      <p:cxnSp>
+        <p:nvCxnSpPr>
+          <p:cNvPr id="13" name="Elbow Connector 12"/>
+          <p:cNvCxnSpPr>
+            <a:stCxn id="4" idx="2"/>
+          </p:cNvCxnSpPr>
+          <p:nvPr/>
+        </p:nvCxnSpPr>
+        <p:spPr>
+          <a:xfrm rot="5400000">
+            <a:off x="1169071" y="2590803"/>
+            <a:ext cx="2025315" cy="1255292"/>
+          </a:xfrm>
+          <a:prstGeom prst="bentConnector3">
+            <a:avLst>
+              <a:gd name="adj1" fmla="val 50000"/>
+            </a:avLst>
+          </a:prstGeom>
+          <a:ln w="25400">
+            <a:solidFill>
+              <a:schemeClr val="tx1"/>
+            </a:solidFill>
+            <a:tailEnd type="triangle"/>
+          </a:ln>
+        </p:spPr>
+        <p:style>
+          <a:lnRef idx="1">
+            <a:schemeClr val="accent1"/>
+          </a:lnRef>
+          <a:fillRef idx="0">
+            <a:schemeClr val="accent1"/>
+          </a:fillRef>
+          <a:effectRef idx="0">
+            <a:schemeClr val="accent1"/>
+          </a:effectRef>
+          <a:fontRef idx="minor">
+            <a:schemeClr val="tx1"/>
+          </a:fontRef>
+        </p:style>
+      </p:cxnSp>
+    </p:spTree>
+    <p:extLst>
+      <p:ext uri="{BB962C8B-B14F-4D97-AF65-F5344CB8AC3E}">
+        <p14:creationId xmlns:p14="http://schemas.microsoft.com/office/powerpoint/2010/main" val="294777747"/>
+      </p:ext>
+    </p:extLst>
+  </p:cSld>
+  <p:clrMapOvr>
+    <a:masterClrMapping/>
+  </p:clrMapOvr>
+</p:sld>
+</file>
+
+<file path=ppt/slides/slide5.xml><?xml version="1.0" encoding="utf-8"?>
+<p:sld xmlns:a="http://schemas.openxmlformats.org/drawingml/2006/main" xmlns:r="http://schemas.openxmlformats.org/officeDocument/2006/relationships" xmlns:p="http://schemas.openxmlformats.org/presentationml/2006/main">
+  <p:cSld>
+    <p:spTree>
+      <p:nvGrpSpPr>
+        <p:cNvPr id="1" name=""/>
+        <p:cNvGrpSpPr/>
+        <p:nvPr/>
+      </p:nvGrpSpPr>
+      <p:grpSpPr>
+        <a:xfrm>
+          <a:off x="0" y="0"/>
+          <a:ext cx="0" cy="0"/>
+          <a:chOff x="0" y="0"/>
+          <a:chExt cx="0" cy="0"/>
+        </a:xfrm>
+      </p:grpSpPr>
+      <p:grpSp>
+        <p:nvGrpSpPr>
+          <p:cNvPr id="47" name="Group 46"/>
+          <p:cNvGrpSpPr/>
+          <p:nvPr/>
+        </p:nvGrpSpPr>
+        <p:grpSpPr>
+          <a:xfrm>
+            <a:off x="-3587646" y="-417605"/>
+            <a:ext cx="3254541" cy="3198900"/>
+            <a:chOff x="506" y="156905"/>
+            <a:chExt cx="3254541" cy="3198900"/>
+          </a:xfrm>
+        </p:grpSpPr>
+        <p:sp>
+          <p:nvSpPr>
+            <p:cNvPr id="4" name="Rectangle 3"/>
+            <p:cNvSpPr/>
+            <p:nvPr/>
+          </p:nvSpPr>
+          <p:spPr>
+            <a:xfrm>
+              <a:off x="1110419" y="156905"/>
+              <a:ext cx="1143000" cy="409073"/>
+            </a:xfrm>
+            <a:prstGeom prst="rect">
+              <a:avLst/>
+            </a:prstGeom>
+            <a:noFill/>
+            <a:ln w="25400">
+              <a:solidFill>
+                <a:schemeClr val="tx1"/>
+              </a:solidFill>
+            </a:ln>
+          </p:spPr>
+          <p:style>
+            <a:lnRef idx="2">
+              <a:schemeClr val="accent1">
+                <a:shade val="50000"/>
+              </a:schemeClr>
+            </a:lnRef>
+            <a:fillRef idx="1">
+              <a:schemeClr val="accent1"/>
+            </a:fillRef>
+            <a:effectRef idx="0">
+              <a:schemeClr val="accent1"/>
+            </a:effectRef>
+            <a:fontRef idx="minor">
+              <a:schemeClr val="lt1"/>
+            </a:fontRef>
+          </p:style>
+          <p:txBody>
+            <a:bodyPr rtlCol="0" anchor="ctr"/>
+            <a:lstStyle/>
+            <a:p>
+              <a:pPr algn="ctr"/>
+              <a:r>
+                <a:rPr kumimoji="1" lang="en-US" altLang="zh-CN" sz="2000" dirty="0" smtClean="0">
+                  <a:solidFill>
+                    <a:schemeClr val="tx1"/>
+                  </a:solidFill>
+                </a:rPr>
+                <a:t>A, B</a:t>
+              </a:r>
+              <a:endParaRPr kumimoji="1" lang="zh-CN" altLang="en-US" sz="2000" dirty="0" smtClean="0">
+                <a:solidFill>
+                  <a:schemeClr val="tx1"/>
+                </a:solidFill>
+              </a:endParaRPr>
+            </a:p>
+          </p:txBody>
+        </p:sp>
+        <p:sp>
+          <p:nvSpPr>
+            <p:cNvPr id="5" name="Rectangle 4"/>
+            <p:cNvSpPr/>
+            <p:nvPr/>
+          </p:nvSpPr>
+          <p:spPr>
+            <a:xfrm>
+              <a:off x="2112047" y="772772"/>
+              <a:ext cx="1143000" cy="409073"/>
+            </a:xfrm>
+            <a:prstGeom prst="rect">
+              <a:avLst/>
+            </a:prstGeom>
+            <a:noFill/>
+            <a:ln w="25400">
+              <a:solidFill>
+                <a:srgbClr val="00B0F0"/>
+              </a:solidFill>
+            </a:ln>
+          </p:spPr>
+          <p:style>
+            <a:lnRef idx="2">
+              <a:schemeClr val="accent1">
+                <a:shade val="50000"/>
+              </a:schemeClr>
+            </a:lnRef>
+            <a:fillRef idx="1">
+              <a:schemeClr val="accent1"/>
+            </a:fillRef>
+            <a:effectRef idx="0">
+              <a:schemeClr val="accent1"/>
+            </a:effectRef>
+            <a:fontRef idx="minor">
+              <a:schemeClr val="lt1"/>
+            </a:fontRef>
+          </p:style>
+          <p:txBody>
+            <a:bodyPr rtlCol="0" anchor="ctr"/>
+            <a:lstStyle/>
+            <a:p>
+              <a:pPr algn="ctr"/>
+              <a:endParaRPr kumimoji="1" lang="zh-CN" altLang="en-US" sz="2000" dirty="0" smtClean="0">
+                <a:solidFill>
+                  <a:schemeClr val="tx1"/>
+                </a:solidFill>
+              </a:endParaRPr>
+            </a:p>
+          </p:txBody>
+        </p:sp>
+        <p:grpSp>
+          <p:nvGrpSpPr>
+            <p:cNvPr id="18" name="Group 17"/>
+            <p:cNvGrpSpPr/>
+            <p:nvPr/>
+          </p:nvGrpSpPr>
+          <p:grpSpPr>
+            <a:xfrm>
+              <a:off x="506" y="2206787"/>
+              <a:ext cx="1143000" cy="1149018"/>
+              <a:chOff x="866275" y="2781297"/>
+              <a:chExt cx="1143000" cy="1149018"/>
+            </a:xfrm>
+          </p:grpSpPr>
+          <p:sp>
+            <p:nvSpPr>
+              <p:cNvPr id="6" name="Rectangle 5"/>
+              <p:cNvSpPr/>
+              <p:nvPr/>
+            </p:nvSpPr>
+            <p:spPr>
+              <a:xfrm>
+                <a:off x="866275" y="3521242"/>
+                <a:ext cx="1143000" cy="409073"/>
+              </a:xfrm>
+              <a:prstGeom prst="rect">
+                <a:avLst/>
+              </a:prstGeom>
+              <a:noFill/>
+              <a:ln w="25400">
+                <a:solidFill>
+                  <a:schemeClr val="tx1"/>
+                </a:solidFill>
+              </a:ln>
+            </p:spPr>
+            <p:style>
+              <a:lnRef idx="2">
+                <a:schemeClr val="accent1">
+                  <a:shade val="50000"/>
+                </a:schemeClr>
+              </a:lnRef>
+              <a:fillRef idx="1">
+                <a:schemeClr val="accent1"/>
+              </a:fillRef>
+              <a:effectRef idx="0">
+                <a:schemeClr val="accent1"/>
+              </a:effectRef>
+              <a:fontRef idx="minor">
+                <a:schemeClr val="lt1"/>
+              </a:fontRef>
+            </p:style>
+            <p:txBody>
+              <a:bodyPr rtlCol="0" anchor="ctr"/>
+              <a:lstStyle/>
+              <a:p>
+                <a:pPr algn="ctr"/>
+                <a:endParaRPr kumimoji="1" lang="zh-CN" altLang="en-US" sz="2000" dirty="0" smtClean="0">
+                  <a:solidFill>
+                    <a:schemeClr val="tx1"/>
+                  </a:solidFill>
+                </a:endParaRPr>
+              </a:p>
+            </p:txBody>
+          </p:sp>
+          <p:sp>
+            <p:nvSpPr>
+              <p:cNvPr id="9" name="Rectangle 8"/>
+              <p:cNvSpPr/>
+              <p:nvPr/>
+            </p:nvSpPr>
+            <p:spPr>
+              <a:xfrm>
+                <a:off x="1082844" y="2781297"/>
+                <a:ext cx="709863" cy="709863"/>
+              </a:xfrm>
+              <a:prstGeom prst="rect">
+                <a:avLst/>
+              </a:prstGeom>
+              <a:noFill/>
+              <a:ln w="25400">
+                <a:solidFill>
+                  <a:srgbClr val="FF0000"/>
+                </a:solidFill>
+              </a:ln>
+            </p:spPr>
+            <p:style>
+              <a:lnRef idx="2">
+                <a:schemeClr val="accent1">
+                  <a:shade val="50000"/>
+                </a:schemeClr>
+              </a:lnRef>
+              <a:fillRef idx="1">
+                <a:schemeClr val="accent1"/>
+              </a:fillRef>
+              <a:effectRef idx="0">
+                <a:schemeClr val="accent1"/>
+              </a:effectRef>
+              <a:fontRef idx="minor">
+                <a:schemeClr val="lt1"/>
+              </a:fontRef>
+            </p:style>
+            <p:txBody>
+              <a:bodyPr rtlCol="0" anchor="ctr"/>
+              <a:lstStyle/>
+              <a:p>
+                <a:pPr algn="ctr"/>
+                <a:endParaRPr kumimoji="1" lang="zh-CN" altLang="en-US" sz="2000" dirty="0" smtClean="0">
+                  <a:solidFill>
+                    <a:schemeClr val="tx1"/>
+                  </a:solidFill>
+                </a:endParaRPr>
+              </a:p>
+            </p:txBody>
+          </p:sp>
+        </p:grpSp>
+        <p:grpSp>
+          <p:nvGrpSpPr>
+            <p:cNvPr id="19" name="Group 18"/>
+            <p:cNvGrpSpPr/>
+            <p:nvPr/>
+          </p:nvGrpSpPr>
+          <p:grpSpPr>
+            <a:xfrm>
+              <a:off x="2112047" y="2206787"/>
+              <a:ext cx="1143000" cy="1149018"/>
+              <a:chOff x="2977816" y="2781297"/>
+              <a:chExt cx="1143000" cy="1149018"/>
+            </a:xfrm>
+          </p:grpSpPr>
+          <p:sp>
+            <p:nvSpPr>
+              <p:cNvPr id="10" name="Rectangle 9"/>
+              <p:cNvSpPr/>
+              <p:nvPr/>
+            </p:nvSpPr>
+            <p:spPr>
+              <a:xfrm>
+                <a:off x="2977816" y="3521242"/>
+                <a:ext cx="1143000" cy="409073"/>
+              </a:xfrm>
+              <a:prstGeom prst="rect">
+                <a:avLst/>
+              </a:prstGeom>
+              <a:noFill/>
+              <a:ln w="25400">
+                <a:solidFill>
+                  <a:schemeClr val="tx1"/>
+                </a:solidFill>
+              </a:ln>
+            </p:spPr>
+            <p:style>
+              <a:lnRef idx="2">
+                <a:schemeClr val="accent1">
+                  <a:shade val="50000"/>
+                </a:schemeClr>
+              </a:lnRef>
+              <a:fillRef idx="1">
+                <a:schemeClr val="accent1"/>
+              </a:fillRef>
+              <a:effectRef idx="0">
+                <a:schemeClr val="accent1"/>
+              </a:effectRef>
+              <a:fontRef idx="minor">
+                <a:schemeClr val="lt1"/>
+              </a:fontRef>
+            </p:style>
+            <p:txBody>
+              <a:bodyPr rtlCol="0" anchor="ctr"/>
+              <a:lstStyle/>
+              <a:p>
+                <a:pPr algn="ctr"/>
+                <a:endParaRPr kumimoji="1" lang="zh-CN" altLang="en-US" sz="2000" dirty="0" smtClean="0">
+                  <a:solidFill>
+                    <a:schemeClr val="tx1"/>
+                  </a:solidFill>
+                </a:endParaRPr>
+              </a:p>
+            </p:txBody>
+          </p:sp>
+          <p:sp>
+            <p:nvSpPr>
+              <p:cNvPr id="11" name="Rectangle 10"/>
+              <p:cNvSpPr/>
+              <p:nvPr/>
+            </p:nvSpPr>
+            <p:spPr>
+              <a:xfrm>
+                <a:off x="3194385" y="2781297"/>
+                <a:ext cx="709863" cy="709863"/>
+              </a:xfrm>
+              <a:prstGeom prst="rect">
+                <a:avLst/>
+              </a:prstGeom>
+              <a:noFill/>
+              <a:ln w="25400">
+                <a:solidFill>
+                  <a:srgbClr val="FF0000"/>
+                </a:solidFill>
+              </a:ln>
+            </p:spPr>
+            <p:style>
+              <a:lnRef idx="2">
+                <a:schemeClr val="accent1">
+                  <a:shade val="50000"/>
+                </a:schemeClr>
+              </a:lnRef>
+              <a:fillRef idx="1">
+                <a:schemeClr val="accent1"/>
+              </a:fillRef>
+              <a:effectRef idx="0">
+                <a:schemeClr val="accent1"/>
+              </a:effectRef>
+              <a:fontRef idx="minor">
+                <a:schemeClr val="lt1"/>
+              </a:fontRef>
+            </p:style>
+            <p:txBody>
+              <a:bodyPr rtlCol="0" anchor="ctr"/>
+              <a:lstStyle/>
+              <a:p>
+                <a:pPr algn="ctr"/>
+                <a:endParaRPr kumimoji="1" lang="zh-CN" altLang="en-US" sz="2000" dirty="0" smtClean="0">
+                  <a:solidFill>
+                    <a:schemeClr val="tx1"/>
+                  </a:solidFill>
+                </a:endParaRPr>
+              </a:p>
+            </p:txBody>
+          </p:sp>
+        </p:grpSp>
+        <p:cxnSp>
+          <p:nvCxnSpPr>
+            <p:cNvPr id="22" name="Elbow Connector 21"/>
+            <p:cNvCxnSpPr>
+              <a:stCxn id="4" idx="2"/>
+              <a:endCxn id="9" idx="0"/>
+            </p:cNvCxnSpPr>
+            <p:nvPr/>
+          </p:nvCxnSpPr>
+          <p:spPr>
+            <a:xfrm rot="5400000">
+              <a:off x="306559" y="831426"/>
+              <a:ext cx="1640809" cy="1109912"/>
+            </a:xfrm>
+            <a:prstGeom prst="bentConnector3">
+              <a:avLst/>
+            </a:prstGeom>
+            <a:ln w="25400">
+              <a:solidFill>
+                <a:schemeClr val="tx1"/>
+              </a:solidFill>
+              <a:tailEnd type="triangle"/>
+            </a:ln>
+          </p:spPr>
+          <p:style>
+            <a:lnRef idx="1">
+              <a:schemeClr val="accent1"/>
+            </a:lnRef>
+            <a:fillRef idx="0">
+              <a:schemeClr val="accent1"/>
+            </a:fillRef>
+            <a:effectRef idx="0">
+              <a:schemeClr val="accent1"/>
+            </a:effectRef>
+            <a:fontRef idx="minor">
+              <a:schemeClr val="tx1"/>
+            </a:fontRef>
+          </p:style>
+        </p:cxnSp>
+        <p:cxnSp>
+          <p:nvCxnSpPr>
+            <p:cNvPr id="24" name="Elbow Connector 23"/>
+            <p:cNvCxnSpPr>
+              <a:stCxn id="4" idx="2"/>
+              <a:endCxn id="11" idx="0"/>
+            </p:cNvCxnSpPr>
+            <p:nvPr/>
+          </p:nvCxnSpPr>
+          <p:spPr>
+            <a:xfrm rot="16200000" flipH="1">
+              <a:off x="1362329" y="885567"/>
+              <a:ext cx="1640809" cy="1001629"/>
+            </a:xfrm>
+            <a:prstGeom prst="bentConnector3">
+              <a:avLst/>
+            </a:prstGeom>
+            <a:ln w="25400">
+              <a:solidFill>
+                <a:schemeClr val="tx1"/>
+              </a:solidFill>
+              <a:tailEnd type="triangle"/>
+            </a:ln>
+          </p:spPr>
+          <p:style>
+            <a:lnRef idx="1">
+              <a:schemeClr val="accent1"/>
+            </a:lnRef>
+            <a:fillRef idx="0">
+              <a:schemeClr val="accent1"/>
+            </a:fillRef>
+            <a:effectRef idx="0">
+              <a:schemeClr val="accent1"/>
+            </a:effectRef>
+            <a:fontRef idx="minor">
+              <a:schemeClr val="tx1"/>
+            </a:fontRef>
+          </p:style>
+        </p:cxnSp>
+      </p:grpSp>
+      <p:grpSp>
+        <p:nvGrpSpPr>
+          <p:cNvPr id="48" name="Group 47"/>
+          <p:cNvGrpSpPr/>
+          <p:nvPr/>
+        </p:nvGrpSpPr>
+        <p:grpSpPr>
+          <a:xfrm>
+            <a:off x="224977" y="-377574"/>
+            <a:ext cx="3254541" cy="3198900"/>
+            <a:chOff x="4440157" y="156905"/>
+            <a:chExt cx="3254541" cy="3198900"/>
+          </a:xfrm>
+        </p:grpSpPr>
+        <p:sp>
+          <p:nvSpPr>
+            <p:cNvPr id="27" name="Rectangle 26"/>
+            <p:cNvSpPr/>
+            <p:nvPr/>
+          </p:nvSpPr>
+          <p:spPr>
+            <a:xfrm>
+              <a:off x="5550070" y="156905"/>
+              <a:ext cx="1143000" cy="409073"/>
+            </a:xfrm>
+            <a:prstGeom prst="rect">
+              <a:avLst/>
+            </a:prstGeom>
+            <a:noFill/>
+            <a:ln w="25400">
+              <a:solidFill>
+                <a:schemeClr val="tx1"/>
+              </a:solidFill>
+            </a:ln>
+          </p:spPr>
+          <p:style>
+            <a:lnRef idx="2">
+              <a:schemeClr val="accent1">
+                <a:shade val="50000"/>
+              </a:schemeClr>
+            </a:lnRef>
+            <a:fillRef idx="1">
+              <a:schemeClr val="accent1"/>
+            </a:fillRef>
+            <a:effectRef idx="0">
+              <a:schemeClr val="accent1"/>
+            </a:effectRef>
+            <a:fontRef idx="minor">
+              <a:schemeClr val="lt1"/>
+            </a:fontRef>
+          </p:style>
+          <p:txBody>
+            <a:bodyPr rtlCol="0" anchor="ctr"/>
+            <a:lstStyle/>
+            <a:p>
+              <a:pPr algn="ctr"/>
+              <a:r>
+                <a:rPr kumimoji="1" lang="en-US" altLang="zh-CN" sz="2000" dirty="0" smtClean="0">
+                  <a:solidFill>
+                    <a:schemeClr val="tx1"/>
+                  </a:solidFill>
+                </a:rPr>
+                <a:t>A, B</a:t>
+              </a:r>
+              <a:endParaRPr kumimoji="1" lang="zh-CN" altLang="en-US" sz="2000" dirty="0" smtClean="0">
+                <a:solidFill>
+                  <a:schemeClr val="tx1"/>
+                </a:solidFill>
+              </a:endParaRPr>
+            </a:p>
+          </p:txBody>
+        </p:sp>
+        <p:sp>
+          <p:nvSpPr>
+            <p:cNvPr id="28" name="Rectangle 27"/>
+            <p:cNvSpPr/>
+            <p:nvPr/>
+          </p:nvSpPr>
+          <p:spPr>
+            <a:xfrm>
+              <a:off x="6551698" y="772772"/>
+              <a:ext cx="1143000" cy="409073"/>
+            </a:xfrm>
+            <a:prstGeom prst="rect">
+              <a:avLst/>
+            </a:prstGeom>
+            <a:noFill/>
+            <a:ln w="25400">
+              <a:solidFill>
+                <a:srgbClr val="00B0F0"/>
+              </a:solidFill>
+            </a:ln>
+          </p:spPr>
+          <p:style>
+            <a:lnRef idx="2">
+              <a:schemeClr val="accent1">
+                <a:shade val="50000"/>
+              </a:schemeClr>
+            </a:lnRef>
+            <a:fillRef idx="1">
+              <a:schemeClr val="accent1"/>
+            </a:fillRef>
+            <a:effectRef idx="0">
+              <a:schemeClr val="accent1"/>
+            </a:effectRef>
+            <a:fontRef idx="minor">
+              <a:schemeClr val="lt1"/>
+            </a:fontRef>
+          </p:style>
+          <p:txBody>
+            <a:bodyPr rtlCol="0" anchor="ctr"/>
+            <a:lstStyle/>
+            <a:p>
+              <a:pPr algn="ctr"/>
+              <a:r>
+                <a:rPr kumimoji="1" lang="en-US" altLang="zh-CN" sz="2000" dirty="0">
+                  <a:solidFill>
+                    <a:schemeClr val="tx1"/>
+                  </a:solidFill>
+                </a:rPr>
+                <a:t>B</a:t>
+              </a:r>
+              <a:endParaRPr kumimoji="1" lang="zh-CN" altLang="en-US" sz="2000" dirty="0" smtClean="0">
+                <a:solidFill>
+                  <a:schemeClr val="tx1"/>
+                </a:solidFill>
+              </a:endParaRPr>
+            </a:p>
+          </p:txBody>
+        </p:sp>
+        <p:grpSp>
+          <p:nvGrpSpPr>
+            <p:cNvPr id="29" name="Group 28"/>
+            <p:cNvGrpSpPr/>
+            <p:nvPr/>
+          </p:nvGrpSpPr>
+          <p:grpSpPr>
+            <a:xfrm>
+              <a:off x="4440157" y="2206787"/>
+              <a:ext cx="1143000" cy="1149018"/>
+              <a:chOff x="866275" y="2781297"/>
+              <a:chExt cx="1143000" cy="1149018"/>
+            </a:xfrm>
+          </p:grpSpPr>
+          <p:sp>
+            <p:nvSpPr>
+              <p:cNvPr id="30" name="Rectangle 29"/>
+              <p:cNvSpPr/>
+              <p:nvPr/>
+            </p:nvSpPr>
+            <p:spPr>
+              <a:xfrm>
+                <a:off x="866275" y="3521242"/>
+                <a:ext cx="1143000" cy="409073"/>
+              </a:xfrm>
+              <a:prstGeom prst="rect">
+                <a:avLst/>
+              </a:prstGeom>
+              <a:noFill/>
+              <a:ln w="25400">
+                <a:solidFill>
+                  <a:schemeClr val="tx1"/>
+                </a:solidFill>
+              </a:ln>
+            </p:spPr>
+            <p:style>
+              <a:lnRef idx="2">
+                <a:schemeClr val="accent1">
+                  <a:shade val="50000"/>
+                </a:schemeClr>
+              </a:lnRef>
+              <a:fillRef idx="1">
+                <a:schemeClr val="accent1"/>
+              </a:fillRef>
+              <a:effectRef idx="0">
+                <a:schemeClr val="accent1"/>
+              </a:effectRef>
+              <a:fontRef idx="minor">
+                <a:schemeClr val="lt1"/>
+              </a:fontRef>
+            </p:style>
+            <p:txBody>
+              <a:bodyPr rtlCol="0" anchor="ctr"/>
+              <a:lstStyle/>
+              <a:p>
+                <a:pPr algn="ctr"/>
+                <a:endParaRPr kumimoji="1" lang="zh-CN" altLang="en-US" sz="2000" dirty="0" smtClean="0">
+                  <a:solidFill>
+                    <a:schemeClr val="tx1"/>
+                  </a:solidFill>
+                </a:endParaRPr>
+              </a:p>
+            </p:txBody>
+          </p:sp>
+          <p:sp>
+            <p:nvSpPr>
+              <p:cNvPr id="31" name="Rectangle 30"/>
+              <p:cNvSpPr/>
+              <p:nvPr/>
+            </p:nvSpPr>
+            <p:spPr>
+              <a:xfrm>
+                <a:off x="1082844" y="2781297"/>
+                <a:ext cx="709863" cy="709863"/>
+              </a:xfrm>
+              <a:prstGeom prst="rect">
+                <a:avLst/>
+              </a:prstGeom>
+              <a:noFill/>
+              <a:ln w="25400">
+                <a:solidFill>
+                  <a:srgbClr val="FF0000"/>
+                </a:solidFill>
+              </a:ln>
+            </p:spPr>
+            <p:style>
+              <a:lnRef idx="2">
+                <a:schemeClr val="accent1">
+                  <a:shade val="50000"/>
+                </a:schemeClr>
+              </a:lnRef>
+              <a:fillRef idx="1">
+                <a:schemeClr val="accent1"/>
+              </a:fillRef>
+              <a:effectRef idx="0">
+                <a:schemeClr val="accent1"/>
+              </a:effectRef>
+              <a:fontRef idx="minor">
+                <a:schemeClr val="lt1"/>
+              </a:fontRef>
+            </p:style>
+            <p:txBody>
+              <a:bodyPr rtlCol="0" anchor="ctr"/>
+              <a:lstStyle/>
+              <a:p>
+                <a:pPr algn="ctr"/>
+                <a:r>
+                  <a:rPr kumimoji="1" lang="en-US" altLang="zh-CN" sz="2000" dirty="0" err="1" smtClean="0">
+                    <a:solidFill>
+                      <a:schemeClr val="tx1"/>
+                    </a:solidFill>
+                  </a:rPr>
+                  <a:t>φ</a:t>
+                </a:r>
+                <a:endParaRPr kumimoji="1" lang="zh-CN" altLang="en-US" sz="2000" dirty="0" smtClean="0">
+                  <a:solidFill>
+                    <a:schemeClr val="tx1"/>
+                  </a:solidFill>
+                </a:endParaRPr>
+              </a:p>
+            </p:txBody>
+          </p:sp>
+        </p:grpSp>
+        <p:grpSp>
+          <p:nvGrpSpPr>
+            <p:cNvPr id="32" name="Group 31"/>
+            <p:cNvGrpSpPr/>
+            <p:nvPr/>
+          </p:nvGrpSpPr>
+          <p:grpSpPr>
+            <a:xfrm>
+              <a:off x="6551698" y="2206787"/>
+              <a:ext cx="1143000" cy="1149018"/>
+              <a:chOff x="2977816" y="2781297"/>
+              <a:chExt cx="1143000" cy="1149018"/>
+            </a:xfrm>
+          </p:grpSpPr>
+          <p:sp>
+            <p:nvSpPr>
+              <p:cNvPr id="33" name="Rectangle 32"/>
+              <p:cNvSpPr/>
+              <p:nvPr/>
+            </p:nvSpPr>
+            <p:spPr>
+              <a:xfrm>
+                <a:off x="2977816" y="3521242"/>
+                <a:ext cx="1143000" cy="409073"/>
+              </a:xfrm>
+              <a:prstGeom prst="rect">
+                <a:avLst/>
+              </a:prstGeom>
+              <a:noFill/>
+              <a:ln w="25400">
+                <a:solidFill>
+                  <a:schemeClr val="tx1"/>
+                </a:solidFill>
+              </a:ln>
+            </p:spPr>
+            <p:style>
+              <a:lnRef idx="2">
+                <a:schemeClr val="accent1">
+                  <a:shade val="50000"/>
+                </a:schemeClr>
+              </a:lnRef>
+              <a:fillRef idx="1">
+                <a:schemeClr val="accent1"/>
+              </a:fillRef>
+              <a:effectRef idx="0">
+                <a:schemeClr val="accent1"/>
+              </a:effectRef>
+              <a:fontRef idx="minor">
+                <a:schemeClr val="lt1"/>
+              </a:fontRef>
+            </p:style>
+            <p:txBody>
+              <a:bodyPr rtlCol="0" anchor="ctr"/>
+              <a:lstStyle/>
+              <a:p>
+                <a:pPr algn="ctr"/>
+                <a:endParaRPr kumimoji="1" lang="zh-CN" altLang="en-US" sz="2000" dirty="0" smtClean="0">
+                  <a:solidFill>
+                    <a:schemeClr val="tx1"/>
+                  </a:solidFill>
+                </a:endParaRPr>
+              </a:p>
+            </p:txBody>
+          </p:sp>
+          <p:sp>
+            <p:nvSpPr>
+              <p:cNvPr id="34" name="Rectangle 33"/>
+              <p:cNvSpPr/>
+              <p:nvPr/>
+            </p:nvSpPr>
+            <p:spPr>
+              <a:xfrm>
+                <a:off x="3194385" y="2781297"/>
+                <a:ext cx="709863" cy="709863"/>
+              </a:xfrm>
+              <a:prstGeom prst="rect">
+                <a:avLst/>
+              </a:prstGeom>
+              <a:noFill/>
+              <a:ln w="25400">
+                <a:solidFill>
+                  <a:srgbClr val="FF0000"/>
+                </a:solidFill>
+              </a:ln>
+            </p:spPr>
+            <p:style>
+              <a:lnRef idx="2">
+                <a:schemeClr val="accent1">
+                  <a:shade val="50000"/>
+                </a:schemeClr>
+              </a:lnRef>
+              <a:fillRef idx="1">
+                <a:schemeClr val="accent1"/>
+              </a:fillRef>
+              <a:effectRef idx="0">
+                <a:schemeClr val="accent1"/>
+              </a:effectRef>
+              <a:fontRef idx="minor">
+                <a:schemeClr val="lt1"/>
+              </a:fontRef>
+            </p:style>
+            <p:txBody>
+              <a:bodyPr rtlCol="0" anchor="ctr"/>
+              <a:lstStyle/>
+              <a:p>
+                <a:pPr algn="ctr"/>
+                <a:r>
+                  <a:rPr kumimoji="1" lang="en-US" altLang="zh-CN" sz="2000" dirty="0" smtClean="0">
+                    <a:solidFill>
+                      <a:schemeClr val="tx1"/>
+                    </a:solidFill>
+                  </a:rPr>
+                  <a:t>B</a:t>
+                </a:r>
+                <a:endParaRPr kumimoji="1" lang="zh-CN" altLang="en-US" sz="2000" dirty="0" smtClean="0">
+                  <a:solidFill>
+                    <a:schemeClr val="tx1"/>
+                  </a:solidFill>
+                </a:endParaRPr>
+              </a:p>
+            </p:txBody>
+          </p:sp>
+        </p:grpSp>
+        <p:cxnSp>
+          <p:nvCxnSpPr>
+            <p:cNvPr id="35" name="Elbow Connector 34"/>
+            <p:cNvCxnSpPr>
+              <a:endCxn id="34" idx="0"/>
+            </p:cNvCxnSpPr>
+            <p:nvPr/>
+          </p:nvCxnSpPr>
+          <p:spPr>
+            <a:xfrm rot="5400000">
+              <a:off x="4746210" y="831426"/>
+              <a:ext cx="1640809" cy="1109912"/>
+            </a:xfrm>
+            <a:prstGeom prst="bentConnector3">
+              <a:avLst/>
+            </a:prstGeom>
+            <a:ln w="25400">
+              <a:solidFill>
+                <a:schemeClr val="tx1"/>
+              </a:solidFill>
+              <a:tailEnd type="triangle"/>
+            </a:ln>
+          </p:spPr>
+          <p:style>
+            <a:lnRef idx="1">
+              <a:schemeClr val="accent1"/>
+            </a:lnRef>
+            <a:fillRef idx="0">
+              <a:schemeClr val="accent1"/>
+            </a:fillRef>
+            <a:effectRef idx="0">
+              <a:schemeClr val="accent1"/>
+            </a:effectRef>
+            <a:fontRef idx="minor">
+              <a:schemeClr val="tx1"/>
+            </a:fontRef>
+          </p:style>
+        </p:cxnSp>
+        <p:cxnSp>
+          <p:nvCxnSpPr>
+            <p:cNvPr id="36" name="Elbow Connector 35"/>
+            <p:cNvCxnSpPr>
+              <a:endCxn id="36" idx="0"/>
+            </p:cNvCxnSpPr>
+            <p:nvPr/>
+          </p:nvCxnSpPr>
+          <p:spPr>
+            <a:xfrm rot="16200000" flipH="1">
+              <a:off x="5801980" y="885567"/>
+              <a:ext cx="1640809" cy="1001629"/>
+            </a:xfrm>
+            <a:prstGeom prst="bentConnector3">
+              <a:avLst/>
+            </a:prstGeom>
+            <a:ln w="25400">
+              <a:solidFill>
+                <a:schemeClr val="tx1"/>
+              </a:solidFill>
+              <a:tailEnd type="triangle"/>
+            </a:ln>
+          </p:spPr>
+          <p:style>
+            <a:lnRef idx="1">
+              <a:schemeClr val="accent1"/>
+            </a:lnRef>
+            <a:fillRef idx="0">
+              <a:schemeClr val="accent1"/>
+            </a:fillRef>
+            <a:effectRef idx="0">
+              <a:schemeClr val="accent1"/>
+            </a:effectRef>
+            <a:fontRef idx="minor">
+              <a:schemeClr val="tx1"/>
+            </a:fontRef>
+          </p:style>
+        </p:cxnSp>
+      </p:grpSp>
+      <p:grpSp>
+        <p:nvGrpSpPr>
+          <p:cNvPr id="49" name="Group 48"/>
+          <p:cNvGrpSpPr/>
+          <p:nvPr/>
+        </p:nvGrpSpPr>
+        <p:grpSpPr>
+          <a:xfrm>
+            <a:off x="4383937" y="-348384"/>
+            <a:ext cx="3254541" cy="3198900"/>
+            <a:chOff x="4440157" y="156905"/>
+            <a:chExt cx="3254541" cy="3198900"/>
+          </a:xfrm>
+        </p:grpSpPr>
+        <p:sp>
+          <p:nvSpPr>
+            <p:cNvPr id="50" name="Rectangle 49"/>
+            <p:cNvSpPr/>
+            <p:nvPr/>
+          </p:nvSpPr>
+          <p:spPr>
+            <a:xfrm>
+              <a:off x="5550070" y="156905"/>
+              <a:ext cx="1143000" cy="409073"/>
+            </a:xfrm>
+            <a:prstGeom prst="rect">
+              <a:avLst/>
+            </a:prstGeom>
+            <a:noFill/>
+            <a:ln w="25400">
+              <a:solidFill>
+                <a:schemeClr val="tx1"/>
+              </a:solidFill>
+            </a:ln>
+          </p:spPr>
+          <p:style>
+            <a:lnRef idx="2">
+              <a:schemeClr val="accent1">
+                <a:shade val="50000"/>
+              </a:schemeClr>
+            </a:lnRef>
+            <a:fillRef idx="1">
+              <a:schemeClr val="accent1"/>
+            </a:fillRef>
+            <a:effectRef idx="0">
+              <a:schemeClr val="accent1"/>
+            </a:effectRef>
+            <a:fontRef idx="minor">
+              <a:schemeClr val="lt1"/>
+            </a:fontRef>
+          </p:style>
+          <p:txBody>
+            <a:bodyPr rtlCol="0" anchor="ctr"/>
+            <a:lstStyle/>
+            <a:p>
+              <a:pPr algn="ctr"/>
+              <a:r>
+                <a:rPr kumimoji="1" lang="en-US" altLang="zh-CN" sz="2000" dirty="0" smtClean="0">
+                  <a:solidFill>
+                    <a:schemeClr val="tx1"/>
+                  </a:solidFill>
+                </a:rPr>
+                <a:t>A, B</a:t>
+              </a:r>
+              <a:endParaRPr kumimoji="1" lang="zh-CN" altLang="en-US" sz="2000" dirty="0" smtClean="0">
+                <a:solidFill>
+                  <a:schemeClr val="tx1"/>
+                </a:solidFill>
+              </a:endParaRPr>
+            </a:p>
+          </p:txBody>
+        </p:sp>
+        <p:sp>
+          <p:nvSpPr>
+            <p:cNvPr id="51" name="Rectangle 50"/>
+            <p:cNvSpPr/>
+            <p:nvPr/>
+          </p:nvSpPr>
+          <p:spPr>
+            <a:xfrm>
+              <a:off x="6551698" y="772772"/>
+              <a:ext cx="1143000" cy="409073"/>
+            </a:xfrm>
+            <a:prstGeom prst="rect">
+              <a:avLst/>
+            </a:prstGeom>
+            <a:noFill/>
+            <a:ln w="25400">
+              <a:solidFill>
+                <a:srgbClr val="00B0F0"/>
+              </a:solidFill>
+            </a:ln>
+          </p:spPr>
+          <p:style>
+            <a:lnRef idx="2">
+              <a:schemeClr val="accent1">
+                <a:shade val="50000"/>
+              </a:schemeClr>
+            </a:lnRef>
+            <a:fillRef idx="1">
+              <a:schemeClr val="accent1"/>
+            </a:fillRef>
+            <a:effectRef idx="0">
+              <a:schemeClr val="accent1"/>
+            </a:effectRef>
+            <a:fontRef idx="minor">
+              <a:schemeClr val="lt1"/>
+            </a:fontRef>
+          </p:style>
+          <p:txBody>
+            <a:bodyPr rtlCol="0" anchor="ctr"/>
+            <a:lstStyle/>
+            <a:p>
+              <a:pPr algn="ctr"/>
+              <a:r>
+                <a:rPr kumimoji="1" lang="en-US" altLang="zh-CN" sz="2000" dirty="0" smtClean="0">
+                  <a:solidFill>
+                    <a:schemeClr val="tx1"/>
+                  </a:solidFill>
+                </a:rPr>
+                <a:t>A</a:t>
+              </a:r>
+              <a:endParaRPr kumimoji="1" lang="zh-CN" altLang="en-US" sz="2000" dirty="0" smtClean="0">
+                <a:solidFill>
+                  <a:schemeClr val="tx1"/>
+                </a:solidFill>
+              </a:endParaRPr>
+            </a:p>
+          </p:txBody>
+        </p:sp>
+        <p:grpSp>
+          <p:nvGrpSpPr>
+            <p:cNvPr id="52" name="Group 51"/>
+            <p:cNvGrpSpPr/>
+            <p:nvPr/>
+          </p:nvGrpSpPr>
+          <p:grpSpPr>
+            <a:xfrm>
+              <a:off x="4440157" y="2206787"/>
+              <a:ext cx="1143000" cy="1149018"/>
+              <a:chOff x="866275" y="2781297"/>
+              <a:chExt cx="1143000" cy="1149018"/>
+            </a:xfrm>
+          </p:grpSpPr>
+          <p:sp>
+            <p:nvSpPr>
+              <p:cNvPr id="58" name="Rectangle 57"/>
+              <p:cNvSpPr/>
+              <p:nvPr/>
+            </p:nvSpPr>
+            <p:spPr>
+              <a:xfrm>
+                <a:off x="866275" y="3521242"/>
+                <a:ext cx="1143000" cy="409073"/>
+              </a:xfrm>
+              <a:prstGeom prst="rect">
+                <a:avLst/>
+              </a:prstGeom>
+              <a:noFill/>
+              <a:ln w="25400">
+                <a:solidFill>
+                  <a:schemeClr val="tx1"/>
+                </a:solidFill>
+              </a:ln>
+            </p:spPr>
+            <p:style>
+              <a:lnRef idx="2">
+                <a:schemeClr val="accent1">
+                  <a:shade val="50000"/>
+                </a:schemeClr>
+              </a:lnRef>
+              <a:fillRef idx="1">
+                <a:schemeClr val="accent1"/>
+              </a:fillRef>
+              <a:effectRef idx="0">
+                <a:schemeClr val="accent1"/>
+              </a:effectRef>
+              <a:fontRef idx="minor">
+                <a:schemeClr val="lt1"/>
+              </a:fontRef>
+            </p:style>
+            <p:txBody>
+              <a:bodyPr rtlCol="0" anchor="ctr"/>
+              <a:lstStyle/>
+              <a:p>
+                <a:pPr algn="ctr"/>
+                <a:endParaRPr kumimoji="1" lang="zh-CN" altLang="en-US" sz="2000" dirty="0" smtClean="0">
+                  <a:solidFill>
+                    <a:schemeClr val="tx1"/>
+                  </a:solidFill>
+                </a:endParaRPr>
+              </a:p>
+            </p:txBody>
+          </p:sp>
+          <p:sp>
+            <p:nvSpPr>
+              <p:cNvPr id="59" name="Rectangle 58"/>
+              <p:cNvSpPr/>
+              <p:nvPr/>
+            </p:nvSpPr>
+            <p:spPr>
+              <a:xfrm>
+                <a:off x="1082844" y="2781297"/>
+                <a:ext cx="709863" cy="709863"/>
+              </a:xfrm>
+              <a:prstGeom prst="rect">
+                <a:avLst/>
+              </a:prstGeom>
+              <a:noFill/>
+              <a:ln w="25400">
+                <a:solidFill>
+                  <a:srgbClr val="FF0000"/>
+                </a:solidFill>
+              </a:ln>
+            </p:spPr>
+            <p:style>
+              <a:lnRef idx="2">
+                <a:schemeClr val="accent1">
+                  <a:shade val="50000"/>
+                </a:schemeClr>
+              </a:lnRef>
+              <a:fillRef idx="1">
+                <a:schemeClr val="accent1"/>
+              </a:fillRef>
+              <a:effectRef idx="0">
+                <a:schemeClr val="accent1"/>
+              </a:effectRef>
+              <a:fontRef idx="minor">
+                <a:schemeClr val="lt1"/>
+              </a:fontRef>
+            </p:style>
+            <p:txBody>
+              <a:bodyPr rtlCol="0" anchor="ctr"/>
+              <a:lstStyle/>
+              <a:p>
+                <a:pPr algn="ctr"/>
+                <a:r>
+                  <a:rPr kumimoji="1" lang="en-US" altLang="zh-CN" sz="2000" dirty="0" err="1">
+                    <a:solidFill>
+                      <a:schemeClr val="tx1"/>
+                    </a:solidFill>
+                  </a:rPr>
+                  <a:t>A</a:t>
+                </a:r>
+                <a:endParaRPr kumimoji="1" lang="zh-CN" altLang="en-US" sz="2000" dirty="0" smtClean="0">
+                  <a:solidFill>
+                    <a:schemeClr val="tx1"/>
+                  </a:solidFill>
+                </a:endParaRPr>
+              </a:p>
+            </p:txBody>
+          </p:sp>
+        </p:grpSp>
+        <p:grpSp>
+          <p:nvGrpSpPr>
+            <p:cNvPr id="53" name="Group 52"/>
+            <p:cNvGrpSpPr/>
+            <p:nvPr/>
+          </p:nvGrpSpPr>
+          <p:grpSpPr>
+            <a:xfrm>
+              <a:off x="6551698" y="2206787"/>
+              <a:ext cx="1143000" cy="1149018"/>
+              <a:chOff x="2977816" y="2781297"/>
+              <a:chExt cx="1143000" cy="1149018"/>
+            </a:xfrm>
+          </p:grpSpPr>
+          <p:sp>
+            <p:nvSpPr>
+              <p:cNvPr id="56" name="Rectangle 55"/>
+              <p:cNvSpPr/>
+              <p:nvPr/>
+            </p:nvSpPr>
+            <p:spPr>
+              <a:xfrm>
+                <a:off x="2977816" y="3521242"/>
+                <a:ext cx="1143000" cy="409073"/>
+              </a:xfrm>
+              <a:prstGeom prst="rect">
+                <a:avLst/>
+              </a:prstGeom>
+              <a:noFill/>
+              <a:ln w="25400">
+                <a:solidFill>
+                  <a:schemeClr val="tx1"/>
+                </a:solidFill>
+              </a:ln>
+            </p:spPr>
+            <p:style>
+              <a:lnRef idx="2">
+                <a:schemeClr val="accent1">
+                  <a:shade val="50000"/>
+                </a:schemeClr>
+              </a:lnRef>
+              <a:fillRef idx="1">
+                <a:schemeClr val="accent1"/>
+              </a:fillRef>
+              <a:effectRef idx="0">
+                <a:schemeClr val="accent1"/>
+              </a:effectRef>
+              <a:fontRef idx="minor">
+                <a:schemeClr val="lt1"/>
+              </a:fontRef>
+            </p:style>
+            <p:txBody>
+              <a:bodyPr rtlCol="0" anchor="ctr"/>
+              <a:lstStyle/>
+              <a:p>
+                <a:pPr algn="ctr"/>
+                <a:endParaRPr kumimoji="1" lang="zh-CN" altLang="en-US" sz="2000" dirty="0" smtClean="0">
+                  <a:solidFill>
+                    <a:schemeClr val="tx1"/>
+                  </a:solidFill>
+                </a:endParaRPr>
+              </a:p>
+            </p:txBody>
+          </p:sp>
+          <p:sp>
+            <p:nvSpPr>
+              <p:cNvPr id="57" name="Rectangle 56"/>
+              <p:cNvSpPr/>
+              <p:nvPr/>
+            </p:nvSpPr>
+            <p:spPr>
+              <a:xfrm>
+                <a:off x="3194385" y="2781297"/>
+                <a:ext cx="709863" cy="709863"/>
+              </a:xfrm>
+              <a:prstGeom prst="rect">
+                <a:avLst/>
+              </a:prstGeom>
+              <a:noFill/>
+              <a:ln w="25400">
+                <a:solidFill>
+                  <a:srgbClr val="FF0000"/>
+                </a:solidFill>
+              </a:ln>
+            </p:spPr>
+            <p:style>
+              <a:lnRef idx="2">
+                <a:schemeClr val="accent1">
+                  <a:shade val="50000"/>
+                </a:schemeClr>
+              </a:lnRef>
+              <a:fillRef idx="1">
+                <a:schemeClr val="accent1"/>
+              </a:fillRef>
+              <a:effectRef idx="0">
+                <a:schemeClr val="accent1"/>
+              </a:effectRef>
+              <a:fontRef idx="minor">
+                <a:schemeClr val="lt1"/>
+              </a:fontRef>
+            </p:style>
+            <p:txBody>
+              <a:bodyPr rtlCol="0" anchor="ctr"/>
+              <a:lstStyle/>
+              <a:p>
+                <a:pPr algn="ctr"/>
+                <a:r>
+                  <a:rPr kumimoji="1" lang="en-US" altLang="zh-CN" sz="2000" dirty="0" smtClean="0">
+                    <a:solidFill>
+                      <a:schemeClr val="tx1"/>
+                    </a:solidFill>
+                  </a:rPr>
+                  <a:t>A</a:t>
+                </a:r>
+                <a:endParaRPr kumimoji="1" lang="zh-CN" altLang="en-US" sz="2000" dirty="0" smtClean="0">
+                  <a:solidFill>
+                    <a:schemeClr val="tx1"/>
+                  </a:solidFill>
+                </a:endParaRPr>
+              </a:p>
+            </p:txBody>
+          </p:sp>
+        </p:grpSp>
+        <p:cxnSp>
+          <p:nvCxnSpPr>
+            <p:cNvPr id="54" name="Elbow Connector 53"/>
+            <p:cNvCxnSpPr/>
+            <p:nvPr/>
+          </p:nvCxnSpPr>
+          <p:spPr>
+            <a:xfrm rot="5400000">
+              <a:off x="4746210" y="831426"/>
+              <a:ext cx="1640809" cy="1109912"/>
+            </a:xfrm>
+            <a:prstGeom prst="bentConnector3">
+              <a:avLst/>
+            </a:prstGeom>
+            <a:ln w="25400">
+              <a:solidFill>
+                <a:schemeClr val="tx1"/>
+              </a:solidFill>
+              <a:tailEnd type="triangle"/>
+            </a:ln>
+          </p:spPr>
+          <p:style>
+            <a:lnRef idx="1">
+              <a:schemeClr val="accent1"/>
+            </a:lnRef>
+            <a:fillRef idx="0">
+              <a:schemeClr val="accent1"/>
+            </a:fillRef>
+            <a:effectRef idx="0">
+              <a:schemeClr val="accent1"/>
+            </a:effectRef>
+            <a:fontRef idx="minor">
+              <a:schemeClr val="tx1"/>
+            </a:fontRef>
+          </p:style>
+        </p:cxnSp>
+        <p:cxnSp>
+          <p:nvCxnSpPr>
+            <p:cNvPr id="55" name="Elbow Connector 54"/>
+            <p:cNvCxnSpPr/>
+            <p:nvPr/>
+          </p:nvCxnSpPr>
+          <p:spPr>
+            <a:xfrm rot="16200000" flipH="1">
+              <a:off x="5801980" y="885567"/>
+              <a:ext cx="1640809" cy="1001629"/>
+            </a:xfrm>
+            <a:prstGeom prst="bentConnector3">
+              <a:avLst/>
+            </a:prstGeom>
+            <a:ln w="25400">
+              <a:solidFill>
+                <a:schemeClr val="tx1"/>
+              </a:solidFill>
+              <a:tailEnd type="triangle"/>
+            </a:ln>
+          </p:spPr>
+          <p:style>
+            <a:lnRef idx="1">
+              <a:schemeClr val="accent1"/>
+            </a:lnRef>
+            <a:fillRef idx="0">
+              <a:schemeClr val="accent1"/>
+            </a:fillRef>
+            <a:effectRef idx="0">
+              <a:schemeClr val="accent1"/>
+            </a:effectRef>
+            <a:fontRef idx="minor">
+              <a:schemeClr val="tx1"/>
+            </a:fontRef>
+          </p:style>
+        </p:cxnSp>
+      </p:grpSp>
+      <p:grpSp>
+        <p:nvGrpSpPr>
+          <p:cNvPr id="60" name="Group 59"/>
+          <p:cNvGrpSpPr/>
+          <p:nvPr/>
+        </p:nvGrpSpPr>
+        <p:grpSpPr>
+          <a:xfrm>
+            <a:off x="8359416" y="-348384"/>
+            <a:ext cx="3254541" cy="3198900"/>
+            <a:chOff x="4440157" y="156905"/>
+            <a:chExt cx="3254541" cy="3198900"/>
+          </a:xfrm>
+        </p:grpSpPr>
+        <p:sp>
+          <p:nvSpPr>
+            <p:cNvPr id="61" name="Rectangle 60"/>
+            <p:cNvSpPr/>
+            <p:nvPr/>
+          </p:nvSpPr>
+          <p:spPr>
+            <a:xfrm>
+              <a:off x="5550070" y="156905"/>
+              <a:ext cx="1143000" cy="409073"/>
+            </a:xfrm>
+            <a:prstGeom prst="rect">
+              <a:avLst/>
+            </a:prstGeom>
+            <a:noFill/>
+            <a:ln w="25400">
+              <a:solidFill>
+                <a:schemeClr val="tx1"/>
+              </a:solidFill>
+            </a:ln>
+          </p:spPr>
+          <p:style>
+            <a:lnRef idx="2">
+              <a:schemeClr val="accent1">
+                <a:shade val="50000"/>
+              </a:schemeClr>
+            </a:lnRef>
+            <a:fillRef idx="1">
+              <a:schemeClr val="accent1"/>
+            </a:fillRef>
+            <a:effectRef idx="0">
+              <a:schemeClr val="accent1"/>
+            </a:effectRef>
+            <a:fontRef idx="minor">
+              <a:schemeClr val="lt1"/>
+            </a:fontRef>
+          </p:style>
+          <p:txBody>
+            <a:bodyPr rtlCol="0" anchor="ctr"/>
+            <a:lstStyle/>
+            <a:p>
+              <a:pPr algn="ctr"/>
+              <a:r>
+                <a:rPr kumimoji="1" lang="en-US" altLang="zh-CN" sz="2000" dirty="0" smtClean="0">
+                  <a:solidFill>
+                    <a:schemeClr val="tx1"/>
+                  </a:solidFill>
+                </a:rPr>
+                <a:t>A, B</a:t>
+              </a:r>
+              <a:endParaRPr kumimoji="1" lang="zh-CN" altLang="en-US" sz="2000" dirty="0" smtClean="0">
+                <a:solidFill>
+                  <a:schemeClr val="tx1"/>
+                </a:solidFill>
+              </a:endParaRPr>
+            </a:p>
+          </p:txBody>
+        </p:sp>
+        <p:sp>
+          <p:nvSpPr>
+            <p:cNvPr id="62" name="Rectangle 61"/>
+            <p:cNvSpPr/>
+            <p:nvPr/>
+          </p:nvSpPr>
+          <p:spPr>
+            <a:xfrm>
+              <a:off x="6551698" y="772772"/>
+              <a:ext cx="1143000" cy="409073"/>
+            </a:xfrm>
+            <a:prstGeom prst="rect">
+              <a:avLst/>
+            </a:prstGeom>
+            <a:noFill/>
+            <a:ln w="25400">
+              <a:solidFill>
+                <a:srgbClr val="00B0F0"/>
+              </a:solidFill>
+            </a:ln>
+          </p:spPr>
+          <p:style>
+            <a:lnRef idx="2">
+              <a:schemeClr val="accent1">
+                <a:shade val="50000"/>
+              </a:schemeClr>
+            </a:lnRef>
+            <a:fillRef idx="1">
+              <a:schemeClr val="accent1"/>
+            </a:fillRef>
+            <a:effectRef idx="0">
+              <a:schemeClr val="accent1"/>
+            </a:effectRef>
+            <a:fontRef idx="minor">
+              <a:schemeClr val="lt1"/>
+            </a:fontRef>
+          </p:style>
+          <p:txBody>
+            <a:bodyPr rtlCol="0" anchor="ctr"/>
+            <a:lstStyle/>
+            <a:p>
+              <a:pPr algn="ctr"/>
+              <a:r>
+                <a:rPr kumimoji="1" lang="en-US" altLang="zh-CN" sz="2000" dirty="0" smtClean="0">
+                  <a:solidFill>
+                    <a:schemeClr val="tx1"/>
+                  </a:solidFill>
+                </a:rPr>
+                <a:t>A</a:t>
+              </a:r>
+              <a:endParaRPr kumimoji="1" lang="zh-CN" altLang="en-US" sz="2000" dirty="0" smtClean="0">
+                <a:solidFill>
+                  <a:schemeClr val="tx1"/>
+                </a:solidFill>
+              </a:endParaRPr>
+            </a:p>
+          </p:txBody>
+        </p:sp>
+        <p:grpSp>
+          <p:nvGrpSpPr>
+            <p:cNvPr id="63" name="Group 62"/>
+            <p:cNvGrpSpPr/>
+            <p:nvPr/>
+          </p:nvGrpSpPr>
+          <p:grpSpPr>
+            <a:xfrm>
+              <a:off x="4440157" y="2206787"/>
+              <a:ext cx="1143000" cy="1149018"/>
+              <a:chOff x="866275" y="2781297"/>
+              <a:chExt cx="1143000" cy="1149018"/>
+            </a:xfrm>
+          </p:grpSpPr>
+          <p:sp>
+            <p:nvSpPr>
+              <p:cNvPr id="69" name="Rectangle 68"/>
+              <p:cNvSpPr/>
+              <p:nvPr/>
+            </p:nvSpPr>
+            <p:spPr>
+              <a:xfrm>
+                <a:off x="866275" y="3521242"/>
+                <a:ext cx="1143000" cy="409073"/>
+              </a:xfrm>
+              <a:prstGeom prst="rect">
+                <a:avLst/>
+              </a:prstGeom>
+              <a:noFill/>
+              <a:ln w="25400">
+                <a:solidFill>
+                  <a:schemeClr val="tx1"/>
+                </a:solidFill>
+              </a:ln>
+            </p:spPr>
+            <p:style>
+              <a:lnRef idx="2">
+                <a:schemeClr val="accent1">
+                  <a:shade val="50000"/>
+                </a:schemeClr>
+              </a:lnRef>
+              <a:fillRef idx="1">
+                <a:schemeClr val="accent1"/>
+              </a:fillRef>
+              <a:effectRef idx="0">
+                <a:schemeClr val="accent1"/>
+              </a:effectRef>
+              <a:fontRef idx="minor">
+                <a:schemeClr val="lt1"/>
+              </a:fontRef>
+            </p:style>
+            <p:txBody>
+              <a:bodyPr rtlCol="0" anchor="ctr"/>
+              <a:lstStyle/>
+              <a:p>
+                <a:pPr algn="ctr"/>
+                <a:endParaRPr kumimoji="1" lang="zh-CN" altLang="en-US" sz="2000" dirty="0" smtClean="0">
+                  <a:solidFill>
+                    <a:schemeClr val="tx1"/>
+                  </a:solidFill>
+                </a:endParaRPr>
+              </a:p>
+            </p:txBody>
+          </p:sp>
+          <p:sp>
+            <p:nvSpPr>
+              <p:cNvPr id="70" name="Rectangle 69"/>
+              <p:cNvSpPr/>
+              <p:nvPr/>
+            </p:nvSpPr>
+            <p:spPr>
+              <a:xfrm>
+                <a:off x="1082844" y="2781297"/>
+                <a:ext cx="709863" cy="709863"/>
+              </a:xfrm>
+              <a:prstGeom prst="rect">
+                <a:avLst/>
+              </a:prstGeom>
+              <a:noFill/>
+              <a:ln w="25400">
+                <a:solidFill>
+                  <a:srgbClr val="FF0000"/>
+                </a:solidFill>
+              </a:ln>
+            </p:spPr>
+            <p:style>
+              <a:lnRef idx="2">
+                <a:schemeClr val="accent1">
+                  <a:shade val="50000"/>
+                </a:schemeClr>
+              </a:lnRef>
+              <a:fillRef idx="1">
+                <a:schemeClr val="accent1"/>
+              </a:fillRef>
+              <a:effectRef idx="0">
+                <a:schemeClr val="accent1"/>
+              </a:effectRef>
+              <a:fontRef idx="minor">
+                <a:schemeClr val="lt1"/>
+              </a:fontRef>
+            </p:style>
+            <p:txBody>
+              <a:bodyPr rtlCol="0" anchor="ctr"/>
+              <a:lstStyle/>
+              <a:p>
+                <a:pPr algn="ctr"/>
+                <a:r>
+                  <a:rPr kumimoji="1" lang="en-US" altLang="zh-CN" sz="2000" dirty="0" err="1">
+                    <a:solidFill>
+                      <a:schemeClr val="tx1"/>
+                    </a:solidFill>
+                  </a:rPr>
+                  <a:t>A</a:t>
+                </a:r>
+                <a:endParaRPr kumimoji="1" lang="zh-CN" altLang="en-US" sz="2000" dirty="0" smtClean="0">
+                  <a:solidFill>
+                    <a:schemeClr val="tx1"/>
+                  </a:solidFill>
+                </a:endParaRPr>
+              </a:p>
+            </p:txBody>
+          </p:sp>
+        </p:grpSp>
+        <p:grpSp>
+          <p:nvGrpSpPr>
+            <p:cNvPr id="64" name="Group 63"/>
+            <p:cNvGrpSpPr/>
+            <p:nvPr/>
+          </p:nvGrpSpPr>
+          <p:grpSpPr>
+            <a:xfrm>
+              <a:off x="6551698" y="2206787"/>
+              <a:ext cx="1143000" cy="1149018"/>
+              <a:chOff x="2977816" y="2781297"/>
+              <a:chExt cx="1143000" cy="1149018"/>
+            </a:xfrm>
+          </p:grpSpPr>
+          <p:sp>
+            <p:nvSpPr>
+              <p:cNvPr id="67" name="Rectangle 66"/>
+              <p:cNvSpPr/>
+              <p:nvPr/>
+            </p:nvSpPr>
+            <p:spPr>
+              <a:xfrm>
+                <a:off x="2977816" y="3521242"/>
+                <a:ext cx="1143000" cy="409073"/>
+              </a:xfrm>
+              <a:prstGeom prst="rect">
+                <a:avLst/>
+              </a:prstGeom>
+              <a:noFill/>
+              <a:ln w="25400">
+                <a:solidFill>
+                  <a:schemeClr val="tx1"/>
+                </a:solidFill>
+              </a:ln>
+            </p:spPr>
+            <p:style>
+              <a:lnRef idx="2">
+                <a:schemeClr val="accent1">
+                  <a:shade val="50000"/>
+                </a:schemeClr>
+              </a:lnRef>
+              <a:fillRef idx="1">
+                <a:schemeClr val="accent1"/>
+              </a:fillRef>
+              <a:effectRef idx="0">
+                <a:schemeClr val="accent1"/>
+              </a:effectRef>
+              <a:fontRef idx="minor">
+                <a:schemeClr val="lt1"/>
+              </a:fontRef>
+            </p:style>
+            <p:txBody>
+              <a:bodyPr rtlCol="0" anchor="ctr"/>
+              <a:lstStyle/>
+              <a:p>
+                <a:pPr algn="ctr"/>
+                <a:endParaRPr kumimoji="1" lang="zh-CN" altLang="en-US" sz="2000" dirty="0" smtClean="0">
+                  <a:solidFill>
+                    <a:schemeClr val="tx1"/>
+                  </a:solidFill>
+                </a:endParaRPr>
+              </a:p>
+            </p:txBody>
+          </p:sp>
+          <p:sp>
+            <p:nvSpPr>
+              <p:cNvPr id="68" name="Rectangle 67"/>
+              <p:cNvSpPr/>
+              <p:nvPr/>
+            </p:nvSpPr>
+            <p:spPr>
+              <a:xfrm>
+                <a:off x="3194385" y="2781297"/>
+                <a:ext cx="709863" cy="709863"/>
+              </a:xfrm>
+              <a:prstGeom prst="rect">
+                <a:avLst/>
+              </a:prstGeom>
+              <a:noFill/>
+              <a:ln w="25400">
+                <a:solidFill>
+                  <a:srgbClr val="FF0000"/>
+                </a:solidFill>
+              </a:ln>
+            </p:spPr>
+            <p:style>
+              <a:lnRef idx="2">
+                <a:schemeClr val="accent1">
+                  <a:shade val="50000"/>
+                </a:schemeClr>
+              </a:lnRef>
+              <a:fillRef idx="1">
+                <a:schemeClr val="accent1"/>
+              </a:fillRef>
+              <a:effectRef idx="0">
+                <a:schemeClr val="accent1"/>
+              </a:effectRef>
+              <a:fontRef idx="minor">
+                <a:schemeClr val="lt1"/>
+              </a:fontRef>
+            </p:style>
+            <p:txBody>
+              <a:bodyPr rtlCol="0" anchor="ctr"/>
+              <a:lstStyle/>
+              <a:p>
+                <a:pPr algn="ctr"/>
+                <a:r>
+                  <a:rPr kumimoji="1" lang="en-US" altLang="zh-CN" sz="2000" dirty="0" err="1">
+                    <a:solidFill>
+                      <a:schemeClr val="tx1"/>
+                    </a:solidFill>
+                  </a:rPr>
+                  <a:t>φ</a:t>
+                </a:r>
+                <a:endParaRPr kumimoji="1" lang="zh-CN" altLang="en-US" sz="2000" dirty="0" smtClean="0">
+                  <a:solidFill>
+                    <a:schemeClr val="tx1"/>
+                  </a:solidFill>
+                </a:endParaRPr>
+              </a:p>
+            </p:txBody>
+          </p:sp>
+        </p:grpSp>
+        <p:cxnSp>
+          <p:nvCxnSpPr>
+            <p:cNvPr id="65" name="Elbow Connector 64"/>
+            <p:cNvCxnSpPr/>
+            <p:nvPr/>
+          </p:nvCxnSpPr>
+          <p:spPr>
+            <a:xfrm rot="5400000">
+              <a:off x="4746210" y="831426"/>
+              <a:ext cx="1640809" cy="1109912"/>
+            </a:xfrm>
+            <a:prstGeom prst="bentConnector3">
+              <a:avLst/>
+            </a:prstGeom>
+            <a:ln w="25400">
+              <a:solidFill>
+                <a:schemeClr val="tx1"/>
+              </a:solidFill>
+              <a:tailEnd type="triangle"/>
+            </a:ln>
+          </p:spPr>
+          <p:style>
+            <a:lnRef idx="1">
+              <a:schemeClr val="accent1"/>
+            </a:lnRef>
+            <a:fillRef idx="0">
+              <a:schemeClr val="accent1"/>
+            </a:fillRef>
+            <a:effectRef idx="0">
+              <a:schemeClr val="accent1"/>
+            </a:effectRef>
+            <a:fontRef idx="minor">
+              <a:schemeClr val="tx1"/>
+            </a:fontRef>
+          </p:style>
+        </p:cxnSp>
+        <p:cxnSp>
+          <p:nvCxnSpPr>
+            <p:cNvPr id="66" name="Elbow Connector 65"/>
+            <p:cNvCxnSpPr/>
+            <p:nvPr/>
+          </p:nvCxnSpPr>
+          <p:spPr>
+            <a:xfrm rot="16200000" flipH="1">
+              <a:off x="5801980" y="885567"/>
+              <a:ext cx="1640809" cy="1001629"/>
+            </a:xfrm>
+            <a:prstGeom prst="bentConnector3">
+              <a:avLst/>
+            </a:prstGeom>
+            <a:ln w="25400">
+              <a:solidFill>
+                <a:schemeClr val="tx1"/>
+              </a:solidFill>
+              <a:tailEnd type="triangle"/>
+            </a:ln>
+          </p:spPr>
+          <p:style>
+            <a:lnRef idx="1">
+              <a:schemeClr val="accent1"/>
+            </a:lnRef>
+            <a:fillRef idx="0">
+              <a:schemeClr val="accent1"/>
+            </a:fillRef>
+            <a:effectRef idx="0">
+              <a:schemeClr val="accent1"/>
+            </a:effectRef>
+            <a:fontRef idx="minor">
+              <a:schemeClr val="tx1"/>
+            </a:fontRef>
+          </p:style>
+        </p:cxnSp>
+      </p:grpSp>
+      <p:grpSp>
+        <p:nvGrpSpPr>
+          <p:cNvPr id="71" name="Group 70"/>
+          <p:cNvGrpSpPr/>
+          <p:nvPr/>
+        </p:nvGrpSpPr>
+        <p:grpSpPr>
+          <a:xfrm>
+            <a:off x="-144727" y="3521242"/>
+            <a:ext cx="3254541" cy="3198900"/>
+            <a:chOff x="4440157" y="156905"/>
+            <a:chExt cx="3254541" cy="3198900"/>
+          </a:xfrm>
+        </p:grpSpPr>
+        <p:sp>
+          <p:nvSpPr>
+            <p:cNvPr id="72" name="Rectangle 71"/>
+            <p:cNvSpPr/>
+            <p:nvPr/>
+          </p:nvSpPr>
+          <p:spPr>
+            <a:xfrm>
+              <a:off x="5550070" y="156905"/>
+              <a:ext cx="1143000" cy="409073"/>
+            </a:xfrm>
+            <a:prstGeom prst="rect">
+              <a:avLst/>
+            </a:prstGeom>
+            <a:noFill/>
+            <a:ln w="25400">
+              <a:solidFill>
+                <a:schemeClr val="tx1"/>
+              </a:solidFill>
+            </a:ln>
+          </p:spPr>
+          <p:style>
+            <a:lnRef idx="2">
+              <a:schemeClr val="accent1">
+                <a:shade val="50000"/>
+              </a:schemeClr>
+            </a:lnRef>
+            <a:fillRef idx="1">
+              <a:schemeClr val="accent1"/>
+            </a:fillRef>
+            <a:effectRef idx="0">
+              <a:schemeClr val="accent1"/>
+            </a:effectRef>
+            <a:fontRef idx="minor">
+              <a:schemeClr val="lt1"/>
+            </a:fontRef>
+          </p:style>
+          <p:txBody>
+            <a:bodyPr rtlCol="0" anchor="ctr"/>
+            <a:lstStyle/>
+            <a:p>
+              <a:pPr algn="ctr"/>
+              <a:r>
+                <a:rPr kumimoji="1" lang="en-US" altLang="zh-CN" sz="2000" dirty="0" smtClean="0">
+                  <a:solidFill>
+                    <a:schemeClr val="tx1"/>
+                  </a:solidFill>
+                </a:rPr>
+                <a:t>A, B</a:t>
+              </a:r>
+              <a:endParaRPr kumimoji="1" lang="zh-CN" altLang="en-US" sz="2000" dirty="0" smtClean="0">
+                <a:solidFill>
+                  <a:schemeClr val="tx1"/>
+                </a:solidFill>
+              </a:endParaRPr>
+            </a:p>
+          </p:txBody>
+        </p:sp>
+        <p:sp>
+          <p:nvSpPr>
+            <p:cNvPr id="73" name="Rectangle 72"/>
+            <p:cNvSpPr/>
+            <p:nvPr/>
+          </p:nvSpPr>
+          <p:spPr>
+            <a:xfrm>
+              <a:off x="6551698" y="772772"/>
+              <a:ext cx="1143000" cy="409073"/>
+            </a:xfrm>
+            <a:prstGeom prst="rect">
+              <a:avLst/>
+            </a:prstGeom>
+            <a:noFill/>
+            <a:ln w="25400">
+              <a:solidFill>
+                <a:srgbClr val="00B0F0"/>
+              </a:solidFill>
+            </a:ln>
+          </p:spPr>
+          <p:style>
+            <a:lnRef idx="2">
+              <a:schemeClr val="accent1">
+                <a:shade val="50000"/>
+              </a:schemeClr>
+            </a:lnRef>
+            <a:fillRef idx="1">
+              <a:schemeClr val="accent1"/>
+            </a:fillRef>
+            <a:effectRef idx="0">
+              <a:schemeClr val="accent1"/>
+            </a:effectRef>
+            <a:fontRef idx="minor">
+              <a:schemeClr val="lt1"/>
+            </a:fontRef>
+          </p:style>
+          <p:txBody>
+            <a:bodyPr rtlCol="0" anchor="ctr"/>
+            <a:lstStyle/>
+            <a:p>
+              <a:pPr algn="ctr"/>
+              <a:r>
+                <a:rPr kumimoji="1" lang="en-US" altLang="zh-CN" sz="2000" dirty="0" smtClean="0">
+                  <a:solidFill>
+                    <a:schemeClr val="tx1"/>
+                  </a:solidFill>
+                </a:rPr>
+                <a:t>A, B</a:t>
+              </a:r>
+              <a:endParaRPr kumimoji="1" lang="zh-CN" altLang="en-US" sz="2000" dirty="0" smtClean="0">
+                <a:solidFill>
+                  <a:schemeClr val="tx1"/>
+                </a:solidFill>
+              </a:endParaRPr>
+            </a:p>
+          </p:txBody>
+        </p:sp>
+        <p:grpSp>
+          <p:nvGrpSpPr>
+            <p:cNvPr id="74" name="Group 73"/>
+            <p:cNvGrpSpPr/>
+            <p:nvPr/>
+          </p:nvGrpSpPr>
+          <p:grpSpPr>
+            <a:xfrm>
+              <a:off x="4440157" y="2206787"/>
+              <a:ext cx="1143000" cy="1149018"/>
+              <a:chOff x="866275" y="2781297"/>
+              <a:chExt cx="1143000" cy="1149018"/>
+            </a:xfrm>
+          </p:grpSpPr>
+          <p:sp>
+            <p:nvSpPr>
+              <p:cNvPr id="80" name="Rectangle 79"/>
+              <p:cNvSpPr/>
+              <p:nvPr/>
+            </p:nvSpPr>
+            <p:spPr>
+              <a:xfrm>
+                <a:off x="866275" y="3521242"/>
+                <a:ext cx="1143000" cy="409073"/>
+              </a:xfrm>
+              <a:prstGeom prst="rect">
+                <a:avLst/>
+              </a:prstGeom>
+              <a:noFill/>
+              <a:ln w="25400">
+                <a:solidFill>
+                  <a:schemeClr val="tx1"/>
+                </a:solidFill>
+              </a:ln>
+            </p:spPr>
+            <p:style>
+              <a:lnRef idx="2">
+                <a:schemeClr val="accent1">
+                  <a:shade val="50000"/>
+                </a:schemeClr>
+              </a:lnRef>
+              <a:fillRef idx="1">
+                <a:schemeClr val="accent1"/>
+              </a:fillRef>
+              <a:effectRef idx="0">
+                <a:schemeClr val="accent1"/>
+              </a:effectRef>
+              <a:fontRef idx="minor">
+                <a:schemeClr val="lt1"/>
+              </a:fontRef>
+            </p:style>
+            <p:txBody>
+              <a:bodyPr rtlCol="0" anchor="ctr"/>
+              <a:lstStyle/>
+              <a:p>
+                <a:pPr algn="ctr"/>
+                <a:r>
+                  <a:rPr kumimoji="1" lang="en-US" altLang="zh-CN" sz="2000" dirty="0" smtClean="0">
+                    <a:solidFill>
+                      <a:schemeClr val="tx1"/>
+                    </a:solidFill>
+                  </a:rPr>
+                  <a:t>B</a:t>
+                </a:r>
+                <a:endParaRPr kumimoji="1" lang="zh-CN" altLang="en-US" sz="2000" dirty="0" smtClean="0">
+                  <a:solidFill>
+                    <a:schemeClr val="tx1"/>
+                  </a:solidFill>
+                </a:endParaRPr>
+              </a:p>
+            </p:txBody>
+          </p:sp>
+          <p:sp>
+            <p:nvSpPr>
+              <p:cNvPr id="81" name="Rectangle 80"/>
+              <p:cNvSpPr/>
+              <p:nvPr/>
+            </p:nvSpPr>
+            <p:spPr>
+              <a:xfrm>
+                <a:off x="1082844" y="2781297"/>
+                <a:ext cx="709863" cy="709863"/>
+              </a:xfrm>
+              <a:prstGeom prst="rect">
+                <a:avLst/>
+              </a:prstGeom>
+              <a:noFill/>
+              <a:ln w="25400">
+                <a:solidFill>
+                  <a:srgbClr val="FF0000"/>
+                </a:solidFill>
+              </a:ln>
+            </p:spPr>
+            <p:style>
+              <a:lnRef idx="2">
+                <a:schemeClr val="accent1">
+                  <a:shade val="50000"/>
+                </a:schemeClr>
+              </a:lnRef>
+              <a:fillRef idx="1">
+                <a:schemeClr val="accent1"/>
+              </a:fillRef>
+              <a:effectRef idx="0">
+                <a:schemeClr val="accent1"/>
+              </a:effectRef>
+              <a:fontRef idx="minor">
+                <a:schemeClr val="lt1"/>
+              </a:fontRef>
+            </p:style>
+            <p:txBody>
+              <a:bodyPr rtlCol="0" anchor="ctr"/>
+              <a:lstStyle/>
+              <a:p>
+                <a:pPr algn="ctr"/>
+                <a:r>
+                  <a:rPr kumimoji="1" lang="en-US" altLang="zh-CN" sz="2000" dirty="0" err="1">
+                    <a:solidFill>
+                      <a:schemeClr val="tx1"/>
+                    </a:solidFill>
+                  </a:rPr>
+                  <a:t>A</a:t>
+                </a:r>
+                <a:endParaRPr kumimoji="1" lang="zh-CN" altLang="en-US" sz="2000" dirty="0" smtClean="0">
+                  <a:solidFill>
+                    <a:schemeClr val="tx1"/>
+                  </a:solidFill>
+                </a:endParaRPr>
+              </a:p>
+            </p:txBody>
+          </p:sp>
+        </p:grpSp>
+        <p:grpSp>
+          <p:nvGrpSpPr>
+            <p:cNvPr id="75" name="Group 74"/>
+            <p:cNvGrpSpPr/>
+            <p:nvPr/>
+          </p:nvGrpSpPr>
+          <p:grpSpPr>
+            <a:xfrm>
+              <a:off x="6551698" y="2206787"/>
+              <a:ext cx="1143000" cy="1149018"/>
+              <a:chOff x="2977816" y="2781297"/>
+              <a:chExt cx="1143000" cy="1149018"/>
+            </a:xfrm>
+          </p:grpSpPr>
+          <p:sp>
+            <p:nvSpPr>
+              <p:cNvPr id="78" name="Rectangle 77"/>
+              <p:cNvSpPr/>
+              <p:nvPr/>
+            </p:nvSpPr>
+            <p:spPr>
+              <a:xfrm>
+                <a:off x="2977816" y="3521242"/>
+                <a:ext cx="1143000" cy="409073"/>
+              </a:xfrm>
+              <a:prstGeom prst="rect">
+                <a:avLst/>
+              </a:prstGeom>
+              <a:noFill/>
+              <a:ln w="25400">
+                <a:solidFill>
+                  <a:schemeClr val="tx1"/>
+                </a:solidFill>
+              </a:ln>
+            </p:spPr>
+            <p:style>
+              <a:lnRef idx="2">
+                <a:schemeClr val="accent1">
+                  <a:shade val="50000"/>
+                </a:schemeClr>
+              </a:lnRef>
+              <a:fillRef idx="1">
+                <a:schemeClr val="accent1"/>
+              </a:fillRef>
+              <a:effectRef idx="0">
+                <a:schemeClr val="accent1"/>
+              </a:effectRef>
+              <a:fontRef idx="minor">
+                <a:schemeClr val="lt1"/>
+              </a:fontRef>
+            </p:style>
+            <p:txBody>
+              <a:bodyPr rtlCol="0" anchor="ctr"/>
+              <a:lstStyle/>
+              <a:p>
+                <a:pPr algn="ctr"/>
+                <a:r>
+                  <a:rPr kumimoji="1" lang="en-US" altLang="zh-CN" sz="2000" dirty="0" smtClean="0">
+                    <a:solidFill>
+                      <a:schemeClr val="tx1"/>
+                    </a:solidFill>
+                  </a:rPr>
+                  <a:t>N</a:t>
+                </a:r>
+                <a:r>
+                  <a:rPr kumimoji="1" lang="en-US" altLang="zh-CN" sz="2000" dirty="0" smtClean="0">
+                    <a:solidFill>
+                      <a:schemeClr val="tx1"/>
+                    </a:solidFill>
+                  </a:rPr>
+                  <a:t>o A</a:t>
+                </a:r>
+                <a:endParaRPr kumimoji="1" lang="zh-CN" altLang="en-US" sz="2000" dirty="0" smtClean="0">
+                  <a:solidFill>
+                    <a:schemeClr val="tx1"/>
+                  </a:solidFill>
+                </a:endParaRPr>
+              </a:p>
+            </p:txBody>
+          </p:sp>
+          <p:sp>
+            <p:nvSpPr>
+              <p:cNvPr id="79" name="Rectangle 78"/>
+              <p:cNvSpPr/>
+              <p:nvPr/>
+            </p:nvSpPr>
+            <p:spPr>
+              <a:xfrm>
+                <a:off x="3194385" y="2781297"/>
+                <a:ext cx="709863" cy="709863"/>
+              </a:xfrm>
+              <a:prstGeom prst="rect">
+                <a:avLst/>
+              </a:prstGeom>
+              <a:noFill/>
+              <a:ln w="25400">
+                <a:solidFill>
+                  <a:srgbClr val="FF0000"/>
+                </a:solidFill>
+              </a:ln>
+            </p:spPr>
+            <p:style>
+              <a:lnRef idx="2">
+                <a:schemeClr val="accent1">
+                  <a:shade val="50000"/>
+                </a:schemeClr>
+              </a:lnRef>
+              <a:fillRef idx="1">
+                <a:schemeClr val="accent1"/>
+              </a:fillRef>
+              <a:effectRef idx="0">
+                <a:schemeClr val="accent1"/>
+              </a:effectRef>
+              <a:fontRef idx="minor">
+                <a:schemeClr val="lt1"/>
+              </a:fontRef>
+            </p:style>
+            <p:txBody>
+              <a:bodyPr rtlCol="0" anchor="ctr"/>
+              <a:lstStyle/>
+              <a:p>
+                <a:pPr algn="ctr"/>
+                <a:r>
+                  <a:rPr kumimoji="1" lang="en-US" altLang="zh-CN" sz="2000" dirty="0" err="1" smtClean="0">
+                    <a:solidFill>
+                      <a:schemeClr val="tx1"/>
+                    </a:solidFill>
+                  </a:rPr>
+                  <a:t>B</a:t>
+                </a:r>
+                <a:endParaRPr kumimoji="1" lang="zh-CN" altLang="en-US" sz="2000" dirty="0" smtClean="0">
+                  <a:solidFill>
+                    <a:schemeClr val="tx1"/>
+                  </a:solidFill>
+                </a:endParaRPr>
+              </a:p>
+            </p:txBody>
+          </p:sp>
+        </p:grpSp>
+        <p:cxnSp>
+          <p:nvCxnSpPr>
+            <p:cNvPr id="76" name="Elbow Connector 75"/>
+            <p:cNvCxnSpPr/>
+            <p:nvPr/>
+          </p:nvCxnSpPr>
+          <p:spPr>
+            <a:xfrm rot="5400000">
+              <a:off x="4746210" y="831426"/>
+              <a:ext cx="1640809" cy="1109912"/>
+            </a:xfrm>
+            <a:prstGeom prst="bentConnector3">
+              <a:avLst/>
+            </a:prstGeom>
+            <a:ln w="25400">
+              <a:solidFill>
+                <a:schemeClr val="tx1"/>
+              </a:solidFill>
+              <a:tailEnd type="triangle"/>
+            </a:ln>
+          </p:spPr>
+          <p:style>
+            <a:lnRef idx="1">
+              <a:schemeClr val="accent1"/>
+            </a:lnRef>
+            <a:fillRef idx="0">
+              <a:schemeClr val="accent1"/>
+            </a:fillRef>
+            <a:effectRef idx="0">
+              <a:schemeClr val="accent1"/>
+            </a:effectRef>
+            <a:fontRef idx="minor">
+              <a:schemeClr val="tx1"/>
+            </a:fontRef>
+          </p:style>
+        </p:cxnSp>
+        <p:cxnSp>
+          <p:nvCxnSpPr>
+            <p:cNvPr id="77" name="Elbow Connector 76"/>
+            <p:cNvCxnSpPr/>
+            <p:nvPr/>
+          </p:nvCxnSpPr>
+          <p:spPr>
+            <a:xfrm rot="16200000" flipH="1">
+              <a:off x="5801980" y="885567"/>
+              <a:ext cx="1640809" cy="1001629"/>
+            </a:xfrm>
+            <a:prstGeom prst="bentConnector3">
+              <a:avLst/>
+            </a:prstGeom>
+            <a:ln w="25400">
+              <a:solidFill>
+                <a:schemeClr val="tx1"/>
+              </a:solidFill>
+              <a:tailEnd type="triangle"/>
+            </a:ln>
+          </p:spPr>
+          <p:style>
+            <a:lnRef idx="1">
+              <a:schemeClr val="accent1"/>
+            </a:lnRef>
+            <a:fillRef idx="0">
+              <a:schemeClr val="accent1"/>
+            </a:fillRef>
+            <a:effectRef idx="0">
+              <a:schemeClr val="accent1"/>
+            </a:effectRef>
+            <a:fontRef idx="minor">
+              <a:schemeClr val="tx1"/>
+            </a:fontRef>
+          </p:style>
+        </p:cxnSp>
+      </p:grpSp>
+      <p:grpSp>
+        <p:nvGrpSpPr>
+          <p:cNvPr id="82" name="Group 81"/>
+          <p:cNvGrpSpPr/>
+          <p:nvPr/>
+        </p:nvGrpSpPr>
+        <p:grpSpPr>
+          <a:xfrm>
+            <a:off x="3739316" y="3521242"/>
+            <a:ext cx="3254541" cy="3198900"/>
+            <a:chOff x="4440157" y="156905"/>
+            <a:chExt cx="3254541" cy="3198900"/>
+          </a:xfrm>
+        </p:grpSpPr>
+        <p:sp>
+          <p:nvSpPr>
+            <p:cNvPr id="83" name="Rectangle 82"/>
+            <p:cNvSpPr/>
+            <p:nvPr/>
+          </p:nvSpPr>
+          <p:spPr>
+            <a:xfrm>
+              <a:off x="5550070" y="156905"/>
+              <a:ext cx="1143000" cy="409073"/>
+            </a:xfrm>
+            <a:prstGeom prst="rect">
+              <a:avLst/>
+            </a:prstGeom>
+            <a:noFill/>
+            <a:ln w="25400">
+              <a:solidFill>
+                <a:schemeClr val="tx1"/>
+              </a:solidFill>
+            </a:ln>
+          </p:spPr>
+          <p:style>
+            <a:lnRef idx="2">
+              <a:schemeClr val="accent1">
+                <a:shade val="50000"/>
+              </a:schemeClr>
+            </a:lnRef>
+            <a:fillRef idx="1">
+              <a:schemeClr val="accent1"/>
+            </a:fillRef>
+            <a:effectRef idx="0">
+              <a:schemeClr val="accent1"/>
+            </a:effectRef>
+            <a:fontRef idx="minor">
+              <a:schemeClr val="lt1"/>
+            </a:fontRef>
+          </p:style>
+          <p:txBody>
+            <a:bodyPr rtlCol="0" anchor="ctr"/>
+            <a:lstStyle/>
+            <a:p>
+              <a:pPr algn="ctr"/>
+              <a:r>
+                <a:rPr kumimoji="1" lang="en-US" altLang="zh-CN" sz="2000" dirty="0" smtClean="0">
+                  <a:solidFill>
+                    <a:schemeClr val="tx1"/>
+                  </a:solidFill>
+                </a:rPr>
+                <a:t>A, B</a:t>
+              </a:r>
+              <a:endParaRPr kumimoji="1" lang="zh-CN" altLang="en-US" sz="2000" dirty="0" smtClean="0">
+                <a:solidFill>
+                  <a:schemeClr val="tx1"/>
+                </a:solidFill>
+              </a:endParaRPr>
+            </a:p>
+          </p:txBody>
+        </p:sp>
+        <p:sp>
+          <p:nvSpPr>
+            <p:cNvPr id="84" name="Rectangle 83"/>
+            <p:cNvSpPr/>
+            <p:nvPr/>
+          </p:nvSpPr>
+          <p:spPr>
+            <a:xfrm>
+              <a:off x="6551698" y="772772"/>
+              <a:ext cx="1143000" cy="409073"/>
+            </a:xfrm>
+            <a:prstGeom prst="rect">
+              <a:avLst/>
+            </a:prstGeom>
+            <a:noFill/>
+            <a:ln w="25400">
+              <a:solidFill>
+                <a:srgbClr val="00B0F0"/>
+              </a:solidFill>
+            </a:ln>
+          </p:spPr>
+          <p:style>
+            <a:lnRef idx="2">
+              <a:schemeClr val="accent1">
+                <a:shade val="50000"/>
+              </a:schemeClr>
+            </a:lnRef>
+            <a:fillRef idx="1">
+              <a:schemeClr val="accent1"/>
+            </a:fillRef>
+            <a:effectRef idx="0">
+              <a:schemeClr val="accent1"/>
+            </a:effectRef>
+            <a:fontRef idx="minor">
+              <a:schemeClr val="lt1"/>
+            </a:fontRef>
+          </p:style>
+          <p:txBody>
+            <a:bodyPr rtlCol="0" anchor="ctr"/>
+            <a:lstStyle/>
+            <a:p>
+              <a:pPr algn="ctr"/>
+              <a:r>
+                <a:rPr kumimoji="1" lang="en-US" altLang="zh-CN" sz="2000" dirty="0" smtClean="0">
+                  <a:solidFill>
+                    <a:schemeClr val="tx1"/>
+                  </a:solidFill>
+                </a:rPr>
+                <a:t>A, B</a:t>
+              </a:r>
+              <a:endParaRPr kumimoji="1" lang="zh-CN" altLang="en-US" sz="2000" dirty="0" smtClean="0">
+                <a:solidFill>
+                  <a:schemeClr val="tx1"/>
+                </a:solidFill>
+              </a:endParaRPr>
+            </a:p>
+          </p:txBody>
+        </p:sp>
+        <p:grpSp>
+          <p:nvGrpSpPr>
+            <p:cNvPr id="85" name="Group 84"/>
+            <p:cNvGrpSpPr/>
+            <p:nvPr/>
+          </p:nvGrpSpPr>
+          <p:grpSpPr>
+            <a:xfrm>
+              <a:off x="4440157" y="2206787"/>
+              <a:ext cx="1143000" cy="1149018"/>
+              <a:chOff x="866275" y="2781297"/>
+              <a:chExt cx="1143000" cy="1149018"/>
+            </a:xfrm>
+          </p:grpSpPr>
+          <p:sp>
+            <p:nvSpPr>
+              <p:cNvPr id="91" name="Rectangle 90"/>
+              <p:cNvSpPr/>
+              <p:nvPr/>
+            </p:nvSpPr>
+            <p:spPr>
+              <a:xfrm>
+                <a:off x="866275" y="3521242"/>
+                <a:ext cx="1143000" cy="409073"/>
+              </a:xfrm>
+              <a:prstGeom prst="rect">
+                <a:avLst/>
+              </a:prstGeom>
+              <a:noFill/>
+              <a:ln w="25400">
+                <a:solidFill>
+                  <a:schemeClr val="tx1"/>
+                </a:solidFill>
+              </a:ln>
+            </p:spPr>
+            <p:style>
+              <a:lnRef idx="2">
+                <a:schemeClr val="accent1">
+                  <a:shade val="50000"/>
+                </a:schemeClr>
+              </a:lnRef>
+              <a:fillRef idx="1">
+                <a:schemeClr val="accent1"/>
+              </a:fillRef>
+              <a:effectRef idx="0">
+                <a:schemeClr val="accent1"/>
+              </a:effectRef>
+              <a:fontRef idx="minor">
+                <a:schemeClr val="lt1"/>
+              </a:fontRef>
+            </p:style>
+            <p:txBody>
+              <a:bodyPr rtlCol="0" anchor="ctr"/>
+              <a:lstStyle/>
+              <a:p>
+                <a:pPr algn="ctr"/>
+                <a:r>
+                  <a:rPr kumimoji="1" lang="en-US" altLang="zh-CN" sz="2000" dirty="0" smtClean="0">
+                    <a:solidFill>
+                      <a:schemeClr val="tx1"/>
+                    </a:solidFill>
+                  </a:rPr>
+                  <a:t>No B</a:t>
+                </a:r>
+                <a:endParaRPr kumimoji="1" lang="zh-CN" altLang="en-US" sz="2000" dirty="0" smtClean="0">
+                  <a:solidFill>
+                    <a:schemeClr val="tx1"/>
+                  </a:solidFill>
+                </a:endParaRPr>
+              </a:p>
+            </p:txBody>
+          </p:sp>
+          <p:sp>
+            <p:nvSpPr>
+              <p:cNvPr id="92" name="Rectangle 91"/>
+              <p:cNvSpPr/>
+              <p:nvPr/>
+            </p:nvSpPr>
+            <p:spPr>
+              <a:xfrm>
+                <a:off x="1082844" y="2781297"/>
+                <a:ext cx="709863" cy="709863"/>
+              </a:xfrm>
+              <a:prstGeom prst="rect">
+                <a:avLst/>
+              </a:prstGeom>
+              <a:noFill/>
+              <a:ln w="25400">
+                <a:solidFill>
+                  <a:srgbClr val="FF0000"/>
+                </a:solidFill>
+              </a:ln>
+            </p:spPr>
+            <p:style>
+              <a:lnRef idx="2">
+                <a:schemeClr val="accent1">
+                  <a:shade val="50000"/>
+                </a:schemeClr>
+              </a:lnRef>
+              <a:fillRef idx="1">
+                <a:schemeClr val="accent1"/>
+              </a:fillRef>
+              <a:effectRef idx="0">
+                <a:schemeClr val="accent1"/>
+              </a:effectRef>
+              <a:fontRef idx="minor">
+                <a:schemeClr val="lt1"/>
+              </a:fontRef>
+            </p:style>
+            <p:txBody>
+              <a:bodyPr rtlCol="0" anchor="ctr"/>
+              <a:lstStyle/>
+              <a:p>
+                <a:pPr algn="ctr"/>
+                <a:r>
+                  <a:rPr kumimoji="1" lang="en-US" altLang="zh-CN" sz="2000" dirty="0" err="1">
+                    <a:solidFill>
+                      <a:schemeClr val="tx1"/>
+                    </a:solidFill>
+                  </a:rPr>
+                  <a:t>A</a:t>
+                </a:r>
+                <a:endParaRPr kumimoji="1" lang="zh-CN" altLang="en-US" sz="2000" dirty="0" smtClean="0">
+                  <a:solidFill>
+                    <a:schemeClr val="tx1"/>
+                  </a:solidFill>
+                </a:endParaRPr>
+              </a:p>
+            </p:txBody>
+          </p:sp>
+        </p:grpSp>
+        <p:grpSp>
+          <p:nvGrpSpPr>
+            <p:cNvPr id="86" name="Group 85"/>
+            <p:cNvGrpSpPr/>
+            <p:nvPr/>
+          </p:nvGrpSpPr>
+          <p:grpSpPr>
+            <a:xfrm>
+              <a:off x="6551698" y="2206787"/>
+              <a:ext cx="1143000" cy="1149018"/>
+              <a:chOff x="2977816" y="2781297"/>
+              <a:chExt cx="1143000" cy="1149018"/>
+            </a:xfrm>
+          </p:grpSpPr>
+          <p:sp>
+            <p:nvSpPr>
+              <p:cNvPr id="89" name="Rectangle 88"/>
+              <p:cNvSpPr/>
+              <p:nvPr/>
+            </p:nvSpPr>
+            <p:spPr>
+              <a:xfrm>
+                <a:off x="2977816" y="3521242"/>
+                <a:ext cx="1143000" cy="409073"/>
+              </a:xfrm>
+              <a:prstGeom prst="rect">
+                <a:avLst/>
+              </a:prstGeom>
+              <a:noFill/>
+              <a:ln w="25400">
+                <a:solidFill>
+                  <a:schemeClr val="tx1"/>
+                </a:solidFill>
+              </a:ln>
+            </p:spPr>
+            <p:style>
+              <a:lnRef idx="2">
+                <a:schemeClr val="accent1">
+                  <a:shade val="50000"/>
+                </a:schemeClr>
+              </a:lnRef>
+              <a:fillRef idx="1">
+                <a:schemeClr val="accent1"/>
+              </a:fillRef>
+              <a:effectRef idx="0">
+                <a:schemeClr val="accent1"/>
+              </a:effectRef>
+              <a:fontRef idx="minor">
+                <a:schemeClr val="lt1"/>
+              </a:fontRef>
+            </p:style>
+            <p:txBody>
+              <a:bodyPr rtlCol="0" anchor="ctr"/>
+              <a:lstStyle/>
+              <a:p>
+                <a:pPr algn="ctr"/>
+                <a:r>
+                  <a:rPr kumimoji="1" lang="en-US" altLang="zh-CN" sz="2000" dirty="0" smtClean="0">
+                    <a:solidFill>
+                      <a:schemeClr val="tx1"/>
+                    </a:solidFill>
+                  </a:rPr>
+                  <a:t>A</a:t>
+                </a:r>
+                <a:endParaRPr kumimoji="1" lang="zh-CN" altLang="en-US" sz="2000" dirty="0" smtClean="0">
+                  <a:solidFill>
+                    <a:schemeClr val="tx1"/>
+                  </a:solidFill>
+                </a:endParaRPr>
+              </a:p>
+            </p:txBody>
+          </p:sp>
+          <p:sp>
+            <p:nvSpPr>
+              <p:cNvPr id="90" name="Rectangle 89"/>
+              <p:cNvSpPr/>
+              <p:nvPr/>
+            </p:nvSpPr>
+            <p:spPr>
+              <a:xfrm>
+                <a:off x="3194385" y="2781297"/>
+                <a:ext cx="709863" cy="709863"/>
+              </a:xfrm>
+              <a:prstGeom prst="rect">
+                <a:avLst/>
+              </a:prstGeom>
+              <a:noFill/>
+              <a:ln w="25400">
+                <a:solidFill>
+                  <a:srgbClr val="FF0000"/>
+                </a:solidFill>
+              </a:ln>
+            </p:spPr>
+            <p:style>
+              <a:lnRef idx="2">
+                <a:schemeClr val="accent1">
+                  <a:shade val="50000"/>
+                </a:schemeClr>
+              </a:lnRef>
+              <a:fillRef idx="1">
+                <a:schemeClr val="accent1"/>
+              </a:fillRef>
+              <a:effectRef idx="0">
+                <a:schemeClr val="accent1"/>
+              </a:effectRef>
+              <a:fontRef idx="minor">
+                <a:schemeClr val="lt1"/>
+              </a:fontRef>
+            </p:style>
+            <p:txBody>
+              <a:bodyPr rtlCol="0" anchor="ctr"/>
+              <a:lstStyle/>
+              <a:p>
+                <a:pPr algn="ctr"/>
+                <a:r>
+                  <a:rPr kumimoji="1" lang="en-US" altLang="zh-CN" sz="2000" dirty="0" err="1" smtClean="0">
+                    <a:solidFill>
+                      <a:schemeClr val="tx1"/>
+                    </a:solidFill>
+                  </a:rPr>
+                  <a:t>B</a:t>
+                </a:r>
+                <a:endParaRPr kumimoji="1" lang="zh-CN" altLang="en-US" sz="2000" dirty="0" smtClean="0">
+                  <a:solidFill>
+                    <a:schemeClr val="tx1"/>
+                  </a:solidFill>
+                </a:endParaRPr>
+              </a:p>
+            </p:txBody>
+          </p:sp>
+        </p:grpSp>
+        <p:cxnSp>
+          <p:nvCxnSpPr>
+            <p:cNvPr id="87" name="Elbow Connector 86"/>
+            <p:cNvCxnSpPr/>
+            <p:nvPr/>
+          </p:nvCxnSpPr>
+          <p:spPr>
+            <a:xfrm rot="5400000">
+              <a:off x="4746210" y="831426"/>
+              <a:ext cx="1640809" cy="1109912"/>
+            </a:xfrm>
+            <a:prstGeom prst="bentConnector3">
+              <a:avLst/>
+            </a:prstGeom>
+            <a:ln w="25400">
+              <a:solidFill>
+                <a:schemeClr val="tx1"/>
+              </a:solidFill>
+              <a:tailEnd type="triangle"/>
+            </a:ln>
+          </p:spPr>
+          <p:style>
+            <a:lnRef idx="1">
+              <a:schemeClr val="accent1"/>
+            </a:lnRef>
+            <a:fillRef idx="0">
+              <a:schemeClr val="accent1"/>
+            </a:fillRef>
+            <a:effectRef idx="0">
+              <a:schemeClr val="accent1"/>
+            </a:effectRef>
+            <a:fontRef idx="minor">
+              <a:schemeClr val="tx1"/>
+            </a:fontRef>
+          </p:style>
+        </p:cxnSp>
+        <p:cxnSp>
+          <p:nvCxnSpPr>
+            <p:cNvPr id="88" name="Elbow Connector 87"/>
+            <p:cNvCxnSpPr/>
+            <p:nvPr/>
+          </p:nvCxnSpPr>
+          <p:spPr>
+            <a:xfrm rot="16200000" flipH="1">
+              <a:off x="5801980" y="885567"/>
+              <a:ext cx="1640809" cy="1001629"/>
+            </a:xfrm>
+            <a:prstGeom prst="bentConnector3">
+              <a:avLst/>
+            </a:prstGeom>
+            <a:ln w="25400">
+              <a:solidFill>
+                <a:schemeClr val="tx1"/>
+              </a:solidFill>
+              <a:tailEnd type="triangle"/>
+            </a:ln>
+          </p:spPr>
+          <p:style>
+            <a:lnRef idx="1">
+              <a:schemeClr val="accent1"/>
+            </a:lnRef>
+            <a:fillRef idx="0">
+              <a:schemeClr val="accent1"/>
+            </a:fillRef>
+            <a:effectRef idx="0">
+              <a:schemeClr val="accent1"/>
+            </a:effectRef>
+            <a:fontRef idx="minor">
+              <a:schemeClr val="tx1"/>
+            </a:fontRef>
+          </p:style>
+        </p:cxnSp>
+      </p:grpSp>
+      <p:grpSp>
+        <p:nvGrpSpPr>
+          <p:cNvPr id="93" name="Group 92"/>
+          <p:cNvGrpSpPr/>
+          <p:nvPr/>
+        </p:nvGrpSpPr>
+        <p:grpSpPr>
+          <a:xfrm>
+            <a:off x="7390899" y="3521242"/>
+            <a:ext cx="3254541" cy="3198900"/>
+            <a:chOff x="4440157" y="156905"/>
+            <a:chExt cx="3254541" cy="3198900"/>
+          </a:xfrm>
+        </p:grpSpPr>
+        <p:sp>
+          <p:nvSpPr>
+            <p:cNvPr id="94" name="Rectangle 93"/>
+            <p:cNvSpPr/>
+            <p:nvPr/>
+          </p:nvSpPr>
+          <p:spPr>
+            <a:xfrm>
+              <a:off x="5550070" y="156905"/>
+              <a:ext cx="1143000" cy="409073"/>
+            </a:xfrm>
+            <a:prstGeom prst="rect">
+              <a:avLst/>
+            </a:prstGeom>
+            <a:noFill/>
+            <a:ln w="25400">
+              <a:solidFill>
+                <a:schemeClr val="tx1"/>
+              </a:solidFill>
+            </a:ln>
+          </p:spPr>
+          <p:style>
+            <a:lnRef idx="2">
+              <a:schemeClr val="accent1">
+                <a:shade val="50000"/>
+              </a:schemeClr>
+            </a:lnRef>
+            <a:fillRef idx="1">
+              <a:schemeClr val="accent1"/>
+            </a:fillRef>
+            <a:effectRef idx="0">
+              <a:schemeClr val="accent1"/>
+            </a:effectRef>
+            <a:fontRef idx="minor">
+              <a:schemeClr val="lt1"/>
+            </a:fontRef>
+          </p:style>
+          <p:txBody>
+            <a:bodyPr rtlCol="0" anchor="ctr"/>
+            <a:lstStyle/>
+            <a:p>
+              <a:pPr algn="ctr"/>
+              <a:r>
+                <a:rPr kumimoji="1" lang="en-US" altLang="zh-CN" sz="2000" dirty="0" smtClean="0">
+                  <a:solidFill>
+                    <a:schemeClr val="tx1"/>
+                  </a:solidFill>
+                </a:rPr>
+                <a:t>A, B</a:t>
+              </a:r>
+              <a:endParaRPr kumimoji="1" lang="zh-CN" altLang="en-US" sz="2000" dirty="0" smtClean="0">
+                <a:solidFill>
+                  <a:schemeClr val="tx1"/>
+                </a:solidFill>
+              </a:endParaRPr>
+            </a:p>
+          </p:txBody>
+        </p:sp>
+        <p:sp>
+          <p:nvSpPr>
+            <p:cNvPr id="95" name="Rectangle 94"/>
+            <p:cNvSpPr/>
+            <p:nvPr/>
+          </p:nvSpPr>
+          <p:spPr>
+            <a:xfrm>
+              <a:off x="6551698" y="772772"/>
+              <a:ext cx="1143000" cy="409073"/>
+            </a:xfrm>
+            <a:prstGeom prst="rect">
+              <a:avLst/>
+            </a:prstGeom>
+            <a:noFill/>
+            <a:ln w="25400">
+              <a:solidFill>
+                <a:srgbClr val="00B0F0"/>
+              </a:solidFill>
+            </a:ln>
+          </p:spPr>
+          <p:style>
+            <a:lnRef idx="2">
+              <a:schemeClr val="accent1">
+                <a:shade val="50000"/>
+              </a:schemeClr>
+            </a:lnRef>
+            <a:fillRef idx="1">
+              <a:schemeClr val="accent1"/>
+            </a:fillRef>
+            <a:effectRef idx="0">
+              <a:schemeClr val="accent1"/>
+            </a:effectRef>
+            <a:fontRef idx="minor">
+              <a:schemeClr val="lt1"/>
+            </a:fontRef>
+          </p:style>
+          <p:txBody>
+            <a:bodyPr rtlCol="0" anchor="ctr"/>
+            <a:lstStyle/>
+            <a:p>
+              <a:pPr algn="ctr"/>
+              <a:r>
+                <a:rPr kumimoji="1" lang="en-US" altLang="zh-CN" sz="2000" dirty="0" smtClean="0">
+                  <a:solidFill>
+                    <a:schemeClr val="tx1"/>
+                  </a:solidFill>
+                </a:rPr>
+                <a:t>A, B</a:t>
+              </a:r>
+              <a:endParaRPr kumimoji="1" lang="zh-CN" altLang="en-US" sz="2000" dirty="0" smtClean="0">
+                <a:solidFill>
+                  <a:schemeClr val="tx1"/>
+                </a:solidFill>
+              </a:endParaRPr>
+            </a:p>
+          </p:txBody>
+        </p:sp>
+        <p:grpSp>
+          <p:nvGrpSpPr>
+            <p:cNvPr id="96" name="Group 95"/>
+            <p:cNvGrpSpPr/>
+            <p:nvPr/>
+          </p:nvGrpSpPr>
+          <p:grpSpPr>
+            <a:xfrm>
+              <a:off x="4440157" y="2206787"/>
+              <a:ext cx="1143000" cy="1149018"/>
+              <a:chOff x="866275" y="2781297"/>
+              <a:chExt cx="1143000" cy="1149018"/>
+            </a:xfrm>
+          </p:grpSpPr>
+          <p:sp>
+            <p:nvSpPr>
+              <p:cNvPr id="102" name="Rectangle 101"/>
+              <p:cNvSpPr/>
+              <p:nvPr/>
+            </p:nvSpPr>
+            <p:spPr>
+              <a:xfrm>
+                <a:off x="866275" y="3521242"/>
+                <a:ext cx="1143000" cy="409073"/>
+              </a:xfrm>
+              <a:prstGeom prst="rect">
+                <a:avLst/>
+              </a:prstGeom>
+              <a:noFill/>
+              <a:ln w="25400">
+                <a:solidFill>
+                  <a:schemeClr val="tx1"/>
+                </a:solidFill>
+              </a:ln>
+            </p:spPr>
+            <p:style>
+              <a:lnRef idx="2">
+                <a:schemeClr val="accent1">
+                  <a:shade val="50000"/>
+                </a:schemeClr>
+              </a:lnRef>
+              <a:fillRef idx="1">
+                <a:schemeClr val="accent1"/>
+              </a:fillRef>
+              <a:effectRef idx="0">
+                <a:schemeClr val="accent1"/>
+              </a:effectRef>
+              <a:fontRef idx="minor">
+                <a:schemeClr val="lt1"/>
+              </a:fontRef>
+            </p:style>
+            <p:txBody>
+              <a:bodyPr rtlCol="0" anchor="ctr"/>
+              <a:lstStyle/>
+              <a:p>
+                <a:pPr algn="ctr"/>
+                <a:r>
+                  <a:rPr kumimoji="1" lang="en-US" altLang="zh-CN" sz="2000" dirty="0" smtClean="0">
+                    <a:solidFill>
+                      <a:schemeClr val="tx1"/>
+                    </a:solidFill>
+                  </a:rPr>
+                  <a:t>B</a:t>
+                </a:r>
+                <a:endParaRPr kumimoji="1" lang="zh-CN" altLang="en-US" sz="2000" dirty="0" smtClean="0">
+                  <a:solidFill>
+                    <a:schemeClr val="tx1"/>
+                  </a:solidFill>
+                </a:endParaRPr>
+              </a:p>
+            </p:txBody>
+          </p:sp>
+          <p:sp>
+            <p:nvSpPr>
+              <p:cNvPr id="103" name="Rectangle 102"/>
+              <p:cNvSpPr/>
+              <p:nvPr/>
+            </p:nvSpPr>
+            <p:spPr>
+              <a:xfrm>
+                <a:off x="1082844" y="2781297"/>
+                <a:ext cx="709863" cy="709863"/>
+              </a:xfrm>
+              <a:prstGeom prst="rect">
+                <a:avLst/>
+              </a:prstGeom>
+              <a:noFill/>
+              <a:ln w="25400">
+                <a:solidFill>
+                  <a:srgbClr val="FF0000"/>
+                </a:solidFill>
+              </a:ln>
+            </p:spPr>
+            <p:style>
+              <a:lnRef idx="2">
+                <a:schemeClr val="accent1">
+                  <a:shade val="50000"/>
+                </a:schemeClr>
+              </a:lnRef>
+              <a:fillRef idx="1">
+                <a:schemeClr val="accent1"/>
+              </a:fillRef>
+              <a:effectRef idx="0">
+                <a:schemeClr val="accent1"/>
+              </a:effectRef>
+              <a:fontRef idx="minor">
+                <a:schemeClr val="lt1"/>
+              </a:fontRef>
+            </p:style>
+            <p:txBody>
+              <a:bodyPr rtlCol="0" anchor="ctr"/>
+              <a:lstStyle/>
+              <a:p>
+                <a:pPr algn="ctr"/>
+                <a:r>
+                  <a:rPr kumimoji="1" lang="en-US" altLang="zh-CN" sz="2000" dirty="0" err="1">
+                    <a:solidFill>
+                      <a:schemeClr val="tx1"/>
+                    </a:solidFill>
+                  </a:rPr>
+                  <a:t>A</a:t>
+                </a:r>
+                <a:endParaRPr kumimoji="1" lang="zh-CN" altLang="en-US" sz="2000" dirty="0" smtClean="0">
+                  <a:solidFill>
+                    <a:schemeClr val="tx1"/>
+                  </a:solidFill>
+                </a:endParaRPr>
+              </a:p>
+            </p:txBody>
+          </p:sp>
+        </p:grpSp>
+        <p:grpSp>
+          <p:nvGrpSpPr>
+            <p:cNvPr id="97" name="Group 96"/>
+            <p:cNvGrpSpPr/>
+            <p:nvPr/>
+          </p:nvGrpSpPr>
+          <p:grpSpPr>
+            <a:xfrm>
+              <a:off x="6551698" y="2206787"/>
+              <a:ext cx="1143000" cy="1149018"/>
+              <a:chOff x="2977816" y="2781297"/>
+              <a:chExt cx="1143000" cy="1149018"/>
+            </a:xfrm>
+          </p:grpSpPr>
+          <p:sp>
+            <p:nvSpPr>
+              <p:cNvPr id="100" name="Rectangle 99"/>
+              <p:cNvSpPr/>
+              <p:nvPr/>
+            </p:nvSpPr>
+            <p:spPr>
+              <a:xfrm>
+                <a:off x="2977816" y="3521242"/>
+                <a:ext cx="1143000" cy="409073"/>
+              </a:xfrm>
+              <a:prstGeom prst="rect">
+                <a:avLst/>
+              </a:prstGeom>
+              <a:noFill/>
+              <a:ln w="25400">
+                <a:solidFill>
+                  <a:schemeClr val="tx1"/>
+                </a:solidFill>
+              </a:ln>
+            </p:spPr>
+            <p:style>
+              <a:lnRef idx="2">
+                <a:schemeClr val="accent1">
+                  <a:shade val="50000"/>
+                </a:schemeClr>
+              </a:lnRef>
+              <a:fillRef idx="1">
+                <a:schemeClr val="accent1"/>
+              </a:fillRef>
+              <a:effectRef idx="0">
+                <a:schemeClr val="accent1"/>
+              </a:effectRef>
+              <a:fontRef idx="minor">
+                <a:schemeClr val="lt1"/>
+              </a:fontRef>
+            </p:style>
+            <p:txBody>
+              <a:bodyPr rtlCol="0" anchor="ctr"/>
+              <a:lstStyle/>
+              <a:p>
+                <a:pPr algn="ctr"/>
+                <a:r>
+                  <a:rPr kumimoji="1" lang="en-US" altLang="zh-CN" dirty="0" smtClean="0">
+                    <a:solidFill>
+                      <a:schemeClr val="tx1"/>
+                    </a:solidFill>
+                  </a:rPr>
+                  <a:t>No A or B</a:t>
+                </a:r>
+                <a:endParaRPr kumimoji="1" lang="zh-CN" altLang="en-US" dirty="0" smtClean="0">
+                  <a:solidFill>
+                    <a:schemeClr val="tx1"/>
+                  </a:solidFill>
+                </a:endParaRPr>
+              </a:p>
+            </p:txBody>
+          </p:sp>
+          <p:sp>
+            <p:nvSpPr>
+              <p:cNvPr id="101" name="Rectangle 100"/>
+              <p:cNvSpPr/>
+              <p:nvPr/>
+            </p:nvSpPr>
+            <p:spPr>
+              <a:xfrm>
+                <a:off x="3194385" y="2781297"/>
+                <a:ext cx="709863" cy="709863"/>
+              </a:xfrm>
+              <a:prstGeom prst="rect">
+                <a:avLst/>
+              </a:prstGeom>
+              <a:noFill/>
+              <a:ln w="25400">
+                <a:solidFill>
+                  <a:srgbClr val="FF0000"/>
+                </a:solidFill>
+              </a:ln>
+            </p:spPr>
+            <p:style>
+              <a:lnRef idx="2">
+                <a:schemeClr val="accent1">
+                  <a:shade val="50000"/>
+                </a:schemeClr>
+              </a:lnRef>
+              <a:fillRef idx="1">
+                <a:schemeClr val="accent1"/>
+              </a:fillRef>
+              <a:effectRef idx="0">
+                <a:schemeClr val="accent1"/>
+              </a:effectRef>
+              <a:fontRef idx="minor">
+                <a:schemeClr val="lt1"/>
+              </a:fontRef>
+            </p:style>
+            <p:txBody>
+              <a:bodyPr rtlCol="0" anchor="ctr"/>
+              <a:lstStyle/>
+              <a:p>
+                <a:pPr algn="ctr"/>
+                <a:r>
+                  <a:rPr kumimoji="1" lang="en-US" altLang="zh-CN" sz="2000" dirty="0" err="1" smtClean="0">
+                    <a:solidFill>
+                      <a:schemeClr val="tx1"/>
+                    </a:solidFill>
+                  </a:rPr>
+                  <a:t>B</a:t>
+                </a:r>
+                <a:endParaRPr kumimoji="1" lang="zh-CN" altLang="en-US" sz="2000" dirty="0" smtClean="0">
+                  <a:solidFill>
+                    <a:schemeClr val="tx1"/>
+                  </a:solidFill>
+                </a:endParaRPr>
+              </a:p>
+            </p:txBody>
+          </p:sp>
+        </p:grpSp>
+        <p:cxnSp>
+          <p:nvCxnSpPr>
+            <p:cNvPr id="98" name="Elbow Connector 97"/>
+            <p:cNvCxnSpPr/>
+            <p:nvPr/>
+          </p:nvCxnSpPr>
+          <p:spPr>
+            <a:xfrm rot="5400000">
+              <a:off x="4746210" y="831426"/>
+              <a:ext cx="1640809" cy="1109912"/>
+            </a:xfrm>
+            <a:prstGeom prst="bentConnector3">
+              <a:avLst/>
+            </a:prstGeom>
+            <a:ln w="25400">
+              <a:solidFill>
+                <a:schemeClr val="tx1"/>
+              </a:solidFill>
+              <a:tailEnd type="triangle"/>
+            </a:ln>
+          </p:spPr>
+          <p:style>
+            <a:lnRef idx="1">
+              <a:schemeClr val="accent1"/>
+            </a:lnRef>
+            <a:fillRef idx="0">
+              <a:schemeClr val="accent1"/>
+            </a:fillRef>
+            <a:effectRef idx="0">
+              <a:schemeClr val="accent1"/>
+            </a:effectRef>
+            <a:fontRef idx="minor">
+              <a:schemeClr val="tx1"/>
+            </a:fontRef>
+          </p:style>
+        </p:cxnSp>
+        <p:cxnSp>
+          <p:nvCxnSpPr>
+            <p:cNvPr id="99" name="Elbow Connector 98"/>
+            <p:cNvCxnSpPr/>
+            <p:nvPr/>
+          </p:nvCxnSpPr>
+          <p:spPr>
+            <a:xfrm rot="16200000" flipH="1">
+              <a:off x="5801980" y="885567"/>
+              <a:ext cx="1640809" cy="1001629"/>
+            </a:xfrm>
+            <a:prstGeom prst="bentConnector3">
+              <a:avLst/>
+            </a:prstGeom>
+            <a:ln w="25400">
+              <a:solidFill>
+                <a:schemeClr val="tx1"/>
+              </a:solidFill>
+              <a:tailEnd type="triangle"/>
+            </a:ln>
+          </p:spPr>
+          <p:style>
+            <a:lnRef idx="1">
+              <a:schemeClr val="accent1"/>
+            </a:lnRef>
+            <a:fillRef idx="0">
+              <a:schemeClr val="accent1"/>
+            </a:fillRef>
+            <a:effectRef idx="0">
+              <a:schemeClr val="accent1"/>
+            </a:effectRef>
+            <a:fontRef idx="minor">
+              <a:schemeClr val="tx1"/>
+            </a:fontRef>
+          </p:style>
+        </p:cxnSp>
+      </p:grpSp>
+      <p:grpSp>
+        <p:nvGrpSpPr>
+          <p:cNvPr id="104" name="Group 103"/>
+          <p:cNvGrpSpPr/>
+          <p:nvPr/>
+        </p:nvGrpSpPr>
+        <p:grpSpPr>
+          <a:xfrm>
+            <a:off x="11081986" y="3521242"/>
+            <a:ext cx="3254541" cy="3198900"/>
+            <a:chOff x="4440157" y="156905"/>
+            <a:chExt cx="3254541" cy="3198900"/>
+          </a:xfrm>
+        </p:grpSpPr>
+        <p:sp>
+          <p:nvSpPr>
+            <p:cNvPr id="105" name="Rectangle 104"/>
+            <p:cNvSpPr/>
+            <p:nvPr/>
+          </p:nvSpPr>
+          <p:spPr>
+            <a:xfrm>
+              <a:off x="5550070" y="156905"/>
+              <a:ext cx="1143000" cy="409073"/>
+            </a:xfrm>
+            <a:prstGeom prst="rect">
+              <a:avLst/>
+            </a:prstGeom>
+            <a:noFill/>
+            <a:ln w="25400">
+              <a:solidFill>
+                <a:schemeClr val="tx1"/>
+              </a:solidFill>
+            </a:ln>
+          </p:spPr>
+          <p:style>
+            <a:lnRef idx="2">
+              <a:schemeClr val="accent1">
+                <a:shade val="50000"/>
+              </a:schemeClr>
+            </a:lnRef>
+            <a:fillRef idx="1">
+              <a:schemeClr val="accent1"/>
+            </a:fillRef>
+            <a:effectRef idx="0">
+              <a:schemeClr val="accent1"/>
+            </a:effectRef>
+            <a:fontRef idx="minor">
+              <a:schemeClr val="lt1"/>
+            </a:fontRef>
+          </p:style>
+          <p:txBody>
+            <a:bodyPr rtlCol="0" anchor="ctr"/>
+            <a:lstStyle/>
+            <a:p>
+              <a:pPr algn="ctr"/>
+              <a:r>
+                <a:rPr kumimoji="1" lang="en-US" altLang="zh-CN" sz="2000" dirty="0" smtClean="0">
+                  <a:solidFill>
+                    <a:schemeClr val="tx1"/>
+                  </a:solidFill>
+                </a:rPr>
+                <a:t>A, B</a:t>
+              </a:r>
+              <a:endParaRPr kumimoji="1" lang="zh-CN" altLang="en-US" sz="2000" dirty="0" smtClean="0">
+                <a:solidFill>
+                  <a:schemeClr val="tx1"/>
+                </a:solidFill>
+              </a:endParaRPr>
+            </a:p>
+          </p:txBody>
+        </p:sp>
+        <p:sp>
+          <p:nvSpPr>
+            <p:cNvPr id="106" name="Rectangle 105"/>
+            <p:cNvSpPr/>
+            <p:nvPr/>
+          </p:nvSpPr>
+          <p:spPr>
+            <a:xfrm>
+              <a:off x="6551698" y="772772"/>
+              <a:ext cx="1143000" cy="409073"/>
+            </a:xfrm>
+            <a:prstGeom prst="rect">
+              <a:avLst/>
+            </a:prstGeom>
+            <a:noFill/>
+            <a:ln w="25400">
+              <a:solidFill>
+                <a:srgbClr val="00B0F0"/>
+              </a:solidFill>
+            </a:ln>
+          </p:spPr>
+          <p:style>
+            <a:lnRef idx="2">
+              <a:schemeClr val="accent1">
+                <a:shade val="50000"/>
+              </a:schemeClr>
+            </a:lnRef>
+            <a:fillRef idx="1">
+              <a:schemeClr val="accent1"/>
+            </a:fillRef>
+            <a:effectRef idx="0">
+              <a:schemeClr val="accent1"/>
+            </a:effectRef>
+            <a:fontRef idx="minor">
+              <a:schemeClr val="lt1"/>
+            </a:fontRef>
+          </p:style>
+          <p:txBody>
+            <a:bodyPr rtlCol="0" anchor="ctr"/>
+            <a:lstStyle/>
+            <a:p>
+              <a:pPr algn="ctr"/>
+              <a:r>
+                <a:rPr kumimoji="1" lang="en-US" altLang="zh-CN" sz="2000" dirty="0" smtClean="0">
+                  <a:solidFill>
+                    <a:schemeClr val="tx1"/>
+                  </a:solidFill>
+                </a:rPr>
+                <a:t>A</a:t>
+              </a:r>
+              <a:r>
+                <a:rPr kumimoji="1" lang="zh-CN" altLang="en-US" sz="2000" dirty="0" smtClean="0">
+                  <a:solidFill>
+                    <a:schemeClr val="tx1"/>
+                  </a:solidFill>
+                </a:rPr>
+                <a:t> </a:t>
+              </a:r>
+              <a:r>
+                <a:rPr kumimoji="1" lang="en-US" altLang="zh-CN" sz="2000" dirty="0" err="1" smtClean="0">
+                  <a:solidFill>
+                    <a:schemeClr val="tx1"/>
+                  </a:solidFill>
+                </a:rPr>
+                <a:t>xor</a:t>
+              </a:r>
+              <a:r>
+                <a:rPr kumimoji="1" lang="zh-CN" altLang="en-US" sz="2000" dirty="0" smtClean="0">
+                  <a:solidFill>
+                    <a:schemeClr val="tx1"/>
+                  </a:solidFill>
+                </a:rPr>
+                <a:t> </a:t>
+              </a:r>
+              <a:r>
+                <a:rPr kumimoji="1" lang="en-US" altLang="zh-CN" sz="2000" dirty="0" smtClean="0">
+                  <a:solidFill>
+                    <a:schemeClr val="tx1"/>
+                  </a:solidFill>
+                </a:rPr>
+                <a:t>B</a:t>
+              </a:r>
+              <a:endParaRPr kumimoji="1" lang="zh-CN" altLang="en-US" sz="2000" dirty="0" smtClean="0">
+                <a:solidFill>
+                  <a:schemeClr val="tx1"/>
+                </a:solidFill>
+              </a:endParaRPr>
+            </a:p>
+          </p:txBody>
+        </p:sp>
+        <p:grpSp>
+          <p:nvGrpSpPr>
+            <p:cNvPr id="107" name="Group 106"/>
+            <p:cNvGrpSpPr/>
+            <p:nvPr/>
+          </p:nvGrpSpPr>
+          <p:grpSpPr>
+            <a:xfrm>
+              <a:off x="4440157" y="2206787"/>
+              <a:ext cx="1143000" cy="1149018"/>
+              <a:chOff x="866275" y="2781297"/>
+              <a:chExt cx="1143000" cy="1149018"/>
+            </a:xfrm>
+          </p:grpSpPr>
+          <p:sp>
+            <p:nvSpPr>
+              <p:cNvPr id="113" name="Rectangle 112"/>
+              <p:cNvSpPr/>
+              <p:nvPr/>
+            </p:nvSpPr>
+            <p:spPr>
+              <a:xfrm>
+                <a:off x="866275" y="3521242"/>
+                <a:ext cx="1143000" cy="409073"/>
+              </a:xfrm>
+              <a:prstGeom prst="rect">
+                <a:avLst/>
+              </a:prstGeom>
+              <a:noFill/>
+              <a:ln w="25400">
+                <a:solidFill>
+                  <a:schemeClr val="tx1"/>
+                </a:solidFill>
+              </a:ln>
+            </p:spPr>
+            <p:style>
+              <a:lnRef idx="2">
+                <a:schemeClr val="accent1">
+                  <a:shade val="50000"/>
+                </a:schemeClr>
+              </a:lnRef>
+              <a:fillRef idx="1">
+                <a:schemeClr val="accent1"/>
+              </a:fillRef>
+              <a:effectRef idx="0">
+                <a:schemeClr val="accent1"/>
+              </a:effectRef>
+              <a:fontRef idx="minor">
+                <a:schemeClr val="lt1"/>
+              </a:fontRef>
+            </p:style>
+            <p:txBody>
+              <a:bodyPr rtlCol="0" anchor="ctr"/>
+              <a:lstStyle/>
+              <a:p>
+                <a:pPr algn="ctr"/>
+                <a:r>
+                  <a:rPr kumimoji="1" lang="en-US" altLang="zh-CN" sz="2000" dirty="0" smtClean="0">
+                    <a:solidFill>
+                      <a:schemeClr val="tx1"/>
+                    </a:solidFill>
+                  </a:rPr>
+                  <a:t>B</a:t>
+                </a:r>
+                <a:endParaRPr kumimoji="1" lang="zh-CN" altLang="en-US" sz="2000" dirty="0" smtClean="0">
+                  <a:solidFill>
+                    <a:schemeClr val="tx1"/>
+                  </a:solidFill>
+                </a:endParaRPr>
+              </a:p>
+            </p:txBody>
+          </p:sp>
+          <p:sp>
+            <p:nvSpPr>
+              <p:cNvPr id="114" name="Rectangle 113"/>
+              <p:cNvSpPr/>
+              <p:nvPr/>
+            </p:nvSpPr>
+            <p:spPr>
+              <a:xfrm>
+                <a:off x="1082844" y="2781297"/>
+                <a:ext cx="709863" cy="709863"/>
+              </a:xfrm>
+              <a:prstGeom prst="rect">
+                <a:avLst/>
+              </a:prstGeom>
+              <a:noFill/>
+              <a:ln w="25400">
+                <a:solidFill>
+                  <a:srgbClr val="FF0000"/>
+                </a:solidFill>
+              </a:ln>
+            </p:spPr>
+            <p:style>
+              <a:lnRef idx="2">
+                <a:schemeClr val="accent1">
+                  <a:shade val="50000"/>
+                </a:schemeClr>
+              </a:lnRef>
+              <a:fillRef idx="1">
+                <a:schemeClr val="accent1"/>
+              </a:fillRef>
+              <a:effectRef idx="0">
+                <a:schemeClr val="accent1"/>
+              </a:effectRef>
+              <a:fontRef idx="minor">
+                <a:schemeClr val="lt1"/>
+              </a:fontRef>
+            </p:style>
+            <p:txBody>
+              <a:bodyPr rtlCol="0" anchor="ctr"/>
+              <a:lstStyle/>
+              <a:p>
+                <a:pPr algn="ctr"/>
+                <a:r>
+                  <a:rPr kumimoji="1" lang="en-US" altLang="zh-CN" sz="2000" dirty="0" err="1">
+                    <a:solidFill>
+                      <a:schemeClr val="tx1"/>
+                    </a:solidFill>
+                  </a:rPr>
+                  <a:t>A</a:t>
+                </a:r>
+                <a:endParaRPr kumimoji="1" lang="zh-CN" altLang="en-US" sz="2000" dirty="0" smtClean="0">
+                  <a:solidFill>
+                    <a:schemeClr val="tx1"/>
+                  </a:solidFill>
+                </a:endParaRPr>
+              </a:p>
+            </p:txBody>
+          </p:sp>
+        </p:grpSp>
+        <p:grpSp>
+          <p:nvGrpSpPr>
+            <p:cNvPr id="108" name="Group 107"/>
+            <p:cNvGrpSpPr/>
+            <p:nvPr/>
+          </p:nvGrpSpPr>
+          <p:grpSpPr>
+            <a:xfrm>
+              <a:off x="6551698" y="2206787"/>
+              <a:ext cx="1143000" cy="1149018"/>
+              <a:chOff x="2977816" y="2781297"/>
+              <a:chExt cx="1143000" cy="1149018"/>
+            </a:xfrm>
+          </p:grpSpPr>
+          <p:sp>
+            <p:nvSpPr>
+              <p:cNvPr id="111" name="Rectangle 110"/>
+              <p:cNvSpPr/>
+              <p:nvPr/>
+            </p:nvSpPr>
+            <p:spPr>
+              <a:xfrm>
+                <a:off x="2977816" y="3521242"/>
+                <a:ext cx="1143000" cy="409073"/>
+              </a:xfrm>
+              <a:prstGeom prst="rect">
+                <a:avLst/>
+              </a:prstGeom>
+              <a:noFill/>
+              <a:ln w="25400">
+                <a:solidFill>
+                  <a:schemeClr val="tx1"/>
+                </a:solidFill>
+              </a:ln>
+            </p:spPr>
+            <p:style>
+              <a:lnRef idx="2">
+                <a:schemeClr val="accent1">
+                  <a:shade val="50000"/>
+                </a:schemeClr>
+              </a:lnRef>
+              <a:fillRef idx="1">
+                <a:schemeClr val="accent1"/>
+              </a:fillRef>
+              <a:effectRef idx="0">
+                <a:schemeClr val="accent1"/>
+              </a:effectRef>
+              <a:fontRef idx="minor">
+                <a:schemeClr val="lt1"/>
+              </a:fontRef>
+            </p:style>
+            <p:txBody>
+              <a:bodyPr rtlCol="0" anchor="ctr"/>
+              <a:lstStyle/>
+              <a:p>
+                <a:pPr algn="ctr"/>
+                <a:r>
+                  <a:rPr kumimoji="1" lang="en-US" altLang="zh-CN" sz="2000" dirty="0" smtClean="0">
+                    <a:solidFill>
+                      <a:schemeClr val="tx1"/>
+                    </a:solidFill>
+                  </a:rPr>
+                  <a:t>A</a:t>
+                </a:r>
+                <a:endParaRPr kumimoji="1" lang="zh-CN" altLang="en-US" sz="2000" dirty="0" smtClean="0">
+                  <a:solidFill>
+                    <a:schemeClr val="tx1"/>
+                  </a:solidFill>
+                </a:endParaRPr>
+              </a:p>
+            </p:txBody>
+          </p:sp>
+          <p:sp>
+            <p:nvSpPr>
+              <p:cNvPr id="112" name="Rectangle 111"/>
+              <p:cNvSpPr/>
+              <p:nvPr/>
+            </p:nvSpPr>
+            <p:spPr>
+              <a:xfrm>
+                <a:off x="3194385" y="2781297"/>
+                <a:ext cx="709863" cy="709863"/>
+              </a:xfrm>
+              <a:prstGeom prst="rect">
+                <a:avLst/>
+              </a:prstGeom>
+              <a:noFill/>
+              <a:ln w="25400">
+                <a:solidFill>
+                  <a:srgbClr val="FF0000"/>
+                </a:solidFill>
+              </a:ln>
+            </p:spPr>
+            <p:style>
+              <a:lnRef idx="2">
+                <a:schemeClr val="accent1">
+                  <a:shade val="50000"/>
+                </a:schemeClr>
+              </a:lnRef>
+              <a:fillRef idx="1">
+                <a:schemeClr val="accent1"/>
+              </a:fillRef>
+              <a:effectRef idx="0">
+                <a:schemeClr val="accent1"/>
+              </a:effectRef>
+              <a:fontRef idx="minor">
+                <a:schemeClr val="lt1"/>
+              </a:fontRef>
+            </p:style>
+            <p:txBody>
+              <a:bodyPr rtlCol="0" anchor="ctr"/>
+              <a:lstStyle/>
+              <a:p>
+                <a:pPr algn="ctr"/>
+                <a:r>
+                  <a:rPr kumimoji="1" lang="en-US" altLang="zh-CN" sz="2000" dirty="0" err="1" smtClean="0">
+                    <a:solidFill>
+                      <a:schemeClr val="tx1"/>
+                    </a:solidFill>
+                  </a:rPr>
+                  <a:t>B</a:t>
+                </a:r>
+                <a:endParaRPr kumimoji="1" lang="zh-CN" altLang="en-US" sz="2000" dirty="0" smtClean="0">
+                  <a:solidFill>
+                    <a:schemeClr val="tx1"/>
+                  </a:solidFill>
+                </a:endParaRPr>
+              </a:p>
+            </p:txBody>
+          </p:sp>
+        </p:grpSp>
+        <p:cxnSp>
+          <p:nvCxnSpPr>
+            <p:cNvPr id="109" name="Elbow Connector 108"/>
+            <p:cNvCxnSpPr/>
+            <p:nvPr/>
+          </p:nvCxnSpPr>
+          <p:spPr>
+            <a:xfrm rot="5400000">
+              <a:off x="4746210" y="831426"/>
+              <a:ext cx="1640809" cy="1109912"/>
+            </a:xfrm>
+            <a:prstGeom prst="bentConnector3">
+              <a:avLst/>
+            </a:prstGeom>
+            <a:ln w="25400">
+              <a:solidFill>
+                <a:schemeClr val="tx1"/>
+              </a:solidFill>
+              <a:tailEnd type="triangle"/>
+            </a:ln>
+          </p:spPr>
+          <p:style>
+            <a:lnRef idx="1">
+              <a:schemeClr val="accent1"/>
+            </a:lnRef>
+            <a:fillRef idx="0">
+              <a:schemeClr val="accent1"/>
+            </a:fillRef>
+            <a:effectRef idx="0">
+              <a:schemeClr val="accent1"/>
+            </a:effectRef>
+            <a:fontRef idx="minor">
+              <a:schemeClr val="tx1"/>
+            </a:fontRef>
+          </p:style>
+        </p:cxnSp>
+        <p:cxnSp>
+          <p:nvCxnSpPr>
+            <p:cNvPr id="110" name="Elbow Connector 109"/>
+            <p:cNvCxnSpPr/>
+            <p:nvPr/>
+          </p:nvCxnSpPr>
+          <p:spPr>
+            <a:xfrm rot="16200000" flipH="1">
+              <a:off x="5801980" y="885567"/>
+              <a:ext cx="1640809" cy="1001629"/>
+            </a:xfrm>
+            <a:prstGeom prst="bentConnector3">
+              <a:avLst/>
+            </a:prstGeom>
+            <a:ln w="25400">
+              <a:solidFill>
+                <a:schemeClr val="tx1"/>
+              </a:solidFill>
+              <a:tailEnd type="triangle"/>
+            </a:ln>
+          </p:spPr>
+          <p:style>
+            <a:lnRef idx="1">
+              <a:schemeClr val="accent1"/>
+            </a:lnRef>
+            <a:fillRef idx="0">
+              <a:schemeClr val="accent1"/>
+            </a:fillRef>
+            <a:effectRef idx="0">
+              <a:schemeClr val="accent1"/>
+            </a:effectRef>
+            <a:fontRef idx="minor">
+              <a:schemeClr val="tx1"/>
+            </a:fontRef>
+          </p:style>
+        </p:cxnSp>
+      </p:grpSp>
+    </p:spTree>
+    <p:extLst>
+      <p:ext uri="{BB962C8B-B14F-4D97-AF65-F5344CB8AC3E}">
+        <p14:creationId xmlns:p14="http://schemas.microsoft.com/office/powerpoint/2010/main" val="1786902044"/>
+      </p:ext>
+    </p:extLst>
+  </p:cSld>
+  <p:clrMapOvr>
+    <a:masterClrMapping/>
+  </p:clrMapOvr>
+</p:sld>
+</file>
+
 <file path=ppt/theme/theme1.xml><?xml version="1.0" encoding="utf-8"?>
 <a:theme xmlns:a="http://schemas.openxmlformats.org/drawingml/2006/main" name="Office Theme">
   <a:themeElements>

</xml_diff>

<commit_message>
table description for memory and codedable request
</commit_message>
<xml_diff>
--- a/figures.pptx
+++ b/figures.pptx
@@ -10,6 +10,7 @@
     <p:sldId id="258" r:id="rId4"/>
     <p:sldId id="259" r:id="rId5"/>
     <p:sldId id="260" r:id="rId6"/>
+    <p:sldId id="261" r:id="rId7"/>
   </p:sldIdLst>
   <p:sldSz cx="12192000" cy="6858000"/>
   <p:notesSz cx="6858000" cy="9144000"/>
@@ -122,6 +123,7 @@
         <p14:section name="Predict Network Status" id="{FEC046B3-1D1B-C84E-8634-F011F0A428EB}">
           <p14:sldIdLst>
             <p14:sldId id="260"/>
+            <p14:sldId id="261"/>
           </p14:sldIdLst>
         </p14:section>
       </p14:sectionLst>
@@ -264,7 +266,7 @@
           <a:p>
             <a:fld id="{5386D14C-7C63-454A-9FEB-090854700008}" type="datetimeFigureOut">
               <a:rPr kumimoji="1" lang="zh-CN" altLang="en-US" smtClean="0"/>
-              <a:t>2017/10/25</a:t>
+              <a:t>2017/11/2</a:t>
             </a:fld>
             <a:endParaRPr kumimoji="1" lang="zh-CN" altLang="en-US"/>
           </a:p>
@@ -434,7 +436,7 @@
           <a:p>
             <a:fld id="{5386D14C-7C63-454A-9FEB-090854700008}" type="datetimeFigureOut">
               <a:rPr kumimoji="1" lang="zh-CN" altLang="en-US" smtClean="0"/>
-              <a:t>2017/10/25</a:t>
+              <a:t>2017/11/2</a:t>
             </a:fld>
             <a:endParaRPr kumimoji="1" lang="zh-CN" altLang="en-US"/>
           </a:p>
@@ -614,7 +616,7 @@
           <a:p>
             <a:fld id="{5386D14C-7C63-454A-9FEB-090854700008}" type="datetimeFigureOut">
               <a:rPr kumimoji="1" lang="zh-CN" altLang="en-US" smtClean="0"/>
-              <a:t>2017/10/25</a:t>
+              <a:t>2017/11/2</a:t>
             </a:fld>
             <a:endParaRPr kumimoji="1" lang="zh-CN" altLang="en-US"/>
           </a:p>
@@ -784,7 +786,7 @@
           <a:p>
             <a:fld id="{5386D14C-7C63-454A-9FEB-090854700008}" type="datetimeFigureOut">
               <a:rPr kumimoji="1" lang="zh-CN" altLang="en-US" smtClean="0"/>
-              <a:t>2017/10/25</a:t>
+              <a:t>2017/11/2</a:t>
             </a:fld>
             <a:endParaRPr kumimoji="1" lang="zh-CN" altLang="en-US"/>
           </a:p>
@@ -1030,7 +1032,7 @@
           <a:p>
             <a:fld id="{5386D14C-7C63-454A-9FEB-090854700008}" type="datetimeFigureOut">
               <a:rPr kumimoji="1" lang="zh-CN" altLang="en-US" smtClean="0"/>
-              <a:t>2017/10/25</a:t>
+              <a:t>2017/11/2</a:t>
             </a:fld>
             <a:endParaRPr kumimoji="1" lang="zh-CN" altLang="en-US"/>
           </a:p>
@@ -1262,7 +1264,7 @@
           <a:p>
             <a:fld id="{5386D14C-7C63-454A-9FEB-090854700008}" type="datetimeFigureOut">
               <a:rPr kumimoji="1" lang="zh-CN" altLang="en-US" smtClean="0"/>
-              <a:t>2017/10/25</a:t>
+              <a:t>2017/11/2</a:t>
             </a:fld>
             <a:endParaRPr kumimoji="1" lang="zh-CN" altLang="en-US"/>
           </a:p>
@@ -1629,7 +1631,7 @@
           <a:p>
             <a:fld id="{5386D14C-7C63-454A-9FEB-090854700008}" type="datetimeFigureOut">
               <a:rPr kumimoji="1" lang="zh-CN" altLang="en-US" smtClean="0"/>
-              <a:t>2017/10/25</a:t>
+              <a:t>2017/11/2</a:t>
             </a:fld>
             <a:endParaRPr kumimoji="1" lang="zh-CN" altLang="en-US"/>
           </a:p>
@@ -1747,7 +1749,7 @@
           <a:p>
             <a:fld id="{5386D14C-7C63-454A-9FEB-090854700008}" type="datetimeFigureOut">
               <a:rPr kumimoji="1" lang="zh-CN" altLang="en-US" smtClean="0"/>
-              <a:t>2017/10/25</a:t>
+              <a:t>2017/11/2</a:t>
             </a:fld>
             <a:endParaRPr kumimoji="1" lang="zh-CN" altLang="en-US"/>
           </a:p>
@@ -1842,7 +1844,7 @@
           <a:p>
             <a:fld id="{5386D14C-7C63-454A-9FEB-090854700008}" type="datetimeFigureOut">
               <a:rPr kumimoji="1" lang="zh-CN" altLang="en-US" smtClean="0"/>
-              <a:t>2017/10/25</a:t>
+              <a:t>2017/11/2</a:t>
             </a:fld>
             <a:endParaRPr kumimoji="1" lang="zh-CN" altLang="en-US"/>
           </a:p>
@@ -2119,7 +2121,7 @@
           <a:p>
             <a:fld id="{5386D14C-7C63-454A-9FEB-090854700008}" type="datetimeFigureOut">
               <a:rPr kumimoji="1" lang="zh-CN" altLang="en-US" smtClean="0"/>
-              <a:t>2017/10/25</a:t>
+              <a:t>2017/11/2</a:t>
             </a:fld>
             <a:endParaRPr kumimoji="1" lang="zh-CN" altLang="en-US"/>
           </a:p>
@@ -2372,7 +2374,7 @@
           <a:p>
             <a:fld id="{5386D14C-7C63-454A-9FEB-090854700008}" type="datetimeFigureOut">
               <a:rPr kumimoji="1" lang="zh-CN" altLang="en-US" smtClean="0"/>
-              <a:t>2017/10/25</a:t>
+              <a:t>2017/11/2</a:t>
             </a:fld>
             <a:endParaRPr kumimoji="1" lang="zh-CN" altLang="en-US"/>
           </a:p>
@@ -2585,7 +2587,7 @@
           <a:p>
             <a:fld id="{5386D14C-7C63-454A-9FEB-090854700008}" type="datetimeFigureOut">
               <a:rPr kumimoji="1" lang="zh-CN" altLang="en-US" smtClean="0"/>
-              <a:t>2017/10/25</a:t>
+              <a:t>2017/11/2</a:t>
             </a:fld>
             <a:endParaRPr kumimoji="1" lang="zh-CN" altLang="en-US"/>
           </a:p>
@@ -7793,7 +7795,7 @@
         </p:nvGrpSpPr>
         <p:grpSpPr>
           <a:xfrm>
-            <a:off x="-3587646" y="-417605"/>
+            <a:off x="-2046581" y="-212175"/>
             <a:ext cx="3254541" cy="3198900"/>
             <a:chOff x="506" y="156905"/>
             <a:chExt cx="3254541" cy="3198900"/>
@@ -7847,7 +7849,7 @@
                     <a:schemeClr val="tx1"/>
                   </a:solidFill>
                 </a:rPr>
-                <a:t>A, B</a:t>
+                <a:t>Server</a:t>
               </a:r>
               <a:endParaRPr kumimoji="1" lang="zh-CN" altLang="en-US" sz="2000" dirty="0" smtClean="0">
                 <a:solidFill>
@@ -7899,6 +7901,14 @@
             <a:lstStyle/>
             <a:p>
               <a:pPr algn="ctr"/>
+              <a:r>
+                <a:rPr kumimoji="1" lang="en-US" altLang="zh-CN" sz="2000" dirty="0" smtClean="0">
+                  <a:solidFill>
+                    <a:schemeClr val="tx1"/>
+                  </a:solidFill>
+                </a:rPr>
+                <a:t>Send</a:t>
+              </a:r>
               <a:endParaRPr kumimoji="1" lang="zh-CN" altLang="en-US" sz="2000" dirty="0" smtClean="0">
                 <a:solidFill>
                   <a:schemeClr val="tx1"/>
@@ -7963,6 +7973,30 @@
               <a:lstStyle/>
               <a:p>
                 <a:pPr algn="ctr"/>
+                <a:r>
+                  <a:rPr kumimoji="1" lang="en-US" altLang="zh-CN" sz="2000" dirty="0" smtClean="0">
+                    <a:solidFill>
+                      <a:schemeClr val="tx1"/>
+                    </a:solidFill>
+                  </a:rPr>
+                  <a:t>Cache</a:t>
+                </a:r>
+                <a:r>
+                  <a:rPr kumimoji="1" lang="zh-CN" altLang="en-US" sz="2000" dirty="0" smtClean="0">
+                    <a:solidFill>
+                      <a:schemeClr val="tx1"/>
+                    </a:solidFill>
+                  </a:rPr>
+                  <a:t> </a:t>
+                </a:r>
+                <a:r>
+                  <a:rPr kumimoji="1" lang="en-US" altLang="zh-CN" sz="2000" dirty="0" smtClean="0">
+                    <a:solidFill>
+                      <a:schemeClr val="tx1"/>
+                    </a:solidFill>
+                  </a:rPr>
+                  <a:t>1</a:t>
+                </a:r>
                 <a:endParaRPr kumimoji="1" lang="zh-CN" altLang="en-US" sz="2000" dirty="0" smtClean="0">
                   <a:solidFill>
                     <a:schemeClr val="tx1"/>
@@ -8013,6 +8047,14 @@
               <a:lstStyle/>
               <a:p>
                 <a:pPr algn="ctr"/>
+                <a:r>
+                  <a:rPr kumimoji="1" lang="en-US" altLang="zh-CN" sz="2000" dirty="0" err="1" smtClean="0">
+                    <a:solidFill>
+                      <a:schemeClr val="tx1"/>
+                    </a:solidFill>
+                  </a:rPr>
+                  <a:t>Req</a:t>
+                </a:r>
                 <a:endParaRPr kumimoji="1" lang="zh-CN" altLang="en-US" sz="2000" dirty="0" smtClean="0">
                   <a:solidFill>
                     <a:schemeClr val="tx1"/>
@@ -8078,6 +8120,30 @@
               <a:lstStyle/>
               <a:p>
                 <a:pPr algn="ctr"/>
+                <a:r>
+                  <a:rPr kumimoji="1" lang="en-US" altLang="zh-CN" sz="2000" dirty="0" smtClean="0">
+                    <a:solidFill>
+                      <a:schemeClr val="tx1"/>
+                    </a:solidFill>
+                  </a:rPr>
+                  <a:t>Cache</a:t>
+                </a:r>
+                <a:r>
+                  <a:rPr kumimoji="1" lang="zh-CN" altLang="en-US" sz="2000" dirty="0" smtClean="0">
+                    <a:solidFill>
+                      <a:schemeClr val="tx1"/>
+                    </a:solidFill>
+                  </a:rPr>
+                  <a:t> </a:t>
+                </a:r>
+                <a:r>
+                  <a:rPr kumimoji="1" lang="en-US" altLang="zh-CN" sz="2000" dirty="0" smtClean="0">
+                    <a:solidFill>
+                      <a:schemeClr val="tx1"/>
+                    </a:solidFill>
+                  </a:rPr>
+                  <a:t>2</a:t>
+                </a:r>
                 <a:endParaRPr kumimoji="1" lang="zh-CN" altLang="en-US" sz="2000" dirty="0" smtClean="0">
                   <a:solidFill>
                     <a:schemeClr val="tx1"/>
@@ -8128,6 +8194,14 @@
               <a:lstStyle/>
               <a:p>
                 <a:pPr algn="ctr"/>
+                <a:r>
+                  <a:rPr kumimoji="1" lang="en-US" altLang="zh-CN" sz="2000" dirty="0" err="1" smtClean="0">
+                    <a:solidFill>
+                      <a:schemeClr val="tx1"/>
+                    </a:solidFill>
+                  </a:rPr>
+                  <a:t>Req</a:t>
+                </a:r>
                 <a:endParaRPr kumimoji="1" lang="zh-CN" altLang="en-US" sz="2000" dirty="0" smtClean="0">
                   <a:solidFill>
                     <a:schemeClr val="tx1"/>
@@ -8224,7 +8298,7 @@
         </p:nvGrpSpPr>
         <p:grpSpPr>
           <a:xfrm>
-            <a:off x="224977" y="-377574"/>
+            <a:off x="2947547" y="-416711"/>
             <a:ext cx="3254541" cy="3198900"/>
             <a:chOff x="4440157" y="156905"/>
             <a:chExt cx="3254541" cy="3198900"/>
@@ -8402,6 +8476,14 @@
               <a:lstStyle/>
               <a:p>
                 <a:pPr algn="ctr"/>
+                <a:r>
+                  <a:rPr kumimoji="1" lang="en-US" altLang="zh-CN" sz="2000" dirty="0" smtClean="0">
+                    <a:solidFill>
+                      <a:schemeClr val="tx1"/>
+                    </a:solidFill>
+                  </a:rPr>
+                  <a:t>N/A</a:t>
+                </a:r>
                 <a:endParaRPr kumimoji="1" lang="zh-CN" altLang="en-US" sz="2000" dirty="0" smtClean="0">
                   <a:solidFill>
                     <a:schemeClr val="tx1"/>
@@ -8525,6 +8607,30 @@
               <a:lstStyle/>
               <a:p>
                 <a:pPr algn="ctr"/>
+                <a:r>
+                  <a:rPr kumimoji="1" lang="en-US" altLang="zh-CN" sz="2000" dirty="0" smtClean="0">
+                    <a:solidFill>
+                      <a:schemeClr val="tx1"/>
+                    </a:solidFill>
+                  </a:rPr>
+                  <a:t>No</a:t>
+                </a:r>
+                <a:r>
+                  <a:rPr kumimoji="1" lang="zh-CN" altLang="en-US" sz="2000" dirty="0" smtClean="0">
+                    <a:solidFill>
+                      <a:schemeClr val="tx1"/>
+                    </a:solidFill>
+                  </a:rPr>
+                  <a:t> </a:t>
+                </a:r>
+                <a:r>
+                  <a:rPr kumimoji="1" lang="en-US" altLang="zh-CN" sz="2000" dirty="0" smtClean="0">
+                    <a:solidFill>
+                      <a:schemeClr val="tx1"/>
+                    </a:solidFill>
+                  </a:rPr>
+                  <a:t>B</a:t>
+                </a:r>
                 <a:endParaRPr kumimoji="1" lang="zh-CN" altLang="en-US" sz="2000" dirty="0" smtClean="0">
                   <a:solidFill>
                     <a:schemeClr val="tx1"/>
@@ -8677,7 +8783,7 @@
         </p:nvGrpSpPr>
         <p:grpSpPr>
           <a:xfrm>
-            <a:off x="4383937" y="-348384"/>
+            <a:off x="7106507" y="-387521"/>
             <a:ext cx="3254541" cy="3198900"/>
             <a:chOff x="4440157" y="156905"/>
             <a:chExt cx="3254541" cy="3198900"/>
@@ -8855,6 +8961,30 @@
               <a:lstStyle/>
               <a:p>
                 <a:pPr algn="ctr"/>
+                <a:r>
+                  <a:rPr kumimoji="1" lang="en-US" altLang="zh-CN" sz="2000" dirty="0" smtClean="0">
+                    <a:solidFill>
+                      <a:schemeClr val="tx1"/>
+                    </a:solidFill>
+                  </a:rPr>
+                  <a:t>No</a:t>
+                </a:r>
+                <a:r>
+                  <a:rPr kumimoji="1" lang="zh-CN" altLang="en-US" sz="2000" dirty="0" smtClean="0">
+                    <a:solidFill>
+                      <a:schemeClr val="tx1"/>
+                    </a:solidFill>
+                  </a:rPr>
+                  <a:t> </a:t>
+                </a:r>
+                <a:r>
+                  <a:rPr kumimoji="1" lang="en-US" altLang="zh-CN" sz="2000" dirty="0" smtClean="0">
+                    <a:solidFill>
+                      <a:schemeClr val="tx1"/>
+                    </a:solidFill>
+                  </a:rPr>
+                  <a:t>A</a:t>
+                </a:r>
                 <a:endParaRPr kumimoji="1" lang="zh-CN" altLang="en-US" sz="2000" dirty="0" smtClean="0">
                   <a:solidFill>
                     <a:schemeClr val="tx1"/>
@@ -8978,6 +9108,30 @@
               <a:lstStyle/>
               <a:p>
                 <a:pPr algn="ctr"/>
+                <a:r>
+                  <a:rPr kumimoji="1" lang="en-US" altLang="zh-CN" sz="2000" dirty="0" smtClean="0">
+                    <a:solidFill>
+                      <a:schemeClr val="tx1"/>
+                    </a:solidFill>
+                  </a:rPr>
+                  <a:t>No</a:t>
+                </a:r>
+                <a:r>
+                  <a:rPr kumimoji="1" lang="zh-CN" altLang="en-US" sz="2000" dirty="0" smtClean="0">
+                    <a:solidFill>
+                      <a:schemeClr val="tx1"/>
+                    </a:solidFill>
+                  </a:rPr>
+                  <a:t> </a:t>
+                </a:r>
+                <a:r>
+                  <a:rPr kumimoji="1" lang="en-US" altLang="zh-CN" sz="2000" dirty="0" smtClean="0">
+                    <a:solidFill>
+                      <a:schemeClr val="tx1"/>
+                    </a:solidFill>
+                  </a:rPr>
+                  <a:t>A</a:t>
+                </a:r>
                 <a:endParaRPr kumimoji="1" lang="zh-CN" altLang="en-US" sz="2000" dirty="0" smtClean="0">
                   <a:solidFill>
                     <a:schemeClr val="tx1"/>
@@ -9126,7 +9280,7 @@
         </p:nvGrpSpPr>
         <p:grpSpPr>
           <a:xfrm>
-            <a:off x="8359416" y="-348384"/>
+            <a:off x="11081986" y="-387521"/>
             <a:ext cx="3254541" cy="3198900"/>
             <a:chOff x="4440157" y="156905"/>
             <a:chExt cx="3254541" cy="3198900"/>
@@ -9304,6 +9458,30 @@
               <a:lstStyle/>
               <a:p>
                 <a:pPr algn="ctr"/>
+                <a:r>
+                  <a:rPr kumimoji="1" lang="en-US" altLang="zh-CN" sz="2000" dirty="0" smtClean="0">
+                    <a:solidFill>
+                      <a:schemeClr val="tx1"/>
+                    </a:solidFill>
+                  </a:rPr>
+                  <a:t>No</a:t>
+                </a:r>
+                <a:r>
+                  <a:rPr kumimoji="1" lang="zh-CN" altLang="en-US" sz="2000" dirty="0" smtClean="0">
+                    <a:solidFill>
+                      <a:schemeClr val="tx1"/>
+                    </a:solidFill>
+                  </a:rPr>
+                  <a:t> </a:t>
+                </a:r>
+                <a:r>
+                  <a:rPr kumimoji="1" lang="en-US" altLang="zh-CN" sz="2000" dirty="0" smtClean="0">
+                    <a:solidFill>
+                      <a:schemeClr val="tx1"/>
+                    </a:solidFill>
+                  </a:rPr>
+                  <a:t>A</a:t>
+                </a:r>
                 <a:endParaRPr kumimoji="1" lang="zh-CN" altLang="en-US" sz="2000" dirty="0" smtClean="0">
                   <a:solidFill>
                     <a:schemeClr val="tx1"/>
@@ -9427,6 +9605,14 @@
               <a:lstStyle/>
               <a:p>
                 <a:pPr algn="ctr"/>
+                <a:r>
+                  <a:rPr kumimoji="1" lang="en-US" altLang="zh-CN" sz="2000" dirty="0" smtClean="0">
+                    <a:solidFill>
+                      <a:schemeClr val="tx1"/>
+                    </a:solidFill>
+                  </a:rPr>
+                  <a:t>N/A</a:t>
+                </a:r>
                 <a:endParaRPr kumimoji="1" lang="zh-CN" altLang="en-US" sz="2000" dirty="0" smtClean="0">
                   <a:solidFill>
                     <a:schemeClr val="tx1"/>
@@ -9890,15 +10076,7 @@
                       <a:schemeClr val="tx1"/>
                     </a:solidFill>
                   </a:rPr>
-                  <a:t>N</a:t>
-                </a:r>
-                <a:r>
-                  <a:rPr kumimoji="1" lang="en-US" altLang="zh-CN" sz="2000" dirty="0" smtClean="0">
-                    <a:solidFill>
-                      <a:schemeClr val="tx1"/>
-                    </a:solidFill>
-                  </a:rPr>
-                  <a:t>o A</a:t>
+                  <a:t>No A</a:t>
                 </a:r>
                 <a:endParaRPr kumimoji="1" lang="zh-CN" altLang="en-US" sz="2000" dirty="0" smtClean="0">
                   <a:solidFill>
@@ -10048,7 +10226,7 @@
         </p:nvGrpSpPr>
         <p:grpSpPr>
           <a:xfrm>
-            <a:off x="3739316" y="3521242"/>
+            <a:off x="7470364" y="3516163"/>
             <a:ext cx="3254541" cy="3198900"/>
             <a:chOff x="4440157" y="156905"/>
             <a:chExt cx="3254541" cy="3198900"/>
@@ -10513,7 +10691,7 @@
         </p:nvGrpSpPr>
         <p:grpSpPr>
           <a:xfrm>
-            <a:off x="7390899" y="3521242"/>
+            <a:off x="3686041" y="3554588"/>
             <a:ext cx="3254541" cy="3198900"/>
             <a:chOff x="4440157" y="156905"/>
             <a:chExt cx="3254541" cy="3198900"/>
@@ -11480,6 +11658,2478 @@
 </p:sld>
 </file>
 
+<file path=ppt/slides/slide6.xml><?xml version="1.0" encoding="utf-8"?>
+<p:sld xmlns:a="http://schemas.openxmlformats.org/drawingml/2006/main" xmlns:r="http://schemas.openxmlformats.org/officeDocument/2006/relationships" xmlns:p="http://schemas.openxmlformats.org/presentationml/2006/main">
+  <p:cSld>
+    <p:spTree>
+      <p:nvGrpSpPr>
+        <p:cNvPr id="1" name=""/>
+        <p:cNvGrpSpPr/>
+        <p:nvPr/>
+      </p:nvGrpSpPr>
+      <p:grpSpPr>
+        <a:xfrm>
+          <a:off x="0" y="0"/>
+          <a:ext cx="0" cy="0"/>
+          <a:chOff x="0" y="0"/>
+          <a:chExt cx="0" cy="0"/>
+        </a:xfrm>
+      </p:grpSpPr>
+      <p:graphicFrame>
+        <p:nvGraphicFramePr>
+          <p:cNvPr id="7" name="Table 6"/>
+          <p:cNvGraphicFramePr>
+            <a:graphicFrameLocks noGrp="1"/>
+          </p:cNvGraphicFramePr>
+          <p:nvPr>
+            <p:extLst>
+              <p:ext uri="{D42A27DB-BD31-4B8C-83A1-F6EECF244321}">
+                <p14:modId xmlns:p14="http://schemas.microsoft.com/office/powerpoint/2010/main" val="1097828562"/>
+              </p:ext>
+            </p:extLst>
+          </p:nvPr>
+        </p:nvGraphicFramePr>
+        <p:xfrm>
+          <a:off x="4832350" y="2355850"/>
+          <a:ext cx="2527301" cy="2146300"/>
+        </p:xfrm>
+        <a:graphic>
+          <a:graphicData uri="http://schemas.openxmlformats.org/drawingml/2006/table">
+            <a:tbl>
+              <a:tblPr/>
+              <a:tblGrid>
+                <a:gridCol w="373351"/>
+                <a:gridCol w="430790"/>
+                <a:gridCol w="430790"/>
+                <a:gridCol w="430790"/>
+                <a:gridCol w="430790"/>
+                <a:gridCol w="430790"/>
+              </a:tblGrid>
+              <a:tr h="304800">
+                <a:tc>
+                  <a:txBody>
+                    <a:bodyPr/>
+                    <a:lstStyle/>
+                    <a:p>
+                      <a:pPr algn="ctr" fontAlgn="b"/>
+                      <a:r>
+                        <a:rPr lang="sk-SK" sz="1800" b="1" i="0" u="none" strike="noStrike">
+                          <a:solidFill>
+                            <a:srgbClr val="000000"/>
+                          </a:solidFill>
+                          <a:effectLst/>
+                          <a:latin typeface="Calibri" charset="0"/>
+                        </a:rPr>
+                        <a:t> </a:t>
+                      </a:r>
+                    </a:p>
+                  </a:txBody>
+                  <a:tcPr marL="12700" marR="12700" marT="12700" marB="0" anchor="b">
+                    <a:lnL w="12700" cap="flat" cmpd="sng" algn="ctr">
+                      <a:solidFill>
+                        <a:srgbClr val="000000"/>
+                      </a:solidFill>
+                      <a:prstDash val="solid"/>
+                      <a:round/>
+                      <a:headEnd type="none" w="med" len="med"/>
+                      <a:tailEnd type="none" w="med" len="med"/>
+                    </a:lnL>
+                    <a:lnR w="6350" cap="flat" cmpd="sng" algn="ctr">
+                      <a:solidFill>
+                        <a:srgbClr val="000000"/>
+                      </a:solidFill>
+                      <a:prstDash val="solid"/>
+                      <a:round/>
+                      <a:headEnd type="none" w="med" len="med"/>
+                      <a:tailEnd type="none" w="med" len="med"/>
+                    </a:lnR>
+                    <a:lnT w="12700" cap="flat" cmpd="sng" algn="ctr">
+                      <a:solidFill>
+                        <a:srgbClr val="000000"/>
+                      </a:solidFill>
+                      <a:prstDash val="solid"/>
+                      <a:round/>
+                      <a:headEnd type="none" w="med" len="med"/>
+                      <a:tailEnd type="none" w="med" len="med"/>
+                    </a:lnT>
+                    <a:lnB w="6350" cap="flat" cmpd="sng" algn="ctr">
+                      <a:solidFill>
+                        <a:srgbClr val="000000"/>
+                      </a:solidFill>
+                      <a:prstDash val="solid"/>
+                      <a:round/>
+                      <a:headEnd type="none" w="med" len="med"/>
+                      <a:tailEnd type="none" w="med" len="med"/>
+                    </a:lnB>
+                  </a:tcPr>
+                </a:tc>
+                <a:tc>
+                  <a:txBody>
+                    <a:bodyPr/>
+                    <a:lstStyle/>
+                    <a:p>
+                      <a:pPr algn="ctr" fontAlgn="b"/>
+                      <a:r>
+                        <a:rPr lang="en-US" sz="1800" b="1" i="0" u="none" strike="noStrike">
+                          <a:solidFill>
+                            <a:srgbClr val="000000"/>
+                          </a:solidFill>
+                          <a:effectLst/>
+                          <a:latin typeface="Calibri" charset="0"/>
+                        </a:rPr>
+                        <a:t>W1</a:t>
+                      </a:r>
+                    </a:p>
+                  </a:txBody>
+                  <a:tcPr marL="12700" marR="12700" marT="12700" marB="0" anchor="b">
+                    <a:lnL w="6350" cap="flat" cmpd="sng" algn="ctr">
+                      <a:solidFill>
+                        <a:srgbClr val="000000"/>
+                      </a:solidFill>
+                      <a:prstDash val="solid"/>
+                      <a:round/>
+                      <a:headEnd type="none" w="med" len="med"/>
+                      <a:tailEnd type="none" w="med" len="med"/>
+                    </a:lnL>
+                    <a:lnR w="6350" cap="flat" cmpd="sng" algn="ctr">
+                      <a:solidFill>
+                        <a:srgbClr val="000000"/>
+                      </a:solidFill>
+                      <a:prstDash val="solid"/>
+                      <a:round/>
+                      <a:headEnd type="none" w="med" len="med"/>
+                      <a:tailEnd type="none" w="med" len="med"/>
+                    </a:lnR>
+                    <a:lnT w="12700" cap="flat" cmpd="sng" algn="ctr">
+                      <a:solidFill>
+                        <a:srgbClr val="000000"/>
+                      </a:solidFill>
+                      <a:prstDash val="solid"/>
+                      <a:round/>
+                      <a:headEnd type="none" w="med" len="med"/>
+                      <a:tailEnd type="none" w="med" len="med"/>
+                    </a:lnT>
+                    <a:lnB w="6350" cap="flat" cmpd="sng" algn="ctr">
+                      <a:solidFill>
+                        <a:srgbClr val="000000"/>
+                      </a:solidFill>
+                      <a:prstDash val="solid"/>
+                      <a:round/>
+                      <a:headEnd type="none" w="med" len="med"/>
+                      <a:tailEnd type="none" w="med" len="med"/>
+                    </a:lnB>
+                  </a:tcPr>
+                </a:tc>
+                <a:tc>
+                  <a:txBody>
+                    <a:bodyPr/>
+                    <a:lstStyle/>
+                    <a:p>
+                      <a:pPr algn="ctr" fontAlgn="b"/>
+                      <a:r>
+                        <a:rPr lang="en-US" sz="1800" b="1" i="0" u="none" strike="noStrike">
+                          <a:solidFill>
+                            <a:srgbClr val="000000"/>
+                          </a:solidFill>
+                          <a:effectLst/>
+                          <a:latin typeface="Calibri" charset="0"/>
+                        </a:rPr>
+                        <a:t>W2</a:t>
+                      </a:r>
+                    </a:p>
+                  </a:txBody>
+                  <a:tcPr marL="12700" marR="12700" marT="12700" marB="0" anchor="b">
+                    <a:lnL w="6350" cap="flat" cmpd="sng" algn="ctr">
+                      <a:solidFill>
+                        <a:srgbClr val="000000"/>
+                      </a:solidFill>
+                      <a:prstDash val="solid"/>
+                      <a:round/>
+                      <a:headEnd type="none" w="med" len="med"/>
+                      <a:tailEnd type="none" w="med" len="med"/>
+                    </a:lnL>
+                    <a:lnR w="6350" cap="flat" cmpd="sng" algn="ctr">
+                      <a:solidFill>
+                        <a:srgbClr val="000000"/>
+                      </a:solidFill>
+                      <a:prstDash val="solid"/>
+                      <a:round/>
+                      <a:headEnd type="none" w="med" len="med"/>
+                      <a:tailEnd type="none" w="med" len="med"/>
+                    </a:lnR>
+                    <a:lnT w="12700" cap="flat" cmpd="sng" algn="ctr">
+                      <a:solidFill>
+                        <a:srgbClr val="000000"/>
+                      </a:solidFill>
+                      <a:prstDash val="solid"/>
+                      <a:round/>
+                      <a:headEnd type="none" w="med" len="med"/>
+                      <a:tailEnd type="none" w="med" len="med"/>
+                    </a:lnT>
+                    <a:lnB w="6350" cap="flat" cmpd="sng" algn="ctr">
+                      <a:solidFill>
+                        <a:srgbClr val="000000"/>
+                      </a:solidFill>
+                      <a:prstDash val="solid"/>
+                      <a:round/>
+                      <a:headEnd type="none" w="med" len="med"/>
+                      <a:tailEnd type="none" w="med" len="med"/>
+                    </a:lnB>
+                  </a:tcPr>
+                </a:tc>
+                <a:tc>
+                  <a:txBody>
+                    <a:bodyPr/>
+                    <a:lstStyle/>
+                    <a:p>
+                      <a:pPr algn="ctr" fontAlgn="b"/>
+                      <a:r>
+                        <a:rPr lang="en-US" sz="1800" b="1" i="0" u="none" strike="noStrike">
+                          <a:solidFill>
+                            <a:srgbClr val="000000"/>
+                          </a:solidFill>
+                          <a:effectLst/>
+                          <a:latin typeface="Calibri" charset="0"/>
+                        </a:rPr>
+                        <a:t>W3</a:t>
+                      </a:r>
+                    </a:p>
+                  </a:txBody>
+                  <a:tcPr marL="12700" marR="12700" marT="12700" marB="0" anchor="b">
+                    <a:lnL w="6350" cap="flat" cmpd="sng" algn="ctr">
+                      <a:solidFill>
+                        <a:srgbClr val="000000"/>
+                      </a:solidFill>
+                      <a:prstDash val="solid"/>
+                      <a:round/>
+                      <a:headEnd type="none" w="med" len="med"/>
+                      <a:tailEnd type="none" w="med" len="med"/>
+                    </a:lnL>
+                    <a:lnR w="6350" cap="flat" cmpd="sng" algn="ctr">
+                      <a:solidFill>
+                        <a:srgbClr val="000000"/>
+                      </a:solidFill>
+                      <a:prstDash val="solid"/>
+                      <a:round/>
+                      <a:headEnd type="none" w="med" len="med"/>
+                      <a:tailEnd type="none" w="med" len="med"/>
+                    </a:lnR>
+                    <a:lnT w="12700" cap="flat" cmpd="sng" algn="ctr">
+                      <a:solidFill>
+                        <a:srgbClr val="000000"/>
+                      </a:solidFill>
+                      <a:prstDash val="solid"/>
+                      <a:round/>
+                      <a:headEnd type="none" w="med" len="med"/>
+                      <a:tailEnd type="none" w="med" len="med"/>
+                    </a:lnT>
+                    <a:lnB w="6350" cap="flat" cmpd="sng" algn="ctr">
+                      <a:solidFill>
+                        <a:srgbClr val="000000"/>
+                      </a:solidFill>
+                      <a:prstDash val="solid"/>
+                      <a:round/>
+                      <a:headEnd type="none" w="med" len="med"/>
+                      <a:tailEnd type="none" w="med" len="med"/>
+                    </a:lnB>
+                  </a:tcPr>
+                </a:tc>
+                <a:tc>
+                  <a:txBody>
+                    <a:bodyPr/>
+                    <a:lstStyle/>
+                    <a:p>
+                      <a:pPr algn="ctr" fontAlgn="b"/>
+                      <a:r>
+                        <a:rPr lang="en-US" sz="1800" b="1" i="0" u="none" strike="noStrike">
+                          <a:solidFill>
+                            <a:srgbClr val="000000"/>
+                          </a:solidFill>
+                          <a:effectLst/>
+                          <a:latin typeface="Calibri" charset="0"/>
+                        </a:rPr>
+                        <a:t>W4</a:t>
+                      </a:r>
+                    </a:p>
+                  </a:txBody>
+                  <a:tcPr marL="12700" marR="12700" marT="12700" marB="0" anchor="b">
+                    <a:lnL w="6350" cap="flat" cmpd="sng" algn="ctr">
+                      <a:solidFill>
+                        <a:srgbClr val="000000"/>
+                      </a:solidFill>
+                      <a:prstDash val="solid"/>
+                      <a:round/>
+                      <a:headEnd type="none" w="med" len="med"/>
+                      <a:tailEnd type="none" w="med" len="med"/>
+                    </a:lnL>
+                    <a:lnR w="6350" cap="flat" cmpd="sng" algn="ctr">
+                      <a:solidFill>
+                        <a:srgbClr val="000000"/>
+                      </a:solidFill>
+                      <a:prstDash val="solid"/>
+                      <a:round/>
+                      <a:headEnd type="none" w="med" len="med"/>
+                      <a:tailEnd type="none" w="med" len="med"/>
+                    </a:lnR>
+                    <a:lnT w="12700" cap="flat" cmpd="sng" algn="ctr">
+                      <a:solidFill>
+                        <a:srgbClr val="000000"/>
+                      </a:solidFill>
+                      <a:prstDash val="solid"/>
+                      <a:round/>
+                      <a:headEnd type="none" w="med" len="med"/>
+                      <a:tailEnd type="none" w="med" len="med"/>
+                    </a:lnT>
+                    <a:lnB w="6350" cap="flat" cmpd="sng" algn="ctr">
+                      <a:solidFill>
+                        <a:srgbClr val="000000"/>
+                      </a:solidFill>
+                      <a:prstDash val="solid"/>
+                      <a:round/>
+                      <a:headEnd type="none" w="med" len="med"/>
+                      <a:tailEnd type="none" w="med" len="med"/>
+                    </a:lnB>
+                  </a:tcPr>
+                </a:tc>
+                <a:tc>
+                  <a:txBody>
+                    <a:bodyPr/>
+                    <a:lstStyle/>
+                    <a:p>
+                      <a:pPr algn="ctr" fontAlgn="b"/>
+                      <a:r>
+                        <a:rPr lang="en-US" sz="1800" b="1" i="0" u="none" strike="noStrike">
+                          <a:solidFill>
+                            <a:srgbClr val="000000"/>
+                          </a:solidFill>
+                          <a:effectLst/>
+                          <a:latin typeface="Calibri" charset="0"/>
+                        </a:rPr>
+                        <a:t>W5</a:t>
+                      </a:r>
+                    </a:p>
+                  </a:txBody>
+                  <a:tcPr marL="12700" marR="12700" marT="12700" marB="0" anchor="b">
+                    <a:lnL w="6350" cap="flat" cmpd="sng" algn="ctr">
+                      <a:solidFill>
+                        <a:srgbClr val="000000"/>
+                      </a:solidFill>
+                      <a:prstDash val="solid"/>
+                      <a:round/>
+                      <a:headEnd type="none" w="med" len="med"/>
+                      <a:tailEnd type="none" w="med" len="med"/>
+                    </a:lnL>
+                    <a:lnR w="12700" cap="flat" cmpd="sng" algn="ctr">
+                      <a:solidFill>
+                        <a:srgbClr val="000000"/>
+                      </a:solidFill>
+                      <a:prstDash val="solid"/>
+                      <a:round/>
+                      <a:headEnd type="none" w="med" len="med"/>
+                      <a:tailEnd type="none" w="med" len="med"/>
+                    </a:lnR>
+                    <a:lnT w="12700" cap="flat" cmpd="sng" algn="ctr">
+                      <a:solidFill>
+                        <a:srgbClr val="000000"/>
+                      </a:solidFill>
+                      <a:prstDash val="solid"/>
+                      <a:round/>
+                      <a:headEnd type="none" w="med" len="med"/>
+                      <a:tailEnd type="none" w="med" len="med"/>
+                    </a:lnT>
+                    <a:lnB w="6350" cap="flat" cmpd="sng" algn="ctr">
+                      <a:solidFill>
+                        <a:srgbClr val="000000"/>
+                      </a:solidFill>
+                      <a:prstDash val="solid"/>
+                      <a:round/>
+                      <a:headEnd type="none" w="med" len="med"/>
+                      <a:tailEnd type="none" w="med" len="med"/>
+                    </a:lnB>
+                  </a:tcPr>
+                </a:tc>
+              </a:tr>
+              <a:tr h="304800">
+                <a:tc>
+                  <a:txBody>
+                    <a:bodyPr/>
+                    <a:lstStyle/>
+                    <a:p>
+                      <a:pPr algn="ctr" fontAlgn="b"/>
+                      <a:r>
+                        <a:rPr lang="en-US" altLang="zh-CN" sz="1800" b="1" i="0" u="none" strike="noStrike">
+                          <a:solidFill>
+                            <a:srgbClr val="000000"/>
+                          </a:solidFill>
+                          <a:effectLst/>
+                          <a:latin typeface="Calibri" charset="0"/>
+                        </a:rPr>
+                        <a:t>U1</a:t>
+                      </a:r>
+                    </a:p>
+                  </a:txBody>
+                  <a:tcPr marL="12700" marR="12700" marT="12700" marB="0" anchor="b">
+                    <a:lnL w="12700" cap="flat" cmpd="sng" algn="ctr">
+                      <a:solidFill>
+                        <a:srgbClr val="000000"/>
+                      </a:solidFill>
+                      <a:prstDash val="solid"/>
+                      <a:round/>
+                      <a:headEnd type="none" w="med" len="med"/>
+                      <a:tailEnd type="none" w="med" len="med"/>
+                    </a:lnL>
+                    <a:lnR w="6350" cap="flat" cmpd="sng" algn="ctr">
+                      <a:solidFill>
+                        <a:srgbClr val="000000"/>
+                      </a:solidFill>
+                      <a:prstDash val="solid"/>
+                      <a:round/>
+                      <a:headEnd type="none" w="med" len="med"/>
+                      <a:tailEnd type="none" w="med" len="med"/>
+                    </a:lnR>
+                    <a:lnT w="6350" cap="flat" cmpd="sng" algn="ctr">
+                      <a:solidFill>
+                        <a:srgbClr val="000000"/>
+                      </a:solidFill>
+                      <a:prstDash val="solid"/>
+                      <a:round/>
+                      <a:headEnd type="none" w="med" len="med"/>
+                      <a:tailEnd type="none" w="med" len="med"/>
+                    </a:lnT>
+                    <a:lnB w="6350" cap="flat" cmpd="sng" algn="ctr">
+                      <a:solidFill>
+                        <a:srgbClr val="000000"/>
+                      </a:solidFill>
+                      <a:prstDash val="solid"/>
+                      <a:round/>
+                      <a:headEnd type="none" w="med" len="med"/>
+                      <a:tailEnd type="none" w="med" len="med"/>
+                    </a:lnB>
+                  </a:tcPr>
+                </a:tc>
+                <a:tc>
+                  <a:txBody>
+                    <a:bodyPr/>
+                    <a:lstStyle/>
+                    <a:p>
+                      <a:pPr algn="ctr" fontAlgn="b"/>
+                      <a:r>
+                        <a:rPr lang="en-US" altLang="zh-CN" sz="1800" b="1" i="0" u="none" strike="noStrike">
+                          <a:solidFill>
+                            <a:srgbClr val="000000"/>
+                          </a:solidFill>
+                          <a:effectLst/>
+                          <a:latin typeface="Calibri" charset="0"/>
+                        </a:rPr>
+                        <a:t>0</a:t>
+                      </a:r>
+                    </a:p>
+                  </a:txBody>
+                  <a:tcPr marL="12700" marR="12700" marT="12700" marB="0" anchor="b">
+                    <a:lnL w="6350" cap="flat" cmpd="sng" algn="ctr">
+                      <a:solidFill>
+                        <a:srgbClr val="000000"/>
+                      </a:solidFill>
+                      <a:prstDash val="solid"/>
+                      <a:round/>
+                      <a:headEnd type="none" w="med" len="med"/>
+                      <a:tailEnd type="none" w="med" len="med"/>
+                    </a:lnL>
+                    <a:lnR w="6350" cap="flat" cmpd="sng" algn="ctr">
+                      <a:solidFill>
+                        <a:srgbClr val="000000"/>
+                      </a:solidFill>
+                      <a:prstDash val="solid"/>
+                      <a:round/>
+                      <a:headEnd type="none" w="med" len="med"/>
+                      <a:tailEnd type="none" w="med" len="med"/>
+                    </a:lnR>
+                    <a:lnT w="6350" cap="flat" cmpd="sng" algn="ctr">
+                      <a:solidFill>
+                        <a:srgbClr val="000000"/>
+                      </a:solidFill>
+                      <a:prstDash val="solid"/>
+                      <a:round/>
+                      <a:headEnd type="none" w="med" len="med"/>
+                      <a:tailEnd type="none" w="med" len="med"/>
+                    </a:lnT>
+                    <a:lnB w="6350" cap="flat" cmpd="sng" algn="ctr">
+                      <a:solidFill>
+                        <a:srgbClr val="000000"/>
+                      </a:solidFill>
+                      <a:prstDash val="solid"/>
+                      <a:round/>
+                      <a:headEnd type="none" w="med" len="med"/>
+                      <a:tailEnd type="none" w="med" len="med"/>
+                    </a:lnB>
+                  </a:tcPr>
+                </a:tc>
+                <a:tc>
+                  <a:txBody>
+                    <a:bodyPr/>
+                    <a:lstStyle/>
+                    <a:p>
+                      <a:pPr algn="ctr" fontAlgn="b"/>
+                      <a:r>
+                        <a:rPr lang="en-US" altLang="zh-CN" sz="1800" b="1" i="0" u="none" strike="noStrike">
+                          <a:solidFill>
+                            <a:srgbClr val="000000"/>
+                          </a:solidFill>
+                          <a:effectLst/>
+                          <a:latin typeface="Calibri" charset="0"/>
+                        </a:rPr>
+                        <a:t>1</a:t>
+                      </a:r>
+                    </a:p>
+                  </a:txBody>
+                  <a:tcPr marL="12700" marR="12700" marT="12700" marB="0" anchor="b">
+                    <a:lnL w="6350" cap="flat" cmpd="sng" algn="ctr">
+                      <a:solidFill>
+                        <a:srgbClr val="000000"/>
+                      </a:solidFill>
+                      <a:prstDash val="solid"/>
+                      <a:round/>
+                      <a:headEnd type="none" w="med" len="med"/>
+                      <a:tailEnd type="none" w="med" len="med"/>
+                    </a:lnL>
+                    <a:lnR w="6350" cap="flat" cmpd="sng" algn="ctr">
+                      <a:solidFill>
+                        <a:srgbClr val="000000"/>
+                      </a:solidFill>
+                      <a:prstDash val="solid"/>
+                      <a:round/>
+                      <a:headEnd type="none" w="med" len="med"/>
+                      <a:tailEnd type="none" w="med" len="med"/>
+                    </a:lnR>
+                    <a:lnT w="6350" cap="flat" cmpd="sng" algn="ctr">
+                      <a:solidFill>
+                        <a:srgbClr val="000000"/>
+                      </a:solidFill>
+                      <a:prstDash val="solid"/>
+                      <a:round/>
+                      <a:headEnd type="none" w="med" len="med"/>
+                      <a:tailEnd type="none" w="med" len="med"/>
+                    </a:lnT>
+                    <a:lnB w="6350" cap="flat" cmpd="sng" algn="ctr">
+                      <a:solidFill>
+                        <a:srgbClr val="000000"/>
+                      </a:solidFill>
+                      <a:prstDash val="solid"/>
+                      <a:round/>
+                      <a:headEnd type="none" w="med" len="med"/>
+                      <a:tailEnd type="none" w="med" len="med"/>
+                    </a:lnB>
+                  </a:tcPr>
+                </a:tc>
+                <a:tc>
+                  <a:txBody>
+                    <a:bodyPr/>
+                    <a:lstStyle/>
+                    <a:p>
+                      <a:pPr algn="ctr" fontAlgn="b"/>
+                      <a:r>
+                        <a:rPr lang="en-US" altLang="zh-CN" sz="1800" b="1" i="0" u="none" strike="noStrike">
+                          <a:solidFill>
+                            <a:srgbClr val="000000"/>
+                          </a:solidFill>
+                          <a:effectLst/>
+                          <a:latin typeface="Calibri" charset="0"/>
+                        </a:rPr>
+                        <a:t>1</a:t>
+                      </a:r>
+                    </a:p>
+                  </a:txBody>
+                  <a:tcPr marL="12700" marR="12700" marT="12700" marB="0" anchor="b">
+                    <a:lnL w="6350" cap="flat" cmpd="sng" algn="ctr">
+                      <a:solidFill>
+                        <a:srgbClr val="000000"/>
+                      </a:solidFill>
+                      <a:prstDash val="solid"/>
+                      <a:round/>
+                      <a:headEnd type="none" w="med" len="med"/>
+                      <a:tailEnd type="none" w="med" len="med"/>
+                    </a:lnL>
+                    <a:lnR w="6350" cap="flat" cmpd="sng" algn="ctr">
+                      <a:solidFill>
+                        <a:srgbClr val="000000"/>
+                      </a:solidFill>
+                      <a:prstDash val="solid"/>
+                      <a:round/>
+                      <a:headEnd type="none" w="med" len="med"/>
+                      <a:tailEnd type="none" w="med" len="med"/>
+                    </a:lnR>
+                    <a:lnT w="6350" cap="flat" cmpd="sng" algn="ctr">
+                      <a:solidFill>
+                        <a:srgbClr val="000000"/>
+                      </a:solidFill>
+                      <a:prstDash val="solid"/>
+                      <a:round/>
+                      <a:headEnd type="none" w="med" len="med"/>
+                      <a:tailEnd type="none" w="med" len="med"/>
+                    </a:lnT>
+                    <a:lnB w="6350" cap="flat" cmpd="sng" algn="ctr">
+                      <a:solidFill>
+                        <a:srgbClr val="000000"/>
+                      </a:solidFill>
+                      <a:prstDash val="solid"/>
+                      <a:round/>
+                      <a:headEnd type="none" w="med" len="med"/>
+                      <a:tailEnd type="none" w="med" len="med"/>
+                    </a:lnB>
+                  </a:tcPr>
+                </a:tc>
+                <a:tc>
+                  <a:txBody>
+                    <a:bodyPr/>
+                    <a:lstStyle/>
+                    <a:p>
+                      <a:pPr algn="ctr" fontAlgn="b"/>
+                      <a:r>
+                        <a:rPr lang="en-US" altLang="zh-CN" sz="1800" b="1" i="0" u="none" strike="noStrike">
+                          <a:solidFill>
+                            <a:srgbClr val="000000"/>
+                          </a:solidFill>
+                          <a:effectLst/>
+                          <a:latin typeface="Calibri" charset="0"/>
+                        </a:rPr>
+                        <a:t>1</a:t>
+                      </a:r>
+                    </a:p>
+                  </a:txBody>
+                  <a:tcPr marL="12700" marR="12700" marT="12700" marB="0" anchor="b">
+                    <a:lnL w="6350" cap="flat" cmpd="sng" algn="ctr">
+                      <a:solidFill>
+                        <a:srgbClr val="000000"/>
+                      </a:solidFill>
+                      <a:prstDash val="solid"/>
+                      <a:round/>
+                      <a:headEnd type="none" w="med" len="med"/>
+                      <a:tailEnd type="none" w="med" len="med"/>
+                    </a:lnL>
+                    <a:lnR w="6350" cap="flat" cmpd="sng" algn="ctr">
+                      <a:solidFill>
+                        <a:srgbClr val="000000"/>
+                      </a:solidFill>
+                      <a:prstDash val="solid"/>
+                      <a:round/>
+                      <a:headEnd type="none" w="med" len="med"/>
+                      <a:tailEnd type="none" w="med" len="med"/>
+                    </a:lnR>
+                    <a:lnT w="6350" cap="flat" cmpd="sng" algn="ctr">
+                      <a:solidFill>
+                        <a:srgbClr val="000000"/>
+                      </a:solidFill>
+                      <a:prstDash val="solid"/>
+                      <a:round/>
+                      <a:headEnd type="none" w="med" len="med"/>
+                      <a:tailEnd type="none" w="med" len="med"/>
+                    </a:lnT>
+                    <a:lnB w="6350" cap="flat" cmpd="sng" algn="ctr">
+                      <a:solidFill>
+                        <a:srgbClr val="000000"/>
+                      </a:solidFill>
+                      <a:prstDash val="solid"/>
+                      <a:round/>
+                      <a:headEnd type="none" w="med" len="med"/>
+                      <a:tailEnd type="none" w="med" len="med"/>
+                    </a:lnB>
+                  </a:tcPr>
+                </a:tc>
+                <a:tc>
+                  <a:txBody>
+                    <a:bodyPr/>
+                    <a:lstStyle/>
+                    <a:p>
+                      <a:pPr algn="ctr" fontAlgn="b"/>
+                      <a:r>
+                        <a:rPr lang="en-US" altLang="zh-CN" sz="1800" b="1" i="0" u="none" strike="noStrike">
+                          <a:solidFill>
+                            <a:srgbClr val="000000"/>
+                          </a:solidFill>
+                          <a:effectLst/>
+                          <a:latin typeface="Calibri" charset="0"/>
+                        </a:rPr>
+                        <a:t>1</a:t>
+                      </a:r>
+                    </a:p>
+                  </a:txBody>
+                  <a:tcPr marL="12700" marR="12700" marT="12700" marB="0" anchor="b">
+                    <a:lnL w="6350" cap="flat" cmpd="sng" algn="ctr">
+                      <a:solidFill>
+                        <a:srgbClr val="000000"/>
+                      </a:solidFill>
+                      <a:prstDash val="solid"/>
+                      <a:round/>
+                      <a:headEnd type="none" w="med" len="med"/>
+                      <a:tailEnd type="none" w="med" len="med"/>
+                    </a:lnL>
+                    <a:lnR w="12700" cap="flat" cmpd="sng" algn="ctr">
+                      <a:solidFill>
+                        <a:srgbClr val="000000"/>
+                      </a:solidFill>
+                      <a:prstDash val="solid"/>
+                      <a:round/>
+                      <a:headEnd type="none" w="med" len="med"/>
+                      <a:tailEnd type="none" w="med" len="med"/>
+                    </a:lnR>
+                    <a:lnT w="6350" cap="flat" cmpd="sng" algn="ctr">
+                      <a:solidFill>
+                        <a:srgbClr val="000000"/>
+                      </a:solidFill>
+                      <a:prstDash val="solid"/>
+                      <a:round/>
+                      <a:headEnd type="none" w="med" len="med"/>
+                      <a:tailEnd type="none" w="med" len="med"/>
+                    </a:lnT>
+                    <a:lnB w="6350" cap="flat" cmpd="sng" algn="ctr">
+                      <a:solidFill>
+                        <a:srgbClr val="000000"/>
+                      </a:solidFill>
+                      <a:prstDash val="solid"/>
+                      <a:round/>
+                      <a:headEnd type="none" w="med" len="med"/>
+                      <a:tailEnd type="none" w="med" len="med"/>
+                    </a:lnB>
+                  </a:tcPr>
+                </a:tc>
+              </a:tr>
+              <a:tr h="304800">
+                <a:tc>
+                  <a:txBody>
+                    <a:bodyPr/>
+                    <a:lstStyle/>
+                    <a:p>
+                      <a:pPr algn="ctr" fontAlgn="b"/>
+                      <a:r>
+                        <a:rPr lang="is-IS" sz="1800" b="1" i="0" u="none" strike="noStrike">
+                          <a:solidFill>
+                            <a:srgbClr val="000000"/>
+                          </a:solidFill>
+                          <a:effectLst/>
+                          <a:latin typeface="Calibri" charset="0"/>
+                        </a:rPr>
+                        <a:t>U2</a:t>
+                      </a:r>
+                    </a:p>
+                  </a:txBody>
+                  <a:tcPr marL="12700" marR="12700" marT="12700" marB="0" anchor="b">
+                    <a:lnL w="12700" cap="flat" cmpd="sng" algn="ctr">
+                      <a:solidFill>
+                        <a:srgbClr val="000000"/>
+                      </a:solidFill>
+                      <a:prstDash val="solid"/>
+                      <a:round/>
+                      <a:headEnd type="none" w="med" len="med"/>
+                      <a:tailEnd type="none" w="med" len="med"/>
+                    </a:lnL>
+                    <a:lnR w="6350" cap="flat" cmpd="sng" algn="ctr">
+                      <a:solidFill>
+                        <a:srgbClr val="000000"/>
+                      </a:solidFill>
+                      <a:prstDash val="solid"/>
+                      <a:round/>
+                      <a:headEnd type="none" w="med" len="med"/>
+                      <a:tailEnd type="none" w="med" len="med"/>
+                    </a:lnR>
+                    <a:lnT w="6350" cap="flat" cmpd="sng" algn="ctr">
+                      <a:solidFill>
+                        <a:srgbClr val="000000"/>
+                      </a:solidFill>
+                      <a:prstDash val="solid"/>
+                      <a:round/>
+                      <a:headEnd type="none" w="med" len="med"/>
+                      <a:tailEnd type="none" w="med" len="med"/>
+                    </a:lnT>
+                    <a:lnB w="6350" cap="flat" cmpd="sng" algn="ctr">
+                      <a:solidFill>
+                        <a:srgbClr val="000000"/>
+                      </a:solidFill>
+                      <a:prstDash val="solid"/>
+                      <a:round/>
+                      <a:headEnd type="none" w="med" len="med"/>
+                      <a:tailEnd type="none" w="med" len="med"/>
+                    </a:lnB>
+                  </a:tcPr>
+                </a:tc>
+                <a:tc>
+                  <a:txBody>
+                    <a:bodyPr/>
+                    <a:lstStyle/>
+                    <a:p>
+                      <a:pPr algn="ctr" fontAlgn="b"/>
+                      <a:r>
+                        <a:rPr lang="en-US" altLang="zh-CN" sz="1800" b="1" i="0" u="none" strike="noStrike">
+                          <a:solidFill>
+                            <a:srgbClr val="000000"/>
+                          </a:solidFill>
+                          <a:effectLst/>
+                          <a:latin typeface="Calibri" charset="0"/>
+                        </a:rPr>
+                        <a:t>1</a:t>
+                      </a:r>
+                    </a:p>
+                  </a:txBody>
+                  <a:tcPr marL="12700" marR="12700" marT="12700" marB="0" anchor="b">
+                    <a:lnL w="6350" cap="flat" cmpd="sng" algn="ctr">
+                      <a:solidFill>
+                        <a:srgbClr val="000000"/>
+                      </a:solidFill>
+                      <a:prstDash val="solid"/>
+                      <a:round/>
+                      <a:headEnd type="none" w="med" len="med"/>
+                      <a:tailEnd type="none" w="med" len="med"/>
+                    </a:lnL>
+                    <a:lnR w="6350" cap="flat" cmpd="sng" algn="ctr">
+                      <a:solidFill>
+                        <a:srgbClr val="000000"/>
+                      </a:solidFill>
+                      <a:prstDash val="solid"/>
+                      <a:round/>
+                      <a:headEnd type="none" w="med" len="med"/>
+                      <a:tailEnd type="none" w="med" len="med"/>
+                    </a:lnR>
+                    <a:lnT w="6350" cap="flat" cmpd="sng" algn="ctr">
+                      <a:solidFill>
+                        <a:srgbClr val="000000"/>
+                      </a:solidFill>
+                      <a:prstDash val="solid"/>
+                      <a:round/>
+                      <a:headEnd type="none" w="med" len="med"/>
+                      <a:tailEnd type="none" w="med" len="med"/>
+                    </a:lnT>
+                    <a:lnB w="6350" cap="flat" cmpd="sng" algn="ctr">
+                      <a:solidFill>
+                        <a:srgbClr val="000000"/>
+                      </a:solidFill>
+                      <a:prstDash val="solid"/>
+                      <a:round/>
+                      <a:headEnd type="none" w="med" len="med"/>
+                      <a:tailEnd type="none" w="med" len="med"/>
+                    </a:lnB>
+                  </a:tcPr>
+                </a:tc>
+                <a:tc>
+                  <a:txBody>
+                    <a:bodyPr/>
+                    <a:lstStyle/>
+                    <a:p>
+                      <a:pPr algn="ctr" fontAlgn="b"/>
+                      <a:r>
+                        <a:rPr lang="en-US" altLang="zh-CN" sz="1800" b="1" i="0" u="none" strike="noStrike">
+                          <a:solidFill>
+                            <a:srgbClr val="000000"/>
+                          </a:solidFill>
+                          <a:effectLst/>
+                          <a:latin typeface="Calibri" charset="0"/>
+                        </a:rPr>
+                        <a:t>0</a:t>
+                      </a:r>
+                    </a:p>
+                  </a:txBody>
+                  <a:tcPr marL="12700" marR="12700" marT="12700" marB="0" anchor="b">
+                    <a:lnL w="6350" cap="flat" cmpd="sng" algn="ctr">
+                      <a:solidFill>
+                        <a:srgbClr val="000000"/>
+                      </a:solidFill>
+                      <a:prstDash val="solid"/>
+                      <a:round/>
+                      <a:headEnd type="none" w="med" len="med"/>
+                      <a:tailEnd type="none" w="med" len="med"/>
+                    </a:lnL>
+                    <a:lnR w="6350" cap="flat" cmpd="sng" algn="ctr">
+                      <a:solidFill>
+                        <a:srgbClr val="000000"/>
+                      </a:solidFill>
+                      <a:prstDash val="solid"/>
+                      <a:round/>
+                      <a:headEnd type="none" w="med" len="med"/>
+                      <a:tailEnd type="none" w="med" len="med"/>
+                    </a:lnR>
+                    <a:lnT w="6350" cap="flat" cmpd="sng" algn="ctr">
+                      <a:solidFill>
+                        <a:srgbClr val="000000"/>
+                      </a:solidFill>
+                      <a:prstDash val="solid"/>
+                      <a:round/>
+                      <a:headEnd type="none" w="med" len="med"/>
+                      <a:tailEnd type="none" w="med" len="med"/>
+                    </a:lnT>
+                    <a:lnB w="6350" cap="flat" cmpd="sng" algn="ctr">
+                      <a:solidFill>
+                        <a:srgbClr val="000000"/>
+                      </a:solidFill>
+                      <a:prstDash val="solid"/>
+                      <a:round/>
+                      <a:headEnd type="none" w="med" len="med"/>
+                      <a:tailEnd type="none" w="med" len="med"/>
+                    </a:lnB>
+                  </a:tcPr>
+                </a:tc>
+                <a:tc>
+                  <a:txBody>
+                    <a:bodyPr/>
+                    <a:lstStyle/>
+                    <a:p>
+                      <a:pPr algn="ctr" fontAlgn="b"/>
+                      <a:r>
+                        <a:rPr lang="en-US" altLang="zh-CN" sz="1800" b="1" i="0" u="none" strike="noStrike">
+                          <a:solidFill>
+                            <a:srgbClr val="000000"/>
+                          </a:solidFill>
+                          <a:effectLst/>
+                          <a:latin typeface="Calibri" charset="0"/>
+                        </a:rPr>
+                        <a:t>0</a:t>
+                      </a:r>
+                    </a:p>
+                  </a:txBody>
+                  <a:tcPr marL="12700" marR="12700" marT="12700" marB="0" anchor="b">
+                    <a:lnL w="6350" cap="flat" cmpd="sng" algn="ctr">
+                      <a:solidFill>
+                        <a:srgbClr val="000000"/>
+                      </a:solidFill>
+                      <a:prstDash val="solid"/>
+                      <a:round/>
+                      <a:headEnd type="none" w="med" len="med"/>
+                      <a:tailEnd type="none" w="med" len="med"/>
+                    </a:lnL>
+                    <a:lnR w="6350" cap="flat" cmpd="sng" algn="ctr">
+                      <a:solidFill>
+                        <a:srgbClr val="000000"/>
+                      </a:solidFill>
+                      <a:prstDash val="solid"/>
+                      <a:round/>
+                      <a:headEnd type="none" w="med" len="med"/>
+                      <a:tailEnd type="none" w="med" len="med"/>
+                    </a:lnR>
+                    <a:lnT w="6350" cap="flat" cmpd="sng" algn="ctr">
+                      <a:solidFill>
+                        <a:srgbClr val="000000"/>
+                      </a:solidFill>
+                      <a:prstDash val="solid"/>
+                      <a:round/>
+                      <a:headEnd type="none" w="med" len="med"/>
+                      <a:tailEnd type="none" w="med" len="med"/>
+                    </a:lnT>
+                    <a:lnB w="6350" cap="flat" cmpd="sng" algn="ctr">
+                      <a:solidFill>
+                        <a:srgbClr val="000000"/>
+                      </a:solidFill>
+                      <a:prstDash val="solid"/>
+                      <a:round/>
+                      <a:headEnd type="none" w="med" len="med"/>
+                      <a:tailEnd type="none" w="med" len="med"/>
+                    </a:lnB>
+                  </a:tcPr>
+                </a:tc>
+                <a:tc>
+                  <a:txBody>
+                    <a:bodyPr/>
+                    <a:lstStyle/>
+                    <a:p>
+                      <a:pPr algn="ctr" fontAlgn="b"/>
+                      <a:r>
+                        <a:rPr lang="en-US" altLang="zh-CN" sz="1800" b="1" i="0" u="none" strike="noStrike">
+                          <a:solidFill>
+                            <a:srgbClr val="000000"/>
+                          </a:solidFill>
+                          <a:effectLst/>
+                          <a:latin typeface="Calibri" charset="0"/>
+                        </a:rPr>
+                        <a:t>1</a:t>
+                      </a:r>
+                    </a:p>
+                  </a:txBody>
+                  <a:tcPr marL="12700" marR="12700" marT="12700" marB="0" anchor="b">
+                    <a:lnL w="6350" cap="flat" cmpd="sng" algn="ctr">
+                      <a:solidFill>
+                        <a:srgbClr val="000000"/>
+                      </a:solidFill>
+                      <a:prstDash val="solid"/>
+                      <a:round/>
+                      <a:headEnd type="none" w="med" len="med"/>
+                      <a:tailEnd type="none" w="med" len="med"/>
+                    </a:lnL>
+                    <a:lnR w="6350" cap="flat" cmpd="sng" algn="ctr">
+                      <a:solidFill>
+                        <a:srgbClr val="000000"/>
+                      </a:solidFill>
+                      <a:prstDash val="solid"/>
+                      <a:round/>
+                      <a:headEnd type="none" w="med" len="med"/>
+                      <a:tailEnd type="none" w="med" len="med"/>
+                    </a:lnR>
+                    <a:lnT w="6350" cap="flat" cmpd="sng" algn="ctr">
+                      <a:solidFill>
+                        <a:srgbClr val="000000"/>
+                      </a:solidFill>
+                      <a:prstDash val="solid"/>
+                      <a:round/>
+                      <a:headEnd type="none" w="med" len="med"/>
+                      <a:tailEnd type="none" w="med" len="med"/>
+                    </a:lnT>
+                    <a:lnB w="6350" cap="flat" cmpd="sng" algn="ctr">
+                      <a:solidFill>
+                        <a:srgbClr val="000000"/>
+                      </a:solidFill>
+                      <a:prstDash val="solid"/>
+                      <a:round/>
+                      <a:headEnd type="none" w="med" len="med"/>
+                      <a:tailEnd type="none" w="med" len="med"/>
+                    </a:lnB>
+                  </a:tcPr>
+                </a:tc>
+                <a:tc>
+                  <a:txBody>
+                    <a:bodyPr/>
+                    <a:lstStyle/>
+                    <a:p>
+                      <a:pPr algn="ctr" fontAlgn="b"/>
+                      <a:r>
+                        <a:rPr lang="en-US" altLang="zh-CN" sz="1800" b="1" i="0" u="none" strike="noStrike">
+                          <a:solidFill>
+                            <a:srgbClr val="000000"/>
+                          </a:solidFill>
+                          <a:effectLst/>
+                          <a:latin typeface="Calibri" charset="0"/>
+                        </a:rPr>
+                        <a:t>0</a:t>
+                      </a:r>
+                    </a:p>
+                  </a:txBody>
+                  <a:tcPr marL="12700" marR="12700" marT="12700" marB="0" anchor="b">
+                    <a:lnL w="6350" cap="flat" cmpd="sng" algn="ctr">
+                      <a:solidFill>
+                        <a:srgbClr val="000000"/>
+                      </a:solidFill>
+                      <a:prstDash val="solid"/>
+                      <a:round/>
+                      <a:headEnd type="none" w="med" len="med"/>
+                      <a:tailEnd type="none" w="med" len="med"/>
+                    </a:lnL>
+                    <a:lnR w="12700" cap="flat" cmpd="sng" algn="ctr">
+                      <a:solidFill>
+                        <a:srgbClr val="000000"/>
+                      </a:solidFill>
+                      <a:prstDash val="solid"/>
+                      <a:round/>
+                      <a:headEnd type="none" w="med" len="med"/>
+                      <a:tailEnd type="none" w="med" len="med"/>
+                    </a:lnR>
+                    <a:lnT w="6350" cap="flat" cmpd="sng" algn="ctr">
+                      <a:solidFill>
+                        <a:srgbClr val="000000"/>
+                      </a:solidFill>
+                      <a:prstDash val="solid"/>
+                      <a:round/>
+                      <a:headEnd type="none" w="med" len="med"/>
+                      <a:tailEnd type="none" w="med" len="med"/>
+                    </a:lnT>
+                    <a:lnB w="6350" cap="flat" cmpd="sng" algn="ctr">
+                      <a:solidFill>
+                        <a:srgbClr val="000000"/>
+                      </a:solidFill>
+                      <a:prstDash val="solid"/>
+                      <a:round/>
+                      <a:headEnd type="none" w="med" len="med"/>
+                      <a:tailEnd type="none" w="med" len="med"/>
+                    </a:lnB>
+                  </a:tcPr>
+                </a:tc>
+              </a:tr>
+              <a:tr h="304800">
+                <a:tc>
+                  <a:txBody>
+                    <a:bodyPr/>
+                    <a:lstStyle/>
+                    <a:p>
+                      <a:pPr algn="ctr" fontAlgn="b"/>
+                      <a:r>
+                        <a:rPr lang="en-US" altLang="zh-CN" sz="1800" b="1" i="0" u="none" strike="noStrike">
+                          <a:solidFill>
+                            <a:srgbClr val="000000"/>
+                          </a:solidFill>
+                          <a:effectLst/>
+                          <a:latin typeface="Calibri" charset="0"/>
+                        </a:rPr>
+                        <a:t>U3</a:t>
+                      </a:r>
+                    </a:p>
+                  </a:txBody>
+                  <a:tcPr marL="12700" marR="12700" marT="12700" marB="0" anchor="b">
+                    <a:lnL w="12700" cap="flat" cmpd="sng" algn="ctr">
+                      <a:solidFill>
+                        <a:srgbClr val="000000"/>
+                      </a:solidFill>
+                      <a:prstDash val="solid"/>
+                      <a:round/>
+                      <a:headEnd type="none" w="med" len="med"/>
+                      <a:tailEnd type="none" w="med" len="med"/>
+                    </a:lnL>
+                    <a:lnR w="6350" cap="flat" cmpd="sng" algn="ctr">
+                      <a:solidFill>
+                        <a:srgbClr val="000000"/>
+                      </a:solidFill>
+                      <a:prstDash val="solid"/>
+                      <a:round/>
+                      <a:headEnd type="none" w="med" len="med"/>
+                      <a:tailEnd type="none" w="med" len="med"/>
+                    </a:lnR>
+                    <a:lnT w="6350" cap="flat" cmpd="sng" algn="ctr">
+                      <a:solidFill>
+                        <a:srgbClr val="000000"/>
+                      </a:solidFill>
+                      <a:prstDash val="solid"/>
+                      <a:round/>
+                      <a:headEnd type="none" w="med" len="med"/>
+                      <a:tailEnd type="none" w="med" len="med"/>
+                    </a:lnT>
+                    <a:lnB w="6350" cap="flat" cmpd="sng" algn="ctr">
+                      <a:solidFill>
+                        <a:srgbClr val="000000"/>
+                      </a:solidFill>
+                      <a:prstDash val="solid"/>
+                      <a:round/>
+                      <a:headEnd type="none" w="med" len="med"/>
+                      <a:tailEnd type="none" w="med" len="med"/>
+                    </a:lnB>
+                  </a:tcPr>
+                </a:tc>
+                <a:tc>
+                  <a:txBody>
+                    <a:bodyPr/>
+                    <a:lstStyle/>
+                    <a:p>
+                      <a:pPr algn="ctr" fontAlgn="b"/>
+                      <a:r>
+                        <a:rPr lang="en-US" altLang="zh-CN" sz="1800" b="1" i="0" u="none" strike="noStrike">
+                          <a:solidFill>
+                            <a:srgbClr val="000000"/>
+                          </a:solidFill>
+                          <a:effectLst/>
+                          <a:latin typeface="Calibri" charset="0"/>
+                        </a:rPr>
+                        <a:t>0</a:t>
+                      </a:r>
+                    </a:p>
+                  </a:txBody>
+                  <a:tcPr marL="12700" marR="12700" marT="12700" marB="0" anchor="b">
+                    <a:lnL w="6350" cap="flat" cmpd="sng" algn="ctr">
+                      <a:solidFill>
+                        <a:srgbClr val="000000"/>
+                      </a:solidFill>
+                      <a:prstDash val="solid"/>
+                      <a:round/>
+                      <a:headEnd type="none" w="med" len="med"/>
+                      <a:tailEnd type="none" w="med" len="med"/>
+                    </a:lnL>
+                    <a:lnR w="6350" cap="flat" cmpd="sng" algn="ctr">
+                      <a:solidFill>
+                        <a:srgbClr val="000000"/>
+                      </a:solidFill>
+                      <a:prstDash val="solid"/>
+                      <a:round/>
+                      <a:headEnd type="none" w="med" len="med"/>
+                      <a:tailEnd type="none" w="med" len="med"/>
+                    </a:lnR>
+                    <a:lnT w="6350" cap="flat" cmpd="sng" algn="ctr">
+                      <a:solidFill>
+                        <a:srgbClr val="000000"/>
+                      </a:solidFill>
+                      <a:prstDash val="solid"/>
+                      <a:round/>
+                      <a:headEnd type="none" w="med" len="med"/>
+                      <a:tailEnd type="none" w="med" len="med"/>
+                    </a:lnT>
+                    <a:lnB w="6350" cap="flat" cmpd="sng" algn="ctr">
+                      <a:solidFill>
+                        <a:srgbClr val="000000"/>
+                      </a:solidFill>
+                      <a:prstDash val="solid"/>
+                      <a:round/>
+                      <a:headEnd type="none" w="med" len="med"/>
+                      <a:tailEnd type="none" w="med" len="med"/>
+                    </a:lnB>
+                  </a:tcPr>
+                </a:tc>
+                <a:tc>
+                  <a:txBody>
+                    <a:bodyPr/>
+                    <a:lstStyle/>
+                    <a:p>
+                      <a:pPr algn="ctr" fontAlgn="b"/>
+                      <a:r>
+                        <a:rPr lang="en-US" altLang="zh-CN" sz="1800" b="1" i="0" u="none" strike="noStrike">
+                          <a:solidFill>
+                            <a:srgbClr val="000000"/>
+                          </a:solidFill>
+                          <a:effectLst/>
+                          <a:latin typeface="Calibri" charset="0"/>
+                        </a:rPr>
+                        <a:t>0</a:t>
+                      </a:r>
+                    </a:p>
+                  </a:txBody>
+                  <a:tcPr marL="12700" marR="12700" marT="12700" marB="0" anchor="b">
+                    <a:lnL w="6350" cap="flat" cmpd="sng" algn="ctr">
+                      <a:solidFill>
+                        <a:srgbClr val="000000"/>
+                      </a:solidFill>
+                      <a:prstDash val="solid"/>
+                      <a:round/>
+                      <a:headEnd type="none" w="med" len="med"/>
+                      <a:tailEnd type="none" w="med" len="med"/>
+                    </a:lnL>
+                    <a:lnR w="6350" cap="flat" cmpd="sng" algn="ctr">
+                      <a:solidFill>
+                        <a:srgbClr val="000000"/>
+                      </a:solidFill>
+                      <a:prstDash val="solid"/>
+                      <a:round/>
+                      <a:headEnd type="none" w="med" len="med"/>
+                      <a:tailEnd type="none" w="med" len="med"/>
+                    </a:lnR>
+                    <a:lnT w="6350" cap="flat" cmpd="sng" algn="ctr">
+                      <a:solidFill>
+                        <a:srgbClr val="000000"/>
+                      </a:solidFill>
+                      <a:prstDash val="solid"/>
+                      <a:round/>
+                      <a:headEnd type="none" w="med" len="med"/>
+                      <a:tailEnd type="none" w="med" len="med"/>
+                    </a:lnT>
+                    <a:lnB w="6350" cap="flat" cmpd="sng" algn="ctr">
+                      <a:solidFill>
+                        <a:srgbClr val="000000"/>
+                      </a:solidFill>
+                      <a:prstDash val="solid"/>
+                      <a:round/>
+                      <a:headEnd type="none" w="med" len="med"/>
+                      <a:tailEnd type="none" w="med" len="med"/>
+                    </a:lnB>
+                  </a:tcPr>
+                </a:tc>
+                <a:tc>
+                  <a:txBody>
+                    <a:bodyPr/>
+                    <a:lstStyle/>
+                    <a:p>
+                      <a:pPr algn="ctr" fontAlgn="b"/>
+                      <a:r>
+                        <a:rPr lang="en-US" altLang="zh-CN" sz="1800" b="1" i="0" u="none" strike="noStrike">
+                          <a:solidFill>
+                            <a:srgbClr val="000000"/>
+                          </a:solidFill>
+                          <a:effectLst/>
+                          <a:latin typeface="Calibri" charset="0"/>
+                        </a:rPr>
+                        <a:t>1</a:t>
+                      </a:r>
+                    </a:p>
+                  </a:txBody>
+                  <a:tcPr marL="12700" marR="12700" marT="12700" marB="0" anchor="b">
+                    <a:lnL w="6350" cap="flat" cmpd="sng" algn="ctr">
+                      <a:solidFill>
+                        <a:srgbClr val="000000"/>
+                      </a:solidFill>
+                      <a:prstDash val="solid"/>
+                      <a:round/>
+                      <a:headEnd type="none" w="med" len="med"/>
+                      <a:tailEnd type="none" w="med" len="med"/>
+                    </a:lnL>
+                    <a:lnR w="6350" cap="flat" cmpd="sng" algn="ctr">
+                      <a:solidFill>
+                        <a:srgbClr val="000000"/>
+                      </a:solidFill>
+                      <a:prstDash val="solid"/>
+                      <a:round/>
+                      <a:headEnd type="none" w="med" len="med"/>
+                      <a:tailEnd type="none" w="med" len="med"/>
+                    </a:lnR>
+                    <a:lnT w="6350" cap="flat" cmpd="sng" algn="ctr">
+                      <a:solidFill>
+                        <a:srgbClr val="000000"/>
+                      </a:solidFill>
+                      <a:prstDash val="solid"/>
+                      <a:round/>
+                      <a:headEnd type="none" w="med" len="med"/>
+                      <a:tailEnd type="none" w="med" len="med"/>
+                    </a:lnT>
+                    <a:lnB w="6350" cap="flat" cmpd="sng" algn="ctr">
+                      <a:solidFill>
+                        <a:srgbClr val="000000"/>
+                      </a:solidFill>
+                      <a:prstDash val="solid"/>
+                      <a:round/>
+                      <a:headEnd type="none" w="med" len="med"/>
+                      <a:tailEnd type="none" w="med" len="med"/>
+                    </a:lnB>
+                  </a:tcPr>
+                </a:tc>
+                <a:tc>
+                  <a:txBody>
+                    <a:bodyPr/>
+                    <a:lstStyle/>
+                    <a:p>
+                      <a:pPr algn="ctr" fontAlgn="b"/>
+                      <a:r>
+                        <a:rPr lang="en-US" altLang="zh-CN" sz="1800" b="1" i="0" u="none" strike="noStrike">
+                          <a:solidFill>
+                            <a:srgbClr val="000000"/>
+                          </a:solidFill>
+                          <a:effectLst/>
+                          <a:latin typeface="Calibri" charset="0"/>
+                        </a:rPr>
+                        <a:t>1</a:t>
+                      </a:r>
+                    </a:p>
+                  </a:txBody>
+                  <a:tcPr marL="12700" marR="12700" marT="12700" marB="0" anchor="b">
+                    <a:lnL w="6350" cap="flat" cmpd="sng" algn="ctr">
+                      <a:solidFill>
+                        <a:srgbClr val="000000"/>
+                      </a:solidFill>
+                      <a:prstDash val="solid"/>
+                      <a:round/>
+                      <a:headEnd type="none" w="med" len="med"/>
+                      <a:tailEnd type="none" w="med" len="med"/>
+                    </a:lnL>
+                    <a:lnR w="6350" cap="flat" cmpd="sng" algn="ctr">
+                      <a:solidFill>
+                        <a:srgbClr val="000000"/>
+                      </a:solidFill>
+                      <a:prstDash val="solid"/>
+                      <a:round/>
+                      <a:headEnd type="none" w="med" len="med"/>
+                      <a:tailEnd type="none" w="med" len="med"/>
+                    </a:lnR>
+                    <a:lnT w="6350" cap="flat" cmpd="sng" algn="ctr">
+                      <a:solidFill>
+                        <a:srgbClr val="000000"/>
+                      </a:solidFill>
+                      <a:prstDash val="solid"/>
+                      <a:round/>
+                      <a:headEnd type="none" w="med" len="med"/>
+                      <a:tailEnd type="none" w="med" len="med"/>
+                    </a:lnT>
+                    <a:lnB w="6350" cap="flat" cmpd="sng" algn="ctr">
+                      <a:solidFill>
+                        <a:srgbClr val="000000"/>
+                      </a:solidFill>
+                      <a:prstDash val="solid"/>
+                      <a:round/>
+                      <a:headEnd type="none" w="med" len="med"/>
+                      <a:tailEnd type="none" w="med" len="med"/>
+                    </a:lnB>
+                  </a:tcPr>
+                </a:tc>
+                <a:tc>
+                  <a:txBody>
+                    <a:bodyPr/>
+                    <a:lstStyle/>
+                    <a:p>
+                      <a:pPr algn="ctr" fontAlgn="b"/>
+                      <a:r>
+                        <a:rPr lang="en-US" altLang="zh-CN" sz="1800" b="1" i="0" u="none" strike="noStrike">
+                          <a:solidFill>
+                            <a:srgbClr val="000000"/>
+                          </a:solidFill>
+                          <a:effectLst/>
+                          <a:latin typeface="Calibri" charset="0"/>
+                        </a:rPr>
+                        <a:t>0</a:t>
+                      </a:r>
+                    </a:p>
+                  </a:txBody>
+                  <a:tcPr marL="12700" marR="12700" marT="12700" marB="0" anchor="b">
+                    <a:lnL w="6350" cap="flat" cmpd="sng" algn="ctr">
+                      <a:solidFill>
+                        <a:srgbClr val="000000"/>
+                      </a:solidFill>
+                      <a:prstDash val="solid"/>
+                      <a:round/>
+                      <a:headEnd type="none" w="med" len="med"/>
+                      <a:tailEnd type="none" w="med" len="med"/>
+                    </a:lnL>
+                    <a:lnR w="12700" cap="flat" cmpd="sng" algn="ctr">
+                      <a:solidFill>
+                        <a:srgbClr val="000000"/>
+                      </a:solidFill>
+                      <a:prstDash val="solid"/>
+                      <a:round/>
+                      <a:headEnd type="none" w="med" len="med"/>
+                      <a:tailEnd type="none" w="med" len="med"/>
+                    </a:lnR>
+                    <a:lnT w="6350" cap="flat" cmpd="sng" algn="ctr">
+                      <a:solidFill>
+                        <a:srgbClr val="000000"/>
+                      </a:solidFill>
+                      <a:prstDash val="solid"/>
+                      <a:round/>
+                      <a:headEnd type="none" w="med" len="med"/>
+                      <a:tailEnd type="none" w="med" len="med"/>
+                    </a:lnT>
+                    <a:lnB w="6350" cap="flat" cmpd="sng" algn="ctr">
+                      <a:solidFill>
+                        <a:srgbClr val="000000"/>
+                      </a:solidFill>
+                      <a:prstDash val="solid"/>
+                      <a:round/>
+                      <a:headEnd type="none" w="med" len="med"/>
+                      <a:tailEnd type="none" w="med" len="med"/>
+                    </a:lnB>
+                  </a:tcPr>
+                </a:tc>
+              </a:tr>
+              <a:tr h="304800">
+                <a:tc>
+                  <a:txBody>
+                    <a:bodyPr/>
+                    <a:lstStyle/>
+                    <a:p>
+                      <a:pPr algn="ctr" fontAlgn="b"/>
+                      <a:r>
+                        <a:rPr lang="en-US" altLang="zh-CN" sz="1800" b="1" i="0" u="none" strike="noStrike">
+                          <a:solidFill>
+                            <a:srgbClr val="000000"/>
+                          </a:solidFill>
+                          <a:effectLst/>
+                          <a:latin typeface="Calibri" charset="0"/>
+                        </a:rPr>
+                        <a:t>U4</a:t>
+                      </a:r>
+                    </a:p>
+                  </a:txBody>
+                  <a:tcPr marL="12700" marR="12700" marT="12700" marB="0" anchor="b">
+                    <a:lnL w="12700" cap="flat" cmpd="sng" algn="ctr">
+                      <a:solidFill>
+                        <a:srgbClr val="000000"/>
+                      </a:solidFill>
+                      <a:prstDash val="solid"/>
+                      <a:round/>
+                      <a:headEnd type="none" w="med" len="med"/>
+                      <a:tailEnd type="none" w="med" len="med"/>
+                    </a:lnL>
+                    <a:lnR w="6350" cap="flat" cmpd="sng" algn="ctr">
+                      <a:solidFill>
+                        <a:srgbClr val="000000"/>
+                      </a:solidFill>
+                      <a:prstDash val="solid"/>
+                      <a:round/>
+                      <a:headEnd type="none" w="med" len="med"/>
+                      <a:tailEnd type="none" w="med" len="med"/>
+                    </a:lnR>
+                    <a:lnT w="6350" cap="flat" cmpd="sng" algn="ctr">
+                      <a:solidFill>
+                        <a:srgbClr val="000000"/>
+                      </a:solidFill>
+                      <a:prstDash val="solid"/>
+                      <a:round/>
+                      <a:headEnd type="none" w="med" len="med"/>
+                      <a:tailEnd type="none" w="med" len="med"/>
+                    </a:lnT>
+                    <a:lnB w="6350" cap="flat" cmpd="sng" algn="ctr">
+                      <a:solidFill>
+                        <a:srgbClr val="000000"/>
+                      </a:solidFill>
+                      <a:prstDash val="solid"/>
+                      <a:round/>
+                      <a:headEnd type="none" w="med" len="med"/>
+                      <a:tailEnd type="none" w="med" len="med"/>
+                    </a:lnB>
+                  </a:tcPr>
+                </a:tc>
+                <a:tc>
+                  <a:txBody>
+                    <a:bodyPr/>
+                    <a:lstStyle/>
+                    <a:p>
+                      <a:pPr algn="ctr" fontAlgn="b"/>
+                      <a:r>
+                        <a:rPr lang="en-US" altLang="zh-CN" sz="1800" b="1" i="0" u="none" strike="noStrike">
+                          <a:solidFill>
+                            <a:srgbClr val="000000"/>
+                          </a:solidFill>
+                          <a:effectLst/>
+                          <a:latin typeface="Calibri" charset="0"/>
+                        </a:rPr>
+                        <a:t>0</a:t>
+                      </a:r>
+                    </a:p>
+                  </a:txBody>
+                  <a:tcPr marL="12700" marR="12700" marT="12700" marB="0" anchor="b">
+                    <a:lnL w="6350" cap="flat" cmpd="sng" algn="ctr">
+                      <a:solidFill>
+                        <a:srgbClr val="000000"/>
+                      </a:solidFill>
+                      <a:prstDash val="solid"/>
+                      <a:round/>
+                      <a:headEnd type="none" w="med" len="med"/>
+                      <a:tailEnd type="none" w="med" len="med"/>
+                    </a:lnL>
+                    <a:lnR w="6350" cap="flat" cmpd="sng" algn="ctr">
+                      <a:solidFill>
+                        <a:srgbClr val="000000"/>
+                      </a:solidFill>
+                      <a:prstDash val="solid"/>
+                      <a:round/>
+                      <a:headEnd type="none" w="med" len="med"/>
+                      <a:tailEnd type="none" w="med" len="med"/>
+                    </a:lnR>
+                    <a:lnT w="6350" cap="flat" cmpd="sng" algn="ctr">
+                      <a:solidFill>
+                        <a:srgbClr val="000000"/>
+                      </a:solidFill>
+                      <a:prstDash val="solid"/>
+                      <a:round/>
+                      <a:headEnd type="none" w="med" len="med"/>
+                      <a:tailEnd type="none" w="med" len="med"/>
+                    </a:lnT>
+                    <a:lnB w="6350" cap="flat" cmpd="sng" algn="ctr">
+                      <a:solidFill>
+                        <a:srgbClr val="000000"/>
+                      </a:solidFill>
+                      <a:prstDash val="solid"/>
+                      <a:round/>
+                      <a:headEnd type="none" w="med" len="med"/>
+                      <a:tailEnd type="none" w="med" len="med"/>
+                    </a:lnB>
+                  </a:tcPr>
+                </a:tc>
+                <a:tc>
+                  <a:txBody>
+                    <a:bodyPr/>
+                    <a:lstStyle/>
+                    <a:p>
+                      <a:pPr algn="ctr" fontAlgn="b"/>
+                      <a:r>
+                        <a:rPr lang="en-US" altLang="zh-CN" sz="1800" b="1" i="0" u="none" strike="noStrike">
+                          <a:solidFill>
+                            <a:srgbClr val="000000"/>
+                          </a:solidFill>
+                          <a:effectLst/>
+                          <a:latin typeface="Calibri" charset="0"/>
+                        </a:rPr>
+                        <a:t>1</a:t>
+                      </a:r>
+                    </a:p>
+                  </a:txBody>
+                  <a:tcPr marL="12700" marR="12700" marT="12700" marB="0" anchor="b">
+                    <a:lnL w="6350" cap="flat" cmpd="sng" algn="ctr">
+                      <a:solidFill>
+                        <a:srgbClr val="000000"/>
+                      </a:solidFill>
+                      <a:prstDash val="solid"/>
+                      <a:round/>
+                      <a:headEnd type="none" w="med" len="med"/>
+                      <a:tailEnd type="none" w="med" len="med"/>
+                    </a:lnL>
+                    <a:lnR w="6350" cap="flat" cmpd="sng" algn="ctr">
+                      <a:solidFill>
+                        <a:srgbClr val="000000"/>
+                      </a:solidFill>
+                      <a:prstDash val="solid"/>
+                      <a:round/>
+                      <a:headEnd type="none" w="med" len="med"/>
+                      <a:tailEnd type="none" w="med" len="med"/>
+                    </a:lnR>
+                    <a:lnT w="6350" cap="flat" cmpd="sng" algn="ctr">
+                      <a:solidFill>
+                        <a:srgbClr val="000000"/>
+                      </a:solidFill>
+                      <a:prstDash val="solid"/>
+                      <a:round/>
+                      <a:headEnd type="none" w="med" len="med"/>
+                      <a:tailEnd type="none" w="med" len="med"/>
+                    </a:lnT>
+                    <a:lnB w="6350" cap="flat" cmpd="sng" algn="ctr">
+                      <a:solidFill>
+                        <a:srgbClr val="000000"/>
+                      </a:solidFill>
+                      <a:prstDash val="solid"/>
+                      <a:round/>
+                      <a:headEnd type="none" w="med" len="med"/>
+                      <a:tailEnd type="none" w="med" len="med"/>
+                    </a:lnB>
+                  </a:tcPr>
+                </a:tc>
+                <a:tc>
+                  <a:txBody>
+                    <a:bodyPr/>
+                    <a:lstStyle/>
+                    <a:p>
+                      <a:pPr algn="ctr" fontAlgn="b"/>
+                      <a:r>
+                        <a:rPr lang="en-US" altLang="zh-CN" sz="1800" b="1" i="0" u="none" strike="noStrike">
+                          <a:solidFill>
+                            <a:srgbClr val="000000"/>
+                          </a:solidFill>
+                          <a:effectLst/>
+                          <a:latin typeface="Calibri" charset="0"/>
+                        </a:rPr>
+                        <a:t>1</a:t>
+                      </a:r>
+                    </a:p>
+                  </a:txBody>
+                  <a:tcPr marL="12700" marR="12700" marT="12700" marB="0" anchor="b">
+                    <a:lnL w="6350" cap="flat" cmpd="sng" algn="ctr">
+                      <a:solidFill>
+                        <a:srgbClr val="000000"/>
+                      </a:solidFill>
+                      <a:prstDash val="solid"/>
+                      <a:round/>
+                      <a:headEnd type="none" w="med" len="med"/>
+                      <a:tailEnd type="none" w="med" len="med"/>
+                    </a:lnL>
+                    <a:lnR w="6350" cap="flat" cmpd="sng" algn="ctr">
+                      <a:solidFill>
+                        <a:srgbClr val="000000"/>
+                      </a:solidFill>
+                      <a:prstDash val="solid"/>
+                      <a:round/>
+                      <a:headEnd type="none" w="med" len="med"/>
+                      <a:tailEnd type="none" w="med" len="med"/>
+                    </a:lnR>
+                    <a:lnT w="6350" cap="flat" cmpd="sng" algn="ctr">
+                      <a:solidFill>
+                        <a:srgbClr val="000000"/>
+                      </a:solidFill>
+                      <a:prstDash val="solid"/>
+                      <a:round/>
+                      <a:headEnd type="none" w="med" len="med"/>
+                      <a:tailEnd type="none" w="med" len="med"/>
+                    </a:lnT>
+                    <a:lnB w="6350" cap="flat" cmpd="sng" algn="ctr">
+                      <a:solidFill>
+                        <a:srgbClr val="000000"/>
+                      </a:solidFill>
+                      <a:prstDash val="solid"/>
+                      <a:round/>
+                      <a:headEnd type="none" w="med" len="med"/>
+                      <a:tailEnd type="none" w="med" len="med"/>
+                    </a:lnB>
+                  </a:tcPr>
+                </a:tc>
+                <a:tc>
+                  <a:txBody>
+                    <a:bodyPr/>
+                    <a:lstStyle/>
+                    <a:p>
+                      <a:pPr algn="ctr" fontAlgn="b"/>
+                      <a:r>
+                        <a:rPr lang="en-US" altLang="zh-CN" sz="1800" b="1" i="0" u="none" strike="noStrike">
+                          <a:solidFill>
+                            <a:srgbClr val="000000"/>
+                          </a:solidFill>
+                          <a:effectLst/>
+                          <a:latin typeface="Calibri" charset="0"/>
+                        </a:rPr>
+                        <a:t>1</a:t>
+                      </a:r>
+                    </a:p>
+                  </a:txBody>
+                  <a:tcPr marL="12700" marR="12700" marT="12700" marB="0" anchor="b">
+                    <a:lnL w="6350" cap="flat" cmpd="sng" algn="ctr">
+                      <a:solidFill>
+                        <a:srgbClr val="000000"/>
+                      </a:solidFill>
+                      <a:prstDash val="solid"/>
+                      <a:round/>
+                      <a:headEnd type="none" w="med" len="med"/>
+                      <a:tailEnd type="none" w="med" len="med"/>
+                    </a:lnL>
+                    <a:lnR w="6350" cap="flat" cmpd="sng" algn="ctr">
+                      <a:solidFill>
+                        <a:srgbClr val="000000"/>
+                      </a:solidFill>
+                      <a:prstDash val="solid"/>
+                      <a:round/>
+                      <a:headEnd type="none" w="med" len="med"/>
+                      <a:tailEnd type="none" w="med" len="med"/>
+                    </a:lnR>
+                    <a:lnT w="6350" cap="flat" cmpd="sng" algn="ctr">
+                      <a:solidFill>
+                        <a:srgbClr val="000000"/>
+                      </a:solidFill>
+                      <a:prstDash val="solid"/>
+                      <a:round/>
+                      <a:headEnd type="none" w="med" len="med"/>
+                      <a:tailEnd type="none" w="med" len="med"/>
+                    </a:lnT>
+                    <a:lnB w="6350" cap="flat" cmpd="sng" algn="ctr">
+                      <a:solidFill>
+                        <a:srgbClr val="000000"/>
+                      </a:solidFill>
+                      <a:prstDash val="solid"/>
+                      <a:round/>
+                      <a:headEnd type="none" w="med" len="med"/>
+                      <a:tailEnd type="none" w="med" len="med"/>
+                    </a:lnB>
+                  </a:tcPr>
+                </a:tc>
+                <a:tc>
+                  <a:txBody>
+                    <a:bodyPr/>
+                    <a:lstStyle/>
+                    <a:p>
+                      <a:pPr algn="ctr" fontAlgn="b"/>
+                      <a:r>
+                        <a:rPr lang="en-US" altLang="zh-CN" sz="1800" b="1" i="0" u="none" strike="noStrike">
+                          <a:solidFill>
+                            <a:srgbClr val="000000"/>
+                          </a:solidFill>
+                          <a:effectLst/>
+                          <a:latin typeface="Calibri" charset="0"/>
+                        </a:rPr>
+                        <a:t>1</a:t>
+                      </a:r>
+                    </a:p>
+                  </a:txBody>
+                  <a:tcPr marL="12700" marR="12700" marT="12700" marB="0" anchor="b">
+                    <a:lnL w="6350" cap="flat" cmpd="sng" algn="ctr">
+                      <a:solidFill>
+                        <a:srgbClr val="000000"/>
+                      </a:solidFill>
+                      <a:prstDash val="solid"/>
+                      <a:round/>
+                      <a:headEnd type="none" w="med" len="med"/>
+                      <a:tailEnd type="none" w="med" len="med"/>
+                    </a:lnL>
+                    <a:lnR w="12700" cap="flat" cmpd="sng" algn="ctr">
+                      <a:solidFill>
+                        <a:srgbClr val="000000"/>
+                      </a:solidFill>
+                      <a:prstDash val="solid"/>
+                      <a:round/>
+                      <a:headEnd type="none" w="med" len="med"/>
+                      <a:tailEnd type="none" w="med" len="med"/>
+                    </a:lnR>
+                    <a:lnT w="6350" cap="flat" cmpd="sng" algn="ctr">
+                      <a:solidFill>
+                        <a:srgbClr val="000000"/>
+                      </a:solidFill>
+                      <a:prstDash val="solid"/>
+                      <a:round/>
+                      <a:headEnd type="none" w="med" len="med"/>
+                      <a:tailEnd type="none" w="med" len="med"/>
+                    </a:lnT>
+                    <a:lnB w="6350" cap="flat" cmpd="sng" algn="ctr">
+                      <a:solidFill>
+                        <a:srgbClr val="000000"/>
+                      </a:solidFill>
+                      <a:prstDash val="solid"/>
+                      <a:round/>
+                      <a:headEnd type="none" w="med" len="med"/>
+                      <a:tailEnd type="none" w="med" len="med"/>
+                    </a:lnB>
+                  </a:tcPr>
+                </a:tc>
+              </a:tr>
+              <a:tr h="304800">
+                <a:tc>
+                  <a:txBody>
+                    <a:bodyPr/>
+                    <a:lstStyle/>
+                    <a:p>
+                      <a:pPr algn="ctr" fontAlgn="b"/>
+                      <a:r>
+                        <a:rPr lang="en-US" altLang="zh-CN" sz="1800" b="1" i="0" u="none" strike="noStrike">
+                          <a:solidFill>
+                            <a:srgbClr val="000000"/>
+                          </a:solidFill>
+                          <a:effectLst/>
+                          <a:latin typeface="Calibri" charset="0"/>
+                        </a:rPr>
+                        <a:t>U5</a:t>
+                      </a:r>
+                    </a:p>
+                  </a:txBody>
+                  <a:tcPr marL="12700" marR="12700" marT="12700" marB="0" anchor="b">
+                    <a:lnL w="12700" cap="flat" cmpd="sng" algn="ctr">
+                      <a:solidFill>
+                        <a:srgbClr val="000000"/>
+                      </a:solidFill>
+                      <a:prstDash val="solid"/>
+                      <a:round/>
+                      <a:headEnd type="none" w="med" len="med"/>
+                      <a:tailEnd type="none" w="med" len="med"/>
+                    </a:lnL>
+                    <a:lnR w="6350" cap="flat" cmpd="sng" algn="ctr">
+                      <a:solidFill>
+                        <a:srgbClr val="000000"/>
+                      </a:solidFill>
+                      <a:prstDash val="solid"/>
+                      <a:round/>
+                      <a:headEnd type="none" w="med" len="med"/>
+                      <a:tailEnd type="none" w="med" len="med"/>
+                    </a:lnR>
+                    <a:lnT w="6350" cap="flat" cmpd="sng" algn="ctr">
+                      <a:solidFill>
+                        <a:srgbClr val="000000"/>
+                      </a:solidFill>
+                      <a:prstDash val="solid"/>
+                      <a:round/>
+                      <a:headEnd type="none" w="med" len="med"/>
+                      <a:tailEnd type="none" w="med" len="med"/>
+                    </a:lnT>
+                    <a:lnB w="6350" cap="flat" cmpd="sng" algn="ctr">
+                      <a:solidFill>
+                        <a:srgbClr val="000000"/>
+                      </a:solidFill>
+                      <a:prstDash val="solid"/>
+                      <a:round/>
+                      <a:headEnd type="none" w="med" len="med"/>
+                      <a:tailEnd type="none" w="med" len="med"/>
+                    </a:lnB>
+                  </a:tcPr>
+                </a:tc>
+                <a:tc>
+                  <a:txBody>
+                    <a:bodyPr/>
+                    <a:lstStyle/>
+                    <a:p>
+                      <a:pPr algn="ctr" fontAlgn="b"/>
+                      <a:r>
+                        <a:rPr lang="en-US" altLang="zh-CN" sz="1800" b="1" i="0" u="none" strike="noStrike">
+                          <a:solidFill>
+                            <a:srgbClr val="000000"/>
+                          </a:solidFill>
+                          <a:effectLst/>
+                          <a:latin typeface="Calibri" charset="0"/>
+                        </a:rPr>
+                        <a:t>0</a:t>
+                      </a:r>
+                    </a:p>
+                  </a:txBody>
+                  <a:tcPr marL="12700" marR="12700" marT="12700" marB="0" anchor="b">
+                    <a:lnL w="6350" cap="flat" cmpd="sng" algn="ctr">
+                      <a:solidFill>
+                        <a:srgbClr val="000000"/>
+                      </a:solidFill>
+                      <a:prstDash val="solid"/>
+                      <a:round/>
+                      <a:headEnd type="none" w="med" len="med"/>
+                      <a:tailEnd type="none" w="med" len="med"/>
+                    </a:lnL>
+                    <a:lnR w="6350" cap="flat" cmpd="sng" algn="ctr">
+                      <a:solidFill>
+                        <a:srgbClr val="000000"/>
+                      </a:solidFill>
+                      <a:prstDash val="solid"/>
+                      <a:round/>
+                      <a:headEnd type="none" w="med" len="med"/>
+                      <a:tailEnd type="none" w="med" len="med"/>
+                    </a:lnR>
+                    <a:lnT w="6350" cap="flat" cmpd="sng" algn="ctr">
+                      <a:solidFill>
+                        <a:srgbClr val="000000"/>
+                      </a:solidFill>
+                      <a:prstDash val="solid"/>
+                      <a:round/>
+                      <a:headEnd type="none" w="med" len="med"/>
+                      <a:tailEnd type="none" w="med" len="med"/>
+                    </a:lnT>
+                    <a:lnB w="6350" cap="flat" cmpd="sng" algn="ctr">
+                      <a:solidFill>
+                        <a:srgbClr val="000000"/>
+                      </a:solidFill>
+                      <a:prstDash val="solid"/>
+                      <a:round/>
+                      <a:headEnd type="none" w="med" len="med"/>
+                      <a:tailEnd type="none" w="med" len="med"/>
+                    </a:lnB>
+                  </a:tcPr>
+                </a:tc>
+                <a:tc>
+                  <a:txBody>
+                    <a:bodyPr/>
+                    <a:lstStyle/>
+                    <a:p>
+                      <a:pPr algn="ctr" fontAlgn="b"/>
+                      <a:r>
+                        <a:rPr lang="en-US" altLang="zh-CN" sz="1800" b="1" i="0" u="none" strike="noStrike">
+                          <a:solidFill>
+                            <a:srgbClr val="000000"/>
+                          </a:solidFill>
+                          <a:effectLst/>
+                          <a:latin typeface="Calibri" charset="0"/>
+                        </a:rPr>
+                        <a:t>0</a:t>
+                      </a:r>
+                    </a:p>
+                  </a:txBody>
+                  <a:tcPr marL="12700" marR="12700" marT="12700" marB="0" anchor="b">
+                    <a:lnL w="6350" cap="flat" cmpd="sng" algn="ctr">
+                      <a:solidFill>
+                        <a:srgbClr val="000000"/>
+                      </a:solidFill>
+                      <a:prstDash val="solid"/>
+                      <a:round/>
+                      <a:headEnd type="none" w="med" len="med"/>
+                      <a:tailEnd type="none" w="med" len="med"/>
+                    </a:lnL>
+                    <a:lnR w="6350" cap="flat" cmpd="sng" algn="ctr">
+                      <a:solidFill>
+                        <a:srgbClr val="000000"/>
+                      </a:solidFill>
+                      <a:prstDash val="solid"/>
+                      <a:round/>
+                      <a:headEnd type="none" w="med" len="med"/>
+                      <a:tailEnd type="none" w="med" len="med"/>
+                    </a:lnR>
+                    <a:lnT w="6350" cap="flat" cmpd="sng" algn="ctr">
+                      <a:solidFill>
+                        <a:srgbClr val="000000"/>
+                      </a:solidFill>
+                      <a:prstDash val="solid"/>
+                      <a:round/>
+                      <a:headEnd type="none" w="med" len="med"/>
+                      <a:tailEnd type="none" w="med" len="med"/>
+                    </a:lnT>
+                    <a:lnB w="6350" cap="flat" cmpd="sng" algn="ctr">
+                      <a:solidFill>
+                        <a:srgbClr val="000000"/>
+                      </a:solidFill>
+                      <a:prstDash val="solid"/>
+                      <a:round/>
+                      <a:headEnd type="none" w="med" len="med"/>
+                      <a:tailEnd type="none" w="med" len="med"/>
+                    </a:lnB>
+                  </a:tcPr>
+                </a:tc>
+                <a:tc>
+                  <a:txBody>
+                    <a:bodyPr/>
+                    <a:lstStyle/>
+                    <a:p>
+                      <a:pPr algn="ctr" fontAlgn="b"/>
+                      <a:r>
+                        <a:rPr lang="en-US" altLang="zh-CN" sz="1800" b="1" i="0" u="none" strike="noStrike">
+                          <a:solidFill>
+                            <a:srgbClr val="000000"/>
+                          </a:solidFill>
+                          <a:effectLst/>
+                          <a:latin typeface="Calibri" charset="0"/>
+                        </a:rPr>
+                        <a:t>1</a:t>
+                      </a:r>
+                    </a:p>
+                  </a:txBody>
+                  <a:tcPr marL="12700" marR="12700" marT="12700" marB="0" anchor="b">
+                    <a:lnL w="6350" cap="flat" cmpd="sng" algn="ctr">
+                      <a:solidFill>
+                        <a:srgbClr val="000000"/>
+                      </a:solidFill>
+                      <a:prstDash val="solid"/>
+                      <a:round/>
+                      <a:headEnd type="none" w="med" len="med"/>
+                      <a:tailEnd type="none" w="med" len="med"/>
+                    </a:lnL>
+                    <a:lnR w="6350" cap="flat" cmpd="sng" algn="ctr">
+                      <a:solidFill>
+                        <a:srgbClr val="000000"/>
+                      </a:solidFill>
+                      <a:prstDash val="solid"/>
+                      <a:round/>
+                      <a:headEnd type="none" w="med" len="med"/>
+                      <a:tailEnd type="none" w="med" len="med"/>
+                    </a:lnR>
+                    <a:lnT w="6350" cap="flat" cmpd="sng" algn="ctr">
+                      <a:solidFill>
+                        <a:srgbClr val="000000"/>
+                      </a:solidFill>
+                      <a:prstDash val="solid"/>
+                      <a:round/>
+                      <a:headEnd type="none" w="med" len="med"/>
+                      <a:tailEnd type="none" w="med" len="med"/>
+                    </a:lnT>
+                    <a:lnB w="6350" cap="flat" cmpd="sng" algn="ctr">
+                      <a:solidFill>
+                        <a:srgbClr val="000000"/>
+                      </a:solidFill>
+                      <a:prstDash val="solid"/>
+                      <a:round/>
+                      <a:headEnd type="none" w="med" len="med"/>
+                      <a:tailEnd type="none" w="med" len="med"/>
+                    </a:lnB>
+                  </a:tcPr>
+                </a:tc>
+                <a:tc>
+                  <a:txBody>
+                    <a:bodyPr/>
+                    <a:lstStyle/>
+                    <a:p>
+                      <a:pPr algn="ctr" fontAlgn="b"/>
+                      <a:r>
+                        <a:rPr lang="en-US" altLang="zh-CN" sz="1800" b="1" i="0" u="none" strike="noStrike">
+                          <a:solidFill>
+                            <a:srgbClr val="000000"/>
+                          </a:solidFill>
+                          <a:effectLst/>
+                          <a:latin typeface="Calibri" charset="0"/>
+                        </a:rPr>
+                        <a:t>1</a:t>
+                      </a:r>
+                    </a:p>
+                  </a:txBody>
+                  <a:tcPr marL="12700" marR="12700" marT="12700" marB="0" anchor="b">
+                    <a:lnL w="6350" cap="flat" cmpd="sng" algn="ctr">
+                      <a:solidFill>
+                        <a:srgbClr val="000000"/>
+                      </a:solidFill>
+                      <a:prstDash val="solid"/>
+                      <a:round/>
+                      <a:headEnd type="none" w="med" len="med"/>
+                      <a:tailEnd type="none" w="med" len="med"/>
+                    </a:lnL>
+                    <a:lnR w="6350" cap="flat" cmpd="sng" algn="ctr">
+                      <a:solidFill>
+                        <a:srgbClr val="000000"/>
+                      </a:solidFill>
+                      <a:prstDash val="solid"/>
+                      <a:round/>
+                      <a:headEnd type="none" w="med" len="med"/>
+                      <a:tailEnd type="none" w="med" len="med"/>
+                    </a:lnR>
+                    <a:lnT w="6350" cap="flat" cmpd="sng" algn="ctr">
+                      <a:solidFill>
+                        <a:srgbClr val="000000"/>
+                      </a:solidFill>
+                      <a:prstDash val="solid"/>
+                      <a:round/>
+                      <a:headEnd type="none" w="med" len="med"/>
+                      <a:tailEnd type="none" w="med" len="med"/>
+                    </a:lnT>
+                    <a:lnB w="6350" cap="flat" cmpd="sng" algn="ctr">
+                      <a:solidFill>
+                        <a:srgbClr val="000000"/>
+                      </a:solidFill>
+                      <a:prstDash val="solid"/>
+                      <a:round/>
+                      <a:headEnd type="none" w="med" len="med"/>
+                      <a:tailEnd type="none" w="med" len="med"/>
+                    </a:lnB>
+                  </a:tcPr>
+                </a:tc>
+                <a:tc>
+                  <a:txBody>
+                    <a:bodyPr/>
+                    <a:lstStyle/>
+                    <a:p>
+                      <a:pPr algn="ctr" fontAlgn="b"/>
+                      <a:r>
+                        <a:rPr lang="en-US" altLang="zh-CN" sz="1800" b="1" i="0" u="none" strike="noStrike">
+                          <a:solidFill>
+                            <a:srgbClr val="000000"/>
+                          </a:solidFill>
+                          <a:effectLst/>
+                          <a:latin typeface="Calibri" charset="0"/>
+                        </a:rPr>
+                        <a:t>1</a:t>
+                      </a:r>
+                    </a:p>
+                  </a:txBody>
+                  <a:tcPr marL="12700" marR="12700" marT="12700" marB="0" anchor="b">
+                    <a:lnL w="6350" cap="flat" cmpd="sng" algn="ctr">
+                      <a:solidFill>
+                        <a:srgbClr val="000000"/>
+                      </a:solidFill>
+                      <a:prstDash val="solid"/>
+                      <a:round/>
+                      <a:headEnd type="none" w="med" len="med"/>
+                      <a:tailEnd type="none" w="med" len="med"/>
+                    </a:lnL>
+                    <a:lnR w="12700" cap="flat" cmpd="sng" algn="ctr">
+                      <a:solidFill>
+                        <a:srgbClr val="000000"/>
+                      </a:solidFill>
+                      <a:prstDash val="solid"/>
+                      <a:round/>
+                      <a:headEnd type="none" w="med" len="med"/>
+                      <a:tailEnd type="none" w="med" len="med"/>
+                    </a:lnR>
+                    <a:lnT w="6350" cap="flat" cmpd="sng" algn="ctr">
+                      <a:solidFill>
+                        <a:srgbClr val="000000"/>
+                      </a:solidFill>
+                      <a:prstDash val="solid"/>
+                      <a:round/>
+                      <a:headEnd type="none" w="med" len="med"/>
+                      <a:tailEnd type="none" w="med" len="med"/>
+                    </a:lnT>
+                    <a:lnB w="6350" cap="flat" cmpd="sng" algn="ctr">
+                      <a:solidFill>
+                        <a:srgbClr val="000000"/>
+                      </a:solidFill>
+                      <a:prstDash val="solid"/>
+                      <a:round/>
+                      <a:headEnd type="none" w="med" len="med"/>
+                      <a:tailEnd type="none" w="med" len="med"/>
+                    </a:lnB>
+                  </a:tcPr>
+                </a:tc>
+              </a:tr>
+              <a:tr h="317500">
+                <a:tc>
+                  <a:txBody>
+                    <a:bodyPr/>
+                    <a:lstStyle/>
+                    <a:p>
+                      <a:pPr algn="ctr" fontAlgn="b"/>
+                      <a:r>
+                        <a:rPr lang="en-US" altLang="zh-CN" sz="1800" b="1" i="0" u="none" strike="noStrike">
+                          <a:solidFill>
+                            <a:srgbClr val="000000"/>
+                          </a:solidFill>
+                          <a:effectLst/>
+                          <a:latin typeface="Calibri" charset="0"/>
+                        </a:rPr>
+                        <a:t>U6</a:t>
+                      </a:r>
+                    </a:p>
+                  </a:txBody>
+                  <a:tcPr marL="12700" marR="12700" marT="12700" marB="0" anchor="b">
+                    <a:lnL w="12700" cap="flat" cmpd="sng" algn="ctr">
+                      <a:solidFill>
+                        <a:srgbClr val="000000"/>
+                      </a:solidFill>
+                      <a:prstDash val="solid"/>
+                      <a:round/>
+                      <a:headEnd type="none" w="med" len="med"/>
+                      <a:tailEnd type="none" w="med" len="med"/>
+                    </a:lnL>
+                    <a:lnR w="6350" cap="flat" cmpd="sng" algn="ctr">
+                      <a:solidFill>
+                        <a:srgbClr val="000000"/>
+                      </a:solidFill>
+                      <a:prstDash val="solid"/>
+                      <a:round/>
+                      <a:headEnd type="none" w="med" len="med"/>
+                      <a:tailEnd type="none" w="med" len="med"/>
+                    </a:lnR>
+                    <a:lnT w="6350" cap="flat" cmpd="sng" algn="ctr">
+                      <a:solidFill>
+                        <a:srgbClr val="000000"/>
+                      </a:solidFill>
+                      <a:prstDash val="solid"/>
+                      <a:round/>
+                      <a:headEnd type="none" w="med" len="med"/>
+                      <a:tailEnd type="none" w="med" len="med"/>
+                    </a:lnT>
+                    <a:lnB w="12700" cap="flat" cmpd="sng" algn="ctr">
+                      <a:solidFill>
+                        <a:srgbClr val="000000"/>
+                      </a:solidFill>
+                      <a:prstDash val="solid"/>
+                      <a:round/>
+                      <a:headEnd type="none" w="med" len="med"/>
+                      <a:tailEnd type="none" w="med" len="med"/>
+                    </a:lnB>
+                  </a:tcPr>
+                </a:tc>
+                <a:tc>
+                  <a:txBody>
+                    <a:bodyPr/>
+                    <a:lstStyle/>
+                    <a:p>
+                      <a:pPr algn="ctr" fontAlgn="b"/>
+                      <a:r>
+                        <a:rPr lang="en-US" altLang="zh-CN" sz="1800" b="1" i="0" u="none" strike="noStrike">
+                          <a:solidFill>
+                            <a:srgbClr val="000000"/>
+                          </a:solidFill>
+                          <a:effectLst/>
+                          <a:latin typeface="Calibri" charset="0"/>
+                        </a:rPr>
+                        <a:t>1</a:t>
+                      </a:r>
+                    </a:p>
+                  </a:txBody>
+                  <a:tcPr marL="12700" marR="12700" marT="12700" marB="0" anchor="b">
+                    <a:lnL w="6350" cap="flat" cmpd="sng" algn="ctr">
+                      <a:solidFill>
+                        <a:srgbClr val="000000"/>
+                      </a:solidFill>
+                      <a:prstDash val="solid"/>
+                      <a:round/>
+                      <a:headEnd type="none" w="med" len="med"/>
+                      <a:tailEnd type="none" w="med" len="med"/>
+                    </a:lnL>
+                    <a:lnR w="6350" cap="flat" cmpd="sng" algn="ctr">
+                      <a:solidFill>
+                        <a:srgbClr val="000000"/>
+                      </a:solidFill>
+                      <a:prstDash val="solid"/>
+                      <a:round/>
+                      <a:headEnd type="none" w="med" len="med"/>
+                      <a:tailEnd type="none" w="med" len="med"/>
+                    </a:lnR>
+                    <a:lnT w="6350" cap="flat" cmpd="sng" algn="ctr">
+                      <a:solidFill>
+                        <a:srgbClr val="000000"/>
+                      </a:solidFill>
+                      <a:prstDash val="solid"/>
+                      <a:round/>
+                      <a:headEnd type="none" w="med" len="med"/>
+                      <a:tailEnd type="none" w="med" len="med"/>
+                    </a:lnT>
+                    <a:lnB w="12700" cap="flat" cmpd="sng" algn="ctr">
+                      <a:solidFill>
+                        <a:srgbClr val="000000"/>
+                      </a:solidFill>
+                      <a:prstDash val="solid"/>
+                      <a:round/>
+                      <a:headEnd type="none" w="med" len="med"/>
+                      <a:tailEnd type="none" w="med" len="med"/>
+                    </a:lnB>
+                  </a:tcPr>
+                </a:tc>
+                <a:tc>
+                  <a:txBody>
+                    <a:bodyPr/>
+                    <a:lstStyle/>
+                    <a:p>
+                      <a:pPr algn="ctr" fontAlgn="b"/>
+                      <a:r>
+                        <a:rPr lang="en-US" altLang="zh-CN" sz="1800" b="1" i="0" u="none" strike="noStrike">
+                          <a:solidFill>
+                            <a:srgbClr val="000000"/>
+                          </a:solidFill>
+                          <a:effectLst/>
+                          <a:latin typeface="Calibri" charset="0"/>
+                        </a:rPr>
+                        <a:t>1</a:t>
+                      </a:r>
+                    </a:p>
+                  </a:txBody>
+                  <a:tcPr marL="12700" marR="12700" marT="12700" marB="0" anchor="b">
+                    <a:lnL w="6350" cap="flat" cmpd="sng" algn="ctr">
+                      <a:solidFill>
+                        <a:srgbClr val="000000"/>
+                      </a:solidFill>
+                      <a:prstDash val="solid"/>
+                      <a:round/>
+                      <a:headEnd type="none" w="med" len="med"/>
+                      <a:tailEnd type="none" w="med" len="med"/>
+                    </a:lnL>
+                    <a:lnR w="6350" cap="flat" cmpd="sng" algn="ctr">
+                      <a:solidFill>
+                        <a:srgbClr val="000000"/>
+                      </a:solidFill>
+                      <a:prstDash val="solid"/>
+                      <a:round/>
+                      <a:headEnd type="none" w="med" len="med"/>
+                      <a:tailEnd type="none" w="med" len="med"/>
+                    </a:lnR>
+                    <a:lnT w="6350" cap="flat" cmpd="sng" algn="ctr">
+                      <a:solidFill>
+                        <a:srgbClr val="000000"/>
+                      </a:solidFill>
+                      <a:prstDash val="solid"/>
+                      <a:round/>
+                      <a:headEnd type="none" w="med" len="med"/>
+                      <a:tailEnd type="none" w="med" len="med"/>
+                    </a:lnT>
+                    <a:lnB w="12700" cap="flat" cmpd="sng" algn="ctr">
+                      <a:solidFill>
+                        <a:srgbClr val="000000"/>
+                      </a:solidFill>
+                      <a:prstDash val="solid"/>
+                      <a:round/>
+                      <a:headEnd type="none" w="med" len="med"/>
+                      <a:tailEnd type="none" w="med" len="med"/>
+                    </a:lnB>
+                  </a:tcPr>
+                </a:tc>
+                <a:tc>
+                  <a:txBody>
+                    <a:bodyPr/>
+                    <a:lstStyle/>
+                    <a:p>
+                      <a:pPr algn="ctr" fontAlgn="b"/>
+                      <a:r>
+                        <a:rPr lang="en-US" altLang="zh-CN" sz="1800" b="1" i="0" u="none" strike="noStrike">
+                          <a:solidFill>
+                            <a:srgbClr val="000000"/>
+                          </a:solidFill>
+                          <a:effectLst/>
+                          <a:latin typeface="Calibri" charset="0"/>
+                        </a:rPr>
+                        <a:t>1</a:t>
+                      </a:r>
+                    </a:p>
+                  </a:txBody>
+                  <a:tcPr marL="12700" marR="12700" marT="12700" marB="0" anchor="b">
+                    <a:lnL w="6350" cap="flat" cmpd="sng" algn="ctr">
+                      <a:solidFill>
+                        <a:srgbClr val="000000"/>
+                      </a:solidFill>
+                      <a:prstDash val="solid"/>
+                      <a:round/>
+                      <a:headEnd type="none" w="med" len="med"/>
+                      <a:tailEnd type="none" w="med" len="med"/>
+                    </a:lnL>
+                    <a:lnR w="6350" cap="flat" cmpd="sng" algn="ctr">
+                      <a:solidFill>
+                        <a:srgbClr val="000000"/>
+                      </a:solidFill>
+                      <a:prstDash val="solid"/>
+                      <a:round/>
+                      <a:headEnd type="none" w="med" len="med"/>
+                      <a:tailEnd type="none" w="med" len="med"/>
+                    </a:lnR>
+                    <a:lnT w="6350" cap="flat" cmpd="sng" algn="ctr">
+                      <a:solidFill>
+                        <a:srgbClr val="000000"/>
+                      </a:solidFill>
+                      <a:prstDash val="solid"/>
+                      <a:round/>
+                      <a:headEnd type="none" w="med" len="med"/>
+                      <a:tailEnd type="none" w="med" len="med"/>
+                    </a:lnT>
+                    <a:lnB w="12700" cap="flat" cmpd="sng" algn="ctr">
+                      <a:solidFill>
+                        <a:srgbClr val="000000"/>
+                      </a:solidFill>
+                      <a:prstDash val="solid"/>
+                      <a:round/>
+                      <a:headEnd type="none" w="med" len="med"/>
+                      <a:tailEnd type="none" w="med" len="med"/>
+                    </a:lnB>
+                  </a:tcPr>
+                </a:tc>
+                <a:tc>
+                  <a:txBody>
+                    <a:bodyPr/>
+                    <a:lstStyle/>
+                    <a:p>
+                      <a:pPr algn="ctr" fontAlgn="b"/>
+                      <a:r>
+                        <a:rPr lang="en-US" altLang="zh-CN" sz="1800" b="1" i="0" u="none" strike="noStrike">
+                          <a:solidFill>
+                            <a:srgbClr val="000000"/>
+                          </a:solidFill>
+                          <a:effectLst/>
+                          <a:latin typeface="Calibri" charset="0"/>
+                        </a:rPr>
+                        <a:t>1</a:t>
+                      </a:r>
+                    </a:p>
+                  </a:txBody>
+                  <a:tcPr marL="12700" marR="12700" marT="12700" marB="0" anchor="b">
+                    <a:lnL w="6350" cap="flat" cmpd="sng" algn="ctr">
+                      <a:solidFill>
+                        <a:srgbClr val="000000"/>
+                      </a:solidFill>
+                      <a:prstDash val="solid"/>
+                      <a:round/>
+                      <a:headEnd type="none" w="med" len="med"/>
+                      <a:tailEnd type="none" w="med" len="med"/>
+                    </a:lnL>
+                    <a:lnR w="6350" cap="flat" cmpd="sng" algn="ctr">
+                      <a:solidFill>
+                        <a:srgbClr val="000000"/>
+                      </a:solidFill>
+                      <a:prstDash val="solid"/>
+                      <a:round/>
+                      <a:headEnd type="none" w="med" len="med"/>
+                      <a:tailEnd type="none" w="med" len="med"/>
+                    </a:lnR>
+                    <a:lnT w="6350" cap="flat" cmpd="sng" algn="ctr">
+                      <a:solidFill>
+                        <a:srgbClr val="000000"/>
+                      </a:solidFill>
+                      <a:prstDash val="solid"/>
+                      <a:round/>
+                      <a:headEnd type="none" w="med" len="med"/>
+                      <a:tailEnd type="none" w="med" len="med"/>
+                    </a:lnT>
+                    <a:lnB w="12700" cap="flat" cmpd="sng" algn="ctr">
+                      <a:solidFill>
+                        <a:srgbClr val="000000"/>
+                      </a:solidFill>
+                      <a:prstDash val="solid"/>
+                      <a:round/>
+                      <a:headEnd type="none" w="med" len="med"/>
+                      <a:tailEnd type="none" w="med" len="med"/>
+                    </a:lnB>
+                  </a:tcPr>
+                </a:tc>
+                <a:tc>
+                  <a:txBody>
+                    <a:bodyPr/>
+                    <a:lstStyle/>
+                    <a:p>
+                      <a:pPr algn="ctr" fontAlgn="b"/>
+                      <a:r>
+                        <a:rPr lang="en-US" altLang="zh-CN" sz="1800" b="1" i="0" u="none" strike="noStrike" dirty="0">
+                          <a:solidFill>
+                            <a:srgbClr val="000000"/>
+                          </a:solidFill>
+                          <a:effectLst/>
+                          <a:latin typeface="Calibri" charset="0"/>
+                        </a:rPr>
+                        <a:t>0</a:t>
+                      </a:r>
+                    </a:p>
+                  </a:txBody>
+                  <a:tcPr marL="12700" marR="12700" marT="12700" marB="0" anchor="b">
+                    <a:lnL w="6350" cap="flat" cmpd="sng" algn="ctr">
+                      <a:solidFill>
+                        <a:srgbClr val="000000"/>
+                      </a:solidFill>
+                      <a:prstDash val="solid"/>
+                      <a:round/>
+                      <a:headEnd type="none" w="med" len="med"/>
+                      <a:tailEnd type="none" w="med" len="med"/>
+                    </a:lnL>
+                    <a:lnR w="12700" cap="flat" cmpd="sng" algn="ctr">
+                      <a:solidFill>
+                        <a:srgbClr val="000000"/>
+                      </a:solidFill>
+                      <a:prstDash val="solid"/>
+                      <a:round/>
+                      <a:headEnd type="none" w="med" len="med"/>
+                      <a:tailEnd type="none" w="med" len="med"/>
+                    </a:lnR>
+                    <a:lnT w="6350" cap="flat" cmpd="sng" algn="ctr">
+                      <a:solidFill>
+                        <a:srgbClr val="000000"/>
+                      </a:solidFill>
+                      <a:prstDash val="solid"/>
+                      <a:round/>
+                      <a:headEnd type="none" w="med" len="med"/>
+                      <a:tailEnd type="none" w="med" len="med"/>
+                    </a:lnT>
+                    <a:lnB w="12700" cap="flat" cmpd="sng" algn="ctr">
+                      <a:solidFill>
+                        <a:srgbClr val="000000"/>
+                      </a:solidFill>
+                      <a:prstDash val="solid"/>
+                      <a:round/>
+                      <a:headEnd type="none" w="med" len="med"/>
+                      <a:tailEnd type="none" w="med" len="med"/>
+                    </a:lnB>
+                  </a:tcPr>
+                </a:tc>
+              </a:tr>
+            </a:tbl>
+          </a:graphicData>
+        </a:graphic>
+      </p:graphicFrame>
+    </p:spTree>
+    <p:extLst>
+      <p:ext uri="{BB962C8B-B14F-4D97-AF65-F5344CB8AC3E}">
+        <p14:creationId xmlns:p14="http://schemas.microsoft.com/office/powerpoint/2010/main" val="418993834"/>
+      </p:ext>
+    </p:extLst>
+  </p:cSld>
+  <p:clrMapOvr>
+    <a:masterClrMapping/>
+  </p:clrMapOvr>
+</p:sld>
+</file>
+
 <file path=ppt/theme/theme1.xml><?xml version="1.0" encoding="utf-8"?>
 <a:theme xmlns:a="http://schemas.openxmlformats.org/drawingml/2006/main" name="Office Theme">
   <a:themeElements>

</xml_diff>

<commit_message>
coded memeory content representation
</commit_message>
<xml_diff>
--- a/figures.pptx
+++ b/figures.pptx
@@ -11684,13 +11684,13 @@
           <p:nvPr>
             <p:extLst>
               <p:ext uri="{D42A27DB-BD31-4B8C-83A1-F6EECF244321}">
-                <p14:modId xmlns:p14="http://schemas.microsoft.com/office/powerpoint/2010/main" val="1097828562"/>
+                <p14:modId xmlns:p14="http://schemas.microsoft.com/office/powerpoint/2010/main" val="1958684911"/>
               </p:ext>
             </p:extLst>
           </p:nvPr>
         </p:nvGraphicFramePr>
         <p:xfrm>
-          <a:off x="4832350" y="2355850"/>
+          <a:off x="381374" y="459815"/>
           <a:ext cx="2527301" cy="2146300"/>
         </p:xfrm>
         <a:graphic>
@@ -12114,7 +12114,7 @@
                     <a:p>
                       <a:pPr algn="ctr" fontAlgn="b"/>
                       <a:r>
-                        <a:rPr lang="en-US" altLang="zh-CN" sz="1800" b="1" i="0" u="none" strike="noStrike">
+                        <a:rPr lang="en-US" altLang="zh-CN" sz="1800" b="1" i="0" u="none" strike="noStrike" dirty="0">
                           <a:solidFill>
                             <a:srgbClr val="000000"/>
                           </a:solidFill>
@@ -12515,7 +12515,7 @@
                     <a:p>
                       <a:pPr algn="ctr" fontAlgn="b"/>
                       <a:r>
-                        <a:rPr lang="en-US" altLang="zh-CN" sz="1800" b="1" i="0" u="none" strike="noStrike">
+                        <a:rPr lang="en-US" altLang="zh-CN" sz="1800" b="1" i="0" u="none" strike="noStrike" dirty="0">
                           <a:solidFill>
                             <a:srgbClr val="000000"/>
                           </a:solidFill>
@@ -14117,6 +14117,3218 @@
           </a:graphicData>
         </a:graphic>
       </p:graphicFrame>
+      <p:graphicFrame>
+        <p:nvGraphicFramePr>
+          <p:cNvPr id="5" name="Table 4"/>
+          <p:cNvGraphicFramePr>
+            <a:graphicFrameLocks noGrp="1"/>
+          </p:cNvGraphicFramePr>
+          <p:nvPr>
+            <p:extLst>
+              <p:ext uri="{D42A27DB-BD31-4B8C-83A1-F6EECF244321}">
+                <p14:modId xmlns:p14="http://schemas.microsoft.com/office/powerpoint/2010/main" val="2074955335"/>
+              </p:ext>
+            </p:extLst>
+          </p:nvPr>
+        </p:nvGraphicFramePr>
+        <p:xfrm>
+          <a:off x="4268321" y="657038"/>
+          <a:ext cx="1638301" cy="1536700"/>
+        </p:xfrm>
+        <a:graphic>
+          <a:graphicData uri="http://schemas.openxmlformats.org/drawingml/2006/table">
+            <a:tbl>
+              <a:tblPr/>
+              <a:tblGrid>
+                <a:gridCol w="344905"/>
+                <a:gridCol w="431132"/>
+                <a:gridCol w="431132"/>
+                <a:gridCol w="431132"/>
+              </a:tblGrid>
+              <a:tr h="304800">
+                <a:tc>
+                  <a:txBody>
+                    <a:bodyPr/>
+                    <a:lstStyle/>
+                    <a:p>
+                      <a:pPr algn="ctr" fontAlgn="b"/>
+                      <a:r>
+                        <a:rPr lang="sk-SK" sz="1800" b="1" i="0" u="none" strike="noStrike">
+                          <a:solidFill>
+                            <a:srgbClr val="000000"/>
+                          </a:solidFill>
+                          <a:effectLst/>
+                          <a:latin typeface="Calibri" charset="0"/>
+                        </a:rPr>
+                        <a:t> </a:t>
+                      </a:r>
+                    </a:p>
+                  </a:txBody>
+                  <a:tcPr marL="12700" marR="12700" marT="12700" marB="0" anchor="b">
+                    <a:lnL w="12700" cap="flat" cmpd="sng" algn="ctr">
+                      <a:solidFill>
+                        <a:srgbClr val="000000"/>
+                      </a:solidFill>
+                      <a:prstDash val="solid"/>
+                      <a:round/>
+                      <a:headEnd type="none" w="med" len="med"/>
+                      <a:tailEnd type="none" w="med" len="med"/>
+                    </a:lnL>
+                    <a:lnR w="6350" cap="flat" cmpd="sng" algn="ctr">
+                      <a:solidFill>
+                        <a:srgbClr val="000000"/>
+                      </a:solidFill>
+                      <a:prstDash val="solid"/>
+                      <a:round/>
+                      <a:headEnd type="none" w="med" len="med"/>
+                      <a:tailEnd type="none" w="med" len="med"/>
+                    </a:lnR>
+                    <a:lnT w="12700" cap="flat" cmpd="sng" algn="ctr">
+                      <a:solidFill>
+                        <a:srgbClr val="000000"/>
+                      </a:solidFill>
+                      <a:prstDash val="solid"/>
+                      <a:round/>
+                      <a:headEnd type="none" w="med" len="med"/>
+                      <a:tailEnd type="none" w="med" len="med"/>
+                    </a:lnT>
+                    <a:lnB w="6350" cap="flat" cmpd="sng" algn="ctr">
+                      <a:solidFill>
+                        <a:srgbClr val="000000"/>
+                      </a:solidFill>
+                      <a:prstDash val="solid"/>
+                      <a:round/>
+                      <a:headEnd type="none" w="med" len="med"/>
+                      <a:tailEnd type="none" w="med" len="med"/>
+                    </a:lnB>
+                  </a:tcPr>
+                </a:tc>
+                <a:tc>
+                  <a:txBody>
+                    <a:bodyPr/>
+                    <a:lstStyle/>
+                    <a:p>
+                      <a:pPr algn="ctr" fontAlgn="b"/>
+                      <a:r>
+                        <a:rPr lang="en-US" sz="1800" b="1" i="0" u="none" strike="noStrike">
+                          <a:solidFill>
+                            <a:srgbClr val="000000"/>
+                          </a:solidFill>
+                          <a:effectLst/>
+                          <a:latin typeface="Calibri" charset="0"/>
+                        </a:rPr>
+                        <a:t>W1</a:t>
+                      </a:r>
+                    </a:p>
+                  </a:txBody>
+                  <a:tcPr marL="12700" marR="12700" marT="12700" marB="0" anchor="b">
+                    <a:lnL w="6350" cap="flat" cmpd="sng" algn="ctr">
+                      <a:solidFill>
+                        <a:srgbClr val="000000"/>
+                      </a:solidFill>
+                      <a:prstDash val="solid"/>
+                      <a:round/>
+                      <a:headEnd type="none" w="med" len="med"/>
+                      <a:tailEnd type="none" w="med" len="med"/>
+                    </a:lnL>
+                    <a:lnR w="6350" cap="flat" cmpd="sng" algn="ctr">
+                      <a:solidFill>
+                        <a:srgbClr val="000000"/>
+                      </a:solidFill>
+                      <a:prstDash val="solid"/>
+                      <a:round/>
+                      <a:headEnd type="none" w="med" len="med"/>
+                      <a:tailEnd type="none" w="med" len="med"/>
+                    </a:lnR>
+                    <a:lnT w="12700" cap="flat" cmpd="sng" algn="ctr">
+                      <a:solidFill>
+                        <a:srgbClr val="000000"/>
+                      </a:solidFill>
+                      <a:prstDash val="solid"/>
+                      <a:round/>
+                      <a:headEnd type="none" w="med" len="med"/>
+                      <a:tailEnd type="none" w="med" len="med"/>
+                    </a:lnT>
+                    <a:lnB w="6350" cap="flat" cmpd="sng" algn="ctr">
+                      <a:solidFill>
+                        <a:srgbClr val="000000"/>
+                      </a:solidFill>
+                      <a:prstDash val="solid"/>
+                      <a:round/>
+                      <a:headEnd type="none" w="med" len="med"/>
+                      <a:tailEnd type="none" w="med" len="med"/>
+                    </a:lnB>
+                  </a:tcPr>
+                </a:tc>
+                <a:tc>
+                  <a:txBody>
+                    <a:bodyPr/>
+                    <a:lstStyle/>
+                    <a:p>
+                      <a:pPr algn="ctr" fontAlgn="b"/>
+                      <a:r>
+                        <a:rPr lang="en-US" sz="1800" b="1" i="0" u="none" strike="noStrike">
+                          <a:solidFill>
+                            <a:srgbClr val="000000"/>
+                          </a:solidFill>
+                          <a:effectLst/>
+                          <a:latin typeface="Calibri" charset="0"/>
+                        </a:rPr>
+                        <a:t>W2</a:t>
+                      </a:r>
+                    </a:p>
+                  </a:txBody>
+                  <a:tcPr marL="12700" marR="12700" marT="12700" marB="0" anchor="b">
+                    <a:lnL w="6350" cap="flat" cmpd="sng" algn="ctr">
+                      <a:solidFill>
+                        <a:srgbClr val="000000"/>
+                      </a:solidFill>
+                      <a:prstDash val="solid"/>
+                      <a:round/>
+                      <a:headEnd type="none" w="med" len="med"/>
+                      <a:tailEnd type="none" w="med" len="med"/>
+                    </a:lnL>
+                    <a:lnR w="6350" cap="flat" cmpd="sng" algn="ctr">
+                      <a:solidFill>
+                        <a:srgbClr val="000000"/>
+                      </a:solidFill>
+                      <a:prstDash val="solid"/>
+                      <a:round/>
+                      <a:headEnd type="none" w="med" len="med"/>
+                      <a:tailEnd type="none" w="med" len="med"/>
+                    </a:lnR>
+                    <a:lnT w="12700" cap="flat" cmpd="sng" algn="ctr">
+                      <a:solidFill>
+                        <a:srgbClr val="000000"/>
+                      </a:solidFill>
+                      <a:prstDash val="solid"/>
+                      <a:round/>
+                      <a:headEnd type="none" w="med" len="med"/>
+                      <a:tailEnd type="none" w="med" len="med"/>
+                    </a:lnT>
+                    <a:lnB w="6350" cap="flat" cmpd="sng" algn="ctr">
+                      <a:solidFill>
+                        <a:srgbClr val="000000"/>
+                      </a:solidFill>
+                      <a:prstDash val="solid"/>
+                      <a:round/>
+                      <a:headEnd type="none" w="med" len="med"/>
+                      <a:tailEnd type="none" w="med" len="med"/>
+                    </a:lnB>
+                  </a:tcPr>
+                </a:tc>
+                <a:tc>
+                  <a:txBody>
+                    <a:bodyPr/>
+                    <a:lstStyle/>
+                    <a:p>
+                      <a:pPr algn="ctr" fontAlgn="b"/>
+                      <a:r>
+                        <a:rPr lang="en-US" sz="1800" b="1" i="0" u="none" strike="noStrike">
+                          <a:solidFill>
+                            <a:srgbClr val="000000"/>
+                          </a:solidFill>
+                          <a:effectLst/>
+                          <a:latin typeface="Calibri" charset="0"/>
+                        </a:rPr>
+                        <a:t>W3</a:t>
+                      </a:r>
+                    </a:p>
+                  </a:txBody>
+                  <a:tcPr marL="12700" marR="12700" marT="12700" marB="0" anchor="b">
+                    <a:lnL w="6350" cap="flat" cmpd="sng" algn="ctr">
+                      <a:solidFill>
+                        <a:srgbClr val="000000"/>
+                      </a:solidFill>
+                      <a:prstDash val="solid"/>
+                      <a:round/>
+                      <a:headEnd type="none" w="med" len="med"/>
+                      <a:tailEnd type="none" w="med" len="med"/>
+                    </a:lnL>
+                    <a:lnR w="12700" cap="flat" cmpd="sng" algn="ctr">
+                      <a:solidFill>
+                        <a:srgbClr val="000000"/>
+                      </a:solidFill>
+                      <a:prstDash val="solid"/>
+                      <a:round/>
+                      <a:headEnd type="none" w="med" len="med"/>
+                      <a:tailEnd type="none" w="med" len="med"/>
+                    </a:lnR>
+                    <a:lnT w="12700" cap="flat" cmpd="sng" algn="ctr">
+                      <a:solidFill>
+                        <a:srgbClr val="000000"/>
+                      </a:solidFill>
+                      <a:prstDash val="solid"/>
+                      <a:round/>
+                      <a:headEnd type="none" w="med" len="med"/>
+                      <a:tailEnd type="none" w="med" len="med"/>
+                    </a:lnT>
+                    <a:lnB w="6350" cap="flat" cmpd="sng" algn="ctr">
+                      <a:solidFill>
+                        <a:srgbClr val="000000"/>
+                      </a:solidFill>
+                      <a:prstDash val="solid"/>
+                      <a:round/>
+                      <a:headEnd type="none" w="med" len="med"/>
+                      <a:tailEnd type="none" w="med" len="med"/>
+                    </a:lnB>
+                  </a:tcPr>
+                </a:tc>
+              </a:tr>
+              <a:tr h="304800">
+                <a:tc>
+                  <a:txBody>
+                    <a:bodyPr/>
+                    <a:lstStyle/>
+                    <a:p>
+                      <a:pPr algn="ctr" fontAlgn="b"/>
+                      <a:r>
+                        <a:rPr lang="en-US" altLang="zh-CN" sz="1800" b="1" i="0" u="none" strike="noStrike">
+                          <a:solidFill>
+                            <a:srgbClr val="000000"/>
+                          </a:solidFill>
+                          <a:effectLst/>
+                          <a:latin typeface="Calibri" charset="0"/>
+                        </a:rPr>
+                        <a:t>u1</a:t>
+                      </a:r>
+                    </a:p>
+                  </a:txBody>
+                  <a:tcPr marL="12700" marR="12700" marT="12700" marB="0" anchor="b">
+                    <a:lnL w="12700" cap="flat" cmpd="sng" algn="ctr">
+                      <a:solidFill>
+                        <a:srgbClr val="000000"/>
+                      </a:solidFill>
+                      <a:prstDash val="solid"/>
+                      <a:round/>
+                      <a:headEnd type="none" w="med" len="med"/>
+                      <a:tailEnd type="none" w="med" len="med"/>
+                    </a:lnL>
+                    <a:lnR w="6350" cap="flat" cmpd="sng" algn="ctr">
+                      <a:solidFill>
+                        <a:srgbClr val="000000"/>
+                      </a:solidFill>
+                      <a:prstDash val="solid"/>
+                      <a:round/>
+                      <a:headEnd type="none" w="med" len="med"/>
+                      <a:tailEnd type="none" w="med" len="med"/>
+                    </a:lnR>
+                    <a:lnT w="6350" cap="flat" cmpd="sng" algn="ctr">
+                      <a:solidFill>
+                        <a:srgbClr val="000000"/>
+                      </a:solidFill>
+                      <a:prstDash val="solid"/>
+                      <a:round/>
+                      <a:headEnd type="none" w="med" len="med"/>
+                      <a:tailEnd type="none" w="med" len="med"/>
+                    </a:lnT>
+                    <a:lnB w="6350" cap="flat" cmpd="sng" algn="ctr">
+                      <a:solidFill>
+                        <a:srgbClr val="000000"/>
+                      </a:solidFill>
+                      <a:prstDash val="solid"/>
+                      <a:round/>
+                      <a:headEnd type="none" w="med" len="med"/>
+                      <a:tailEnd type="none" w="med" len="med"/>
+                    </a:lnB>
+                  </a:tcPr>
+                </a:tc>
+                <a:tc>
+                  <a:txBody>
+                    <a:bodyPr/>
+                    <a:lstStyle/>
+                    <a:p>
+                      <a:pPr algn="ctr" fontAlgn="b"/>
+                      <a:r>
+                        <a:rPr lang="en-US" altLang="zh-CN" sz="1800" b="1" i="0" u="none" strike="noStrike">
+                          <a:solidFill>
+                            <a:srgbClr val="000000"/>
+                          </a:solidFill>
+                          <a:effectLst/>
+                          <a:latin typeface="Calibri" charset="0"/>
+                        </a:rPr>
+                        <a:t>0</a:t>
+                      </a:r>
+                    </a:p>
+                  </a:txBody>
+                  <a:tcPr marL="12700" marR="12700" marT="12700" marB="0" anchor="b">
+                    <a:lnL w="6350" cap="flat" cmpd="sng" algn="ctr">
+                      <a:solidFill>
+                        <a:srgbClr val="000000"/>
+                      </a:solidFill>
+                      <a:prstDash val="solid"/>
+                      <a:round/>
+                      <a:headEnd type="none" w="med" len="med"/>
+                      <a:tailEnd type="none" w="med" len="med"/>
+                    </a:lnL>
+                    <a:lnR w="6350" cap="flat" cmpd="sng" algn="ctr">
+                      <a:solidFill>
+                        <a:srgbClr val="000000"/>
+                      </a:solidFill>
+                      <a:prstDash val="solid"/>
+                      <a:round/>
+                      <a:headEnd type="none" w="med" len="med"/>
+                      <a:tailEnd type="none" w="med" len="med"/>
+                    </a:lnR>
+                    <a:lnT w="6350" cap="flat" cmpd="sng" algn="ctr">
+                      <a:solidFill>
+                        <a:srgbClr val="000000"/>
+                      </a:solidFill>
+                      <a:prstDash val="solid"/>
+                      <a:round/>
+                      <a:headEnd type="none" w="med" len="med"/>
+                      <a:tailEnd type="none" w="med" len="med"/>
+                    </a:lnT>
+                    <a:lnB w="6350" cap="flat" cmpd="sng" algn="ctr">
+                      <a:solidFill>
+                        <a:srgbClr val="000000"/>
+                      </a:solidFill>
+                      <a:prstDash val="solid"/>
+                      <a:round/>
+                      <a:headEnd type="none" w="med" len="med"/>
+                      <a:tailEnd type="none" w="med" len="med"/>
+                    </a:lnB>
+                  </a:tcPr>
+                </a:tc>
+                <a:tc>
+                  <a:txBody>
+                    <a:bodyPr/>
+                    <a:lstStyle/>
+                    <a:p>
+                      <a:pPr algn="ctr" fontAlgn="b"/>
+                      <a:r>
+                        <a:rPr lang="en-US" altLang="zh-CN" sz="1800" b="1" i="0" u="none" strike="noStrike">
+                          <a:solidFill>
+                            <a:srgbClr val="000000"/>
+                          </a:solidFill>
+                          <a:effectLst/>
+                          <a:latin typeface="Calibri" charset="0"/>
+                        </a:rPr>
+                        <a:t>1</a:t>
+                      </a:r>
+                    </a:p>
+                  </a:txBody>
+                  <a:tcPr marL="12700" marR="12700" marT="12700" marB="0" anchor="b">
+                    <a:lnL w="6350" cap="flat" cmpd="sng" algn="ctr">
+                      <a:solidFill>
+                        <a:srgbClr val="000000"/>
+                      </a:solidFill>
+                      <a:prstDash val="solid"/>
+                      <a:round/>
+                      <a:headEnd type="none" w="med" len="med"/>
+                      <a:tailEnd type="none" w="med" len="med"/>
+                    </a:lnL>
+                    <a:lnR w="6350" cap="flat" cmpd="sng" algn="ctr">
+                      <a:solidFill>
+                        <a:srgbClr val="000000"/>
+                      </a:solidFill>
+                      <a:prstDash val="solid"/>
+                      <a:round/>
+                      <a:headEnd type="none" w="med" len="med"/>
+                      <a:tailEnd type="none" w="med" len="med"/>
+                    </a:lnR>
+                    <a:lnT w="6350" cap="flat" cmpd="sng" algn="ctr">
+                      <a:solidFill>
+                        <a:srgbClr val="000000"/>
+                      </a:solidFill>
+                      <a:prstDash val="solid"/>
+                      <a:round/>
+                      <a:headEnd type="none" w="med" len="med"/>
+                      <a:tailEnd type="none" w="med" len="med"/>
+                    </a:lnT>
+                    <a:lnB w="6350" cap="flat" cmpd="sng" algn="ctr">
+                      <a:solidFill>
+                        <a:srgbClr val="000000"/>
+                      </a:solidFill>
+                      <a:prstDash val="solid"/>
+                      <a:round/>
+                      <a:headEnd type="none" w="med" len="med"/>
+                      <a:tailEnd type="none" w="med" len="med"/>
+                    </a:lnB>
+                  </a:tcPr>
+                </a:tc>
+                <a:tc>
+                  <a:txBody>
+                    <a:bodyPr/>
+                    <a:lstStyle/>
+                    <a:p>
+                      <a:pPr algn="ctr" fontAlgn="b"/>
+                      <a:r>
+                        <a:rPr lang="en-US" altLang="zh-CN" sz="1800" b="1" i="0" u="none" strike="noStrike">
+                          <a:solidFill>
+                            <a:srgbClr val="000000"/>
+                          </a:solidFill>
+                          <a:effectLst/>
+                          <a:latin typeface="Calibri" charset="0"/>
+                        </a:rPr>
+                        <a:t>1</a:t>
+                      </a:r>
+                    </a:p>
+                  </a:txBody>
+                  <a:tcPr marL="12700" marR="12700" marT="12700" marB="0" anchor="b">
+                    <a:lnL w="6350" cap="flat" cmpd="sng" algn="ctr">
+                      <a:solidFill>
+                        <a:srgbClr val="000000"/>
+                      </a:solidFill>
+                      <a:prstDash val="solid"/>
+                      <a:round/>
+                      <a:headEnd type="none" w="med" len="med"/>
+                      <a:tailEnd type="none" w="med" len="med"/>
+                    </a:lnL>
+                    <a:lnR w="12700" cap="flat" cmpd="sng" algn="ctr">
+                      <a:solidFill>
+                        <a:srgbClr val="000000"/>
+                      </a:solidFill>
+                      <a:prstDash val="solid"/>
+                      <a:round/>
+                      <a:headEnd type="none" w="med" len="med"/>
+                      <a:tailEnd type="none" w="med" len="med"/>
+                    </a:lnR>
+                    <a:lnT w="6350" cap="flat" cmpd="sng" algn="ctr">
+                      <a:solidFill>
+                        <a:srgbClr val="000000"/>
+                      </a:solidFill>
+                      <a:prstDash val="solid"/>
+                      <a:round/>
+                      <a:headEnd type="none" w="med" len="med"/>
+                      <a:tailEnd type="none" w="med" len="med"/>
+                    </a:lnT>
+                    <a:lnB w="6350" cap="flat" cmpd="sng" algn="ctr">
+                      <a:solidFill>
+                        <a:srgbClr val="000000"/>
+                      </a:solidFill>
+                      <a:prstDash val="solid"/>
+                      <a:round/>
+                      <a:headEnd type="none" w="med" len="med"/>
+                      <a:tailEnd type="none" w="med" len="med"/>
+                    </a:lnB>
+                  </a:tcPr>
+                </a:tc>
+              </a:tr>
+              <a:tr h="304800">
+                <a:tc>
+                  <a:txBody>
+                    <a:bodyPr/>
+                    <a:lstStyle/>
+                    <a:p>
+                      <a:pPr algn="ctr" fontAlgn="b"/>
+                      <a:r>
+                        <a:rPr lang="is-IS" sz="1800" b="1" i="0" u="none" strike="noStrike">
+                          <a:solidFill>
+                            <a:srgbClr val="000000"/>
+                          </a:solidFill>
+                          <a:effectLst/>
+                          <a:latin typeface="Calibri" charset="0"/>
+                        </a:rPr>
+                        <a:t>u2</a:t>
+                      </a:r>
+                    </a:p>
+                  </a:txBody>
+                  <a:tcPr marL="12700" marR="12700" marT="12700" marB="0" anchor="b">
+                    <a:lnL w="12700" cap="flat" cmpd="sng" algn="ctr">
+                      <a:solidFill>
+                        <a:srgbClr val="000000"/>
+                      </a:solidFill>
+                      <a:prstDash val="solid"/>
+                      <a:round/>
+                      <a:headEnd type="none" w="med" len="med"/>
+                      <a:tailEnd type="none" w="med" len="med"/>
+                    </a:lnL>
+                    <a:lnR w="6350" cap="flat" cmpd="sng" algn="ctr">
+                      <a:solidFill>
+                        <a:srgbClr val="000000"/>
+                      </a:solidFill>
+                      <a:prstDash val="solid"/>
+                      <a:round/>
+                      <a:headEnd type="none" w="med" len="med"/>
+                      <a:tailEnd type="none" w="med" len="med"/>
+                    </a:lnR>
+                    <a:lnT w="6350" cap="flat" cmpd="sng" algn="ctr">
+                      <a:solidFill>
+                        <a:srgbClr val="000000"/>
+                      </a:solidFill>
+                      <a:prstDash val="solid"/>
+                      <a:round/>
+                      <a:headEnd type="none" w="med" len="med"/>
+                      <a:tailEnd type="none" w="med" len="med"/>
+                    </a:lnT>
+                    <a:lnB w="6350" cap="flat" cmpd="sng" algn="ctr">
+                      <a:solidFill>
+                        <a:srgbClr val="000000"/>
+                      </a:solidFill>
+                      <a:prstDash val="solid"/>
+                      <a:round/>
+                      <a:headEnd type="none" w="med" len="med"/>
+                      <a:tailEnd type="none" w="med" len="med"/>
+                    </a:lnB>
+                  </a:tcPr>
+                </a:tc>
+                <a:tc>
+                  <a:txBody>
+                    <a:bodyPr/>
+                    <a:lstStyle/>
+                    <a:p>
+                      <a:pPr algn="ctr" fontAlgn="b"/>
+                      <a:r>
+                        <a:rPr lang="en-US" altLang="zh-CN" sz="1800" b="1" i="0" u="none" strike="noStrike">
+                          <a:solidFill>
+                            <a:srgbClr val="000000"/>
+                          </a:solidFill>
+                          <a:effectLst/>
+                          <a:latin typeface="Calibri" charset="0"/>
+                        </a:rPr>
+                        <a:t>1</a:t>
+                      </a:r>
+                    </a:p>
+                  </a:txBody>
+                  <a:tcPr marL="12700" marR="12700" marT="12700" marB="0" anchor="b">
+                    <a:lnL w="6350" cap="flat" cmpd="sng" algn="ctr">
+                      <a:solidFill>
+                        <a:srgbClr val="000000"/>
+                      </a:solidFill>
+                      <a:prstDash val="solid"/>
+                      <a:round/>
+                      <a:headEnd type="none" w="med" len="med"/>
+                      <a:tailEnd type="none" w="med" len="med"/>
+                    </a:lnL>
+                    <a:lnR w="6350" cap="flat" cmpd="sng" algn="ctr">
+                      <a:solidFill>
+                        <a:srgbClr val="000000"/>
+                      </a:solidFill>
+                      <a:prstDash val="solid"/>
+                      <a:round/>
+                      <a:headEnd type="none" w="med" len="med"/>
+                      <a:tailEnd type="none" w="med" len="med"/>
+                    </a:lnR>
+                    <a:lnT w="6350" cap="flat" cmpd="sng" algn="ctr">
+                      <a:solidFill>
+                        <a:srgbClr val="000000"/>
+                      </a:solidFill>
+                      <a:prstDash val="solid"/>
+                      <a:round/>
+                      <a:headEnd type="none" w="med" len="med"/>
+                      <a:tailEnd type="none" w="med" len="med"/>
+                    </a:lnT>
+                    <a:lnB w="6350" cap="flat" cmpd="sng" algn="ctr">
+                      <a:solidFill>
+                        <a:srgbClr val="000000"/>
+                      </a:solidFill>
+                      <a:prstDash val="solid"/>
+                      <a:round/>
+                      <a:headEnd type="none" w="med" len="med"/>
+                      <a:tailEnd type="none" w="med" len="med"/>
+                    </a:lnB>
+                  </a:tcPr>
+                </a:tc>
+                <a:tc>
+                  <a:txBody>
+                    <a:bodyPr/>
+                    <a:lstStyle/>
+                    <a:p>
+                      <a:pPr algn="ctr" fontAlgn="b"/>
+                      <a:r>
+                        <a:rPr lang="en-US" altLang="zh-CN" sz="1800" b="1" i="0" u="none" strike="noStrike">
+                          <a:solidFill>
+                            <a:srgbClr val="000000"/>
+                          </a:solidFill>
+                          <a:effectLst/>
+                          <a:latin typeface="Calibri" charset="0"/>
+                        </a:rPr>
+                        <a:t>0</a:t>
+                      </a:r>
+                    </a:p>
+                  </a:txBody>
+                  <a:tcPr marL="12700" marR="12700" marT="12700" marB="0" anchor="b">
+                    <a:lnL w="6350" cap="flat" cmpd="sng" algn="ctr">
+                      <a:solidFill>
+                        <a:srgbClr val="000000"/>
+                      </a:solidFill>
+                      <a:prstDash val="solid"/>
+                      <a:round/>
+                      <a:headEnd type="none" w="med" len="med"/>
+                      <a:tailEnd type="none" w="med" len="med"/>
+                    </a:lnL>
+                    <a:lnR w="6350" cap="flat" cmpd="sng" algn="ctr">
+                      <a:solidFill>
+                        <a:srgbClr val="000000"/>
+                      </a:solidFill>
+                      <a:prstDash val="solid"/>
+                      <a:round/>
+                      <a:headEnd type="none" w="med" len="med"/>
+                      <a:tailEnd type="none" w="med" len="med"/>
+                    </a:lnR>
+                    <a:lnT w="6350" cap="flat" cmpd="sng" algn="ctr">
+                      <a:solidFill>
+                        <a:srgbClr val="000000"/>
+                      </a:solidFill>
+                      <a:prstDash val="solid"/>
+                      <a:round/>
+                      <a:headEnd type="none" w="med" len="med"/>
+                      <a:tailEnd type="none" w="med" len="med"/>
+                    </a:lnT>
+                    <a:lnB w="6350" cap="flat" cmpd="sng" algn="ctr">
+                      <a:solidFill>
+                        <a:srgbClr val="000000"/>
+                      </a:solidFill>
+                      <a:prstDash val="solid"/>
+                      <a:round/>
+                      <a:headEnd type="none" w="med" len="med"/>
+                      <a:tailEnd type="none" w="med" len="med"/>
+                    </a:lnB>
+                  </a:tcPr>
+                </a:tc>
+                <a:tc>
+                  <a:txBody>
+                    <a:bodyPr/>
+                    <a:lstStyle/>
+                    <a:p>
+                      <a:pPr algn="ctr" fontAlgn="b"/>
+                      <a:r>
+                        <a:rPr lang="en-US" altLang="zh-CN" sz="1800" b="1" i="0" u="none" strike="noStrike">
+                          <a:solidFill>
+                            <a:srgbClr val="000000"/>
+                          </a:solidFill>
+                          <a:effectLst/>
+                          <a:latin typeface="Calibri" charset="0"/>
+                        </a:rPr>
+                        <a:t>1</a:t>
+                      </a:r>
+                    </a:p>
+                  </a:txBody>
+                  <a:tcPr marL="12700" marR="12700" marT="12700" marB="0" anchor="b">
+                    <a:lnL w="6350" cap="flat" cmpd="sng" algn="ctr">
+                      <a:solidFill>
+                        <a:srgbClr val="000000"/>
+                      </a:solidFill>
+                      <a:prstDash val="solid"/>
+                      <a:round/>
+                      <a:headEnd type="none" w="med" len="med"/>
+                      <a:tailEnd type="none" w="med" len="med"/>
+                    </a:lnL>
+                    <a:lnR w="12700" cap="flat" cmpd="sng" algn="ctr">
+                      <a:solidFill>
+                        <a:srgbClr val="000000"/>
+                      </a:solidFill>
+                      <a:prstDash val="solid"/>
+                      <a:round/>
+                      <a:headEnd type="none" w="med" len="med"/>
+                      <a:tailEnd type="none" w="med" len="med"/>
+                    </a:lnR>
+                    <a:lnT w="6350" cap="flat" cmpd="sng" algn="ctr">
+                      <a:solidFill>
+                        <a:srgbClr val="000000"/>
+                      </a:solidFill>
+                      <a:prstDash val="solid"/>
+                      <a:round/>
+                      <a:headEnd type="none" w="med" len="med"/>
+                      <a:tailEnd type="none" w="med" len="med"/>
+                    </a:lnT>
+                    <a:lnB w="6350" cap="flat" cmpd="sng" algn="ctr">
+                      <a:solidFill>
+                        <a:srgbClr val="000000"/>
+                      </a:solidFill>
+                      <a:prstDash val="solid"/>
+                      <a:round/>
+                      <a:headEnd type="none" w="med" len="med"/>
+                      <a:tailEnd type="none" w="med" len="med"/>
+                    </a:lnB>
+                  </a:tcPr>
+                </a:tc>
+              </a:tr>
+              <a:tr h="304800">
+                <a:tc>
+                  <a:txBody>
+                    <a:bodyPr/>
+                    <a:lstStyle/>
+                    <a:p>
+                      <a:pPr algn="ctr" fontAlgn="b"/>
+                      <a:r>
+                        <a:rPr lang="en-US" altLang="zh-CN" sz="1800" b="1" i="0" u="none" strike="noStrike">
+                          <a:solidFill>
+                            <a:srgbClr val="000000"/>
+                          </a:solidFill>
+                          <a:effectLst/>
+                          <a:latin typeface="Calibri" charset="0"/>
+                        </a:rPr>
+                        <a:t>u3</a:t>
+                      </a:r>
+                    </a:p>
+                  </a:txBody>
+                  <a:tcPr marL="12700" marR="12700" marT="12700" marB="0" anchor="b">
+                    <a:lnL w="12700" cap="flat" cmpd="sng" algn="ctr">
+                      <a:solidFill>
+                        <a:srgbClr val="000000"/>
+                      </a:solidFill>
+                      <a:prstDash val="solid"/>
+                      <a:round/>
+                      <a:headEnd type="none" w="med" len="med"/>
+                      <a:tailEnd type="none" w="med" len="med"/>
+                    </a:lnL>
+                    <a:lnR w="6350" cap="flat" cmpd="sng" algn="ctr">
+                      <a:solidFill>
+                        <a:srgbClr val="000000"/>
+                      </a:solidFill>
+                      <a:prstDash val="solid"/>
+                      <a:round/>
+                      <a:headEnd type="none" w="med" len="med"/>
+                      <a:tailEnd type="none" w="med" len="med"/>
+                    </a:lnR>
+                    <a:lnT w="6350" cap="flat" cmpd="sng" algn="ctr">
+                      <a:solidFill>
+                        <a:srgbClr val="000000"/>
+                      </a:solidFill>
+                      <a:prstDash val="solid"/>
+                      <a:round/>
+                      <a:headEnd type="none" w="med" len="med"/>
+                      <a:tailEnd type="none" w="med" len="med"/>
+                    </a:lnT>
+                    <a:lnB w="6350" cap="flat" cmpd="sng" algn="ctr">
+                      <a:solidFill>
+                        <a:srgbClr val="000000"/>
+                      </a:solidFill>
+                      <a:prstDash val="solid"/>
+                      <a:round/>
+                      <a:headEnd type="none" w="med" len="med"/>
+                      <a:tailEnd type="none" w="med" len="med"/>
+                    </a:lnB>
+                  </a:tcPr>
+                </a:tc>
+                <a:tc>
+                  <a:txBody>
+                    <a:bodyPr/>
+                    <a:lstStyle/>
+                    <a:p>
+                      <a:pPr algn="ctr" fontAlgn="b"/>
+                      <a:r>
+                        <a:rPr lang="en-US" altLang="zh-CN" sz="1800" b="1" i="0" u="none" strike="noStrike">
+                          <a:solidFill>
+                            <a:srgbClr val="000000"/>
+                          </a:solidFill>
+                          <a:effectLst/>
+                          <a:latin typeface="Calibri" charset="0"/>
+                        </a:rPr>
+                        <a:t>1</a:t>
+                      </a:r>
+                    </a:p>
+                  </a:txBody>
+                  <a:tcPr marL="12700" marR="12700" marT="12700" marB="0" anchor="b">
+                    <a:lnL w="6350" cap="flat" cmpd="sng" algn="ctr">
+                      <a:solidFill>
+                        <a:srgbClr val="000000"/>
+                      </a:solidFill>
+                      <a:prstDash val="solid"/>
+                      <a:round/>
+                      <a:headEnd type="none" w="med" len="med"/>
+                      <a:tailEnd type="none" w="med" len="med"/>
+                    </a:lnL>
+                    <a:lnR w="6350" cap="flat" cmpd="sng" algn="ctr">
+                      <a:solidFill>
+                        <a:srgbClr val="000000"/>
+                      </a:solidFill>
+                      <a:prstDash val="solid"/>
+                      <a:round/>
+                      <a:headEnd type="none" w="med" len="med"/>
+                      <a:tailEnd type="none" w="med" len="med"/>
+                    </a:lnR>
+                    <a:lnT w="6350" cap="flat" cmpd="sng" algn="ctr">
+                      <a:solidFill>
+                        <a:srgbClr val="000000"/>
+                      </a:solidFill>
+                      <a:prstDash val="solid"/>
+                      <a:round/>
+                      <a:headEnd type="none" w="med" len="med"/>
+                      <a:tailEnd type="none" w="med" len="med"/>
+                    </a:lnT>
+                    <a:lnB w="6350" cap="flat" cmpd="sng" algn="ctr">
+                      <a:solidFill>
+                        <a:srgbClr val="000000"/>
+                      </a:solidFill>
+                      <a:prstDash val="solid"/>
+                      <a:round/>
+                      <a:headEnd type="none" w="med" len="med"/>
+                      <a:tailEnd type="none" w="med" len="med"/>
+                    </a:lnB>
+                  </a:tcPr>
+                </a:tc>
+                <a:tc>
+                  <a:txBody>
+                    <a:bodyPr/>
+                    <a:lstStyle/>
+                    <a:p>
+                      <a:pPr algn="ctr" fontAlgn="b"/>
+                      <a:r>
+                        <a:rPr lang="en-US" altLang="zh-CN" sz="1800" b="1" i="0" u="none" strike="noStrike">
+                          <a:solidFill>
+                            <a:srgbClr val="000000"/>
+                          </a:solidFill>
+                          <a:effectLst/>
+                          <a:latin typeface="Calibri" charset="0"/>
+                        </a:rPr>
+                        <a:t>1</a:t>
+                      </a:r>
+                    </a:p>
+                  </a:txBody>
+                  <a:tcPr marL="12700" marR="12700" marT="12700" marB="0" anchor="b">
+                    <a:lnL w="6350" cap="flat" cmpd="sng" algn="ctr">
+                      <a:solidFill>
+                        <a:srgbClr val="000000"/>
+                      </a:solidFill>
+                      <a:prstDash val="solid"/>
+                      <a:round/>
+                      <a:headEnd type="none" w="med" len="med"/>
+                      <a:tailEnd type="none" w="med" len="med"/>
+                    </a:lnL>
+                    <a:lnR w="6350" cap="flat" cmpd="sng" algn="ctr">
+                      <a:solidFill>
+                        <a:srgbClr val="000000"/>
+                      </a:solidFill>
+                      <a:prstDash val="solid"/>
+                      <a:round/>
+                      <a:headEnd type="none" w="med" len="med"/>
+                      <a:tailEnd type="none" w="med" len="med"/>
+                    </a:lnR>
+                    <a:lnT w="6350" cap="flat" cmpd="sng" algn="ctr">
+                      <a:solidFill>
+                        <a:srgbClr val="000000"/>
+                      </a:solidFill>
+                      <a:prstDash val="solid"/>
+                      <a:round/>
+                      <a:headEnd type="none" w="med" len="med"/>
+                      <a:tailEnd type="none" w="med" len="med"/>
+                    </a:lnT>
+                    <a:lnB w="6350" cap="flat" cmpd="sng" algn="ctr">
+                      <a:solidFill>
+                        <a:srgbClr val="000000"/>
+                      </a:solidFill>
+                      <a:prstDash val="solid"/>
+                      <a:round/>
+                      <a:headEnd type="none" w="med" len="med"/>
+                      <a:tailEnd type="none" w="med" len="med"/>
+                    </a:lnB>
+                  </a:tcPr>
+                </a:tc>
+                <a:tc>
+                  <a:txBody>
+                    <a:bodyPr/>
+                    <a:lstStyle/>
+                    <a:p>
+                      <a:pPr algn="ctr" fontAlgn="b"/>
+                      <a:r>
+                        <a:rPr lang="en-US" altLang="zh-CN" sz="1800" b="1" i="0" u="none" strike="noStrike">
+                          <a:solidFill>
+                            <a:srgbClr val="000000"/>
+                          </a:solidFill>
+                          <a:effectLst/>
+                          <a:latin typeface="Calibri" charset="0"/>
+                        </a:rPr>
+                        <a:t>0</a:t>
+                      </a:r>
+                    </a:p>
+                  </a:txBody>
+                  <a:tcPr marL="12700" marR="12700" marT="12700" marB="0" anchor="b">
+                    <a:lnL w="6350" cap="flat" cmpd="sng" algn="ctr">
+                      <a:solidFill>
+                        <a:srgbClr val="000000"/>
+                      </a:solidFill>
+                      <a:prstDash val="solid"/>
+                      <a:round/>
+                      <a:headEnd type="none" w="med" len="med"/>
+                      <a:tailEnd type="none" w="med" len="med"/>
+                    </a:lnL>
+                    <a:lnR w="12700" cap="flat" cmpd="sng" algn="ctr">
+                      <a:solidFill>
+                        <a:srgbClr val="000000"/>
+                      </a:solidFill>
+                      <a:prstDash val="solid"/>
+                      <a:round/>
+                      <a:headEnd type="none" w="med" len="med"/>
+                      <a:tailEnd type="none" w="med" len="med"/>
+                    </a:lnR>
+                    <a:lnT w="6350" cap="flat" cmpd="sng" algn="ctr">
+                      <a:solidFill>
+                        <a:srgbClr val="000000"/>
+                      </a:solidFill>
+                      <a:prstDash val="solid"/>
+                      <a:round/>
+                      <a:headEnd type="none" w="med" len="med"/>
+                      <a:tailEnd type="none" w="med" len="med"/>
+                    </a:lnT>
+                    <a:lnB w="6350" cap="flat" cmpd="sng" algn="ctr">
+                      <a:solidFill>
+                        <a:srgbClr val="000000"/>
+                      </a:solidFill>
+                      <a:prstDash val="solid"/>
+                      <a:round/>
+                      <a:headEnd type="none" w="med" len="med"/>
+                      <a:tailEnd type="none" w="med" len="med"/>
+                    </a:lnB>
+                  </a:tcPr>
+                </a:tc>
+              </a:tr>
+              <a:tr h="317500">
+                <a:tc>
+                  <a:txBody>
+                    <a:bodyPr/>
+                    <a:lstStyle/>
+                    <a:p>
+                      <a:pPr algn="ctr" fontAlgn="b"/>
+                      <a:r>
+                        <a:rPr lang="en-US" altLang="zh-CN" sz="1800" b="1" i="0" u="none" strike="noStrike">
+                          <a:solidFill>
+                            <a:srgbClr val="000000"/>
+                          </a:solidFill>
+                          <a:effectLst/>
+                          <a:latin typeface="Calibri" charset="0"/>
+                        </a:rPr>
+                        <a:t>u4</a:t>
+                      </a:r>
+                    </a:p>
+                  </a:txBody>
+                  <a:tcPr marL="12700" marR="12700" marT="12700" marB="0" anchor="b">
+                    <a:lnL w="12700" cap="flat" cmpd="sng" algn="ctr">
+                      <a:solidFill>
+                        <a:srgbClr val="000000"/>
+                      </a:solidFill>
+                      <a:prstDash val="solid"/>
+                      <a:round/>
+                      <a:headEnd type="none" w="med" len="med"/>
+                      <a:tailEnd type="none" w="med" len="med"/>
+                    </a:lnL>
+                    <a:lnR w="6350" cap="flat" cmpd="sng" algn="ctr">
+                      <a:solidFill>
+                        <a:srgbClr val="000000"/>
+                      </a:solidFill>
+                      <a:prstDash val="solid"/>
+                      <a:round/>
+                      <a:headEnd type="none" w="med" len="med"/>
+                      <a:tailEnd type="none" w="med" len="med"/>
+                    </a:lnR>
+                    <a:lnT w="6350" cap="flat" cmpd="sng" algn="ctr">
+                      <a:solidFill>
+                        <a:srgbClr val="000000"/>
+                      </a:solidFill>
+                      <a:prstDash val="solid"/>
+                      <a:round/>
+                      <a:headEnd type="none" w="med" len="med"/>
+                      <a:tailEnd type="none" w="med" len="med"/>
+                    </a:lnT>
+                    <a:lnB w="12700" cap="flat" cmpd="sng" algn="ctr">
+                      <a:solidFill>
+                        <a:srgbClr val="000000"/>
+                      </a:solidFill>
+                      <a:prstDash val="solid"/>
+                      <a:round/>
+                      <a:headEnd type="none" w="med" len="med"/>
+                      <a:tailEnd type="none" w="med" len="med"/>
+                    </a:lnB>
+                  </a:tcPr>
+                </a:tc>
+                <a:tc>
+                  <a:txBody>
+                    <a:bodyPr/>
+                    <a:lstStyle/>
+                    <a:p>
+                      <a:pPr algn="ctr" fontAlgn="b"/>
+                      <a:r>
+                        <a:rPr lang="en-US" altLang="zh-CN" sz="1800" b="1" i="0" u="none" strike="noStrike">
+                          <a:solidFill>
+                            <a:srgbClr val="000000"/>
+                          </a:solidFill>
+                          <a:effectLst/>
+                          <a:latin typeface="Calibri" charset="0"/>
+                        </a:rPr>
+                        <a:t>1</a:t>
+                      </a:r>
+                    </a:p>
+                  </a:txBody>
+                  <a:tcPr marL="12700" marR="12700" marT="12700" marB="0" anchor="b">
+                    <a:lnL w="6350" cap="flat" cmpd="sng" algn="ctr">
+                      <a:solidFill>
+                        <a:srgbClr val="000000"/>
+                      </a:solidFill>
+                      <a:prstDash val="solid"/>
+                      <a:round/>
+                      <a:headEnd type="none" w="med" len="med"/>
+                      <a:tailEnd type="none" w="med" len="med"/>
+                    </a:lnL>
+                    <a:lnR w="6350" cap="flat" cmpd="sng" algn="ctr">
+                      <a:solidFill>
+                        <a:srgbClr val="000000"/>
+                      </a:solidFill>
+                      <a:prstDash val="solid"/>
+                      <a:round/>
+                      <a:headEnd type="none" w="med" len="med"/>
+                      <a:tailEnd type="none" w="med" len="med"/>
+                    </a:lnR>
+                    <a:lnT w="6350" cap="flat" cmpd="sng" algn="ctr">
+                      <a:solidFill>
+                        <a:srgbClr val="000000"/>
+                      </a:solidFill>
+                      <a:prstDash val="solid"/>
+                      <a:round/>
+                      <a:headEnd type="none" w="med" len="med"/>
+                      <a:tailEnd type="none" w="med" len="med"/>
+                    </a:lnT>
+                    <a:lnB w="12700" cap="flat" cmpd="sng" algn="ctr">
+                      <a:solidFill>
+                        <a:srgbClr val="000000"/>
+                      </a:solidFill>
+                      <a:prstDash val="solid"/>
+                      <a:round/>
+                      <a:headEnd type="none" w="med" len="med"/>
+                      <a:tailEnd type="none" w="med" len="med"/>
+                    </a:lnB>
+                  </a:tcPr>
+                </a:tc>
+                <a:tc>
+                  <a:txBody>
+                    <a:bodyPr/>
+                    <a:lstStyle/>
+                    <a:p>
+                      <a:pPr algn="ctr" fontAlgn="b"/>
+                      <a:r>
+                        <a:rPr lang="en-US" altLang="zh-CN" sz="1800" b="1" i="0" u="none" strike="noStrike">
+                          <a:solidFill>
+                            <a:srgbClr val="000000"/>
+                          </a:solidFill>
+                          <a:effectLst/>
+                          <a:latin typeface="Calibri" charset="0"/>
+                        </a:rPr>
+                        <a:t>1</a:t>
+                      </a:r>
+                    </a:p>
+                  </a:txBody>
+                  <a:tcPr marL="12700" marR="12700" marT="12700" marB="0" anchor="b">
+                    <a:lnL w="6350" cap="flat" cmpd="sng" algn="ctr">
+                      <a:solidFill>
+                        <a:srgbClr val="000000"/>
+                      </a:solidFill>
+                      <a:prstDash val="solid"/>
+                      <a:round/>
+                      <a:headEnd type="none" w="med" len="med"/>
+                      <a:tailEnd type="none" w="med" len="med"/>
+                    </a:lnL>
+                    <a:lnR w="6350" cap="flat" cmpd="sng" algn="ctr">
+                      <a:solidFill>
+                        <a:srgbClr val="000000"/>
+                      </a:solidFill>
+                      <a:prstDash val="solid"/>
+                      <a:round/>
+                      <a:headEnd type="none" w="med" len="med"/>
+                      <a:tailEnd type="none" w="med" len="med"/>
+                    </a:lnR>
+                    <a:lnT w="6350" cap="flat" cmpd="sng" algn="ctr">
+                      <a:solidFill>
+                        <a:srgbClr val="000000"/>
+                      </a:solidFill>
+                      <a:prstDash val="solid"/>
+                      <a:round/>
+                      <a:headEnd type="none" w="med" len="med"/>
+                      <a:tailEnd type="none" w="med" len="med"/>
+                    </a:lnT>
+                    <a:lnB w="12700" cap="flat" cmpd="sng" algn="ctr">
+                      <a:solidFill>
+                        <a:srgbClr val="000000"/>
+                      </a:solidFill>
+                      <a:prstDash val="solid"/>
+                      <a:round/>
+                      <a:headEnd type="none" w="med" len="med"/>
+                      <a:tailEnd type="none" w="med" len="med"/>
+                    </a:lnB>
+                  </a:tcPr>
+                </a:tc>
+                <a:tc>
+                  <a:txBody>
+                    <a:bodyPr/>
+                    <a:lstStyle/>
+                    <a:p>
+                      <a:pPr algn="ctr" fontAlgn="b"/>
+                      <a:r>
+                        <a:rPr lang="en-US" altLang="zh-CN" sz="1800" b="1" i="0" u="none" strike="noStrike" dirty="0">
+                          <a:solidFill>
+                            <a:srgbClr val="000000"/>
+                          </a:solidFill>
+                          <a:effectLst/>
+                          <a:latin typeface="Calibri" charset="0"/>
+                        </a:rPr>
+                        <a:t>0</a:t>
+                      </a:r>
+                    </a:p>
+                  </a:txBody>
+                  <a:tcPr marL="12700" marR="12700" marT="12700" marB="0" anchor="b">
+                    <a:lnL w="6350" cap="flat" cmpd="sng" algn="ctr">
+                      <a:solidFill>
+                        <a:srgbClr val="000000"/>
+                      </a:solidFill>
+                      <a:prstDash val="solid"/>
+                      <a:round/>
+                      <a:headEnd type="none" w="med" len="med"/>
+                      <a:tailEnd type="none" w="med" len="med"/>
+                    </a:lnL>
+                    <a:lnR w="12700" cap="flat" cmpd="sng" algn="ctr">
+                      <a:solidFill>
+                        <a:srgbClr val="000000"/>
+                      </a:solidFill>
+                      <a:prstDash val="solid"/>
+                      <a:round/>
+                      <a:headEnd type="none" w="med" len="med"/>
+                      <a:tailEnd type="none" w="med" len="med"/>
+                    </a:lnR>
+                    <a:lnT w="6350" cap="flat" cmpd="sng" algn="ctr">
+                      <a:solidFill>
+                        <a:srgbClr val="000000"/>
+                      </a:solidFill>
+                      <a:prstDash val="solid"/>
+                      <a:round/>
+                      <a:headEnd type="none" w="med" len="med"/>
+                      <a:tailEnd type="none" w="med" len="med"/>
+                    </a:lnT>
+                    <a:lnB w="12700" cap="flat" cmpd="sng" algn="ctr">
+                      <a:solidFill>
+                        <a:srgbClr val="000000"/>
+                      </a:solidFill>
+                      <a:prstDash val="solid"/>
+                      <a:round/>
+                      <a:headEnd type="none" w="med" len="med"/>
+                      <a:tailEnd type="none" w="med" len="med"/>
+                    </a:lnB>
+                  </a:tcPr>
+                </a:tc>
+              </a:tr>
+            </a:tbl>
+          </a:graphicData>
+        </a:graphic>
+      </p:graphicFrame>
+      <p:graphicFrame>
+        <p:nvGraphicFramePr>
+          <p:cNvPr id="8" name="Table 7"/>
+          <p:cNvGraphicFramePr>
+            <a:graphicFrameLocks noGrp="1"/>
+          </p:cNvGraphicFramePr>
+          <p:nvPr>
+            <p:extLst>
+              <p:ext uri="{D42A27DB-BD31-4B8C-83A1-F6EECF244321}">
+                <p14:modId xmlns:p14="http://schemas.microsoft.com/office/powerpoint/2010/main" val="1828909160"/>
+              </p:ext>
+            </p:extLst>
+          </p:nvPr>
+        </p:nvGraphicFramePr>
+        <p:xfrm>
+          <a:off x="5897286" y="2606115"/>
+          <a:ext cx="2451100" cy="927100"/>
+        </p:xfrm>
+        <a:graphic>
+          <a:graphicData uri="http://schemas.openxmlformats.org/drawingml/2006/table">
+            <a:tbl>
+              <a:tblPr/>
+              <a:tblGrid>
+                <a:gridCol w="342014"/>
+                <a:gridCol w="1054543"/>
+                <a:gridCol w="1054543"/>
+              </a:tblGrid>
+              <a:tr h="304800">
+                <a:tc>
+                  <a:txBody>
+                    <a:bodyPr/>
+                    <a:lstStyle/>
+                    <a:p>
+                      <a:pPr algn="ctr" fontAlgn="b"/>
+                      <a:r>
+                        <a:rPr lang="sk-SK" sz="1800" b="1" i="0" u="none" strike="noStrike">
+                          <a:solidFill>
+                            <a:srgbClr val="000000"/>
+                          </a:solidFill>
+                          <a:effectLst/>
+                          <a:latin typeface="Calibri" charset="0"/>
+                        </a:rPr>
+                        <a:t> </a:t>
+                      </a:r>
+                    </a:p>
+                  </a:txBody>
+                  <a:tcPr marL="12700" marR="12700" marT="12700" marB="0" anchor="b">
+                    <a:lnL w="12700" cap="flat" cmpd="sng" algn="ctr">
+                      <a:solidFill>
+                        <a:srgbClr val="000000"/>
+                      </a:solidFill>
+                      <a:prstDash val="solid"/>
+                      <a:round/>
+                      <a:headEnd type="none" w="med" len="med"/>
+                      <a:tailEnd type="none" w="med" len="med"/>
+                    </a:lnL>
+                    <a:lnR w="6350" cap="flat" cmpd="sng" algn="ctr">
+                      <a:solidFill>
+                        <a:srgbClr val="000000"/>
+                      </a:solidFill>
+                      <a:prstDash val="solid"/>
+                      <a:round/>
+                      <a:headEnd type="none" w="med" len="med"/>
+                      <a:tailEnd type="none" w="med" len="med"/>
+                    </a:lnR>
+                    <a:lnT w="12700" cap="flat" cmpd="sng" algn="ctr">
+                      <a:solidFill>
+                        <a:srgbClr val="000000"/>
+                      </a:solidFill>
+                      <a:prstDash val="solid"/>
+                      <a:round/>
+                      <a:headEnd type="none" w="med" len="med"/>
+                      <a:tailEnd type="none" w="med" len="med"/>
+                    </a:lnT>
+                    <a:lnB w="6350" cap="flat" cmpd="sng" algn="ctr">
+                      <a:solidFill>
+                        <a:srgbClr val="000000"/>
+                      </a:solidFill>
+                      <a:prstDash val="solid"/>
+                      <a:round/>
+                      <a:headEnd type="none" w="med" len="med"/>
+                      <a:tailEnd type="none" w="med" len="med"/>
+                    </a:lnB>
+                  </a:tcPr>
+                </a:tc>
+                <a:tc>
+                  <a:txBody>
+                    <a:bodyPr/>
+                    <a:lstStyle/>
+                    <a:p>
+                      <a:pPr algn="ctr" fontAlgn="b"/>
+                      <a:r>
+                        <a:rPr lang="de-DE" sz="1800" b="1" i="0" u="none" strike="noStrike">
+                          <a:solidFill>
+                            <a:srgbClr val="000000"/>
+                          </a:solidFill>
+                          <a:effectLst/>
+                          <a:latin typeface="Calibri" charset="0"/>
+                        </a:rPr>
+                        <a:t>W1 XOR 0</a:t>
+                      </a:r>
+                    </a:p>
+                  </a:txBody>
+                  <a:tcPr marL="12700" marR="12700" marT="12700" marB="0" anchor="b">
+                    <a:lnL w="6350" cap="flat" cmpd="sng" algn="ctr">
+                      <a:solidFill>
+                        <a:srgbClr val="000000"/>
+                      </a:solidFill>
+                      <a:prstDash val="solid"/>
+                      <a:round/>
+                      <a:headEnd type="none" w="med" len="med"/>
+                      <a:tailEnd type="none" w="med" len="med"/>
+                    </a:lnL>
+                    <a:lnR w="6350" cap="flat" cmpd="sng" algn="ctr">
+                      <a:solidFill>
+                        <a:srgbClr val="000000"/>
+                      </a:solidFill>
+                      <a:prstDash val="solid"/>
+                      <a:round/>
+                      <a:headEnd type="none" w="med" len="med"/>
+                      <a:tailEnd type="none" w="med" len="med"/>
+                    </a:lnR>
+                    <a:lnT w="12700" cap="flat" cmpd="sng" algn="ctr">
+                      <a:solidFill>
+                        <a:srgbClr val="000000"/>
+                      </a:solidFill>
+                      <a:prstDash val="solid"/>
+                      <a:round/>
+                      <a:headEnd type="none" w="med" len="med"/>
+                      <a:tailEnd type="none" w="med" len="med"/>
+                    </a:lnT>
+                    <a:lnB w="6350" cap="flat" cmpd="sng" algn="ctr">
+                      <a:solidFill>
+                        <a:srgbClr val="000000"/>
+                      </a:solidFill>
+                      <a:prstDash val="solid"/>
+                      <a:round/>
+                      <a:headEnd type="none" w="med" len="med"/>
+                      <a:tailEnd type="none" w="med" len="med"/>
+                    </a:lnB>
+                  </a:tcPr>
+                </a:tc>
+                <a:tc>
+                  <a:txBody>
+                    <a:bodyPr/>
+                    <a:lstStyle/>
+                    <a:p>
+                      <a:pPr algn="ctr" fontAlgn="b"/>
+                      <a:r>
+                        <a:rPr lang="de-DE" sz="1800" b="1" i="0" u="none" strike="noStrike">
+                          <a:solidFill>
+                            <a:srgbClr val="000000"/>
+                          </a:solidFill>
+                          <a:effectLst/>
+                          <a:latin typeface="Calibri" charset="0"/>
+                        </a:rPr>
+                        <a:t>W2 XOR 0</a:t>
+                      </a:r>
+                    </a:p>
+                  </a:txBody>
+                  <a:tcPr marL="12700" marR="12700" marT="12700" marB="0" anchor="b">
+                    <a:lnL w="6350" cap="flat" cmpd="sng" algn="ctr">
+                      <a:solidFill>
+                        <a:srgbClr val="000000"/>
+                      </a:solidFill>
+                      <a:prstDash val="solid"/>
+                      <a:round/>
+                      <a:headEnd type="none" w="med" len="med"/>
+                      <a:tailEnd type="none" w="med" len="med"/>
+                    </a:lnL>
+                    <a:lnR w="12700" cap="flat" cmpd="sng" algn="ctr">
+                      <a:solidFill>
+                        <a:srgbClr val="000000"/>
+                      </a:solidFill>
+                      <a:prstDash val="solid"/>
+                      <a:round/>
+                      <a:headEnd type="none" w="med" len="med"/>
+                      <a:tailEnd type="none" w="med" len="med"/>
+                    </a:lnR>
+                    <a:lnT w="12700" cap="flat" cmpd="sng" algn="ctr">
+                      <a:solidFill>
+                        <a:srgbClr val="000000"/>
+                      </a:solidFill>
+                      <a:prstDash val="solid"/>
+                      <a:round/>
+                      <a:headEnd type="none" w="med" len="med"/>
+                      <a:tailEnd type="none" w="med" len="med"/>
+                    </a:lnT>
+                    <a:lnB w="6350" cap="flat" cmpd="sng" algn="ctr">
+                      <a:solidFill>
+                        <a:srgbClr val="000000"/>
+                      </a:solidFill>
+                      <a:prstDash val="solid"/>
+                      <a:round/>
+                      <a:headEnd type="none" w="med" len="med"/>
+                      <a:tailEnd type="none" w="med" len="med"/>
+                    </a:lnB>
+                  </a:tcPr>
+                </a:tc>
+              </a:tr>
+              <a:tr h="304800">
+                <a:tc>
+                  <a:txBody>
+                    <a:bodyPr/>
+                    <a:lstStyle/>
+                    <a:p>
+                      <a:pPr algn="ctr" fontAlgn="b"/>
+                      <a:r>
+                        <a:rPr lang="en-US" altLang="zh-CN" sz="1800" b="1" i="0" u="none" strike="noStrike">
+                          <a:solidFill>
+                            <a:srgbClr val="000000"/>
+                          </a:solidFill>
+                          <a:effectLst/>
+                          <a:latin typeface="Calibri" charset="0"/>
+                        </a:rPr>
+                        <a:t>u1</a:t>
+                      </a:r>
+                    </a:p>
+                  </a:txBody>
+                  <a:tcPr marL="12700" marR="12700" marT="12700" marB="0" anchor="b">
+                    <a:lnL w="12700" cap="flat" cmpd="sng" algn="ctr">
+                      <a:solidFill>
+                        <a:srgbClr val="000000"/>
+                      </a:solidFill>
+                      <a:prstDash val="solid"/>
+                      <a:round/>
+                      <a:headEnd type="none" w="med" len="med"/>
+                      <a:tailEnd type="none" w="med" len="med"/>
+                    </a:lnL>
+                    <a:lnR w="6350" cap="flat" cmpd="sng" algn="ctr">
+                      <a:solidFill>
+                        <a:srgbClr val="000000"/>
+                      </a:solidFill>
+                      <a:prstDash val="solid"/>
+                      <a:round/>
+                      <a:headEnd type="none" w="med" len="med"/>
+                      <a:tailEnd type="none" w="med" len="med"/>
+                    </a:lnR>
+                    <a:lnT w="6350" cap="flat" cmpd="sng" algn="ctr">
+                      <a:solidFill>
+                        <a:srgbClr val="000000"/>
+                      </a:solidFill>
+                      <a:prstDash val="solid"/>
+                      <a:round/>
+                      <a:headEnd type="none" w="med" len="med"/>
+                      <a:tailEnd type="none" w="med" len="med"/>
+                    </a:lnT>
+                    <a:lnB w="6350" cap="flat" cmpd="sng" algn="ctr">
+                      <a:solidFill>
+                        <a:srgbClr val="000000"/>
+                      </a:solidFill>
+                      <a:prstDash val="solid"/>
+                      <a:round/>
+                      <a:headEnd type="none" w="med" len="med"/>
+                      <a:tailEnd type="none" w="med" len="med"/>
+                    </a:lnB>
+                  </a:tcPr>
+                </a:tc>
+                <a:tc>
+                  <a:txBody>
+                    <a:bodyPr/>
+                    <a:lstStyle/>
+                    <a:p>
+                      <a:pPr algn="ctr" fontAlgn="b"/>
+                      <a:r>
+                        <a:rPr lang="en-US" altLang="zh-CN" sz="1800" b="1" i="0" u="none" strike="noStrike">
+                          <a:solidFill>
+                            <a:srgbClr val="000000"/>
+                          </a:solidFill>
+                          <a:effectLst/>
+                          <a:latin typeface="Calibri" charset="0"/>
+                        </a:rPr>
+                        <a:t>1</a:t>
+                      </a:r>
+                    </a:p>
+                  </a:txBody>
+                  <a:tcPr marL="12700" marR="12700" marT="12700" marB="0" anchor="b">
+                    <a:lnL w="6350" cap="flat" cmpd="sng" algn="ctr">
+                      <a:solidFill>
+                        <a:srgbClr val="000000"/>
+                      </a:solidFill>
+                      <a:prstDash val="solid"/>
+                      <a:round/>
+                      <a:headEnd type="none" w="med" len="med"/>
+                      <a:tailEnd type="none" w="med" len="med"/>
+                    </a:lnL>
+                    <a:lnR w="6350" cap="flat" cmpd="sng" algn="ctr">
+                      <a:solidFill>
+                        <a:srgbClr val="000000"/>
+                      </a:solidFill>
+                      <a:prstDash val="solid"/>
+                      <a:round/>
+                      <a:headEnd type="none" w="med" len="med"/>
+                      <a:tailEnd type="none" w="med" len="med"/>
+                    </a:lnR>
+                    <a:lnT w="6350" cap="flat" cmpd="sng" algn="ctr">
+                      <a:solidFill>
+                        <a:srgbClr val="000000"/>
+                      </a:solidFill>
+                      <a:prstDash val="solid"/>
+                      <a:round/>
+                      <a:headEnd type="none" w="med" len="med"/>
+                      <a:tailEnd type="none" w="med" len="med"/>
+                    </a:lnT>
+                    <a:lnB w="6350" cap="flat" cmpd="sng" algn="ctr">
+                      <a:solidFill>
+                        <a:srgbClr val="000000"/>
+                      </a:solidFill>
+                      <a:prstDash val="solid"/>
+                      <a:round/>
+                      <a:headEnd type="none" w="med" len="med"/>
+                      <a:tailEnd type="none" w="med" len="med"/>
+                    </a:lnB>
+                  </a:tcPr>
+                </a:tc>
+                <a:tc>
+                  <a:txBody>
+                    <a:bodyPr/>
+                    <a:lstStyle/>
+                    <a:p>
+                      <a:pPr algn="ctr" fontAlgn="b"/>
+                      <a:r>
+                        <a:rPr lang="en-US" altLang="zh-CN" sz="1800" b="1" i="0" u="none" strike="noStrike">
+                          <a:solidFill>
+                            <a:srgbClr val="000000"/>
+                          </a:solidFill>
+                          <a:effectLst/>
+                          <a:latin typeface="Calibri" charset="0"/>
+                        </a:rPr>
+                        <a:t>0</a:t>
+                      </a:r>
+                    </a:p>
+                  </a:txBody>
+                  <a:tcPr marL="12700" marR="12700" marT="12700" marB="0" anchor="b">
+                    <a:lnL w="6350" cap="flat" cmpd="sng" algn="ctr">
+                      <a:solidFill>
+                        <a:srgbClr val="000000"/>
+                      </a:solidFill>
+                      <a:prstDash val="solid"/>
+                      <a:round/>
+                      <a:headEnd type="none" w="med" len="med"/>
+                      <a:tailEnd type="none" w="med" len="med"/>
+                    </a:lnL>
+                    <a:lnR w="12700" cap="flat" cmpd="sng" algn="ctr">
+                      <a:solidFill>
+                        <a:srgbClr val="000000"/>
+                      </a:solidFill>
+                      <a:prstDash val="solid"/>
+                      <a:round/>
+                      <a:headEnd type="none" w="med" len="med"/>
+                      <a:tailEnd type="none" w="med" len="med"/>
+                    </a:lnR>
+                    <a:lnT w="6350" cap="flat" cmpd="sng" algn="ctr">
+                      <a:solidFill>
+                        <a:srgbClr val="000000"/>
+                      </a:solidFill>
+                      <a:prstDash val="solid"/>
+                      <a:round/>
+                      <a:headEnd type="none" w="med" len="med"/>
+                      <a:tailEnd type="none" w="med" len="med"/>
+                    </a:lnT>
+                    <a:lnB w="6350" cap="flat" cmpd="sng" algn="ctr">
+                      <a:solidFill>
+                        <a:srgbClr val="000000"/>
+                      </a:solidFill>
+                      <a:prstDash val="solid"/>
+                      <a:round/>
+                      <a:headEnd type="none" w="med" len="med"/>
+                      <a:tailEnd type="none" w="med" len="med"/>
+                    </a:lnB>
+                  </a:tcPr>
+                </a:tc>
+              </a:tr>
+              <a:tr h="317500">
+                <a:tc>
+                  <a:txBody>
+                    <a:bodyPr/>
+                    <a:lstStyle/>
+                    <a:p>
+                      <a:pPr algn="ctr" fontAlgn="b"/>
+                      <a:r>
+                        <a:rPr lang="is-IS" sz="1800" b="1" i="0" u="none" strike="noStrike">
+                          <a:solidFill>
+                            <a:srgbClr val="000000"/>
+                          </a:solidFill>
+                          <a:effectLst/>
+                          <a:latin typeface="Calibri" charset="0"/>
+                        </a:rPr>
+                        <a:t>u2</a:t>
+                      </a:r>
+                    </a:p>
+                  </a:txBody>
+                  <a:tcPr marL="12700" marR="12700" marT="12700" marB="0" anchor="b">
+                    <a:lnL w="12700" cap="flat" cmpd="sng" algn="ctr">
+                      <a:solidFill>
+                        <a:srgbClr val="000000"/>
+                      </a:solidFill>
+                      <a:prstDash val="solid"/>
+                      <a:round/>
+                      <a:headEnd type="none" w="med" len="med"/>
+                      <a:tailEnd type="none" w="med" len="med"/>
+                    </a:lnL>
+                    <a:lnR w="6350" cap="flat" cmpd="sng" algn="ctr">
+                      <a:solidFill>
+                        <a:srgbClr val="000000"/>
+                      </a:solidFill>
+                      <a:prstDash val="solid"/>
+                      <a:round/>
+                      <a:headEnd type="none" w="med" len="med"/>
+                      <a:tailEnd type="none" w="med" len="med"/>
+                    </a:lnR>
+                    <a:lnT w="6350" cap="flat" cmpd="sng" algn="ctr">
+                      <a:solidFill>
+                        <a:srgbClr val="000000"/>
+                      </a:solidFill>
+                      <a:prstDash val="solid"/>
+                      <a:round/>
+                      <a:headEnd type="none" w="med" len="med"/>
+                      <a:tailEnd type="none" w="med" len="med"/>
+                    </a:lnT>
+                    <a:lnB w="12700" cap="flat" cmpd="sng" algn="ctr">
+                      <a:solidFill>
+                        <a:srgbClr val="000000"/>
+                      </a:solidFill>
+                      <a:prstDash val="solid"/>
+                      <a:round/>
+                      <a:headEnd type="none" w="med" len="med"/>
+                      <a:tailEnd type="none" w="med" len="med"/>
+                    </a:lnB>
+                  </a:tcPr>
+                </a:tc>
+                <a:tc>
+                  <a:txBody>
+                    <a:bodyPr/>
+                    <a:lstStyle/>
+                    <a:p>
+                      <a:pPr algn="ctr" fontAlgn="b"/>
+                      <a:r>
+                        <a:rPr lang="en-US" altLang="zh-CN" sz="1800" b="1" i="0" u="none" strike="noStrike" dirty="0">
+                          <a:solidFill>
+                            <a:srgbClr val="000000"/>
+                          </a:solidFill>
+                          <a:effectLst/>
+                          <a:latin typeface="Calibri" charset="0"/>
+                        </a:rPr>
+                        <a:t>0</a:t>
+                      </a:r>
+                    </a:p>
+                  </a:txBody>
+                  <a:tcPr marL="12700" marR="12700" marT="12700" marB="0" anchor="b">
+                    <a:lnL w="6350" cap="flat" cmpd="sng" algn="ctr">
+                      <a:solidFill>
+                        <a:srgbClr val="000000"/>
+                      </a:solidFill>
+                      <a:prstDash val="solid"/>
+                      <a:round/>
+                      <a:headEnd type="none" w="med" len="med"/>
+                      <a:tailEnd type="none" w="med" len="med"/>
+                    </a:lnL>
+                    <a:lnR w="6350" cap="flat" cmpd="sng" algn="ctr">
+                      <a:solidFill>
+                        <a:srgbClr val="000000"/>
+                      </a:solidFill>
+                      <a:prstDash val="solid"/>
+                      <a:round/>
+                      <a:headEnd type="none" w="med" len="med"/>
+                      <a:tailEnd type="none" w="med" len="med"/>
+                    </a:lnR>
+                    <a:lnT w="6350" cap="flat" cmpd="sng" algn="ctr">
+                      <a:solidFill>
+                        <a:srgbClr val="000000"/>
+                      </a:solidFill>
+                      <a:prstDash val="solid"/>
+                      <a:round/>
+                      <a:headEnd type="none" w="med" len="med"/>
+                      <a:tailEnd type="none" w="med" len="med"/>
+                    </a:lnT>
+                    <a:lnB w="12700" cap="flat" cmpd="sng" algn="ctr">
+                      <a:solidFill>
+                        <a:srgbClr val="000000"/>
+                      </a:solidFill>
+                      <a:prstDash val="solid"/>
+                      <a:round/>
+                      <a:headEnd type="none" w="med" len="med"/>
+                      <a:tailEnd type="none" w="med" len="med"/>
+                    </a:lnB>
+                  </a:tcPr>
+                </a:tc>
+                <a:tc>
+                  <a:txBody>
+                    <a:bodyPr/>
+                    <a:lstStyle/>
+                    <a:p>
+                      <a:pPr algn="ctr" fontAlgn="b"/>
+                      <a:r>
+                        <a:rPr lang="en-US" altLang="zh-CN" sz="1800" b="1" i="0" u="none" strike="noStrike" dirty="0">
+                          <a:solidFill>
+                            <a:srgbClr val="000000"/>
+                          </a:solidFill>
+                          <a:effectLst/>
+                          <a:latin typeface="Calibri" charset="0"/>
+                        </a:rPr>
+                        <a:t>1</a:t>
+                      </a:r>
+                    </a:p>
+                  </a:txBody>
+                  <a:tcPr marL="12700" marR="12700" marT="12700" marB="0" anchor="b">
+                    <a:lnL w="6350" cap="flat" cmpd="sng" algn="ctr">
+                      <a:solidFill>
+                        <a:srgbClr val="000000"/>
+                      </a:solidFill>
+                      <a:prstDash val="solid"/>
+                      <a:round/>
+                      <a:headEnd type="none" w="med" len="med"/>
+                      <a:tailEnd type="none" w="med" len="med"/>
+                    </a:lnL>
+                    <a:lnR w="12700" cap="flat" cmpd="sng" algn="ctr">
+                      <a:solidFill>
+                        <a:srgbClr val="000000"/>
+                      </a:solidFill>
+                      <a:prstDash val="solid"/>
+                      <a:round/>
+                      <a:headEnd type="none" w="med" len="med"/>
+                      <a:tailEnd type="none" w="med" len="med"/>
+                    </a:lnR>
+                    <a:lnT w="6350" cap="flat" cmpd="sng" algn="ctr">
+                      <a:solidFill>
+                        <a:srgbClr val="000000"/>
+                      </a:solidFill>
+                      <a:prstDash val="solid"/>
+                      <a:round/>
+                      <a:headEnd type="none" w="med" len="med"/>
+                      <a:tailEnd type="none" w="med" len="med"/>
+                    </a:lnT>
+                    <a:lnB w="12700" cap="flat" cmpd="sng" algn="ctr">
+                      <a:solidFill>
+                        <a:srgbClr val="000000"/>
+                      </a:solidFill>
+                      <a:prstDash val="solid"/>
+                      <a:round/>
+                      <a:headEnd type="none" w="med" len="med"/>
+                      <a:tailEnd type="none" w="med" len="med"/>
+                    </a:lnB>
+                  </a:tcPr>
+                </a:tc>
+              </a:tr>
+            </a:tbl>
+          </a:graphicData>
+        </a:graphic>
+      </p:graphicFrame>
+      <p:graphicFrame>
+        <p:nvGraphicFramePr>
+          <p:cNvPr id="9" name="Table 8"/>
+          <p:cNvGraphicFramePr>
+            <a:graphicFrameLocks noGrp="1"/>
+          </p:cNvGraphicFramePr>
+          <p:nvPr>
+            <p:extLst>
+              <p:ext uri="{D42A27DB-BD31-4B8C-83A1-F6EECF244321}">
+                <p14:modId xmlns:p14="http://schemas.microsoft.com/office/powerpoint/2010/main" val="653532989"/>
+              </p:ext>
+            </p:extLst>
+          </p:nvPr>
+        </p:nvGraphicFramePr>
+        <p:xfrm>
+          <a:off x="5906622" y="4049524"/>
+          <a:ext cx="2882901" cy="927100"/>
+        </p:xfrm>
+        <a:graphic>
+          <a:graphicData uri="http://schemas.openxmlformats.org/drawingml/2006/table">
+            <a:tbl>
+              <a:tblPr/>
+              <a:tblGrid>
+                <a:gridCol w="343657"/>
+                <a:gridCol w="1269622"/>
+                <a:gridCol w="1269622"/>
+              </a:tblGrid>
+              <a:tr h="304800">
+                <a:tc>
+                  <a:txBody>
+                    <a:bodyPr/>
+                    <a:lstStyle/>
+                    <a:p>
+                      <a:pPr algn="ctr" fontAlgn="b"/>
+                      <a:r>
+                        <a:rPr lang="sk-SK" sz="1800" b="1" i="0" u="none" strike="noStrike">
+                          <a:solidFill>
+                            <a:srgbClr val="000000"/>
+                          </a:solidFill>
+                          <a:effectLst/>
+                          <a:latin typeface="Calibri" charset="0"/>
+                        </a:rPr>
+                        <a:t> </a:t>
+                      </a:r>
+                    </a:p>
+                  </a:txBody>
+                  <a:tcPr marL="12700" marR="12700" marT="12700" marB="0" anchor="b">
+                    <a:lnL w="12700" cap="flat" cmpd="sng" algn="ctr">
+                      <a:solidFill>
+                        <a:srgbClr val="000000"/>
+                      </a:solidFill>
+                      <a:prstDash val="solid"/>
+                      <a:round/>
+                      <a:headEnd type="none" w="med" len="med"/>
+                      <a:tailEnd type="none" w="med" len="med"/>
+                    </a:lnL>
+                    <a:lnR w="6350" cap="flat" cmpd="sng" algn="ctr">
+                      <a:solidFill>
+                        <a:srgbClr val="000000"/>
+                      </a:solidFill>
+                      <a:prstDash val="solid"/>
+                      <a:round/>
+                      <a:headEnd type="none" w="med" len="med"/>
+                      <a:tailEnd type="none" w="med" len="med"/>
+                    </a:lnR>
+                    <a:lnT w="12700" cap="flat" cmpd="sng" algn="ctr">
+                      <a:solidFill>
+                        <a:srgbClr val="000000"/>
+                      </a:solidFill>
+                      <a:prstDash val="solid"/>
+                      <a:round/>
+                      <a:headEnd type="none" w="med" len="med"/>
+                      <a:tailEnd type="none" w="med" len="med"/>
+                    </a:lnT>
+                    <a:lnB w="6350" cap="flat" cmpd="sng" algn="ctr">
+                      <a:solidFill>
+                        <a:srgbClr val="000000"/>
+                      </a:solidFill>
+                      <a:prstDash val="solid"/>
+                      <a:round/>
+                      <a:headEnd type="none" w="med" len="med"/>
+                      <a:tailEnd type="none" w="med" len="med"/>
+                    </a:lnB>
+                  </a:tcPr>
+                </a:tc>
+                <a:tc>
+                  <a:txBody>
+                    <a:bodyPr/>
+                    <a:lstStyle/>
+                    <a:p>
+                      <a:pPr algn="ctr" fontAlgn="b"/>
+                      <a:r>
+                        <a:rPr lang="de-DE" sz="1800" b="1" i="0" u="none" strike="noStrike">
+                          <a:solidFill>
+                            <a:srgbClr val="000000"/>
+                          </a:solidFill>
+                          <a:effectLst/>
+                          <a:latin typeface="Calibri" charset="0"/>
+                        </a:rPr>
+                        <a:t>W1 XOR W1</a:t>
+                      </a:r>
+                    </a:p>
+                  </a:txBody>
+                  <a:tcPr marL="12700" marR="12700" marT="12700" marB="0" anchor="b">
+                    <a:lnL w="6350" cap="flat" cmpd="sng" algn="ctr">
+                      <a:solidFill>
+                        <a:srgbClr val="000000"/>
+                      </a:solidFill>
+                      <a:prstDash val="solid"/>
+                      <a:round/>
+                      <a:headEnd type="none" w="med" len="med"/>
+                      <a:tailEnd type="none" w="med" len="med"/>
+                    </a:lnL>
+                    <a:lnR w="6350" cap="flat" cmpd="sng" algn="ctr">
+                      <a:solidFill>
+                        <a:srgbClr val="000000"/>
+                      </a:solidFill>
+                      <a:prstDash val="solid"/>
+                      <a:round/>
+                      <a:headEnd type="none" w="med" len="med"/>
+                      <a:tailEnd type="none" w="med" len="med"/>
+                    </a:lnR>
+                    <a:lnT w="12700" cap="flat" cmpd="sng" algn="ctr">
+                      <a:solidFill>
+                        <a:srgbClr val="000000"/>
+                      </a:solidFill>
+                      <a:prstDash val="solid"/>
+                      <a:round/>
+                      <a:headEnd type="none" w="med" len="med"/>
+                      <a:tailEnd type="none" w="med" len="med"/>
+                    </a:lnT>
+                    <a:lnB w="6350" cap="flat" cmpd="sng" algn="ctr">
+                      <a:solidFill>
+                        <a:srgbClr val="000000"/>
+                      </a:solidFill>
+                      <a:prstDash val="solid"/>
+                      <a:round/>
+                      <a:headEnd type="none" w="med" len="med"/>
+                      <a:tailEnd type="none" w="med" len="med"/>
+                    </a:lnB>
+                  </a:tcPr>
+                </a:tc>
+                <a:tc>
+                  <a:txBody>
+                    <a:bodyPr/>
+                    <a:lstStyle/>
+                    <a:p>
+                      <a:pPr algn="ctr" fontAlgn="b"/>
+                      <a:r>
+                        <a:rPr lang="de-DE" sz="1800" b="1" i="0" u="none" strike="noStrike">
+                          <a:solidFill>
+                            <a:srgbClr val="000000"/>
+                          </a:solidFill>
+                          <a:effectLst/>
+                          <a:latin typeface="Calibri" charset="0"/>
+                        </a:rPr>
+                        <a:t>W2 XOR W1</a:t>
+                      </a:r>
+                    </a:p>
+                  </a:txBody>
+                  <a:tcPr marL="12700" marR="12700" marT="12700" marB="0" anchor="b">
+                    <a:lnL w="6350" cap="flat" cmpd="sng" algn="ctr">
+                      <a:solidFill>
+                        <a:srgbClr val="000000"/>
+                      </a:solidFill>
+                      <a:prstDash val="solid"/>
+                      <a:round/>
+                      <a:headEnd type="none" w="med" len="med"/>
+                      <a:tailEnd type="none" w="med" len="med"/>
+                    </a:lnL>
+                    <a:lnR w="12700" cap="flat" cmpd="sng" algn="ctr">
+                      <a:solidFill>
+                        <a:srgbClr val="000000"/>
+                      </a:solidFill>
+                      <a:prstDash val="solid"/>
+                      <a:round/>
+                      <a:headEnd type="none" w="med" len="med"/>
+                      <a:tailEnd type="none" w="med" len="med"/>
+                    </a:lnR>
+                    <a:lnT w="12700" cap="flat" cmpd="sng" algn="ctr">
+                      <a:solidFill>
+                        <a:srgbClr val="000000"/>
+                      </a:solidFill>
+                      <a:prstDash val="solid"/>
+                      <a:round/>
+                      <a:headEnd type="none" w="med" len="med"/>
+                      <a:tailEnd type="none" w="med" len="med"/>
+                    </a:lnT>
+                    <a:lnB w="6350" cap="flat" cmpd="sng" algn="ctr">
+                      <a:solidFill>
+                        <a:srgbClr val="000000"/>
+                      </a:solidFill>
+                      <a:prstDash val="solid"/>
+                      <a:round/>
+                      <a:headEnd type="none" w="med" len="med"/>
+                      <a:tailEnd type="none" w="med" len="med"/>
+                    </a:lnB>
+                  </a:tcPr>
+                </a:tc>
+              </a:tr>
+              <a:tr h="304800">
+                <a:tc>
+                  <a:txBody>
+                    <a:bodyPr/>
+                    <a:lstStyle/>
+                    <a:p>
+                      <a:pPr algn="ctr" fontAlgn="b"/>
+                      <a:r>
+                        <a:rPr lang="en-US" altLang="zh-CN" sz="1800" b="1" i="0" u="none" strike="noStrike">
+                          <a:solidFill>
+                            <a:srgbClr val="000000"/>
+                          </a:solidFill>
+                          <a:effectLst/>
+                          <a:latin typeface="Calibri" charset="0"/>
+                        </a:rPr>
+                        <a:t>u1</a:t>
+                      </a:r>
+                    </a:p>
+                  </a:txBody>
+                  <a:tcPr marL="12700" marR="12700" marT="12700" marB="0" anchor="b">
+                    <a:lnL w="12700" cap="flat" cmpd="sng" algn="ctr">
+                      <a:solidFill>
+                        <a:srgbClr val="000000"/>
+                      </a:solidFill>
+                      <a:prstDash val="solid"/>
+                      <a:round/>
+                      <a:headEnd type="none" w="med" len="med"/>
+                      <a:tailEnd type="none" w="med" len="med"/>
+                    </a:lnL>
+                    <a:lnR w="6350" cap="flat" cmpd="sng" algn="ctr">
+                      <a:solidFill>
+                        <a:srgbClr val="000000"/>
+                      </a:solidFill>
+                      <a:prstDash val="solid"/>
+                      <a:round/>
+                      <a:headEnd type="none" w="med" len="med"/>
+                      <a:tailEnd type="none" w="med" len="med"/>
+                    </a:lnR>
+                    <a:lnT w="6350" cap="flat" cmpd="sng" algn="ctr">
+                      <a:solidFill>
+                        <a:srgbClr val="000000"/>
+                      </a:solidFill>
+                      <a:prstDash val="solid"/>
+                      <a:round/>
+                      <a:headEnd type="none" w="med" len="med"/>
+                      <a:tailEnd type="none" w="med" len="med"/>
+                    </a:lnT>
+                    <a:lnB w="6350" cap="flat" cmpd="sng" algn="ctr">
+                      <a:solidFill>
+                        <a:srgbClr val="000000"/>
+                      </a:solidFill>
+                      <a:prstDash val="solid"/>
+                      <a:round/>
+                      <a:headEnd type="none" w="med" len="med"/>
+                      <a:tailEnd type="none" w="med" len="med"/>
+                    </a:lnB>
+                  </a:tcPr>
+                </a:tc>
+                <a:tc>
+                  <a:txBody>
+                    <a:bodyPr/>
+                    <a:lstStyle/>
+                    <a:p>
+                      <a:pPr algn="ctr" fontAlgn="b"/>
+                      <a:r>
+                        <a:rPr lang="en-US" altLang="zh-CN" sz="1800" b="1" i="0" u="none" strike="noStrike">
+                          <a:solidFill>
+                            <a:srgbClr val="000000"/>
+                          </a:solidFill>
+                          <a:effectLst/>
+                          <a:latin typeface="Calibri" charset="0"/>
+                        </a:rPr>
+                        <a:t>0</a:t>
+                      </a:r>
+                    </a:p>
+                  </a:txBody>
+                  <a:tcPr marL="12700" marR="12700" marT="12700" marB="0" anchor="b">
+                    <a:lnL w="6350" cap="flat" cmpd="sng" algn="ctr">
+                      <a:solidFill>
+                        <a:srgbClr val="000000"/>
+                      </a:solidFill>
+                      <a:prstDash val="solid"/>
+                      <a:round/>
+                      <a:headEnd type="none" w="med" len="med"/>
+                      <a:tailEnd type="none" w="med" len="med"/>
+                    </a:lnL>
+                    <a:lnR w="6350" cap="flat" cmpd="sng" algn="ctr">
+                      <a:solidFill>
+                        <a:srgbClr val="000000"/>
+                      </a:solidFill>
+                      <a:prstDash val="solid"/>
+                      <a:round/>
+                      <a:headEnd type="none" w="med" len="med"/>
+                      <a:tailEnd type="none" w="med" len="med"/>
+                    </a:lnR>
+                    <a:lnT w="6350" cap="flat" cmpd="sng" algn="ctr">
+                      <a:solidFill>
+                        <a:srgbClr val="000000"/>
+                      </a:solidFill>
+                      <a:prstDash val="solid"/>
+                      <a:round/>
+                      <a:headEnd type="none" w="med" len="med"/>
+                      <a:tailEnd type="none" w="med" len="med"/>
+                    </a:lnT>
+                    <a:lnB w="6350" cap="flat" cmpd="sng" algn="ctr">
+                      <a:solidFill>
+                        <a:srgbClr val="000000"/>
+                      </a:solidFill>
+                      <a:prstDash val="solid"/>
+                      <a:round/>
+                      <a:headEnd type="none" w="med" len="med"/>
+                      <a:tailEnd type="none" w="med" len="med"/>
+                    </a:lnB>
+                  </a:tcPr>
+                </a:tc>
+                <a:tc>
+                  <a:txBody>
+                    <a:bodyPr/>
+                    <a:lstStyle/>
+                    <a:p>
+                      <a:pPr algn="ctr" fontAlgn="b"/>
+                      <a:r>
+                        <a:rPr lang="en-US" altLang="zh-CN" sz="1800" b="1" i="0" u="none" strike="noStrike">
+                          <a:solidFill>
+                            <a:srgbClr val="000000"/>
+                          </a:solidFill>
+                          <a:effectLst/>
+                          <a:latin typeface="Calibri" charset="0"/>
+                        </a:rPr>
+                        <a:t>1</a:t>
+                      </a:r>
+                    </a:p>
+                  </a:txBody>
+                  <a:tcPr marL="12700" marR="12700" marT="12700" marB="0" anchor="b">
+                    <a:lnL w="6350" cap="flat" cmpd="sng" algn="ctr">
+                      <a:solidFill>
+                        <a:srgbClr val="000000"/>
+                      </a:solidFill>
+                      <a:prstDash val="solid"/>
+                      <a:round/>
+                      <a:headEnd type="none" w="med" len="med"/>
+                      <a:tailEnd type="none" w="med" len="med"/>
+                    </a:lnL>
+                    <a:lnR w="12700" cap="flat" cmpd="sng" algn="ctr">
+                      <a:solidFill>
+                        <a:srgbClr val="000000"/>
+                      </a:solidFill>
+                      <a:prstDash val="solid"/>
+                      <a:round/>
+                      <a:headEnd type="none" w="med" len="med"/>
+                      <a:tailEnd type="none" w="med" len="med"/>
+                    </a:lnR>
+                    <a:lnT w="6350" cap="flat" cmpd="sng" algn="ctr">
+                      <a:solidFill>
+                        <a:srgbClr val="000000"/>
+                      </a:solidFill>
+                      <a:prstDash val="solid"/>
+                      <a:round/>
+                      <a:headEnd type="none" w="med" len="med"/>
+                      <a:tailEnd type="none" w="med" len="med"/>
+                    </a:lnT>
+                    <a:lnB w="6350" cap="flat" cmpd="sng" algn="ctr">
+                      <a:solidFill>
+                        <a:srgbClr val="000000"/>
+                      </a:solidFill>
+                      <a:prstDash val="solid"/>
+                      <a:round/>
+                      <a:headEnd type="none" w="med" len="med"/>
+                      <a:tailEnd type="none" w="med" len="med"/>
+                    </a:lnB>
+                  </a:tcPr>
+                </a:tc>
+              </a:tr>
+              <a:tr h="317500">
+                <a:tc>
+                  <a:txBody>
+                    <a:bodyPr/>
+                    <a:lstStyle/>
+                    <a:p>
+                      <a:pPr algn="ctr" fontAlgn="b"/>
+                      <a:r>
+                        <a:rPr lang="is-IS" sz="1800" b="1" i="0" u="none" strike="noStrike">
+                          <a:solidFill>
+                            <a:srgbClr val="000000"/>
+                          </a:solidFill>
+                          <a:effectLst/>
+                          <a:latin typeface="Calibri" charset="0"/>
+                        </a:rPr>
+                        <a:t>u2</a:t>
+                      </a:r>
+                    </a:p>
+                  </a:txBody>
+                  <a:tcPr marL="12700" marR="12700" marT="12700" marB="0" anchor="b">
+                    <a:lnL w="12700" cap="flat" cmpd="sng" algn="ctr">
+                      <a:solidFill>
+                        <a:srgbClr val="000000"/>
+                      </a:solidFill>
+                      <a:prstDash val="solid"/>
+                      <a:round/>
+                      <a:headEnd type="none" w="med" len="med"/>
+                      <a:tailEnd type="none" w="med" len="med"/>
+                    </a:lnL>
+                    <a:lnR w="6350" cap="flat" cmpd="sng" algn="ctr">
+                      <a:solidFill>
+                        <a:srgbClr val="000000"/>
+                      </a:solidFill>
+                      <a:prstDash val="solid"/>
+                      <a:round/>
+                      <a:headEnd type="none" w="med" len="med"/>
+                      <a:tailEnd type="none" w="med" len="med"/>
+                    </a:lnR>
+                    <a:lnT w="6350" cap="flat" cmpd="sng" algn="ctr">
+                      <a:solidFill>
+                        <a:srgbClr val="000000"/>
+                      </a:solidFill>
+                      <a:prstDash val="solid"/>
+                      <a:round/>
+                      <a:headEnd type="none" w="med" len="med"/>
+                      <a:tailEnd type="none" w="med" len="med"/>
+                    </a:lnT>
+                    <a:lnB w="12700" cap="flat" cmpd="sng" algn="ctr">
+                      <a:solidFill>
+                        <a:srgbClr val="000000"/>
+                      </a:solidFill>
+                      <a:prstDash val="solid"/>
+                      <a:round/>
+                      <a:headEnd type="none" w="med" len="med"/>
+                      <a:tailEnd type="none" w="med" len="med"/>
+                    </a:lnB>
+                  </a:tcPr>
+                </a:tc>
+                <a:tc>
+                  <a:txBody>
+                    <a:bodyPr/>
+                    <a:lstStyle/>
+                    <a:p>
+                      <a:pPr algn="ctr" fontAlgn="b"/>
+                      <a:r>
+                        <a:rPr lang="en-US" altLang="zh-CN" sz="1800" b="1" i="0" u="none" strike="noStrike" dirty="0" smtClean="0">
+                          <a:solidFill>
+                            <a:srgbClr val="000000"/>
+                          </a:solidFill>
+                          <a:effectLst/>
+                          <a:latin typeface="Calibri" charset="0"/>
+                        </a:rPr>
+                        <a:t>0</a:t>
+                      </a:r>
+                      <a:endParaRPr lang="en-US" altLang="zh-CN" sz="1800" b="1" i="0" u="none" strike="noStrike" dirty="0">
+                        <a:solidFill>
+                          <a:srgbClr val="000000"/>
+                        </a:solidFill>
+                        <a:effectLst/>
+                        <a:latin typeface="Calibri" charset="0"/>
+                      </a:endParaRPr>
+                    </a:p>
+                  </a:txBody>
+                  <a:tcPr marL="12700" marR="12700" marT="12700" marB="0" anchor="b">
+                    <a:lnL w="6350" cap="flat" cmpd="sng" algn="ctr">
+                      <a:solidFill>
+                        <a:srgbClr val="000000"/>
+                      </a:solidFill>
+                      <a:prstDash val="solid"/>
+                      <a:round/>
+                      <a:headEnd type="none" w="med" len="med"/>
+                      <a:tailEnd type="none" w="med" len="med"/>
+                    </a:lnL>
+                    <a:lnR w="6350" cap="flat" cmpd="sng" algn="ctr">
+                      <a:solidFill>
+                        <a:srgbClr val="000000"/>
+                      </a:solidFill>
+                      <a:prstDash val="solid"/>
+                      <a:round/>
+                      <a:headEnd type="none" w="med" len="med"/>
+                      <a:tailEnd type="none" w="med" len="med"/>
+                    </a:lnR>
+                    <a:lnT w="6350" cap="flat" cmpd="sng" algn="ctr">
+                      <a:solidFill>
+                        <a:srgbClr val="000000"/>
+                      </a:solidFill>
+                      <a:prstDash val="solid"/>
+                      <a:round/>
+                      <a:headEnd type="none" w="med" len="med"/>
+                      <a:tailEnd type="none" w="med" len="med"/>
+                    </a:lnT>
+                    <a:lnB w="12700" cap="flat" cmpd="sng" algn="ctr">
+                      <a:solidFill>
+                        <a:srgbClr val="000000"/>
+                      </a:solidFill>
+                      <a:prstDash val="solid"/>
+                      <a:round/>
+                      <a:headEnd type="none" w="med" len="med"/>
+                      <a:tailEnd type="none" w="med" len="med"/>
+                    </a:lnB>
+                  </a:tcPr>
+                </a:tc>
+                <a:tc>
+                  <a:txBody>
+                    <a:bodyPr/>
+                    <a:lstStyle/>
+                    <a:p>
+                      <a:pPr algn="ctr" fontAlgn="b"/>
+                      <a:r>
+                        <a:rPr lang="en-US" altLang="zh-CN" sz="1800" b="1" i="0" u="none" strike="noStrike" dirty="0">
+                          <a:solidFill>
+                            <a:srgbClr val="000000"/>
+                          </a:solidFill>
+                          <a:effectLst/>
+                          <a:latin typeface="Calibri" charset="0"/>
+                        </a:rPr>
+                        <a:t>0</a:t>
+                      </a:r>
+                    </a:p>
+                  </a:txBody>
+                  <a:tcPr marL="12700" marR="12700" marT="12700" marB="0" anchor="b">
+                    <a:lnL w="6350" cap="flat" cmpd="sng" algn="ctr">
+                      <a:solidFill>
+                        <a:srgbClr val="000000"/>
+                      </a:solidFill>
+                      <a:prstDash val="solid"/>
+                      <a:round/>
+                      <a:headEnd type="none" w="med" len="med"/>
+                      <a:tailEnd type="none" w="med" len="med"/>
+                    </a:lnL>
+                    <a:lnR w="12700" cap="flat" cmpd="sng" algn="ctr">
+                      <a:solidFill>
+                        <a:srgbClr val="000000"/>
+                      </a:solidFill>
+                      <a:prstDash val="solid"/>
+                      <a:round/>
+                      <a:headEnd type="none" w="med" len="med"/>
+                      <a:tailEnd type="none" w="med" len="med"/>
+                    </a:lnR>
+                    <a:lnT w="6350" cap="flat" cmpd="sng" algn="ctr">
+                      <a:solidFill>
+                        <a:srgbClr val="000000"/>
+                      </a:solidFill>
+                      <a:prstDash val="solid"/>
+                      <a:round/>
+                      <a:headEnd type="none" w="med" len="med"/>
+                      <a:tailEnd type="none" w="med" len="med"/>
+                    </a:lnT>
+                    <a:lnB w="12700" cap="flat" cmpd="sng" algn="ctr">
+                      <a:solidFill>
+                        <a:srgbClr val="000000"/>
+                      </a:solidFill>
+                      <a:prstDash val="solid"/>
+                      <a:round/>
+                      <a:headEnd type="none" w="med" len="med"/>
+                      <a:tailEnd type="none" w="med" len="med"/>
+                    </a:lnB>
+                  </a:tcPr>
+                </a:tc>
+              </a:tr>
+            </a:tbl>
+          </a:graphicData>
+        </a:graphic>
+      </p:graphicFrame>
+      <p:graphicFrame>
+        <p:nvGraphicFramePr>
+          <p:cNvPr id="10" name="Table 9"/>
+          <p:cNvGraphicFramePr>
+            <a:graphicFrameLocks noGrp="1"/>
+          </p:cNvGraphicFramePr>
+          <p:nvPr>
+            <p:extLst>
+              <p:ext uri="{D42A27DB-BD31-4B8C-83A1-F6EECF244321}">
+                <p14:modId xmlns:p14="http://schemas.microsoft.com/office/powerpoint/2010/main" val="1697575365"/>
+              </p:ext>
+            </p:extLst>
+          </p:nvPr>
+        </p:nvGraphicFramePr>
+        <p:xfrm>
+          <a:off x="6361956" y="5305237"/>
+          <a:ext cx="2882901" cy="927100"/>
+        </p:xfrm>
+        <a:graphic>
+          <a:graphicData uri="http://schemas.openxmlformats.org/drawingml/2006/table">
+            <a:tbl>
+              <a:tblPr/>
+              <a:tblGrid>
+                <a:gridCol w="343657"/>
+                <a:gridCol w="1269622"/>
+                <a:gridCol w="1269622"/>
+              </a:tblGrid>
+              <a:tr h="304800">
+                <a:tc>
+                  <a:txBody>
+                    <a:bodyPr/>
+                    <a:lstStyle/>
+                    <a:p>
+                      <a:pPr algn="ctr" fontAlgn="b"/>
+                      <a:r>
+                        <a:rPr lang="sk-SK" sz="1800" b="1" i="0" u="none" strike="noStrike">
+                          <a:solidFill>
+                            <a:srgbClr val="000000"/>
+                          </a:solidFill>
+                          <a:effectLst/>
+                          <a:latin typeface="Calibri" charset="0"/>
+                        </a:rPr>
+                        <a:t> </a:t>
+                      </a:r>
+                    </a:p>
+                  </a:txBody>
+                  <a:tcPr marL="12700" marR="12700" marT="12700" marB="0" anchor="b">
+                    <a:lnL w="12700" cap="flat" cmpd="sng" algn="ctr">
+                      <a:solidFill>
+                        <a:srgbClr val="000000"/>
+                      </a:solidFill>
+                      <a:prstDash val="solid"/>
+                      <a:round/>
+                      <a:headEnd type="none" w="med" len="med"/>
+                      <a:tailEnd type="none" w="med" len="med"/>
+                    </a:lnL>
+                    <a:lnR w="6350" cap="flat" cmpd="sng" algn="ctr">
+                      <a:solidFill>
+                        <a:srgbClr val="000000"/>
+                      </a:solidFill>
+                      <a:prstDash val="solid"/>
+                      <a:round/>
+                      <a:headEnd type="none" w="med" len="med"/>
+                      <a:tailEnd type="none" w="med" len="med"/>
+                    </a:lnR>
+                    <a:lnT w="12700" cap="flat" cmpd="sng" algn="ctr">
+                      <a:solidFill>
+                        <a:srgbClr val="000000"/>
+                      </a:solidFill>
+                      <a:prstDash val="solid"/>
+                      <a:round/>
+                      <a:headEnd type="none" w="med" len="med"/>
+                      <a:tailEnd type="none" w="med" len="med"/>
+                    </a:lnT>
+                    <a:lnB w="6350" cap="flat" cmpd="sng" algn="ctr">
+                      <a:solidFill>
+                        <a:srgbClr val="000000"/>
+                      </a:solidFill>
+                      <a:prstDash val="solid"/>
+                      <a:round/>
+                      <a:headEnd type="none" w="med" len="med"/>
+                      <a:tailEnd type="none" w="med" len="med"/>
+                    </a:lnB>
+                  </a:tcPr>
+                </a:tc>
+                <a:tc>
+                  <a:txBody>
+                    <a:bodyPr/>
+                    <a:lstStyle/>
+                    <a:p>
+                      <a:pPr algn="ctr" fontAlgn="b"/>
+                      <a:r>
+                        <a:rPr lang="de-DE" sz="1800" b="1" i="0" u="none" strike="noStrike">
+                          <a:solidFill>
+                            <a:srgbClr val="000000"/>
+                          </a:solidFill>
+                          <a:effectLst/>
+                          <a:latin typeface="Calibri" charset="0"/>
+                        </a:rPr>
+                        <a:t>W1 XOR W2</a:t>
+                      </a:r>
+                    </a:p>
+                  </a:txBody>
+                  <a:tcPr marL="12700" marR="12700" marT="12700" marB="0" anchor="b">
+                    <a:lnL w="6350" cap="flat" cmpd="sng" algn="ctr">
+                      <a:solidFill>
+                        <a:srgbClr val="000000"/>
+                      </a:solidFill>
+                      <a:prstDash val="solid"/>
+                      <a:round/>
+                      <a:headEnd type="none" w="med" len="med"/>
+                      <a:tailEnd type="none" w="med" len="med"/>
+                    </a:lnL>
+                    <a:lnR w="6350" cap="flat" cmpd="sng" algn="ctr">
+                      <a:solidFill>
+                        <a:srgbClr val="000000"/>
+                      </a:solidFill>
+                      <a:prstDash val="solid"/>
+                      <a:round/>
+                      <a:headEnd type="none" w="med" len="med"/>
+                      <a:tailEnd type="none" w="med" len="med"/>
+                    </a:lnR>
+                    <a:lnT w="12700" cap="flat" cmpd="sng" algn="ctr">
+                      <a:solidFill>
+                        <a:srgbClr val="000000"/>
+                      </a:solidFill>
+                      <a:prstDash val="solid"/>
+                      <a:round/>
+                      <a:headEnd type="none" w="med" len="med"/>
+                      <a:tailEnd type="none" w="med" len="med"/>
+                    </a:lnT>
+                    <a:lnB w="6350" cap="flat" cmpd="sng" algn="ctr">
+                      <a:solidFill>
+                        <a:srgbClr val="000000"/>
+                      </a:solidFill>
+                      <a:prstDash val="solid"/>
+                      <a:round/>
+                      <a:headEnd type="none" w="med" len="med"/>
+                      <a:tailEnd type="none" w="med" len="med"/>
+                    </a:lnB>
+                  </a:tcPr>
+                </a:tc>
+                <a:tc>
+                  <a:txBody>
+                    <a:bodyPr/>
+                    <a:lstStyle/>
+                    <a:p>
+                      <a:pPr algn="ctr" fontAlgn="b"/>
+                      <a:r>
+                        <a:rPr lang="de-DE" sz="1800" b="1" i="0" u="none" strike="noStrike">
+                          <a:solidFill>
+                            <a:srgbClr val="000000"/>
+                          </a:solidFill>
+                          <a:effectLst/>
+                          <a:latin typeface="Calibri" charset="0"/>
+                        </a:rPr>
+                        <a:t>W2 XOR W2</a:t>
+                      </a:r>
+                    </a:p>
+                  </a:txBody>
+                  <a:tcPr marL="12700" marR="12700" marT="12700" marB="0" anchor="b">
+                    <a:lnL w="6350" cap="flat" cmpd="sng" algn="ctr">
+                      <a:solidFill>
+                        <a:srgbClr val="000000"/>
+                      </a:solidFill>
+                      <a:prstDash val="solid"/>
+                      <a:round/>
+                      <a:headEnd type="none" w="med" len="med"/>
+                      <a:tailEnd type="none" w="med" len="med"/>
+                    </a:lnL>
+                    <a:lnR w="12700" cap="flat" cmpd="sng" algn="ctr">
+                      <a:solidFill>
+                        <a:srgbClr val="000000"/>
+                      </a:solidFill>
+                      <a:prstDash val="solid"/>
+                      <a:round/>
+                      <a:headEnd type="none" w="med" len="med"/>
+                      <a:tailEnd type="none" w="med" len="med"/>
+                    </a:lnR>
+                    <a:lnT w="12700" cap="flat" cmpd="sng" algn="ctr">
+                      <a:solidFill>
+                        <a:srgbClr val="000000"/>
+                      </a:solidFill>
+                      <a:prstDash val="solid"/>
+                      <a:round/>
+                      <a:headEnd type="none" w="med" len="med"/>
+                      <a:tailEnd type="none" w="med" len="med"/>
+                    </a:lnT>
+                    <a:lnB w="6350" cap="flat" cmpd="sng" algn="ctr">
+                      <a:solidFill>
+                        <a:srgbClr val="000000"/>
+                      </a:solidFill>
+                      <a:prstDash val="solid"/>
+                      <a:round/>
+                      <a:headEnd type="none" w="med" len="med"/>
+                      <a:tailEnd type="none" w="med" len="med"/>
+                    </a:lnB>
+                  </a:tcPr>
+                </a:tc>
+              </a:tr>
+              <a:tr h="304800">
+                <a:tc>
+                  <a:txBody>
+                    <a:bodyPr/>
+                    <a:lstStyle/>
+                    <a:p>
+                      <a:pPr algn="ctr" fontAlgn="b"/>
+                      <a:r>
+                        <a:rPr lang="en-US" altLang="zh-CN" sz="1800" b="1" i="0" u="none" strike="noStrike">
+                          <a:solidFill>
+                            <a:srgbClr val="000000"/>
+                          </a:solidFill>
+                          <a:effectLst/>
+                          <a:latin typeface="Calibri" charset="0"/>
+                        </a:rPr>
+                        <a:t>u1</a:t>
+                      </a:r>
+                    </a:p>
+                  </a:txBody>
+                  <a:tcPr marL="12700" marR="12700" marT="12700" marB="0" anchor="b">
+                    <a:lnL w="12700" cap="flat" cmpd="sng" algn="ctr">
+                      <a:solidFill>
+                        <a:srgbClr val="000000"/>
+                      </a:solidFill>
+                      <a:prstDash val="solid"/>
+                      <a:round/>
+                      <a:headEnd type="none" w="med" len="med"/>
+                      <a:tailEnd type="none" w="med" len="med"/>
+                    </a:lnL>
+                    <a:lnR w="6350" cap="flat" cmpd="sng" algn="ctr">
+                      <a:solidFill>
+                        <a:srgbClr val="000000"/>
+                      </a:solidFill>
+                      <a:prstDash val="solid"/>
+                      <a:round/>
+                      <a:headEnd type="none" w="med" len="med"/>
+                      <a:tailEnd type="none" w="med" len="med"/>
+                    </a:lnR>
+                    <a:lnT w="6350" cap="flat" cmpd="sng" algn="ctr">
+                      <a:solidFill>
+                        <a:srgbClr val="000000"/>
+                      </a:solidFill>
+                      <a:prstDash val="solid"/>
+                      <a:round/>
+                      <a:headEnd type="none" w="med" len="med"/>
+                      <a:tailEnd type="none" w="med" len="med"/>
+                    </a:lnT>
+                    <a:lnB w="6350" cap="flat" cmpd="sng" algn="ctr">
+                      <a:solidFill>
+                        <a:srgbClr val="000000"/>
+                      </a:solidFill>
+                      <a:prstDash val="solid"/>
+                      <a:round/>
+                      <a:headEnd type="none" w="med" len="med"/>
+                      <a:tailEnd type="none" w="med" len="med"/>
+                    </a:lnB>
+                  </a:tcPr>
+                </a:tc>
+                <a:tc>
+                  <a:txBody>
+                    <a:bodyPr/>
+                    <a:lstStyle/>
+                    <a:p>
+                      <a:pPr algn="ctr" fontAlgn="b"/>
+                      <a:r>
+                        <a:rPr lang="en-US" altLang="zh-CN" sz="1800" b="1" i="0" u="none" strike="noStrike">
+                          <a:solidFill>
+                            <a:srgbClr val="000000"/>
+                          </a:solidFill>
+                          <a:effectLst/>
+                          <a:latin typeface="Calibri" charset="0"/>
+                        </a:rPr>
+                        <a:t>0</a:t>
+                      </a:r>
+                    </a:p>
+                  </a:txBody>
+                  <a:tcPr marL="12700" marR="12700" marT="12700" marB="0" anchor="b">
+                    <a:lnL w="6350" cap="flat" cmpd="sng" algn="ctr">
+                      <a:solidFill>
+                        <a:srgbClr val="000000"/>
+                      </a:solidFill>
+                      <a:prstDash val="solid"/>
+                      <a:round/>
+                      <a:headEnd type="none" w="med" len="med"/>
+                      <a:tailEnd type="none" w="med" len="med"/>
+                    </a:lnL>
+                    <a:lnR w="6350" cap="flat" cmpd="sng" algn="ctr">
+                      <a:solidFill>
+                        <a:srgbClr val="000000"/>
+                      </a:solidFill>
+                      <a:prstDash val="solid"/>
+                      <a:round/>
+                      <a:headEnd type="none" w="med" len="med"/>
+                      <a:tailEnd type="none" w="med" len="med"/>
+                    </a:lnR>
+                    <a:lnT w="6350" cap="flat" cmpd="sng" algn="ctr">
+                      <a:solidFill>
+                        <a:srgbClr val="000000"/>
+                      </a:solidFill>
+                      <a:prstDash val="solid"/>
+                      <a:round/>
+                      <a:headEnd type="none" w="med" len="med"/>
+                      <a:tailEnd type="none" w="med" len="med"/>
+                    </a:lnT>
+                    <a:lnB w="6350" cap="flat" cmpd="sng" algn="ctr">
+                      <a:solidFill>
+                        <a:srgbClr val="000000"/>
+                      </a:solidFill>
+                      <a:prstDash val="solid"/>
+                      <a:round/>
+                      <a:headEnd type="none" w="med" len="med"/>
+                      <a:tailEnd type="none" w="med" len="med"/>
+                    </a:lnB>
+                  </a:tcPr>
+                </a:tc>
+                <a:tc>
+                  <a:txBody>
+                    <a:bodyPr/>
+                    <a:lstStyle/>
+                    <a:p>
+                      <a:pPr algn="ctr" fontAlgn="b"/>
+                      <a:r>
+                        <a:rPr lang="en-US" altLang="zh-CN" sz="1800" b="1" i="0" u="none" strike="noStrike">
+                          <a:solidFill>
+                            <a:srgbClr val="000000"/>
+                          </a:solidFill>
+                          <a:effectLst/>
+                          <a:latin typeface="Calibri" charset="0"/>
+                        </a:rPr>
+                        <a:t>0</a:t>
+                      </a:r>
+                    </a:p>
+                  </a:txBody>
+                  <a:tcPr marL="12700" marR="12700" marT="12700" marB="0" anchor="b">
+                    <a:lnL w="6350" cap="flat" cmpd="sng" algn="ctr">
+                      <a:solidFill>
+                        <a:srgbClr val="000000"/>
+                      </a:solidFill>
+                      <a:prstDash val="solid"/>
+                      <a:round/>
+                      <a:headEnd type="none" w="med" len="med"/>
+                      <a:tailEnd type="none" w="med" len="med"/>
+                    </a:lnL>
+                    <a:lnR w="12700" cap="flat" cmpd="sng" algn="ctr">
+                      <a:solidFill>
+                        <a:srgbClr val="000000"/>
+                      </a:solidFill>
+                      <a:prstDash val="solid"/>
+                      <a:round/>
+                      <a:headEnd type="none" w="med" len="med"/>
+                      <a:tailEnd type="none" w="med" len="med"/>
+                    </a:lnR>
+                    <a:lnT w="6350" cap="flat" cmpd="sng" algn="ctr">
+                      <a:solidFill>
+                        <a:srgbClr val="000000"/>
+                      </a:solidFill>
+                      <a:prstDash val="solid"/>
+                      <a:round/>
+                      <a:headEnd type="none" w="med" len="med"/>
+                      <a:tailEnd type="none" w="med" len="med"/>
+                    </a:lnT>
+                    <a:lnB w="6350" cap="flat" cmpd="sng" algn="ctr">
+                      <a:solidFill>
+                        <a:srgbClr val="000000"/>
+                      </a:solidFill>
+                      <a:prstDash val="solid"/>
+                      <a:round/>
+                      <a:headEnd type="none" w="med" len="med"/>
+                      <a:tailEnd type="none" w="med" len="med"/>
+                    </a:lnB>
+                  </a:tcPr>
+                </a:tc>
+              </a:tr>
+              <a:tr h="317500">
+                <a:tc>
+                  <a:txBody>
+                    <a:bodyPr/>
+                    <a:lstStyle/>
+                    <a:p>
+                      <a:pPr algn="ctr" fontAlgn="b"/>
+                      <a:r>
+                        <a:rPr lang="is-IS" sz="1800" b="1" i="0" u="none" strike="noStrike" dirty="0">
+                          <a:solidFill>
+                            <a:srgbClr val="000000"/>
+                          </a:solidFill>
+                          <a:effectLst/>
+                          <a:latin typeface="Calibri" charset="0"/>
+                        </a:rPr>
+                        <a:t>u2</a:t>
+                      </a:r>
+                    </a:p>
+                  </a:txBody>
+                  <a:tcPr marL="12700" marR="12700" marT="12700" marB="0" anchor="b">
+                    <a:lnL w="12700" cap="flat" cmpd="sng" algn="ctr">
+                      <a:solidFill>
+                        <a:srgbClr val="000000"/>
+                      </a:solidFill>
+                      <a:prstDash val="solid"/>
+                      <a:round/>
+                      <a:headEnd type="none" w="med" len="med"/>
+                      <a:tailEnd type="none" w="med" len="med"/>
+                    </a:lnL>
+                    <a:lnR w="6350" cap="flat" cmpd="sng" algn="ctr">
+                      <a:solidFill>
+                        <a:srgbClr val="000000"/>
+                      </a:solidFill>
+                      <a:prstDash val="solid"/>
+                      <a:round/>
+                      <a:headEnd type="none" w="med" len="med"/>
+                      <a:tailEnd type="none" w="med" len="med"/>
+                    </a:lnR>
+                    <a:lnT w="6350" cap="flat" cmpd="sng" algn="ctr">
+                      <a:solidFill>
+                        <a:srgbClr val="000000"/>
+                      </a:solidFill>
+                      <a:prstDash val="solid"/>
+                      <a:round/>
+                      <a:headEnd type="none" w="med" len="med"/>
+                      <a:tailEnd type="none" w="med" len="med"/>
+                    </a:lnT>
+                    <a:lnB w="12700" cap="flat" cmpd="sng" algn="ctr">
+                      <a:solidFill>
+                        <a:srgbClr val="000000"/>
+                      </a:solidFill>
+                      <a:prstDash val="solid"/>
+                      <a:round/>
+                      <a:headEnd type="none" w="med" len="med"/>
+                      <a:tailEnd type="none" w="med" len="med"/>
+                    </a:lnB>
+                  </a:tcPr>
+                </a:tc>
+                <a:tc>
+                  <a:txBody>
+                    <a:bodyPr/>
+                    <a:lstStyle/>
+                    <a:p>
+                      <a:pPr algn="ctr" fontAlgn="b"/>
+                      <a:r>
+                        <a:rPr lang="en-US" altLang="zh-CN" sz="1800" b="1" i="0" u="none" strike="noStrike" dirty="0" smtClean="0">
+                          <a:solidFill>
+                            <a:srgbClr val="000000"/>
+                          </a:solidFill>
+                          <a:effectLst/>
+                          <a:latin typeface="Calibri" charset="0"/>
+                        </a:rPr>
+                        <a:t>1</a:t>
+                      </a:r>
+                      <a:endParaRPr lang="en-US" altLang="zh-CN" sz="1800" b="1" i="0" u="none" strike="noStrike" dirty="0">
+                        <a:solidFill>
+                          <a:srgbClr val="000000"/>
+                        </a:solidFill>
+                        <a:effectLst/>
+                        <a:latin typeface="Calibri" charset="0"/>
+                      </a:endParaRPr>
+                    </a:p>
+                  </a:txBody>
+                  <a:tcPr marL="12700" marR="12700" marT="12700" marB="0" anchor="b">
+                    <a:lnL w="6350" cap="flat" cmpd="sng" algn="ctr">
+                      <a:solidFill>
+                        <a:srgbClr val="000000"/>
+                      </a:solidFill>
+                      <a:prstDash val="solid"/>
+                      <a:round/>
+                      <a:headEnd type="none" w="med" len="med"/>
+                      <a:tailEnd type="none" w="med" len="med"/>
+                    </a:lnL>
+                    <a:lnR w="6350" cap="flat" cmpd="sng" algn="ctr">
+                      <a:solidFill>
+                        <a:srgbClr val="000000"/>
+                      </a:solidFill>
+                      <a:prstDash val="solid"/>
+                      <a:round/>
+                      <a:headEnd type="none" w="med" len="med"/>
+                      <a:tailEnd type="none" w="med" len="med"/>
+                    </a:lnR>
+                    <a:lnT w="6350" cap="flat" cmpd="sng" algn="ctr">
+                      <a:solidFill>
+                        <a:srgbClr val="000000"/>
+                      </a:solidFill>
+                      <a:prstDash val="solid"/>
+                      <a:round/>
+                      <a:headEnd type="none" w="med" len="med"/>
+                      <a:tailEnd type="none" w="med" len="med"/>
+                    </a:lnT>
+                    <a:lnB w="12700" cap="flat" cmpd="sng" algn="ctr">
+                      <a:solidFill>
+                        <a:srgbClr val="000000"/>
+                      </a:solidFill>
+                      <a:prstDash val="solid"/>
+                      <a:round/>
+                      <a:headEnd type="none" w="med" len="med"/>
+                      <a:tailEnd type="none" w="med" len="med"/>
+                    </a:lnB>
+                  </a:tcPr>
+                </a:tc>
+                <a:tc>
+                  <a:txBody>
+                    <a:bodyPr/>
+                    <a:lstStyle/>
+                    <a:p>
+                      <a:pPr algn="ctr" fontAlgn="b"/>
+                      <a:r>
+                        <a:rPr lang="en-US" altLang="zh-CN" sz="1800" b="1" i="0" u="none" strike="noStrike" dirty="0">
+                          <a:solidFill>
+                            <a:srgbClr val="000000"/>
+                          </a:solidFill>
+                          <a:effectLst/>
+                          <a:latin typeface="Calibri" charset="0"/>
+                        </a:rPr>
+                        <a:t>0</a:t>
+                      </a:r>
+                    </a:p>
+                  </a:txBody>
+                  <a:tcPr marL="12700" marR="12700" marT="12700" marB="0" anchor="b">
+                    <a:lnL w="6350" cap="flat" cmpd="sng" algn="ctr">
+                      <a:solidFill>
+                        <a:srgbClr val="000000"/>
+                      </a:solidFill>
+                      <a:prstDash val="solid"/>
+                      <a:round/>
+                      <a:headEnd type="none" w="med" len="med"/>
+                      <a:tailEnd type="none" w="med" len="med"/>
+                    </a:lnL>
+                    <a:lnR w="12700" cap="flat" cmpd="sng" algn="ctr">
+                      <a:solidFill>
+                        <a:srgbClr val="000000"/>
+                      </a:solidFill>
+                      <a:prstDash val="solid"/>
+                      <a:round/>
+                      <a:headEnd type="none" w="med" len="med"/>
+                      <a:tailEnd type="none" w="med" len="med"/>
+                    </a:lnR>
+                    <a:lnT w="6350" cap="flat" cmpd="sng" algn="ctr">
+                      <a:solidFill>
+                        <a:srgbClr val="000000"/>
+                      </a:solidFill>
+                      <a:prstDash val="solid"/>
+                      <a:round/>
+                      <a:headEnd type="none" w="med" len="med"/>
+                      <a:tailEnd type="none" w="med" len="med"/>
+                    </a:lnT>
+                    <a:lnB w="12700" cap="flat" cmpd="sng" algn="ctr">
+                      <a:solidFill>
+                        <a:srgbClr val="000000"/>
+                      </a:solidFill>
+                      <a:prstDash val="solid"/>
+                      <a:round/>
+                      <a:headEnd type="none" w="med" len="med"/>
+                      <a:tailEnd type="none" w="med" len="med"/>
+                    </a:lnB>
+                  </a:tcPr>
+                </a:tc>
+              </a:tr>
+            </a:tbl>
+          </a:graphicData>
+        </a:graphic>
+      </p:graphicFrame>
+      <p:sp>
+        <p:nvSpPr>
+          <p:cNvPr id="11" name="Parallelogram 10"/>
+          <p:cNvSpPr/>
+          <p:nvPr/>
+        </p:nvSpPr>
+        <p:spPr>
+          <a:xfrm>
+            <a:off x="3040906" y="4686673"/>
+            <a:ext cx="1496734" cy="927100"/>
+          </a:xfrm>
+          <a:prstGeom prst="parallelogram">
+            <a:avLst/>
+          </a:prstGeom>
+          <a:solidFill>
+            <a:schemeClr val="bg1"/>
+          </a:solidFill>
+          <a:ln w="25400">
+            <a:solidFill>
+              <a:schemeClr val="tx1"/>
+            </a:solidFill>
+          </a:ln>
+        </p:spPr>
+        <p:style>
+          <a:lnRef idx="2">
+            <a:schemeClr val="accent1">
+              <a:shade val="50000"/>
+            </a:schemeClr>
+          </a:lnRef>
+          <a:fillRef idx="1">
+            <a:schemeClr val="accent1"/>
+          </a:fillRef>
+          <a:effectRef idx="0">
+            <a:schemeClr val="accent1"/>
+          </a:effectRef>
+          <a:fontRef idx="minor">
+            <a:schemeClr val="lt1"/>
+          </a:fontRef>
+        </p:style>
+        <p:txBody>
+          <a:bodyPr rtlCol="0" anchor="ctr"/>
+          <a:lstStyle/>
+          <a:p>
+            <a:pPr algn="ctr"/>
+            <a:endParaRPr kumimoji="1" lang="zh-CN" altLang="en-US" sz="2800" dirty="0" smtClean="0">
+              <a:solidFill>
+                <a:schemeClr val="tx1"/>
+              </a:solidFill>
+            </a:endParaRPr>
+          </a:p>
+        </p:txBody>
+      </p:sp>
+      <p:sp>
+        <p:nvSpPr>
+          <p:cNvPr id="12" name="Parallelogram 11"/>
+          <p:cNvSpPr/>
+          <p:nvPr/>
+        </p:nvSpPr>
+        <p:spPr>
+          <a:xfrm>
+            <a:off x="3040906" y="4166533"/>
+            <a:ext cx="1496734" cy="927100"/>
+          </a:xfrm>
+          <a:prstGeom prst="parallelogram">
+            <a:avLst/>
+          </a:prstGeom>
+          <a:solidFill>
+            <a:schemeClr val="bg1"/>
+          </a:solidFill>
+          <a:ln w="25400">
+            <a:solidFill>
+              <a:schemeClr val="tx1"/>
+            </a:solidFill>
+          </a:ln>
+        </p:spPr>
+        <p:style>
+          <a:lnRef idx="2">
+            <a:schemeClr val="accent1">
+              <a:shade val="50000"/>
+            </a:schemeClr>
+          </a:lnRef>
+          <a:fillRef idx="1">
+            <a:schemeClr val="accent1"/>
+          </a:fillRef>
+          <a:effectRef idx="0">
+            <a:schemeClr val="accent1"/>
+          </a:effectRef>
+          <a:fontRef idx="minor">
+            <a:schemeClr val="lt1"/>
+          </a:fontRef>
+        </p:style>
+        <p:txBody>
+          <a:bodyPr rtlCol="0" anchor="ctr"/>
+          <a:lstStyle/>
+          <a:p>
+            <a:pPr algn="ctr"/>
+            <a:endParaRPr kumimoji="1" lang="zh-CN" altLang="en-US" sz="2800" dirty="0" smtClean="0">
+              <a:solidFill>
+                <a:schemeClr val="tx1"/>
+              </a:solidFill>
+            </a:endParaRPr>
+          </a:p>
+        </p:txBody>
+      </p:sp>
+      <p:sp>
+        <p:nvSpPr>
+          <p:cNvPr id="13" name="Parallelogram 12"/>
+          <p:cNvSpPr/>
+          <p:nvPr/>
+        </p:nvSpPr>
+        <p:spPr>
+          <a:xfrm>
+            <a:off x="3031569" y="3646394"/>
+            <a:ext cx="1496734" cy="927100"/>
+          </a:xfrm>
+          <a:prstGeom prst="parallelogram">
+            <a:avLst/>
+          </a:prstGeom>
+          <a:solidFill>
+            <a:schemeClr val="bg1"/>
+          </a:solidFill>
+          <a:ln w="25400">
+            <a:solidFill>
+              <a:schemeClr val="tx1"/>
+            </a:solidFill>
+          </a:ln>
+        </p:spPr>
+        <p:style>
+          <a:lnRef idx="2">
+            <a:schemeClr val="accent1">
+              <a:shade val="50000"/>
+            </a:schemeClr>
+          </a:lnRef>
+          <a:fillRef idx="1">
+            <a:schemeClr val="accent1"/>
+          </a:fillRef>
+          <a:effectRef idx="0">
+            <a:schemeClr val="accent1"/>
+          </a:effectRef>
+          <a:fontRef idx="minor">
+            <a:schemeClr val="lt1"/>
+          </a:fontRef>
+        </p:style>
+        <p:txBody>
+          <a:bodyPr rtlCol="0" anchor="ctr"/>
+          <a:lstStyle/>
+          <a:p>
+            <a:pPr algn="ctr"/>
+            <a:endParaRPr kumimoji="1" lang="zh-CN" altLang="en-US" sz="2800" dirty="0" smtClean="0">
+              <a:solidFill>
+                <a:schemeClr val="tx1"/>
+              </a:solidFill>
+            </a:endParaRPr>
+          </a:p>
+        </p:txBody>
+      </p:sp>
+      <p:cxnSp>
+        <p:nvCxnSpPr>
+          <p:cNvPr id="15" name="Straight Connector 14"/>
+          <p:cNvCxnSpPr/>
+          <p:nvPr/>
+        </p:nvCxnSpPr>
+        <p:spPr>
+          <a:xfrm flipH="1">
+            <a:off x="4537640" y="2606115"/>
+            <a:ext cx="1359645" cy="1040279"/>
+          </a:xfrm>
+          <a:prstGeom prst="line">
+            <a:avLst/>
+          </a:prstGeom>
+          <a:ln w="25400">
+            <a:solidFill>
+              <a:schemeClr val="tx1"/>
+            </a:solidFill>
+          </a:ln>
+        </p:spPr>
+        <p:style>
+          <a:lnRef idx="1">
+            <a:schemeClr val="accent1"/>
+          </a:lnRef>
+          <a:fillRef idx="0">
+            <a:schemeClr val="accent1"/>
+          </a:fillRef>
+          <a:effectRef idx="0">
+            <a:schemeClr val="accent1"/>
+          </a:effectRef>
+          <a:fontRef idx="minor">
+            <a:schemeClr val="tx1"/>
+          </a:fontRef>
+        </p:style>
+      </p:cxnSp>
+      <p:cxnSp>
+        <p:nvCxnSpPr>
+          <p:cNvPr id="17" name="Straight Connector 16"/>
+          <p:cNvCxnSpPr/>
+          <p:nvPr/>
+        </p:nvCxnSpPr>
+        <p:spPr>
+          <a:xfrm flipH="1">
+            <a:off x="4537641" y="4058771"/>
+            <a:ext cx="1350307" cy="107762"/>
+          </a:xfrm>
+          <a:prstGeom prst="line">
+            <a:avLst/>
+          </a:prstGeom>
+          <a:ln w="25400">
+            <a:solidFill>
+              <a:schemeClr val="tx1"/>
+            </a:solidFill>
+          </a:ln>
+        </p:spPr>
+        <p:style>
+          <a:lnRef idx="1">
+            <a:schemeClr val="accent1"/>
+          </a:lnRef>
+          <a:fillRef idx="0">
+            <a:schemeClr val="accent1"/>
+          </a:fillRef>
+          <a:effectRef idx="0">
+            <a:schemeClr val="accent1"/>
+          </a:effectRef>
+          <a:fontRef idx="minor">
+            <a:schemeClr val="tx1"/>
+          </a:fontRef>
+        </p:style>
+      </p:cxnSp>
+      <p:cxnSp>
+        <p:nvCxnSpPr>
+          <p:cNvPr id="19" name="Straight Connector 18"/>
+          <p:cNvCxnSpPr/>
+          <p:nvPr/>
+        </p:nvCxnSpPr>
+        <p:spPr>
+          <a:xfrm flipH="1" flipV="1">
+            <a:off x="4546977" y="4686673"/>
+            <a:ext cx="1814979" cy="618564"/>
+          </a:xfrm>
+          <a:prstGeom prst="line">
+            <a:avLst/>
+          </a:prstGeom>
+          <a:ln w="25400">
+            <a:solidFill>
+              <a:schemeClr val="tx1"/>
+            </a:solidFill>
+          </a:ln>
+        </p:spPr>
+        <p:style>
+          <a:lnRef idx="1">
+            <a:schemeClr val="accent1"/>
+          </a:lnRef>
+          <a:fillRef idx="0">
+            <a:schemeClr val="accent1"/>
+          </a:fillRef>
+          <a:effectRef idx="0">
+            <a:schemeClr val="accent1"/>
+          </a:effectRef>
+          <a:fontRef idx="minor">
+            <a:schemeClr val="tx1"/>
+          </a:fontRef>
+        </p:style>
+      </p:cxnSp>
+      <p:cxnSp>
+        <p:nvCxnSpPr>
+          <p:cNvPr id="21" name="Straight Connector 20"/>
+          <p:cNvCxnSpPr/>
+          <p:nvPr/>
+        </p:nvCxnSpPr>
+        <p:spPr>
+          <a:xfrm flipH="1" flipV="1">
+            <a:off x="4304932" y="5613774"/>
+            <a:ext cx="2057024" cy="618563"/>
+          </a:xfrm>
+          <a:prstGeom prst="line">
+            <a:avLst/>
+          </a:prstGeom>
+          <a:ln w="25400">
+            <a:solidFill>
+              <a:schemeClr val="tx1"/>
+            </a:solidFill>
+          </a:ln>
+        </p:spPr>
+        <p:style>
+          <a:lnRef idx="1">
+            <a:schemeClr val="accent1"/>
+          </a:lnRef>
+          <a:fillRef idx="0">
+            <a:schemeClr val="accent1"/>
+          </a:fillRef>
+          <a:effectRef idx="0">
+            <a:schemeClr val="accent1"/>
+          </a:effectRef>
+          <a:fontRef idx="minor">
+            <a:schemeClr val="tx1"/>
+          </a:fontRef>
+        </p:style>
+      </p:cxnSp>
+      <p:cxnSp>
+        <p:nvCxnSpPr>
+          <p:cNvPr id="23" name="Straight Connector 22"/>
+          <p:cNvCxnSpPr/>
+          <p:nvPr/>
+        </p:nvCxnSpPr>
+        <p:spPr>
+          <a:xfrm flipH="1">
+            <a:off x="4304931" y="4976624"/>
+            <a:ext cx="1601691" cy="117009"/>
+          </a:xfrm>
+          <a:prstGeom prst="line">
+            <a:avLst/>
+          </a:prstGeom>
+          <a:ln w="25400">
+            <a:solidFill>
+              <a:schemeClr val="tx1"/>
+            </a:solidFill>
+          </a:ln>
+        </p:spPr>
+        <p:style>
+          <a:lnRef idx="1">
+            <a:schemeClr val="accent1"/>
+          </a:lnRef>
+          <a:fillRef idx="0">
+            <a:schemeClr val="accent1"/>
+          </a:fillRef>
+          <a:effectRef idx="0">
+            <a:schemeClr val="accent1"/>
+          </a:effectRef>
+          <a:fontRef idx="minor">
+            <a:schemeClr val="tx1"/>
+          </a:fontRef>
+        </p:style>
+      </p:cxnSp>
+      <p:cxnSp>
+        <p:nvCxnSpPr>
+          <p:cNvPr id="25" name="Straight Connector 24"/>
+          <p:cNvCxnSpPr/>
+          <p:nvPr/>
+        </p:nvCxnSpPr>
+        <p:spPr>
+          <a:xfrm flipH="1">
+            <a:off x="4304930" y="3533215"/>
+            <a:ext cx="1592355" cy="1040279"/>
+          </a:xfrm>
+          <a:prstGeom prst="line">
+            <a:avLst/>
+          </a:prstGeom>
+          <a:ln w="25400">
+            <a:solidFill>
+              <a:schemeClr val="tx1"/>
+            </a:solidFill>
+          </a:ln>
+        </p:spPr>
+        <p:style>
+          <a:lnRef idx="1">
+            <a:schemeClr val="accent1"/>
+          </a:lnRef>
+          <a:fillRef idx="0">
+            <a:schemeClr val="accent1"/>
+          </a:fillRef>
+          <a:effectRef idx="0">
+            <a:schemeClr val="accent1"/>
+          </a:effectRef>
+          <a:fontRef idx="minor">
+            <a:schemeClr val="tx1"/>
+          </a:fontRef>
+        </p:style>
+      </p:cxnSp>
     </p:spTree>
     <p:extLst>
       <p:ext uri="{BB962C8B-B14F-4D97-AF65-F5344CB8AC3E}">

</xml_diff>

<commit_message>
symmetric channel model for fake request
</commit_message>
<xml_diff>
--- a/figures.pptx
+++ b/figures.pptx
@@ -11,6 +11,7 @@
     <p:sldId id="259" r:id="rId5"/>
     <p:sldId id="260" r:id="rId6"/>
     <p:sldId id="261" r:id="rId7"/>
+    <p:sldId id="262" r:id="rId8"/>
   </p:sldIdLst>
   <p:sldSz cx="12192000" cy="6858000"/>
   <p:notesSz cx="6858000" cy="9144000"/>
@@ -124,6 +125,7 @@
           <p14:sldIdLst>
             <p14:sldId id="260"/>
             <p14:sldId id="261"/>
+            <p14:sldId id="262"/>
           </p14:sldIdLst>
         </p14:section>
       </p14:sectionLst>
@@ -266,7 +268,7 @@
           <a:p>
             <a:fld id="{5386D14C-7C63-454A-9FEB-090854700008}" type="datetimeFigureOut">
               <a:rPr kumimoji="1" lang="zh-CN" altLang="en-US" smtClean="0"/>
-              <a:t>2017/11/2</a:t>
+              <a:t>2017/11/9</a:t>
             </a:fld>
             <a:endParaRPr kumimoji="1" lang="zh-CN" altLang="en-US"/>
           </a:p>
@@ -436,7 +438,7 @@
           <a:p>
             <a:fld id="{5386D14C-7C63-454A-9FEB-090854700008}" type="datetimeFigureOut">
               <a:rPr kumimoji="1" lang="zh-CN" altLang="en-US" smtClean="0"/>
-              <a:t>2017/11/2</a:t>
+              <a:t>2017/11/9</a:t>
             </a:fld>
             <a:endParaRPr kumimoji="1" lang="zh-CN" altLang="en-US"/>
           </a:p>
@@ -616,7 +618,7 @@
           <a:p>
             <a:fld id="{5386D14C-7C63-454A-9FEB-090854700008}" type="datetimeFigureOut">
               <a:rPr kumimoji="1" lang="zh-CN" altLang="en-US" smtClean="0"/>
-              <a:t>2017/11/2</a:t>
+              <a:t>2017/11/9</a:t>
             </a:fld>
             <a:endParaRPr kumimoji="1" lang="zh-CN" altLang="en-US"/>
           </a:p>
@@ -786,7 +788,7 @@
           <a:p>
             <a:fld id="{5386D14C-7C63-454A-9FEB-090854700008}" type="datetimeFigureOut">
               <a:rPr kumimoji="1" lang="zh-CN" altLang="en-US" smtClean="0"/>
-              <a:t>2017/11/2</a:t>
+              <a:t>2017/11/9</a:t>
             </a:fld>
             <a:endParaRPr kumimoji="1" lang="zh-CN" altLang="en-US"/>
           </a:p>
@@ -1032,7 +1034,7 @@
           <a:p>
             <a:fld id="{5386D14C-7C63-454A-9FEB-090854700008}" type="datetimeFigureOut">
               <a:rPr kumimoji="1" lang="zh-CN" altLang="en-US" smtClean="0"/>
-              <a:t>2017/11/2</a:t>
+              <a:t>2017/11/9</a:t>
             </a:fld>
             <a:endParaRPr kumimoji="1" lang="zh-CN" altLang="en-US"/>
           </a:p>
@@ -1264,7 +1266,7 @@
           <a:p>
             <a:fld id="{5386D14C-7C63-454A-9FEB-090854700008}" type="datetimeFigureOut">
               <a:rPr kumimoji="1" lang="zh-CN" altLang="en-US" smtClean="0"/>
-              <a:t>2017/11/2</a:t>
+              <a:t>2017/11/9</a:t>
             </a:fld>
             <a:endParaRPr kumimoji="1" lang="zh-CN" altLang="en-US"/>
           </a:p>
@@ -1631,7 +1633,7 @@
           <a:p>
             <a:fld id="{5386D14C-7C63-454A-9FEB-090854700008}" type="datetimeFigureOut">
               <a:rPr kumimoji="1" lang="zh-CN" altLang="en-US" smtClean="0"/>
-              <a:t>2017/11/2</a:t>
+              <a:t>2017/11/9</a:t>
             </a:fld>
             <a:endParaRPr kumimoji="1" lang="zh-CN" altLang="en-US"/>
           </a:p>
@@ -1749,7 +1751,7 @@
           <a:p>
             <a:fld id="{5386D14C-7C63-454A-9FEB-090854700008}" type="datetimeFigureOut">
               <a:rPr kumimoji="1" lang="zh-CN" altLang="en-US" smtClean="0"/>
-              <a:t>2017/11/2</a:t>
+              <a:t>2017/11/9</a:t>
             </a:fld>
             <a:endParaRPr kumimoji="1" lang="zh-CN" altLang="en-US"/>
           </a:p>
@@ -1844,7 +1846,7 @@
           <a:p>
             <a:fld id="{5386D14C-7C63-454A-9FEB-090854700008}" type="datetimeFigureOut">
               <a:rPr kumimoji="1" lang="zh-CN" altLang="en-US" smtClean="0"/>
-              <a:t>2017/11/2</a:t>
+              <a:t>2017/11/9</a:t>
             </a:fld>
             <a:endParaRPr kumimoji="1" lang="zh-CN" altLang="en-US"/>
           </a:p>
@@ -2121,7 +2123,7 @@
           <a:p>
             <a:fld id="{5386D14C-7C63-454A-9FEB-090854700008}" type="datetimeFigureOut">
               <a:rPr kumimoji="1" lang="zh-CN" altLang="en-US" smtClean="0"/>
-              <a:t>2017/11/2</a:t>
+              <a:t>2017/11/9</a:t>
             </a:fld>
             <a:endParaRPr kumimoji="1" lang="zh-CN" altLang="en-US"/>
           </a:p>
@@ -2374,7 +2376,7 @@
           <a:p>
             <a:fld id="{5386D14C-7C63-454A-9FEB-090854700008}" type="datetimeFigureOut">
               <a:rPr kumimoji="1" lang="zh-CN" altLang="en-US" smtClean="0"/>
-              <a:t>2017/11/2</a:t>
+              <a:t>2017/11/9</a:t>
             </a:fld>
             <a:endParaRPr kumimoji="1" lang="zh-CN" altLang="en-US"/>
           </a:p>
@@ -2587,7 +2589,7 @@
           <a:p>
             <a:fld id="{5386D14C-7C63-454A-9FEB-090854700008}" type="datetimeFigureOut">
               <a:rPr kumimoji="1" lang="zh-CN" altLang="en-US" smtClean="0"/>
-              <a:t>2017/11/2</a:t>
+              <a:t>2017/11/9</a:t>
             </a:fld>
             <a:endParaRPr kumimoji="1" lang="zh-CN" altLang="en-US"/>
           </a:p>
@@ -17342,6 +17344,1002 @@
 </p:sld>
 </file>
 
+<file path=ppt/slides/slide7.xml><?xml version="1.0" encoding="utf-8"?>
+<p:sld xmlns:a="http://schemas.openxmlformats.org/drawingml/2006/main" xmlns:r="http://schemas.openxmlformats.org/officeDocument/2006/relationships" xmlns:p="http://schemas.openxmlformats.org/presentationml/2006/main">
+  <p:cSld>
+    <p:spTree>
+      <p:nvGrpSpPr>
+        <p:cNvPr id="1" name=""/>
+        <p:cNvGrpSpPr/>
+        <p:nvPr/>
+      </p:nvGrpSpPr>
+      <p:grpSpPr>
+        <a:xfrm>
+          <a:off x="0" y="0"/>
+          <a:ext cx="0" cy="0"/>
+          <a:chOff x="0" y="0"/>
+          <a:chExt cx="0" cy="0"/>
+        </a:xfrm>
+      </p:grpSpPr>
+      <p:grpSp>
+        <p:nvGrpSpPr>
+          <p:cNvPr id="4" name="Group 3"/>
+          <p:cNvGrpSpPr/>
+          <p:nvPr/>
+        </p:nvGrpSpPr>
+        <p:grpSpPr>
+          <a:xfrm>
+            <a:off x="2963112" y="884289"/>
+            <a:ext cx="2934614" cy="2248117"/>
+            <a:chOff x="2963112" y="884289"/>
+            <a:chExt cx="2934614" cy="2248117"/>
+          </a:xfrm>
+        </p:grpSpPr>
+        <p:sp>
+          <p:nvSpPr>
+            <p:cNvPr id="5" name="Oval 4"/>
+            <p:cNvSpPr/>
+            <p:nvPr/>
+          </p:nvSpPr>
+          <p:spPr>
+            <a:xfrm>
+              <a:off x="3090203" y="1301262"/>
+              <a:ext cx="73152" cy="70338"/>
+            </a:xfrm>
+            <a:prstGeom prst="ellipse">
+              <a:avLst/>
+            </a:prstGeom>
+            <a:solidFill>
+              <a:schemeClr val="tx1"/>
+            </a:solidFill>
+            <a:ln>
+              <a:noFill/>
+            </a:ln>
+          </p:spPr>
+          <p:style>
+            <a:lnRef idx="2">
+              <a:schemeClr val="accent1">
+                <a:shade val="50000"/>
+              </a:schemeClr>
+            </a:lnRef>
+            <a:fillRef idx="1">
+              <a:schemeClr val="accent1"/>
+            </a:fillRef>
+            <a:effectRef idx="0">
+              <a:schemeClr val="accent1"/>
+            </a:effectRef>
+            <a:fontRef idx="minor">
+              <a:schemeClr val="lt1"/>
+            </a:fontRef>
+          </p:style>
+          <p:txBody>
+            <a:bodyPr rtlCol="0" anchor="ctr"/>
+            <a:lstStyle/>
+            <a:p>
+              <a:pPr algn="ctr"/>
+              <a:endParaRPr kumimoji="1" lang="zh-CN" altLang="en-US"/>
+            </a:p>
+          </p:txBody>
+        </p:sp>
+        <p:sp>
+          <p:nvSpPr>
+            <p:cNvPr id="6" name="Oval 5"/>
+            <p:cNvSpPr/>
+            <p:nvPr/>
+          </p:nvSpPr>
+          <p:spPr>
+            <a:xfrm>
+              <a:off x="3090203" y="1653423"/>
+              <a:ext cx="73152" cy="70338"/>
+            </a:xfrm>
+            <a:prstGeom prst="ellipse">
+              <a:avLst/>
+            </a:prstGeom>
+            <a:solidFill>
+              <a:schemeClr val="tx1"/>
+            </a:solidFill>
+            <a:ln>
+              <a:noFill/>
+            </a:ln>
+          </p:spPr>
+          <p:style>
+            <a:lnRef idx="2">
+              <a:schemeClr val="accent1">
+                <a:shade val="50000"/>
+              </a:schemeClr>
+            </a:lnRef>
+            <a:fillRef idx="1">
+              <a:schemeClr val="accent1"/>
+            </a:fillRef>
+            <a:effectRef idx="0">
+              <a:schemeClr val="accent1"/>
+            </a:effectRef>
+            <a:fontRef idx="minor">
+              <a:schemeClr val="lt1"/>
+            </a:fontRef>
+          </p:style>
+          <p:txBody>
+            <a:bodyPr rtlCol="0" anchor="ctr"/>
+            <a:lstStyle/>
+            <a:p>
+              <a:pPr algn="ctr"/>
+              <a:endParaRPr kumimoji="1" lang="zh-CN" altLang="en-US"/>
+            </a:p>
+          </p:txBody>
+        </p:sp>
+        <p:sp>
+          <p:nvSpPr>
+            <p:cNvPr id="7" name="Oval 6"/>
+            <p:cNvSpPr/>
+            <p:nvPr/>
+          </p:nvSpPr>
+          <p:spPr>
+            <a:xfrm>
+              <a:off x="3090203" y="2005584"/>
+              <a:ext cx="73152" cy="70338"/>
+            </a:xfrm>
+            <a:prstGeom prst="ellipse">
+              <a:avLst/>
+            </a:prstGeom>
+            <a:solidFill>
+              <a:schemeClr val="tx1"/>
+            </a:solidFill>
+            <a:ln>
+              <a:noFill/>
+            </a:ln>
+          </p:spPr>
+          <p:style>
+            <a:lnRef idx="2">
+              <a:schemeClr val="accent1">
+                <a:shade val="50000"/>
+              </a:schemeClr>
+            </a:lnRef>
+            <a:fillRef idx="1">
+              <a:schemeClr val="accent1"/>
+            </a:fillRef>
+            <a:effectRef idx="0">
+              <a:schemeClr val="accent1"/>
+            </a:effectRef>
+            <a:fontRef idx="minor">
+              <a:schemeClr val="lt1"/>
+            </a:fontRef>
+          </p:style>
+          <p:txBody>
+            <a:bodyPr rtlCol="0" anchor="ctr"/>
+            <a:lstStyle/>
+            <a:p>
+              <a:pPr algn="ctr"/>
+              <a:endParaRPr kumimoji="1" lang="zh-CN" altLang="en-US"/>
+            </a:p>
+          </p:txBody>
+        </p:sp>
+        <p:sp>
+          <p:nvSpPr>
+            <p:cNvPr id="8" name="Oval 7"/>
+            <p:cNvSpPr/>
+            <p:nvPr/>
+          </p:nvSpPr>
+          <p:spPr>
+            <a:xfrm>
+              <a:off x="3090203" y="2357745"/>
+              <a:ext cx="73152" cy="70338"/>
+            </a:xfrm>
+            <a:prstGeom prst="ellipse">
+              <a:avLst/>
+            </a:prstGeom>
+            <a:solidFill>
+              <a:schemeClr val="tx1"/>
+            </a:solidFill>
+            <a:ln>
+              <a:noFill/>
+            </a:ln>
+          </p:spPr>
+          <p:style>
+            <a:lnRef idx="2">
+              <a:schemeClr val="accent1">
+                <a:shade val="50000"/>
+              </a:schemeClr>
+            </a:lnRef>
+            <a:fillRef idx="1">
+              <a:schemeClr val="accent1"/>
+            </a:fillRef>
+            <a:effectRef idx="0">
+              <a:schemeClr val="accent1"/>
+            </a:effectRef>
+            <a:fontRef idx="minor">
+              <a:schemeClr val="lt1"/>
+            </a:fontRef>
+          </p:style>
+          <p:txBody>
+            <a:bodyPr rtlCol="0" anchor="ctr"/>
+            <a:lstStyle/>
+            <a:p>
+              <a:pPr algn="ctr"/>
+              <a:endParaRPr kumimoji="1" lang="zh-CN" altLang="en-US"/>
+            </a:p>
+          </p:txBody>
+        </p:sp>
+        <p:sp>
+          <p:nvSpPr>
+            <p:cNvPr id="9" name="Oval 8"/>
+            <p:cNvSpPr/>
+            <p:nvPr/>
+          </p:nvSpPr>
+          <p:spPr>
+            <a:xfrm>
+              <a:off x="3090203" y="2709906"/>
+              <a:ext cx="73152" cy="70338"/>
+            </a:xfrm>
+            <a:prstGeom prst="ellipse">
+              <a:avLst/>
+            </a:prstGeom>
+            <a:solidFill>
+              <a:schemeClr val="tx1"/>
+            </a:solidFill>
+            <a:ln>
+              <a:noFill/>
+            </a:ln>
+          </p:spPr>
+          <p:style>
+            <a:lnRef idx="2">
+              <a:schemeClr val="accent1">
+                <a:shade val="50000"/>
+              </a:schemeClr>
+            </a:lnRef>
+            <a:fillRef idx="1">
+              <a:schemeClr val="accent1"/>
+            </a:fillRef>
+            <a:effectRef idx="0">
+              <a:schemeClr val="accent1"/>
+            </a:effectRef>
+            <a:fontRef idx="minor">
+              <a:schemeClr val="lt1"/>
+            </a:fontRef>
+          </p:style>
+          <p:txBody>
+            <a:bodyPr rtlCol="0" anchor="ctr"/>
+            <a:lstStyle/>
+            <a:p>
+              <a:pPr algn="ctr"/>
+              <a:endParaRPr kumimoji="1" lang="zh-CN" altLang="en-US"/>
+            </a:p>
+          </p:txBody>
+        </p:sp>
+        <p:sp>
+          <p:nvSpPr>
+            <p:cNvPr id="10" name="Oval 9"/>
+            <p:cNvSpPr/>
+            <p:nvPr/>
+          </p:nvSpPr>
+          <p:spPr>
+            <a:xfrm>
+              <a:off x="3090203" y="3062068"/>
+              <a:ext cx="73152" cy="70338"/>
+            </a:xfrm>
+            <a:prstGeom prst="ellipse">
+              <a:avLst/>
+            </a:prstGeom>
+            <a:solidFill>
+              <a:schemeClr val="tx1"/>
+            </a:solidFill>
+            <a:ln>
+              <a:noFill/>
+            </a:ln>
+          </p:spPr>
+          <p:style>
+            <a:lnRef idx="2">
+              <a:schemeClr val="accent1">
+                <a:shade val="50000"/>
+              </a:schemeClr>
+            </a:lnRef>
+            <a:fillRef idx="1">
+              <a:schemeClr val="accent1"/>
+            </a:fillRef>
+            <a:effectRef idx="0">
+              <a:schemeClr val="accent1"/>
+            </a:effectRef>
+            <a:fontRef idx="minor">
+              <a:schemeClr val="lt1"/>
+            </a:fontRef>
+          </p:style>
+          <p:txBody>
+            <a:bodyPr rtlCol="0" anchor="ctr"/>
+            <a:lstStyle/>
+            <a:p>
+              <a:pPr algn="ctr"/>
+              <a:endParaRPr kumimoji="1" lang="zh-CN" altLang="en-US"/>
+            </a:p>
+          </p:txBody>
+        </p:sp>
+        <p:sp>
+          <p:nvSpPr>
+            <p:cNvPr id="11" name="Oval 10"/>
+            <p:cNvSpPr/>
+            <p:nvPr/>
+          </p:nvSpPr>
+          <p:spPr>
+            <a:xfrm>
+              <a:off x="5591908" y="1301262"/>
+              <a:ext cx="73152" cy="70338"/>
+            </a:xfrm>
+            <a:prstGeom prst="ellipse">
+              <a:avLst/>
+            </a:prstGeom>
+            <a:solidFill>
+              <a:schemeClr val="tx1"/>
+            </a:solidFill>
+            <a:ln>
+              <a:noFill/>
+            </a:ln>
+          </p:spPr>
+          <p:style>
+            <a:lnRef idx="2">
+              <a:schemeClr val="accent1">
+                <a:shade val="50000"/>
+              </a:schemeClr>
+            </a:lnRef>
+            <a:fillRef idx="1">
+              <a:schemeClr val="accent1"/>
+            </a:fillRef>
+            <a:effectRef idx="0">
+              <a:schemeClr val="accent1"/>
+            </a:effectRef>
+            <a:fontRef idx="minor">
+              <a:schemeClr val="lt1"/>
+            </a:fontRef>
+          </p:style>
+          <p:txBody>
+            <a:bodyPr rtlCol="0" anchor="ctr"/>
+            <a:lstStyle/>
+            <a:p>
+              <a:pPr algn="ctr"/>
+              <a:endParaRPr kumimoji="1" lang="zh-CN" altLang="en-US"/>
+            </a:p>
+          </p:txBody>
+        </p:sp>
+        <p:sp>
+          <p:nvSpPr>
+            <p:cNvPr id="12" name="Oval 11"/>
+            <p:cNvSpPr/>
+            <p:nvPr/>
+          </p:nvSpPr>
+          <p:spPr>
+            <a:xfrm>
+              <a:off x="5591908" y="1653423"/>
+              <a:ext cx="73152" cy="70338"/>
+            </a:xfrm>
+            <a:prstGeom prst="ellipse">
+              <a:avLst/>
+            </a:prstGeom>
+            <a:solidFill>
+              <a:schemeClr val="tx1"/>
+            </a:solidFill>
+            <a:ln>
+              <a:noFill/>
+            </a:ln>
+          </p:spPr>
+          <p:style>
+            <a:lnRef idx="2">
+              <a:schemeClr val="accent1">
+                <a:shade val="50000"/>
+              </a:schemeClr>
+            </a:lnRef>
+            <a:fillRef idx="1">
+              <a:schemeClr val="accent1"/>
+            </a:fillRef>
+            <a:effectRef idx="0">
+              <a:schemeClr val="accent1"/>
+            </a:effectRef>
+            <a:fontRef idx="minor">
+              <a:schemeClr val="lt1"/>
+            </a:fontRef>
+          </p:style>
+          <p:txBody>
+            <a:bodyPr rtlCol="0" anchor="ctr"/>
+            <a:lstStyle/>
+            <a:p>
+              <a:pPr algn="ctr"/>
+              <a:endParaRPr kumimoji="1" lang="zh-CN" altLang="en-US"/>
+            </a:p>
+          </p:txBody>
+        </p:sp>
+        <p:sp>
+          <p:nvSpPr>
+            <p:cNvPr id="13" name="Oval 12"/>
+            <p:cNvSpPr/>
+            <p:nvPr/>
+          </p:nvSpPr>
+          <p:spPr>
+            <a:xfrm>
+              <a:off x="5591908" y="2005584"/>
+              <a:ext cx="73152" cy="70338"/>
+            </a:xfrm>
+            <a:prstGeom prst="ellipse">
+              <a:avLst/>
+            </a:prstGeom>
+            <a:solidFill>
+              <a:schemeClr val="tx1"/>
+            </a:solidFill>
+            <a:ln>
+              <a:noFill/>
+            </a:ln>
+          </p:spPr>
+          <p:style>
+            <a:lnRef idx="2">
+              <a:schemeClr val="accent1">
+                <a:shade val="50000"/>
+              </a:schemeClr>
+            </a:lnRef>
+            <a:fillRef idx="1">
+              <a:schemeClr val="accent1"/>
+            </a:fillRef>
+            <a:effectRef idx="0">
+              <a:schemeClr val="accent1"/>
+            </a:effectRef>
+            <a:fontRef idx="minor">
+              <a:schemeClr val="lt1"/>
+            </a:fontRef>
+          </p:style>
+          <p:txBody>
+            <a:bodyPr rtlCol="0" anchor="ctr"/>
+            <a:lstStyle/>
+            <a:p>
+              <a:pPr algn="ctr"/>
+              <a:endParaRPr kumimoji="1" lang="zh-CN" altLang="en-US"/>
+            </a:p>
+          </p:txBody>
+        </p:sp>
+        <p:sp>
+          <p:nvSpPr>
+            <p:cNvPr id="14" name="Oval 13"/>
+            <p:cNvSpPr/>
+            <p:nvPr/>
+          </p:nvSpPr>
+          <p:spPr>
+            <a:xfrm>
+              <a:off x="5591908" y="2357745"/>
+              <a:ext cx="73152" cy="70338"/>
+            </a:xfrm>
+            <a:prstGeom prst="ellipse">
+              <a:avLst/>
+            </a:prstGeom>
+            <a:solidFill>
+              <a:schemeClr val="tx1"/>
+            </a:solidFill>
+            <a:ln>
+              <a:noFill/>
+            </a:ln>
+          </p:spPr>
+          <p:style>
+            <a:lnRef idx="2">
+              <a:schemeClr val="accent1">
+                <a:shade val="50000"/>
+              </a:schemeClr>
+            </a:lnRef>
+            <a:fillRef idx="1">
+              <a:schemeClr val="accent1"/>
+            </a:fillRef>
+            <a:effectRef idx="0">
+              <a:schemeClr val="accent1"/>
+            </a:effectRef>
+            <a:fontRef idx="minor">
+              <a:schemeClr val="lt1"/>
+            </a:fontRef>
+          </p:style>
+          <p:txBody>
+            <a:bodyPr rtlCol="0" anchor="ctr"/>
+            <a:lstStyle/>
+            <a:p>
+              <a:pPr algn="ctr"/>
+              <a:endParaRPr kumimoji="1" lang="zh-CN" altLang="en-US"/>
+            </a:p>
+          </p:txBody>
+        </p:sp>
+        <p:sp>
+          <p:nvSpPr>
+            <p:cNvPr id="15" name="Oval 14"/>
+            <p:cNvSpPr/>
+            <p:nvPr/>
+          </p:nvSpPr>
+          <p:spPr>
+            <a:xfrm>
+              <a:off x="5591908" y="2709906"/>
+              <a:ext cx="73152" cy="70338"/>
+            </a:xfrm>
+            <a:prstGeom prst="ellipse">
+              <a:avLst/>
+            </a:prstGeom>
+            <a:solidFill>
+              <a:schemeClr val="tx1"/>
+            </a:solidFill>
+            <a:ln>
+              <a:noFill/>
+            </a:ln>
+          </p:spPr>
+          <p:style>
+            <a:lnRef idx="2">
+              <a:schemeClr val="accent1">
+                <a:shade val="50000"/>
+              </a:schemeClr>
+            </a:lnRef>
+            <a:fillRef idx="1">
+              <a:schemeClr val="accent1"/>
+            </a:fillRef>
+            <a:effectRef idx="0">
+              <a:schemeClr val="accent1"/>
+            </a:effectRef>
+            <a:fontRef idx="minor">
+              <a:schemeClr val="lt1"/>
+            </a:fontRef>
+          </p:style>
+          <p:txBody>
+            <a:bodyPr rtlCol="0" anchor="ctr"/>
+            <a:lstStyle/>
+            <a:p>
+              <a:pPr algn="ctr"/>
+              <a:endParaRPr kumimoji="1" lang="zh-CN" altLang="en-US"/>
+            </a:p>
+          </p:txBody>
+        </p:sp>
+        <p:sp>
+          <p:nvSpPr>
+            <p:cNvPr id="16" name="Oval 15"/>
+            <p:cNvSpPr/>
+            <p:nvPr/>
+          </p:nvSpPr>
+          <p:spPr>
+            <a:xfrm>
+              <a:off x="5591908" y="3062068"/>
+              <a:ext cx="73152" cy="70338"/>
+            </a:xfrm>
+            <a:prstGeom prst="ellipse">
+              <a:avLst/>
+            </a:prstGeom>
+            <a:solidFill>
+              <a:schemeClr val="tx1"/>
+            </a:solidFill>
+            <a:ln>
+              <a:noFill/>
+            </a:ln>
+          </p:spPr>
+          <p:style>
+            <a:lnRef idx="2">
+              <a:schemeClr val="accent1">
+                <a:shade val="50000"/>
+              </a:schemeClr>
+            </a:lnRef>
+            <a:fillRef idx="1">
+              <a:schemeClr val="accent1"/>
+            </a:fillRef>
+            <a:effectRef idx="0">
+              <a:schemeClr val="accent1"/>
+            </a:effectRef>
+            <a:fontRef idx="minor">
+              <a:schemeClr val="lt1"/>
+            </a:fontRef>
+          </p:style>
+          <p:txBody>
+            <a:bodyPr rtlCol="0" anchor="ctr"/>
+            <a:lstStyle/>
+            <a:p>
+              <a:pPr algn="ctr"/>
+              <a:endParaRPr kumimoji="1" lang="zh-CN" altLang="en-US"/>
+            </a:p>
+          </p:txBody>
+        </p:sp>
+        <p:cxnSp>
+          <p:nvCxnSpPr>
+            <p:cNvPr id="17" name="Straight Arrow Connector 16"/>
+            <p:cNvCxnSpPr>
+              <a:stCxn id="6" idx="6"/>
+              <a:endCxn id="12" idx="2"/>
+            </p:cNvCxnSpPr>
+            <p:nvPr/>
+          </p:nvCxnSpPr>
+          <p:spPr>
+            <a:xfrm>
+              <a:off x="3163355" y="1336431"/>
+              <a:ext cx="2428553" cy="0"/>
+            </a:xfrm>
+            <a:prstGeom prst="straightConnector1">
+              <a:avLst/>
+            </a:prstGeom>
+            <a:ln>
+              <a:solidFill>
+                <a:schemeClr val="tx1"/>
+              </a:solidFill>
+              <a:tailEnd type="triangle"/>
+            </a:ln>
+          </p:spPr>
+          <p:style>
+            <a:lnRef idx="1">
+              <a:schemeClr val="accent1"/>
+            </a:lnRef>
+            <a:fillRef idx="0">
+              <a:schemeClr val="accent1"/>
+            </a:fillRef>
+            <a:effectRef idx="0">
+              <a:schemeClr val="accent1"/>
+            </a:effectRef>
+            <a:fontRef idx="minor">
+              <a:schemeClr val="tx1"/>
+            </a:fontRef>
+          </p:style>
+        </p:cxnSp>
+        <p:cxnSp>
+          <p:nvCxnSpPr>
+            <p:cNvPr id="18" name="Straight Arrow Connector 17"/>
+            <p:cNvCxnSpPr>
+              <a:stCxn id="6" idx="6"/>
+              <a:endCxn id="13" idx="2"/>
+            </p:cNvCxnSpPr>
+            <p:nvPr/>
+          </p:nvCxnSpPr>
+          <p:spPr>
+            <a:xfrm>
+              <a:off x="3163355" y="1336431"/>
+              <a:ext cx="2428553" cy="352161"/>
+            </a:xfrm>
+            <a:prstGeom prst="straightConnector1">
+              <a:avLst/>
+            </a:prstGeom>
+            <a:ln>
+              <a:solidFill>
+                <a:schemeClr val="tx1"/>
+              </a:solidFill>
+              <a:tailEnd type="triangle"/>
+            </a:ln>
+          </p:spPr>
+          <p:style>
+            <a:lnRef idx="1">
+              <a:schemeClr val="accent1"/>
+            </a:lnRef>
+            <a:fillRef idx="0">
+              <a:schemeClr val="accent1"/>
+            </a:fillRef>
+            <a:effectRef idx="0">
+              <a:schemeClr val="accent1"/>
+            </a:effectRef>
+            <a:fontRef idx="minor">
+              <a:schemeClr val="tx1"/>
+            </a:fontRef>
+          </p:style>
+        </p:cxnSp>
+        <p:cxnSp>
+          <p:nvCxnSpPr>
+            <p:cNvPr id="19" name="Straight Arrow Connector 18"/>
+            <p:cNvCxnSpPr>
+              <a:stCxn id="6" idx="6"/>
+              <a:endCxn id="14" idx="2"/>
+            </p:cNvCxnSpPr>
+            <p:nvPr/>
+          </p:nvCxnSpPr>
+          <p:spPr>
+            <a:xfrm>
+              <a:off x="3163355" y="1336431"/>
+              <a:ext cx="2428553" cy="704322"/>
+            </a:xfrm>
+            <a:prstGeom prst="straightConnector1">
+              <a:avLst/>
+            </a:prstGeom>
+            <a:ln>
+              <a:solidFill>
+                <a:schemeClr val="tx1"/>
+              </a:solidFill>
+              <a:tailEnd type="triangle"/>
+            </a:ln>
+          </p:spPr>
+          <p:style>
+            <a:lnRef idx="1">
+              <a:schemeClr val="accent1"/>
+            </a:lnRef>
+            <a:fillRef idx="0">
+              <a:schemeClr val="accent1"/>
+            </a:fillRef>
+            <a:effectRef idx="0">
+              <a:schemeClr val="accent1"/>
+            </a:effectRef>
+            <a:fontRef idx="minor">
+              <a:schemeClr val="tx1"/>
+            </a:fontRef>
+          </p:style>
+        </p:cxnSp>
+        <p:cxnSp>
+          <p:nvCxnSpPr>
+            <p:cNvPr id="20" name="Straight Arrow Connector 19"/>
+            <p:cNvCxnSpPr>
+              <a:stCxn id="6" idx="6"/>
+              <a:endCxn id="15" idx="2"/>
+            </p:cNvCxnSpPr>
+            <p:nvPr/>
+          </p:nvCxnSpPr>
+          <p:spPr>
+            <a:xfrm>
+              <a:off x="3163355" y="1336431"/>
+              <a:ext cx="2428553" cy="1056483"/>
+            </a:xfrm>
+            <a:prstGeom prst="straightConnector1">
+              <a:avLst/>
+            </a:prstGeom>
+            <a:ln>
+              <a:solidFill>
+                <a:schemeClr val="tx1"/>
+              </a:solidFill>
+              <a:tailEnd type="triangle"/>
+            </a:ln>
+          </p:spPr>
+          <p:style>
+            <a:lnRef idx="1">
+              <a:schemeClr val="accent1"/>
+            </a:lnRef>
+            <a:fillRef idx="0">
+              <a:schemeClr val="accent1"/>
+            </a:fillRef>
+            <a:effectRef idx="0">
+              <a:schemeClr val="accent1"/>
+            </a:effectRef>
+            <a:fontRef idx="minor">
+              <a:schemeClr val="tx1"/>
+            </a:fontRef>
+          </p:style>
+        </p:cxnSp>
+        <p:cxnSp>
+          <p:nvCxnSpPr>
+            <p:cNvPr id="21" name="Straight Arrow Connector 20"/>
+            <p:cNvCxnSpPr>
+              <a:stCxn id="6" idx="6"/>
+              <a:endCxn id="16" idx="2"/>
+            </p:cNvCxnSpPr>
+            <p:nvPr/>
+          </p:nvCxnSpPr>
+          <p:spPr>
+            <a:xfrm>
+              <a:off x="3163355" y="1336431"/>
+              <a:ext cx="2428553" cy="1408644"/>
+            </a:xfrm>
+            <a:prstGeom prst="straightConnector1">
+              <a:avLst/>
+            </a:prstGeom>
+            <a:ln>
+              <a:solidFill>
+                <a:schemeClr val="tx1"/>
+              </a:solidFill>
+              <a:tailEnd type="triangle"/>
+            </a:ln>
+          </p:spPr>
+          <p:style>
+            <a:lnRef idx="1">
+              <a:schemeClr val="accent1"/>
+            </a:lnRef>
+            <a:fillRef idx="0">
+              <a:schemeClr val="accent1"/>
+            </a:fillRef>
+            <a:effectRef idx="0">
+              <a:schemeClr val="accent1"/>
+            </a:effectRef>
+            <a:fontRef idx="minor">
+              <a:schemeClr val="tx1"/>
+            </a:fontRef>
+          </p:style>
+        </p:cxnSp>
+        <p:sp>
+          <p:nvSpPr>
+            <p:cNvPr id="22" name="TextBox 21"/>
+            <p:cNvSpPr txBox="1"/>
+            <p:nvPr/>
+          </p:nvSpPr>
+          <p:spPr>
+            <a:xfrm>
+              <a:off x="4562335" y="1109990"/>
+              <a:ext cx="373820" cy="261610"/>
+            </a:xfrm>
+            <a:prstGeom prst="rect">
+              <a:avLst/>
+            </a:prstGeom>
+            <a:noFill/>
+          </p:spPr>
+          <p:txBody>
+            <a:bodyPr wrap="none" rtlCol="0">
+              <a:spAutoFit/>
+            </a:bodyPr>
+            <a:lstStyle/>
+            <a:p>
+              <a:r>
+                <a:rPr kumimoji="1" lang="en-US" altLang="zh-CN" sz="1050" dirty="0" smtClean="0"/>
+                <a:t>1-p</a:t>
+              </a:r>
+              <a:endParaRPr kumimoji="1" lang="zh-CN" altLang="en-US" sz="1050" dirty="0"/>
+            </a:p>
+          </p:txBody>
+        </p:sp>
+        <p:sp>
+          <p:nvSpPr>
+            <p:cNvPr id="23" name="TextBox 22"/>
+            <p:cNvSpPr txBox="1"/>
+            <p:nvPr/>
+          </p:nvSpPr>
+          <p:spPr>
+            <a:xfrm>
+              <a:off x="4483638" y="1419447"/>
+              <a:ext cx="606256" cy="261610"/>
+            </a:xfrm>
+            <a:prstGeom prst="rect">
+              <a:avLst/>
+            </a:prstGeom>
+            <a:noFill/>
+          </p:spPr>
+          <p:txBody>
+            <a:bodyPr wrap="none" rtlCol="0">
+              <a:spAutoFit/>
+            </a:bodyPr>
+            <a:lstStyle/>
+            <a:p>
+              <a:r>
+                <a:rPr kumimoji="1" lang="en-US" altLang="zh-CN" sz="1050" dirty="0" smtClean="0"/>
+                <a:t>p/(N-1)</a:t>
+              </a:r>
+              <a:endParaRPr kumimoji="1" lang="zh-CN" altLang="en-US" sz="1050" dirty="0"/>
+            </a:p>
+          </p:txBody>
+        </p:sp>
+        <p:sp>
+          <p:nvSpPr>
+            <p:cNvPr id="24" name="TextBox 23"/>
+            <p:cNvSpPr txBox="1"/>
+            <p:nvPr/>
+          </p:nvSpPr>
+          <p:spPr>
+            <a:xfrm>
+              <a:off x="4562335" y="1674528"/>
+              <a:ext cx="606256" cy="261610"/>
+            </a:xfrm>
+            <a:prstGeom prst="rect">
+              <a:avLst/>
+            </a:prstGeom>
+            <a:noFill/>
+          </p:spPr>
+          <p:txBody>
+            <a:bodyPr wrap="none" rtlCol="0">
+              <a:spAutoFit/>
+            </a:bodyPr>
+            <a:lstStyle/>
+            <a:p>
+              <a:r>
+                <a:rPr kumimoji="1" lang="en-US" altLang="zh-CN" sz="1050" dirty="0" smtClean="0"/>
+                <a:t>p/(N-1)</a:t>
+              </a:r>
+              <a:endParaRPr kumimoji="1" lang="zh-CN" altLang="en-US" sz="1050" dirty="0"/>
+            </a:p>
+          </p:txBody>
+        </p:sp>
+        <p:sp>
+          <p:nvSpPr>
+            <p:cNvPr id="25" name="TextBox 24"/>
+            <p:cNvSpPr txBox="1"/>
+            <p:nvPr/>
+          </p:nvSpPr>
+          <p:spPr>
+            <a:xfrm>
+              <a:off x="4719100" y="2012625"/>
+              <a:ext cx="606256" cy="261610"/>
+            </a:xfrm>
+            <a:prstGeom prst="rect">
+              <a:avLst/>
+            </a:prstGeom>
+            <a:noFill/>
+          </p:spPr>
+          <p:txBody>
+            <a:bodyPr wrap="none" rtlCol="0">
+              <a:spAutoFit/>
+            </a:bodyPr>
+            <a:lstStyle/>
+            <a:p>
+              <a:r>
+                <a:rPr kumimoji="1" lang="en-US" altLang="zh-CN" sz="1050" smtClean="0"/>
+                <a:t>p/(N-1)</a:t>
+              </a:r>
+              <a:endParaRPr kumimoji="1" lang="zh-CN" altLang="en-US" sz="1050" dirty="0"/>
+            </a:p>
+          </p:txBody>
+        </p:sp>
+        <p:sp>
+          <p:nvSpPr>
+            <p:cNvPr id="26" name="TextBox 25"/>
+            <p:cNvSpPr txBox="1"/>
+            <p:nvPr/>
+          </p:nvSpPr>
+          <p:spPr>
+            <a:xfrm>
+              <a:off x="4859918" y="2360968"/>
+              <a:ext cx="606256" cy="261610"/>
+            </a:xfrm>
+            <a:prstGeom prst="rect">
+              <a:avLst/>
+            </a:prstGeom>
+            <a:noFill/>
+          </p:spPr>
+          <p:txBody>
+            <a:bodyPr wrap="none" rtlCol="0">
+              <a:spAutoFit/>
+            </a:bodyPr>
+            <a:lstStyle/>
+            <a:p>
+              <a:r>
+                <a:rPr kumimoji="1" lang="en-US" altLang="zh-CN" sz="1050" smtClean="0"/>
+                <a:t>p/(N-1)</a:t>
+              </a:r>
+              <a:endParaRPr kumimoji="1" lang="zh-CN" altLang="en-US" sz="1050" dirty="0"/>
+            </a:p>
+          </p:txBody>
+        </p:sp>
+        <p:sp>
+          <p:nvSpPr>
+            <p:cNvPr id="27" name="TextBox 26"/>
+            <p:cNvSpPr txBox="1"/>
+            <p:nvPr/>
+          </p:nvSpPr>
+          <p:spPr>
+            <a:xfrm>
+              <a:off x="2963112" y="920503"/>
+              <a:ext cx="268285" cy="369332"/>
+            </a:xfrm>
+            <a:prstGeom prst="rect">
+              <a:avLst/>
+            </a:prstGeom>
+            <a:noFill/>
+          </p:spPr>
+          <p:txBody>
+            <a:bodyPr wrap="square" rtlCol="0">
+              <a:spAutoFit/>
+            </a:bodyPr>
+            <a:lstStyle/>
+            <a:p>
+              <a:r>
+                <a:rPr kumimoji="1" lang="en-US" altLang="zh-CN" smtClean="0"/>
+                <a:t>D</a:t>
+              </a:r>
+              <a:endParaRPr kumimoji="1" lang="zh-CN" altLang="en-US" dirty="0"/>
+            </a:p>
+          </p:txBody>
+        </p:sp>
+        <p:pic>
+          <p:nvPicPr>
+            <p:cNvPr id="28" name="Picture 27"/>
+            <p:cNvPicPr>
+              <a:picLocks noChangeAspect="1"/>
+            </p:cNvPicPr>
+            <p:nvPr/>
+          </p:nvPicPr>
+          <p:blipFill>
+            <a:blip r:embed="rId2"/>
+            <a:stretch>
+              <a:fillRect/>
+            </a:stretch>
+          </p:blipFill>
+          <p:spPr>
+            <a:xfrm>
+              <a:off x="5286090" y="884289"/>
+              <a:ext cx="611636" cy="366982"/>
+            </a:xfrm>
+            <a:prstGeom prst="rect">
+              <a:avLst/>
+            </a:prstGeom>
+          </p:spPr>
+        </p:pic>
+      </p:grpSp>
+    </p:spTree>
+    <p:extLst>
+      <p:ext uri="{BB962C8B-B14F-4D97-AF65-F5344CB8AC3E}">
+        <p14:creationId xmlns:p14="http://schemas.microsoft.com/office/powerpoint/2010/main" val="2000950532"/>
+      </p:ext>
+    </p:extLst>
+  </p:cSld>
+  <p:clrMapOvr>
+    <a:masterClrMapping/>
+  </p:clrMapOvr>
+</p:sld>
+</file>
+
 <file path=ppt/theme/theme1.xml><?xml version="1.0" encoding="utf-8"?>
 <a:theme xmlns:a="http://schemas.openxmlformats.org/drawingml/2006/main" name="Office Theme">
   <a:themeElements>

</xml_diff>

<commit_message>
add wyner wire-tapper channel figure
</commit_message>
<xml_diff>
--- a/figures.pptx
+++ b/figures.pptx
@@ -8,10 +8,10 @@
     <p:sldId id="256" r:id="rId2"/>
     <p:sldId id="257" r:id="rId3"/>
     <p:sldId id="258" r:id="rId4"/>
-    <p:sldId id="259" r:id="rId5"/>
-    <p:sldId id="260" r:id="rId6"/>
-    <p:sldId id="261" r:id="rId7"/>
-    <p:sldId id="262" r:id="rId8"/>
+    <p:sldId id="260" r:id="rId5"/>
+    <p:sldId id="261" r:id="rId6"/>
+    <p:sldId id="262" r:id="rId7"/>
+    <p:sldId id="259" r:id="rId8"/>
   </p:sldIdLst>
   <p:sldSz cx="12192000" cy="6858000"/>
   <p:notesSz cx="6858000" cy="9144000"/>
@@ -118,7 +118,6 @@
             <p14:sldId id="256"/>
             <p14:sldId id="257"/>
             <p14:sldId id="258"/>
-            <p14:sldId id="259"/>
           </p14:sldIdLst>
         </p14:section>
         <p14:section name="Predict Network Status" id="{FEC046B3-1D1B-C84E-8634-F011F0A428EB}">
@@ -126,6 +125,7 @@
             <p14:sldId id="260"/>
             <p14:sldId id="261"/>
             <p14:sldId id="262"/>
+            <p14:sldId id="259"/>
           </p14:sldIdLst>
         </p14:section>
       </p14:sectionLst>
@@ -268,7 +268,7 @@
           <a:p>
             <a:fld id="{5386D14C-7C63-454A-9FEB-090854700008}" type="datetimeFigureOut">
               <a:rPr kumimoji="1" lang="zh-CN" altLang="en-US" smtClean="0"/>
-              <a:t>2017/11/20</a:t>
+              <a:t>2017/12/7</a:t>
             </a:fld>
             <a:endParaRPr kumimoji="1" lang="zh-CN" altLang="en-US"/>
           </a:p>
@@ -438,7 +438,7 @@
           <a:p>
             <a:fld id="{5386D14C-7C63-454A-9FEB-090854700008}" type="datetimeFigureOut">
               <a:rPr kumimoji="1" lang="zh-CN" altLang="en-US" smtClean="0"/>
-              <a:t>2017/11/20</a:t>
+              <a:t>2017/12/7</a:t>
             </a:fld>
             <a:endParaRPr kumimoji="1" lang="zh-CN" altLang="en-US"/>
           </a:p>
@@ -618,7 +618,7 @@
           <a:p>
             <a:fld id="{5386D14C-7C63-454A-9FEB-090854700008}" type="datetimeFigureOut">
               <a:rPr kumimoji="1" lang="zh-CN" altLang="en-US" smtClean="0"/>
-              <a:t>2017/11/20</a:t>
+              <a:t>2017/12/7</a:t>
             </a:fld>
             <a:endParaRPr kumimoji="1" lang="zh-CN" altLang="en-US"/>
           </a:p>
@@ -788,7 +788,7 @@
           <a:p>
             <a:fld id="{5386D14C-7C63-454A-9FEB-090854700008}" type="datetimeFigureOut">
               <a:rPr kumimoji="1" lang="zh-CN" altLang="en-US" smtClean="0"/>
-              <a:t>2017/11/20</a:t>
+              <a:t>2017/12/7</a:t>
             </a:fld>
             <a:endParaRPr kumimoji="1" lang="zh-CN" altLang="en-US"/>
           </a:p>
@@ -1034,7 +1034,7 @@
           <a:p>
             <a:fld id="{5386D14C-7C63-454A-9FEB-090854700008}" type="datetimeFigureOut">
               <a:rPr kumimoji="1" lang="zh-CN" altLang="en-US" smtClean="0"/>
-              <a:t>2017/11/20</a:t>
+              <a:t>2017/12/7</a:t>
             </a:fld>
             <a:endParaRPr kumimoji="1" lang="zh-CN" altLang="en-US"/>
           </a:p>
@@ -1266,7 +1266,7 @@
           <a:p>
             <a:fld id="{5386D14C-7C63-454A-9FEB-090854700008}" type="datetimeFigureOut">
               <a:rPr kumimoji="1" lang="zh-CN" altLang="en-US" smtClean="0"/>
-              <a:t>2017/11/20</a:t>
+              <a:t>2017/12/7</a:t>
             </a:fld>
             <a:endParaRPr kumimoji="1" lang="zh-CN" altLang="en-US"/>
           </a:p>
@@ -1633,7 +1633,7 @@
           <a:p>
             <a:fld id="{5386D14C-7C63-454A-9FEB-090854700008}" type="datetimeFigureOut">
               <a:rPr kumimoji="1" lang="zh-CN" altLang="en-US" smtClean="0"/>
-              <a:t>2017/11/20</a:t>
+              <a:t>2017/12/7</a:t>
             </a:fld>
             <a:endParaRPr kumimoji="1" lang="zh-CN" altLang="en-US"/>
           </a:p>
@@ -1751,7 +1751,7 @@
           <a:p>
             <a:fld id="{5386D14C-7C63-454A-9FEB-090854700008}" type="datetimeFigureOut">
               <a:rPr kumimoji="1" lang="zh-CN" altLang="en-US" smtClean="0"/>
-              <a:t>2017/11/20</a:t>
+              <a:t>2017/12/7</a:t>
             </a:fld>
             <a:endParaRPr kumimoji="1" lang="zh-CN" altLang="en-US"/>
           </a:p>
@@ -1846,7 +1846,7 @@
           <a:p>
             <a:fld id="{5386D14C-7C63-454A-9FEB-090854700008}" type="datetimeFigureOut">
               <a:rPr kumimoji="1" lang="zh-CN" altLang="en-US" smtClean="0"/>
-              <a:t>2017/11/20</a:t>
+              <a:t>2017/12/7</a:t>
             </a:fld>
             <a:endParaRPr kumimoji="1" lang="zh-CN" altLang="en-US"/>
           </a:p>
@@ -2123,7 +2123,7 @@
           <a:p>
             <a:fld id="{5386D14C-7C63-454A-9FEB-090854700008}" type="datetimeFigureOut">
               <a:rPr kumimoji="1" lang="zh-CN" altLang="en-US" smtClean="0"/>
-              <a:t>2017/11/20</a:t>
+              <a:t>2017/12/7</a:t>
             </a:fld>
             <a:endParaRPr kumimoji="1" lang="zh-CN" altLang="en-US"/>
           </a:p>
@@ -2376,7 +2376,7 @@
           <a:p>
             <a:fld id="{5386D14C-7C63-454A-9FEB-090854700008}" type="datetimeFigureOut">
               <a:rPr kumimoji="1" lang="zh-CN" altLang="en-US" smtClean="0"/>
-              <a:t>2017/11/20</a:t>
+              <a:t>2017/12/7</a:t>
             </a:fld>
             <a:endParaRPr kumimoji="1" lang="zh-CN" altLang="en-US"/>
           </a:p>
@@ -2589,7 +2589,7 @@
           <a:p>
             <a:fld id="{5386D14C-7C63-454A-9FEB-090854700008}" type="datetimeFigureOut">
               <a:rPr kumimoji="1" lang="zh-CN" altLang="en-US" smtClean="0"/>
-              <a:t>2017/11/20</a:t>
+              <a:t>2017/12/7</a:t>
             </a:fld>
             <a:endParaRPr kumimoji="1" lang="zh-CN" altLang="en-US"/>
           </a:p>
@@ -7470,325 +7470,6 @@
           <a:chExt cx="0" cy="0"/>
         </a:xfrm>
       </p:grpSpPr>
-      <p:sp>
-        <p:nvSpPr>
-          <p:cNvPr id="4" name="Rectangle 3"/>
-          <p:cNvSpPr/>
-          <p:nvPr/>
-        </p:nvSpPr>
-        <p:spPr>
-          <a:xfrm>
-            <a:off x="2051384" y="1544055"/>
-            <a:ext cx="1515979" cy="661737"/>
-          </a:xfrm>
-          <a:prstGeom prst="rect">
-            <a:avLst/>
-          </a:prstGeom>
-          <a:noFill/>
-          <a:ln w="25400">
-            <a:solidFill>
-              <a:schemeClr val="tx1"/>
-            </a:solidFill>
-          </a:ln>
-        </p:spPr>
-        <p:style>
-          <a:lnRef idx="2">
-            <a:schemeClr val="accent1">
-              <a:shade val="50000"/>
-            </a:schemeClr>
-          </a:lnRef>
-          <a:fillRef idx="1">
-            <a:schemeClr val="accent1"/>
-          </a:fillRef>
-          <a:effectRef idx="0">
-            <a:schemeClr val="accent1"/>
-          </a:effectRef>
-          <a:fontRef idx="minor">
-            <a:schemeClr val="lt1"/>
-          </a:fontRef>
-        </p:style>
-        <p:txBody>
-          <a:bodyPr rtlCol="0" anchor="ctr"/>
-          <a:lstStyle/>
-          <a:p>
-            <a:pPr algn="ctr"/>
-            <a:r>
-              <a:rPr kumimoji="1" lang="en-US" altLang="zh-CN" sz="2800" dirty="0" smtClean="0">
-                <a:solidFill>
-                  <a:schemeClr val="tx1"/>
-                </a:solidFill>
-              </a:rPr>
-              <a:t>Server</a:t>
-            </a:r>
-            <a:endParaRPr kumimoji="1" lang="zh-CN" altLang="en-US" sz="2800" dirty="0">
-              <a:solidFill>
-                <a:schemeClr val="tx1"/>
-              </a:solidFill>
-            </a:endParaRPr>
-          </a:p>
-        </p:txBody>
-      </p:sp>
-      <p:sp>
-        <p:nvSpPr>
-          <p:cNvPr id="5" name="Rectangle 4"/>
-          <p:cNvSpPr/>
-          <p:nvPr/>
-        </p:nvSpPr>
-        <p:spPr>
-          <a:xfrm>
-            <a:off x="796090" y="4231107"/>
-            <a:ext cx="1515979" cy="661737"/>
-          </a:xfrm>
-          <a:prstGeom prst="rect">
-            <a:avLst/>
-          </a:prstGeom>
-          <a:noFill/>
-          <a:ln w="25400">
-            <a:solidFill>
-              <a:schemeClr val="tx1"/>
-            </a:solidFill>
-          </a:ln>
-        </p:spPr>
-        <p:style>
-          <a:lnRef idx="2">
-            <a:schemeClr val="accent1">
-              <a:shade val="50000"/>
-            </a:schemeClr>
-          </a:lnRef>
-          <a:fillRef idx="1">
-            <a:schemeClr val="accent1"/>
-          </a:fillRef>
-          <a:effectRef idx="0">
-            <a:schemeClr val="accent1"/>
-          </a:effectRef>
-          <a:fontRef idx="minor">
-            <a:schemeClr val="lt1"/>
-          </a:fontRef>
-        </p:style>
-        <p:txBody>
-          <a:bodyPr rtlCol="0" anchor="ctr"/>
-          <a:lstStyle/>
-          <a:p>
-            <a:pPr algn="ctr"/>
-            <a:r>
-              <a:rPr kumimoji="1" lang="en-US" altLang="zh-CN" sz="2800" dirty="0" smtClean="0">
-                <a:solidFill>
-                  <a:schemeClr val="tx1"/>
-                </a:solidFill>
-              </a:rPr>
-              <a:t>Cache 1</a:t>
-            </a:r>
-            <a:endParaRPr kumimoji="1" lang="zh-CN" altLang="en-US" sz="2800" dirty="0">
-              <a:solidFill>
-                <a:schemeClr val="tx1"/>
-              </a:solidFill>
-            </a:endParaRPr>
-          </a:p>
-        </p:txBody>
-      </p:sp>
-      <p:sp>
-        <p:nvSpPr>
-          <p:cNvPr id="6" name="Rectangle 5"/>
-          <p:cNvSpPr/>
-          <p:nvPr/>
-        </p:nvSpPr>
-        <p:spPr>
-          <a:xfrm>
-            <a:off x="3306679" y="4231107"/>
-            <a:ext cx="1515979" cy="661737"/>
-          </a:xfrm>
-          <a:prstGeom prst="rect">
-            <a:avLst/>
-          </a:prstGeom>
-          <a:noFill/>
-          <a:ln w="25400">
-            <a:solidFill>
-              <a:schemeClr val="tx1"/>
-            </a:solidFill>
-          </a:ln>
-        </p:spPr>
-        <p:style>
-          <a:lnRef idx="2">
-            <a:schemeClr val="accent1">
-              <a:shade val="50000"/>
-            </a:schemeClr>
-          </a:lnRef>
-          <a:fillRef idx="1">
-            <a:schemeClr val="accent1"/>
-          </a:fillRef>
-          <a:effectRef idx="0">
-            <a:schemeClr val="accent1"/>
-          </a:effectRef>
-          <a:fontRef idx="minor">
-            <a:schemeClr val="lt1"/>
-          </a:fontRef>
-        </p:style>
-        <p:txBody>
-          <a:bodyPr rtlCol="0" anchor="ctr"/>
-          <a:lstStyle/>
-          <a:p>
-            <a:pPr algn="ctr"/>
-            <a:r>
-              <a:rPr kumimoji="1" lang="en-US" altLang="zh-CN" sz="2800" dirty="0" smtClean="0">
-                <a:solidFill>
-                  <a:schemeClr val="tx1"/>
-                </a:solidFill>
-              </a:rPr>
-              <a:t>Cache 2</a:t>
-            </a:r>
-            <a:endParaRPr kumimoji="1" lang="zh-CN" altLang="en-US" sz="2800" dirty="0">
-              <a:solidFill>
-                <a:schemeClr val="tx1"/>
-              </a:solidFill>
-            </a:endParaRPr>
-          </a:p>
-        </p:txBody>
-      </p:sp>
-      <p:cxnSp>
-        <p:nvCxnSpPr>
-          <p:cNvPr id="9" name="Straight Connector 8"/>
-          <p:cNvCxnSpPr/>
-          <p:nvPr/>
-        </p:nvCxnSpPr>
-        <p:spPr>
-          <a:xfrm flipH="1">
-            <a:off x="2809373" y="2205792"/>
-            <a:ext cx="3" cy="1012656"/>
-          </a:xfrm>
-          <a:prstGeom prst="line">
-            <a:avLst/>
-          </a:prstGeom>
-          <a:ln w="101600">
-            <a:solidFill>
-              <a:schemeClr val="tx1"/>
-            </a:solidFill>
-          </a:ln>
-        </p:spPr>
-        <p:style>
-          <a:lnRef idx="1">
-            <a:schemeClr val="accent1"/>
-          </a:lnRef>
-          <a:fillRef idx="0">
-            <a:schemeClr val="accent1"/>
-          </a:fillRef>
-          <a:effectRef idx="0">
-            <a:schemeClr val="accent1"/>
-          </a:effectRef>
-          <a:fontRef idx="minor">
-            <a:schemeClr val="tx1"/>
-          </a:fontRef>
-        </p:style>
-      </p:cxnSp>
-      <p:cxnSp>
-        <p:nvCxnSpPr>
-          <p:cNvPr id="11" name="Elbow Connector 10"/>
-          <p:cNvCxnSpPr>
-            <a:stCxn id="4" idx="2"/>
-          </p:cNvCxnSpPr>
-          <p:nvPr/>
-        </p:nvCxnSpPr>
-        <p:spPr>
-          <a:xfrm rot="16200000" flipH="1">
-            <a:off x="2424364" y="2590801"/>
-            <a:ext cx="2025315" cy="1255295"/>
-          </a:xfrm>
-          <a:prstGeom prst="bentConnector3">
-            <a:avLst>
-              <a:gd name="adj1" fmla="val 50000"/>
-            </a:avLst>
-          </a:prstGeom>
-          <a:ln w="25400">
-            <a:solidFill>
-              <a:schemeClr val="tx1"/>
-            </a:solidFill>
-            <a:tailEnd type="triangle"/>
-          </a:ln>
-        </p:spPr>
-        <p:style>
-          <a:lnRef idx="1">
-            <a:schemeClr val="accent1"/>
-          </a:lnRef>
-          <a:fillRef idx="0">
-            <a:schemeClr val="accent1"/>
-          </a:fillRef>
-          <a:effectRef idx="0">
-            <a:schemeClr val="accent1"/>
-          </a:effectRef>
-          <a:fontRef idx="minor">
-            <a:schemeClr val="tx1"/>
-          </a:fontRef>
-        </p:style>
-      </p:cxnSp>
-      <p:cxnSp>
-        <p:nvCxnSpPr>
-          <p:cNvPr id="13" name="Elbow Connector 12"/>
-          <p:cNvCxnSpPr>
-            <a:stCxn id="4" idx="2"/>
-          </p:cNvCxnSpPr>
-          <p:nvPr/>
-        </p:nvCxnSpPr>
-        <p:spPr>
-          <a:xfrm rot="5400000">
-            <a:off x="1169071" y="2590803"/>
-            <a:ext cx="2025315" cy="1255292"/>
-          </a:xfrm>
-          <a:prstGeom prst="bentConnector3">
-            <a:avLst>
-              <a:gd name="adj1" fmla="val 50000"/>
-            </a:avLst>
-          </a:prstGeom>
-          <a:ln w="25400">
-            <a:solidFill>
-              <a:schemeClr val="tx1"/>
-            </a:solidFill>
-            <a:tailEnd type="triangle"/>
-          </a:ln>
-        </p:spPr>
-        <p:style>
-          <a:lnRef idx="1">
-            <a:schemeClr val="accent1"/>
-          </a:lnRef>
-          <a:fillRef idx="0">
-            <a:schemeClr val="accent1"/>
-          </a:fillRef>
-          <a:effectRef idx="0">
-            <a:schemeClr val="accent1"/>
-          </a:effectRef>
-          <a:fontRef idx="minor">
-            <a:schemeClr val="tx1"/>
-          </a:fontRef>
-        </p:style>
-      </p:cxnSp>
-    </p:spTree>
-    <p:extLst>
-      <p:ext uri="{BB962C8B-B14F-4D97-AF65-F5344CB8AC3E}">
-        <p14:creationId xmlns:p14="http://schemas.microsoft.com/office/powerpoint/2010/main" val="294777747"/>
-      </p:ext>
-    </p:extLst>
-  </p:cSld>
-  <p:clrMapOvr>
-    <a:masterClrMapping/>
-  </p:clrMapOvr>
-</p:sld>
-</file>
-
-<file path=ppt/slides/slide5.xml><?xml version="1.0" encoding="utf-8"?>
-<p:sld xmlns:a="http://schemas.openxmlformats.org/drawingml/2006/main" xmlns:r="http://schemas.openxmlformats.org/officeDocument/2006/relationships" xmlns:p="http://schemas.openxmlformats.org/presentationml/2006/main">
-  <p:cSld>
-    <p:spTree>
-      <p:nvGrpSpPr>
-        <p:cNvPr id="1" name=""/>
-        <p:cNvGrpSpPr/>
-        <p:nvPr/>
-      </p:nvGrpSpPr>
-      <p:grpSpPr>
-        <a:xfrm>
-          <a:off x="0" y="0"/>
-          <a:ext cx="0" cy="0"/>
-          <a:chOff x="0" y="0"/>
-          <a:chExt cx="0" cy="0"/>
-        </a:xfrm>
-      </p:grpSpPr>
       <p:grpSp>
         <p:nvGrpSpPr>
           <p:cNvPr id="47" name="Group 46"/>
@@ -11660,7 +11341,7 @@
 </p:sld>
 </file>
 
-<file path=ppt/slides/slide6.xml><?xml version="1.0" encoding="utf-8"?>
+<file path=ppt/slides/slide5.xml><?xml version="1.0" encoding="utf-8"?>
 <p:sld xmlns:a="http://schemas.openxmlformats.org/drawingml/2006/main" xmlns:r="http://schemas.openxmlformats.org/officeDocument/2006/relationships" xmlns:p="http://schemas.openxmlformats.org/presentationml/2006/main">
   <p:cSld>
     <p:spTree>
@@ -17341,10 +17022,17 @@
   <p:clrMapOvr>
     <a:masterClrMapping/>
   </p:clrMapOvr>
+  <p:timing>
+    <p:tnLst>
+      <p:par>
+        <p:cTn id="1" dur="indefinite" restart="never" nodeType="tmRoot"/>
+      </p:par>
+    </p:tnLst>
+  </p:timing>
 </p:sld>
 </file>
 
-<file path=ppt/slides/slide7.xml><?xml version="1.0" encoding="utf-8"?>
+<file path=ppt/slides/slide6.xml><?xml version="1.0" encoding="utf-8"?>
 <p:sld xmlns:a="http://schemas.openxmlformats.org/drawingml/2006/main" xmlns:r="http://schemas.openxmlformats.org/officeDocument/2006/relationships" xmlns:p="http://schemas.openxmlformats.org/presentationml/2006/main">
   <p:cSld>
     <p:spTree>
@@ -18366,6 +18054,718 @@
           </a:fontRef>
         </p:style>
       </p:cxnSp>
+      <p:sp>
+        <p:nvSpPr>
+          <p:cNvPr id="31" name="Oval 30"/>
+          <p:cNvSpPr/>
+          <p:nvPr/>
+        </p:nvSpPr>
+        <p:spPr>
+          <a:xfrm>
+            <a:off x="7724235" y="1298498"/>
+            <a:ext cx="73152" cy="70338"/>
+          </a:xfrm>
+          <a:prstGeom prst="ellipse">
+            <a:avLst/>
+          </a:prstGeom>
+          <a:solidFill>
+            <a:schemeClr val="tx1"/>
+          </a:solidFill>
+          <a:ln>
+            <a:noFill/>
+          </a:ln>
+        </p:spPr>
+        <p:style>
+          <a:lnRef idx="2">
+            <a:schemeClr val="accent1">
+              <a:shade val="50000"/>
+            </a:schemeClr>
+          </a:lnRef>
+          <a:fillRef idx="1">
+            <a:schemeClr val="accent1"/>
+          </a:fillRef>
+          <a:effectRef idx="0">
+            <a:schemeClr val="accent1"/>
+          </a:effectRef>
+          <a:fontRef idx="minor">
+            <a:schemeClr val="lt1"/>
+          </a:fontRef>
+        </p:style>
+        <p:txBody>
+          <a:bodyPr rtlCol="0" anchor="ctr"/>
+          <a:lstStyle/>
+          <a:p>
+            <a:pPr algn="ctr"/>
+            <a:endParaRPr kumimoji="1" lang="zh-CN" altLang="en-US"/>
+          </a:p>
+        </p:txBody>
+      </p:sp>
+      <p:sp>
+        <p:nvSpPr>
+          <p:cNvPr id="32" name="Oval 31"/>
+          <p:cNvSpPr/>
+          <p:nvPr/>
+        </p:nvSpPr>
+        <p:spPr>
+          <a:xfrm>
+            <a:off x="7724235" y="2356715"/>
+            <a:ext cx="73152" cy="70338"/>
+          </a:xfrm>
+          <a:prstGeom prst="ellipse">
+            <a:avLst/>
+          </a:prstGeom>
+          <a:solidFill>
+            <a:schemeClr val="tx1"/>
+          </a:solidFill>
+          <a:ln>
+            <a:noFill/>
+          </a:ln>
+        </p:spPr>
+        <p:style>
+          <a:lnRef idx="2">
+            <a:schemeClr val="accent1">
+              <a:shade val="50000"/>
+            </a:schemeClr>
+          </a:lnRef>
+          <a:fillRef idx="1">
+            <a:schemeClr val="accent1"/>
+          </a:fillRef>
+          <a:effectRef idx="0">
+            <a:schemeClr val="accent1"/>
+          </a:effectRef>
+          <a:fontRef idx="minor">
+            <a:schemeClr val="lt1"/>
+          </a:fontRef>
+        </p:style>
+        <p:txBody>
+          <a:bodyPr rtlCol="0" anchor="ctr"/>
+          <a:lstStyle/>
+          <a:p>
+            <a:pPr algn="ctr"/>
+            <a:endParaRPr kumimoji="1" lang="zh-CN" altLang="en-US"/>
+          </a:p>
+        </p:txBody>
+      </p:sp>
+      <p:sp>
+        <p:nvSpPr>
+          <p:cNvPr id="37" name="Oval 36"/>
+          <p:cNvSpPr/>
+          <p:nvPr/>
+        </p:nvSpPr>
+        <p:spPr>
+          <a:xfrm>
+            <a:off x="10225940" y="1298498"/>
+            <a:ext cx="73152" cy="70338"/>
+          </a:xfrm>
+          <a:prstGeom prst="ellipse">
+            <a:avLst/>
+          </a:prstGeom>
+          <a:solidFill>
+            <a:schemeClr val="tx1"/>
+          </a:solidFill>
+          <a:ln>
+            <a:noFill/>
+          </a:ln>
+        </p:spPr>
+        <p:style>
+          <a:lnRef idx="2">
+            <a:schemeClr val="accent1">
+              <a:shade val="50000"/>
+            </a:schemeClr>
+          </a:lnRef>
+          <a:fillRef idx="1">
+            <a:schemeClr val="accent1"/>
+          </a:fillRef>
+          <a:effectRef idx="0">
+            <a:schemeClr val="accent1"/>
+          </a:effectRef>
+          <a:fontRef idx="minor">
+            <a:schemeClr val="lt1"/>
+          </a:fontRef>
+        </p:style>
+        <p:txBody>
+          <a:bodyPr rtlCol="0" anchor="ctr"/>
+          <a:lstStyle/>
+          <a:p>
+            <a:pPr algn="ctr"/>
+            <a:endParaRPr kumimoji="1" lang="zh-CN" altLang="en-US"/>
+          </a:p>
+        </p:txBody>
+      </p:sp>
+      <p:sp>
+        <p:nvSpPr>
+          <p:cNvPr id="38" name="Oval 37"/>
+          <p:cNvSpPr/>
+          <p:nvPr/>
+        </p:nvSpPr>
+        <p:spPr>
+          <a:xfrm>
+            <a:off x="10225940" y="2356715"/>
+            <a:ext cx="73152" cy="70338"/>
+          </a:xfrm>
+          <a:prstGeom prst="ellipse">
+            <a:avLst/>
+          </a:prstGeom>
+          <a:solidFill>
+            <a:schemeClr val="tx1"/>
+          </a:solidFill>
+          <a:ln>
+            <a:noFill/>
+          </a:ln>
+        </p:spPr>
+        <p:style>
+          <a:lnRef idx="2">
+            <a:schemeClr val="accent1">
+              <a:shade val="50000"/>
+            </a:schemeClr>
+          </a:lnRef>
+          <a:fillRef idx="1">
+            <a:schemeClr val="accent1"/>
+          </a:fillRef>
+          <a:effectRef idx="0">
+            <a:schemeClr val="accent1"/>
+          </a:effectRef>
+          <a:fontRef idx="minor">
+            <a:schemeClr val="lt1"/>
+          </a:fontRef>
+        </p:style>
+        <p:txBody>
+          <a:bodyPr rtlCol="0" anchor="ctr"/>
+          <a:lstStyle/>
+          <a:p>
+            <a:pPr algn="ctr"/>
+            <a:endParaRPr kumimoji="1" lang="zh-CN" altLang="en-US"/>
+          </a:p>
+        </p:txBody>
+      </p:sp>
+      <p:cxnSp>
+        <p:nvCxnSpPr>
+          <p:cNvPr id="43" name="Straight Arrow Connector 42"/>
+          <p:cNvCxnSpPr/>
+          <p:nvPr/>
+        </p:nvCxnSpPr>
+        <p:spPr>
+          <a:xfrm>
+            <a:off x="7797387" y="1333667"/>
+            <a:ext cx="2428553" cy="0"/>
+          </a:xfrm>
+          <a:prstGeom prst="straightConnector1">
+            <a:avLst/>
+          </a:prstGeom>
+          <a:ln>
+            <a:solidFill>
+              <a:schemeClr val="tx1"/>
+            </a:solidFill>
+            <a:tailEnd type="triangle"/>
+          </a:ln>
+        </p:spPr>
+        <p:style>
+          <a:lnRef idx="1">
+            <a:schemeClr val="accent1"/>
+          </a:lnRef>
+          <a:fillRef idx="0">
+            <a:schemeClr val="accent1"/>
+          </a:fillRef>
+          <a:effectRef idx="0">
+            <a:schemeClr val="accent1"/>
+          </a:effectRef>
+          <a:fontRef idx="minor">
+            <a:schemeClr val="tx1"/>
+          </a:fontRef>
+        </p:style>
+      </p:cxnSp>
+      <p:cxnSp>
+        <p:nvCxnSpPr>
+          <p:cNvPr id="44" name="Straight Arrow Connector 43"/>
+          <p:cNvCxnSpPr>
+            <a:endCxn id="38" idx="2"/>
+          </p:cNvCxnSpPr>
+          <p:nvPr/>
+        </p:nvCxnSpPr>
+        <p:spPr>
+          <a:xfrm>
+            <a:off x="7797387" y="1333667"/>
+            <a:ext cx="2428553" cy="1058217"/>
+          </a:xfrm>
+          <a:prstGeom prst="straightConnector1">
+            <a:avLst/>
+          </a:prstGeom>
+          <a:ln>
+            <a:solidFill>
+              <a:schemeClr val="tx1"/>
+            </a:solidFill>
+            <a:tailEnd type="triangle"/>
+          </a:ln>
+        </p:spPr>
+        <p:style>
+          <a:lnRef idx="1">
+            <a:schemeClr val="accent1"/>
+          </a:lnRef>
+          <a:fillRef idx="0">
+            <a:schemeClr val="accent1"/>
+          </a:fillRef>
+          <a:effectRef idx="0">
+            <a:schemeClr val="accent1"/>
+          </a:effectRef>
+          <a:fontRef idx="minor">
+            <a:schemeClr val="tx1"/>
+          </a:fontRef>
+        </p:style>
+      </p:cxnSp>
+      <p:sp>
+        <p:nvSpPr>
+          <p:cNvPr id="48" name="TextBox 47"/>
+          <p:cNvSpPr txBox="1"/>
+          <p:nvPr/>
+        </p:nvSpPr>
+        <p:spPr>
+          <a:xfrm>
+            <a:off x="8817924" y="1041246"/>
+            <a:ext cx="425116" cy="307777"/>
+          </a:xfrm>
+          <a:prstGeom prst="rect">
+            <a:avLst/>
+          </a:prstGeom>
+          <a:noFill/>
+        </p:spPr>
+        <p:txBody>
+          <a:bodyPr wrap="none" rtlCol="0">
+            <a:spAutoFit/>
+          </a:bodyPr>
+          <a:lstStyle/>
+          <a:p>
+            <a:r>
+              <a:rPr kumimoji="1" lang="en-US" altLang="zh-CN" sz="1400" b="1" dirty="0" smtClean="0"/>
+              <a:t>1-p</a:t>
+            </a:r>
+            <a:endParaRPr kumimoji="1" lang="zh-CN" altLang="en-US" sz="1400" b="1" dirty="0"/>
+          </a:p>
+        </p:txBody>
+      </p:sp>
+      <p:sp>
+        <p:nvSpPr>
+          <p:cNvPr id="49" name="TextBox 48"/>
+          <p:cNvSpPr txBox="1"/>
+          <p:nvPr/>
+        </p:nvSpPr>
+        <p:spPr>
+          <a:xfrm>
+            <a:off x="8133181" y="1913795"/>
+            <a:ext cx="279244" cy="307777"/>
+          </a:xfrm>
+          <a:prstGeom prst="rect">
+            <a:avLst/>
+          </a:prstGeom>
+          <a:noFill/>
+        </p:spPr>
+        <p:txBody>
+          <a:bodyPr wrap="none" rtlCol="0">
+            <a:spAutoFit/>
+          </a:bodyPr>
+          <a:lstStyle/>
+          <a:p>
+            <a:r>
+              <a:rPr kumimoji="1" lang="en-US" altLang="zh-CN" sz="1400" b="1" dirty="0" smtClean="0"/>
+              <a:t>p</a:t>
+            </a:r>
+            <a:endParaRPr kumimoji="1" lang="zh-CN" altLang="en-US" sz="1400" b="1" dirty="0"/>
+          </a:p>
+        </p:txBody>
+      </p:sp>
+      <p:sp>
+        <p:nvSpPr>
+          <p:cNvPr id="53" name="TextBox 52"/>
+          <p:cNvSpPr txBox="1"/>
+          <p:nvPr/>
+        </p:nvSpPr>
+        <p:spPr>
+          <a:xfrm>
+            <a:off x="7588068" y="929165"/>
+            <a:ext cx="545113" cy="369332"/>
+          </a:xfrm>
+          <a:prstGeom prst="rect">
+            <a:avLst/>
+          </a:prstGeom>
+          <a:noFill/>
+        </p:spPr>
+        <p:txBody>
+          <a:bodyPr wrap="square" rtlCol="0">
+            <a:spAutoFit/>
+          </a:bodyPr>
+          <a:lstStyle/>
+          <a:p>
+            <a:r>
+              <a:rPr kumimoji="1" lang="en-US" altLang="zh-CN" dirty="0" smtClean="0"/>
+              <a:t>d</a:t>
+            </a:r>
+            <a:r>
+              <a:rPr kumimoji="1" lang="en-US" altLang="zh-CN" baseline="-25000" dirty="0"/>
+              <a:t>i</a:t>
+            </a:r>
+            <a:endParaRPr kumimoji="1" lang="zh-CN" altLang="en-US" baseline="-25000" dirty="0"/>
+          </a:p>
+        </p:txBody>
+      </p:sp>
+      <p:cxnSp>
+        <p:nvCxnSpPr>
+          <p:cNvPr id="56" name="Straight Arrow Connector 55"/>
+          <p:cNvCxnSpPr>
+            <a:stCxn id="32" idx="6"/>
+            <a:endCxn id="38" idx="2"/>
+          </p:cNvCxnSpPr>
+          <p:nvPr/>
+        </p:nvCxnSpPr>
+        <p:spPr>
+          <a:xfrm>
+            <a:off x="7797387" y="2391884"/>
+            <a:ext cx="2428553" cy="0"/>
+          </a:xfrm>
+          <a:prstGeom prst="straightConnector1">
+            <a:avLst/>
+          </a:prstGeom>
+          <a:ln>
+            <a:solidFill>
+              <a:schemeClr val="tx1"/>
+            </a:solidFill>
+            <a:tailEnd type="triangle"/>
+          </a:ln>
+        </p:spPr>
+        <p:style>
+          <a:lnRef idx="1">
+            <a:schemeClr val="accent1"/>
+          </a:lnRef>
+          <a:fillRef idx="0">
+            <a:schemeClr val="accent1"/>
+          </a:fillRef>
+          <a:effectRef idx="0">
+            <a:schemeClr val="accent1"/>
+          </a:effectRef>
+          <a:fontRef idx="minor">
+            <a:schemeClr val="tx1"/>
+          </a:fontRef>
+        </p:style>
+      </p:cxnSp>
+      <p:cxnSp>
+        <p:nvCxnSpPr>
+          <p:cNvPr id="58" name="Straight Arrow Connector 57"/>
+          <p:cNvCxnSpPr>
+            <a:stCxn id="32" idx="6"/>
+            <a:endCxn id="37" idx="3"/>
+          </p:cNvCxnSpPr>
+          <p:nvPr/>
+        </p:nvCxnSpPr>
+        <p:spPr>
+          <a:xfrm flipV="1">
+            <a:off x="7797387" y="1358535"/>
+            <a:ext cx="2439266" cy="1033349"/>
+          </a:xfrm>
+          <a:prstGeom prst="straightConnector1">
+            <a:avLst/>
+          </a:prstGeom>
+          <a:ln>
+            <a:solidFill>
+              <a:schemeClr val="tx1"/>
+            </a:solidFill>
+            <a:tailEnd type="triangle"/>
+          </a:ln>
+        </p:spPr>
+        <p:style>
+          <a:lnRef idx="1">
+            <a:schemeClr val="accent1"/>
+          </a:lnRef>
+          <a:fillRef idx="0">
+            <a:schemeClr val="accent1"/>
+          </a:fillRef>
+          <a:effectRef idx="0">
+            <a:schemeClr val="accent1"/>
+          </a:effectRef>
+          <a:fontRef idx="minor">
+            <a:schemeClr val="tx1"/>
+          </a:fontRef>
+        </p:style>
+      </p:cxnSp>
+      <p:sp>
+        <p:nvSpPr>
+          <p:cNvPr id="61" name="TextBox 60"/>
+          <p:cNvSpPr txBox="1"/>
+          <p:nvPr/>
+        </p:nvSpPr>
+        <p:spPr>
+          <a:xfrm>
+            <a:off x="8133181" y="1539101"/>
+            <a:ext cx="279244" cy="307777"/>
+          </a:xfrm>
+          <a:prstGeom prst="rect">
+            <a:avLst/>
+          </a:prstGeom>
+          <a:noFill/>
+        </p:spPr>
+        <p:txBody>
+          <a:bodyPr wrap="none" rtlCol="0">
+            <a:spAutoFit/>
+          </a:bodyPr>
+          <a:lstStyle/>
+          <a:p>
+            <a:r>
+              <a:rPr kumimoji="1" lang="en-US" altLang="zh-CN" sz="1400" b="1" dirty="0" smtClean="0"/>
+              <a:t>p</a:t>
+            </a:r>
+            <a:endParaRPr kumimoji="1" lang="zh-CN" altLang="en-US" sz="1400" b="1" dirty="0"/>
+          </a:p>
+        </p:txBody>
+      </p:sp>
+      <p:sp>
+        <p:nvSpPr>
+          <p:cNvPr id="62" name="TextBox 61"/>
+          <p:cNvSpPr txBox="1"/>
+          <p:nvPr/>
+        </p:nvSpPr>
+        <p:spPr>
+          <a:xfrm>
+            <a:off x="8820153" y="2408307"/>
+            <a:ext cx="425116" cy="307777"/>
+          </a:xfrm>
+          <a:prstGeom prst="rect">
+            <a:avLst/>
+          </a:prstGeom>
+          <a:noFill/>
+        </p:spPr>
+        <p:txBody>
+          <a:bodyPr wrap="none" rtlCol="0">
+            <a:spAutoFit/>
+          </a:bodyPr>
+          <a:lstStyle/>
+          <a:p>
+            <a:r>
+              <a:rPr kumimoji="1" lang="en-US" altLang="zh-CN" sz="1400" b="1" dirty="0" smtClean="0"/>
+              <a:t>1-p</a:t>
+            </a:r>
+            <a:endParaRPr kumimoji="1" lang="zh-CN" altLang="en-US" sz="1400" b="1" dirty="0"/>
+          </a:p>
+        </p:txBody>
+      </p:sp>
+      <mc:AlternateContent xmlns:mc="http://schemas.openxmlformats.org/markup-compatibility/2006">
+        <mc:Choice xmlns:a14="http://schemas.microsoft.com/office/drawing/2010/main" Requires="a14">
+          <p:sp>
+            <p:nvSpPr>
+              <p:cNvPr id="41" name="TextBox 40"/>
+              <p:cNvSpPr txBox="1"/>
+              <p:nvPr/>
+            </p:nvSpPr>
+            <p:spPr>
+              <a:xfrm>
+                <a:off x="10102510" y="904299"/>
+                <a:ext cx="268285" cy="384272"/>
+              </a:xfrm>
+              <a:prstGeom prst="rect">
+                <a:avLst/>
+              </a:prstGeom>
+              <a:noFill/>
+            </p:spPr>
+            <p:txBody>
+              <a:bodyPr wrap="square" rtlCol="0">
+                <a:spAutoFit/>
+              </a:bodyPr>
+              <a:lstStyle/>
+              <a:p>
+                <a:pPr/>
+                <a14:m>
+                  <m:oMathPara xmlns:m="http://schemas.openxmlformats.org/officeDocument/2006/math">
+                    <m:oMathParaPr>
+                      <m:jc m:val="centerGroup"/>
+                    </m:oMathParaPr>
+                    <m:oMath xmlns:m="http://schemas.openxmlformats.org/officeDocument/2006/math">
+                      <m:acc>
+                        <m:accPr>
+                          <m:chr m:val="̂"/>
+                          <m:ctrlPr>
+                            <a:rPr kumimoji="1" lang="zh-CN" altLang="en-US" i="1" smtClean="0">
+                              <a:latin typeface="Cambria Math" charset="0"/>
+                            </a:rPr>
+                          </m:ctrlPr>
+                        </m:accPr>
+                        <m:e>
+                          <m:r>
+                            <a:rPr kumimoji="1" lang="en-US" altLang="zh-CN" i="1" smtClean="0">
+                              <a:latin typeface="Cambria Math" charset="0"/>
+                            </a:rPr>
+                            <m:t>𝑑</m:t>
+                          </m:r>
+                          <m:r>
+                            <a:rPr kumimoji="1" lang="en-US" altLang="zh-CN" b="0" i="1" baseline="-25000" smtClean="0">
+                              <a:latin typeface="Cambria Math" charset="0"/>
+                            </a:rPr>
+                            <m:t>𝑖</m:t>
+                          </m:r>
+                        </m:e>
+                      </m:acc>
+                    </m:oMath>
+                  </m:oMathPara>
+                </a14:m>
+                <a:endParaRPr kumimoji="1" lang="zh-CN" altLang="en-US" dirty="0"/>
+              </a:p>
+            </p:txBody>
+          </p:sp>
+        </mc:Choice>
+        <mc:Fallback>
+          <p:sp>
+            <p:nvSpPr>
+              <p:cNvPr id="41" name="TextBox 40"/>
+              <p:cNvSpPr txBox="1">
+                <a:spLocks noRot="1" noChangeAspect="1" noMove="1" noResize="1" noEditPoints="1" noAdjustHandles="1" noChangeArrowheads="1" noChangeShapeType="1" noTextEdit="1"/>
+              </p:cNvSpPr>
+              <p:nvPr/>
+            </p:nvSpPr>
+            <p:spPr>
+              <a:xfrm>
+                <a:off x="10102510" y="904299"/>
+                <a:ext cx="268285" cy="384272"/>
+              </a:xfrm>
+              <a:prstGeom prst="rect">
+                <a:avLst/>
+              </a:prstGeom>
+              <a:blipFill rotWithShape="0">
+                <a:blip r:embed="rId3"/>
+                <a:stretch>
+                  <a:fillRect t="-7937" r="-22727" b="-1587"/>
+                </a:stretch>
+              </a:blipFill>
+            </p:spPr>
+            <p:txBody>
+              <a:bodyPr/>
+              <a:lstStyle/>
+              <a:p>
+                <a:r>
+                  <a:rPr lang="zh-CN" altLang="en-US">
+                    <a:noFill/>
+                  </a:rPr>
+                  <a:t> </a:t>
+                </a:r>
+              </a:p>
+            </p:txBody>
+          </p:sp>
+        </mc:Fallback>
+      </mc:AlternateContent>
+      <p:sp>
+        <p:nvSpPr>
+          <p:cNvPr id="42" name="TextBox 41"/>
+          <p:cNvSpPr txBox="1"/>
+          <p:nvPr/>
+        </p:nvSpPr>
+        <p:spPr>
+          <a:xfrm>
+            <a:off x="7393511" y="1173869"/>
+            <a:ext cx="268285" cy="369332"/>
+          </a:xfrm>
+          <a:prstGeom prst="rect">
+            <a:avLst/>
+          </a:prstGeom>
+          <a:noFill/>
+        </p:spPr>
+        <p:txBody>
+          <a:bodyPr wrap="square" rtlCol="0">
+            <a:spAutoFit/>
+          </a:bodyPr>
+          <a:lstStyle/>
+          <a:p>
+            <a:r>
+              <a:rPr kumimoji="1" lang="en-US" altLang="zh-CN" dirty="0" smtClean="0"/>
+              <a:t>A</a:t>
+            </a:r>
+            <a:endParaRPr kumimoji="1" lang="zh-CN" altLang="en-US" dirty="0"/>
+          </a:p>
+        </p:txBody>
+      </p:sp>
+      <p:sp>
+        <p:nvSpPr>
+          <p:cNvPr id="45" name="TextBox 44"/>
+          <p:cNvSpPr txBox="1"/>
+          <p:nvPr/>
+        </p:nvSpPr>
+        <p:spPr>
+          <a:xfrm>
+            <a:off x="7396692" y="2192863"/>
+            <a:ext cx="268285" cy="369332"/>
+          </a:xfrm>
+          <a:prstGeom prst="rect">
+            <a:avLst/>
+          </a:prstGeom>
+          <a:noFill/>
+        </p:spPr>
+        <p:txBody>
+          <a:bodyPr wrap="square" rtlCol="0">
+            <a:spAutoFit/>
+          </a:bodyPr>
+          <a:lstStyle/>
+          <a:p>
+            <a:r>
+              <a:rPr kumimoji="1" lang="en-US" altLang="zh-CN" dirty="0"/>
+              <a:t>B</a:t>
+            </a:r>
+            <a:endParaRPr kumimoji="1" lang="zh-CN" altLang="en-US" dirty="0"/>
+          </a:p>
+        </p:txBody>
+      </p:sp>
+      <p:sp>
+        <p:nvSpPr>
+          <p:cNvPr id="46" name="TextBox 45"/>
+          <p:cNvSpPr txBox="1"/>
+          <p:nvPr/>
+        </p:nvSpPr>
+        <p:spPr>
+          <a:xfrm>
+            <a:off x="10320125" y="1173869"/>
+            <a:ext cx="268285" cy="369332"/>
+          </a:xfrm>
+          <a:prstGeom prst="rect">
+            <a:avLst/>
+          </a:prstGeom>
+          <a:noFill/>
+        </p:spPr>
+        <p:txBody>
+          <a:bodyPr wrap="square" rtlCol="0">
+            <a:spAutoFit/>
+          </a:bodyPr>
+          <a:lstStyle/>
+          <a:p>
+            <a:r>
+              <a:rPr kumimoji="1" lang="en-US" altLang="zh-CN" dirty="0" smtClean="0"/>
+              <a:t>A</a:t>
+            </a:r>
+            <a:endParaRPr kumimoji="1" lang="zh-CN" altLang="en-US" dirty="0"/>
+          </a:p>
+        </p:txBody>
+      </p:sp>
+      <p:sp>
+        <p:nvSpPr>
+          <p:cNvPr id="47" name="TextBox 46"/>
+          <p:cNvSpPr txBox="1"/>
+          <p:nvPr/>
+        </p:nvSpPr>
+        <p:spPr>
+          <a:xfrm>
+            <a:off x="10323306" y="2192863"/>
+            <a:ext cx="268285" cy="369332"/>
+          </a:xfrm>
+          <a:prstGeom prst="rect">
+            <a:avLst/>
+          </a:prstGeom>
+          <a:noFill/>
+        </p:spPr>
+        <p:txBody>
+          <a:bodyPr wrap="square" rtlCol="0">
+            <a:spAutoFit/>
+          </a:bodyPr>
+          <a:lstStyle/>
+          <a:p>
+            <a:r>
+              <a:rPr kumimoji="1" lang="en-US" altLang="zh-CN" dirty="0"/>
+              <a:t>B</a:t>
+            </a:r>
+            <a:endParaRPr kumimoji="1" lang="zh-CN" altLang="en-US" dirty="0"/>
+          </a:p>
+        </p:txBody>
+      </p:sp>
     </p:spTree>
     <p:extLst>
       <p:ext uri="{BB962C8B-B14F-4D97-AF65-F5344CB8AC3E}">
@@ -18376,6 +18776,995 @@
   <p:clrMapOvr>
     <a:masterClrMapping/>
   </p:clrMapOvr>
+  <p:timing>
+    <p:tnLst>
+      <p:par>
+        <p:cTn id="1" dur="indefinite" restart="never" nodeType="tmRoot"/>
+      </p:par>
+    </p:tnLst>
+  </p:timing>
+</p:sld>
+</file>
+
+<file path=ppt/slides/slide7.xml><?xml version="1.0" encoding="utf-8"?>
+<p:sld xmlns:a="http://schemas.openxmlformats.org/drawingml/2006/main" xmlns:r="http://schemas.openxmlformats.org/officeDocument/2006/relationships" xmlns:p="http://schemas.openxmlformats.org/presentationml/2006/main">
+  <p:cSld>
+    <p:spTree>
+      <p:nvGrpSpPr>
+        <p:cNvPr id="1" name=""/>
+        <p:cNvGrpSpPr/>
+        <p:nvPr/>
+      </p:nvGrpSpPr>
+      <p:grpSpPr>
+        <a:xfrm>
+          <a:off x="0" y="0"/>
+          <a:ext cx="0" cy="0"/>
+          <a:chOff x="0" y="0"/>
+          <a:chExt cx="0" cy="0"/>
+        </a:xfrm>
+      </p:grpSpPr>
+      <p:sp>
+        <p:nvSpPr>
+          <p:cNvPr id="4" name="Rectangle 3"/>
+          <p:cNvSpPr/>
+          <p:nvPr/>
+        </p:nvSpPr>
+        <p:spPr>
+          <a:xfrm>
+            <a:off x="2051384" y="1544055"/>
+            <a:ext cx="1515979" cy="661737"/>
+          </a:xfrm>
+          <a:prstGeom prst="rect">
+            <a:avLst/>
+          </a:prstGeom>
+          <a:noFill/>
+          <a:ln w="25400">
+            <a:solidFill>
+              <a:schemeClr val="tx1"/>
+            </a:solidFill>
+          </a:ln>
+        </p:spPr>
+        <p:style>
+          <a:lnRef idx="2">
+            <a:schemeClr val="accent1">
+              <a:shade val="50000"/>
+            </a:schemeClr>
+          </a:lnRef>
+          <a:fillRef idx="1">
+            <a:schemeClr val="accent1"/>
+          </a:fillRef>
+          <a:effectRef idx="0">
+            <a:schemeClr val="accent1"/>
+          </a:effectRef>
+          <a:fontRef idx="minor">
+            <a:schemeClr val="lt1"/>
+          </a:fontRef>
+        </p:style>
+        <p:txBody>
+          <a:bodyPr rtlCol="0" anchor="ctr"/>
+          <a:lstStyle/>
+          <a:p>
+            <a:pPr algn="ctr"/>
+            <a:r>
+              <a:rPr kumimoji="1" lang="en-US" altLang="zh-CN" sz="2800" dirty="0" smtClean="0">
+                <a:solidFill>
+                  <a:schemeClr val="tx1"/>
+                </a:solidFill>
+              </a:rPr>
+              <a:t>Server</a:t>
+            </a:r>
+            <a:endParaRPr kumimoji="1" lang="zh-CN" altLang="en-US" sz="2800" dirty="0">
+              <a:solidFill>
+                <a:schemeClr val="tx1"/>
+              </a:solidFill>
+            </a:endParaRPr>
+          </a:p>
+        </p:txBody>
+      </p:sp>
+      <p:sp>
+        <p:nvSpPr>
+          <p:cNvPr id="5" name="Rectangle 4"/>
+          <p:cNvSpPr/>
+          <p:nvPr/>
+        </p:nvSpPr>
+        <p:spPr>
+          <a:xfrm>
+            <a:off x="796090" y="4231107"/>
+            <a:ext cx="1515979" cy="661737"/>
+          </a:xfrm>
+          <a:prstGeom prst="rect">
+            <a:avLst/>
+          </a:prstGeom>
+          <a:noFill/>
+          <a:ln w="25400">
+            <a:solidFill>
+              <a:schemeClr val="tx1"/>
+            </a:solidFill>
+          </a:ln>
+        </p:spPr>
+        <p:style>
+          <a:lnRef idx="2">
+            <a:schemeClr val="accent1">
+              <a:shade val="50000"/>
+            </a:schemeClr>
+          </a:lnRef>
+          <a:fillRef idx="1">
+            <a:schemeClr val="accent1"/>
+          </a:fillRef>
+          <a:effectRef idx="0">
+            <a:schemeClr val="accent1"/>
+          </a:effectRef>
+          <a:fontRef idx="minor">
+            <a:schemeClr val="lt1"/>
+          </a:fontRef>
+        </p:style>
+        <p:txBody>
+          <a:bodyPr rtlCol="0" anchor="ctr"/>
+          <a:lstStyle/>
+          <a:p>
+            <a:pPr algn="ctr"/>
+            <a:r>
+              <a:rPr kumimoji="1" lang="en-US" altLang="zh-CN" sz="2800" dirty="0" smtClean="0">
+                <a:solidFill>
+                  <a:schemeClr val="tx1"/>
+                </a:solidFill>
+              </a:rPr>
+              <a:t>Cache 1</a:t>
+            </a:r>
+            <a:endParaRPr kumimoji="1" lang="zh-CN" altLang="en-US" sz="2800" dirty="0">
+              <a:solidFill>
+                <a:schemeClr val="tx1"/>
+              </a:solidFill>
+            </a:endParaRPr>
+          </a:p>
+        </p:txBody>
+      </p:sp>
+      <p:sp>
+        <p:nvSpPr>
+          <p:cNvPr id="6" name="Rectangle 5"/>
+          <p:cNvSpPr/>
+          <p:nvPr/>
+        </p:nvSpPr>
+        <p:spPr>
+          <a:xfrm>
+            <a:off x="3306679" y="4231107"/>
+            <a:ext cx="1515979" cy="661737"/>
+          </a:xfrm>
+          <a:prstGeom prst="rect">
+            <a:avLst/>
+          </a:prstGeom>
+          <a:noFill/>
+          <a:ln w="25400">
+            <a:solidFill>
+              <a:schemeClr val="tx1"/>
+            </a:solidFill>
+          </a:ln>
+        </p:spPr>
+        <p:style>
+          <a:lnRef idx="2">
+            <a:schemeClr val="accent1">
+              <a:shade val="50000"/>
+            </a:schemeClr>
+          </a:lnRef>
+          <a:fillRef idx="1">
+            <a:schemeClr val="accent1"/>
+          </a:fillRef>
+          <a:effectRef idx="0">
+            <a:schemeClr val="accent1"/>
+          </a:effectRef>
+          <a:fontRef idx="minor">
+            <a:schemeClr val="lt1"/>
+          </a:fontRef>
+        </p:style>
+        <p:txBody>
+          <a:bodyPr rtlCol="0" anchor="ctr"/>
+          <a:lstStyle/>
+          <a:p>
+            <a:pPr algn="ctr"/>
+            <a:r>
+              <a:rPr kumimoji="1" lang="en-US" altLang="zh-CN" sz="2800" dirty="0" smtClean="0">
+                <a:solidFill>
+                  <a:schemeClr val="tx1"/>
+                </a:solidFill>
+              </a:rPr>
+              <a:t>Cache 2</a:t>
+            </a:r>
+            <a:endParaRPr kumimoji="1" lang="zh-CN" altLang="en-US" sz="2800" dirty="0">
+              <a:solidFill>
+                <a:schemeClr val="tx1"/>
+              </a:solidFill>
+            </a:endParaRPr>
+          </a:p>
+        </p:txBody>
+      </p:sp>
+      <p:cxnSp>
+        <p:nvCxnSpPr>
+          <p:cNvPr id="9" name="Straight Connector 8"/>
+          <p:cNvCxnSpPr/>
+          <p:nvPr/>
+        </p:nvCxnSpPr>
+        <p:spPr>
+          <a:xfrm flipH="1">
+            <a:off x="2809373" y="2205792"/>
+            <a:ext cx="3" cy="1012656"/>
+          </a:xfrm>
+          <a:prstGeom prst="line">
+            <a:avLst/>
+          </a:prstGeom>
+          <a:ln w="101600">
+            <a:solidFill>
+              <a:schemeClr val="tx1"/>
+            </a:solidFill>
+          </a:ln>
+        </p:spPr>
+        <p:style>
+          <a:lnRef idx="1">
+            <a:schemeClr val="accent1"/>
+          </a:lnRef>
+          <a:fillRef idx="0">
+            <a:schemeClr val="accent1"/>
+          </a:fillRef>
+          <a:effectRef idx="0">
+            <a:schemeClr val="accent1"/>
+          </a:effectRef>
+          <a:fontRef idx="minor">
+            <a:schemeClr val="tx1"/>
+          </a:fontRef>
+        </p:style>
+      </p:cxnSp>
+      <p:cxnSp>
+        <p:nvCxnSpPr>
+          <p:cNvPr id="11" name="Elbow Connector 10"/>
+          <p:cNvCxnSpPr>
+            <a:stCxn id="4" idx="2"/>
+          </p:cNvCxnSpPr>
+          <p:nvPr/>
+        </p:nvCxnSpPr>
+        <p:spPr>
+          <a:xfrm rot="16200000" flipH="1">
+            <a:off x="2424364" y="2590801"/>
+            <a:ext cx="2025315" cy="1255295"/>
+          </a:xfrm>
+          <a:prstGeom prst="bentConnector3">
+            <a:avLst>
+              <a:gd name="adj1" fmla="val 50000"/>
+            </a:avLst>
+          </a:prstGeom>
+          <a:ln w="25400">
+            <a:solidFill>
+              <a:schemeClr val="tx1"/>
+            </a:solidFill>
+            <a:tailEnd type="triangle"/>
+          </a:ln>
+        </p:spPr>
+        <p:style>
+          <a:lnRef idx="1">
+            <a:schemeClr val="accent1"/>
+          </a:lnRef>
+          <a:fillRef idx="0">
+            <a:schemeClr val="accent1"/>
+          </a:fillRef>
+          <a:effectRef idx="0">
+            <a:schemeClr val="accent1"/>
+          </a:effectRef>
+          <a:fontRef idx="minor">
+            <a:schemeClr val="tx1"/>
+          </a:fontRef>
+        </p:style>
+      </p:cxnSp>
+      <p:cxnSp>
+        <p:nvCxnSpPr>
+          <p:cNvPr id="13" name="Elbow Connector 12"/>
+          <p:cNvCxnSpPr>
+            <a:stCxn id="4" idx="2"/>
+          </p:cNvCxnSpPr>
+          <p:nvPr/>
+        </p:nvCxnSpPr>
+        <p:spPr>
+          <a:xfrm rot="5400000">
+            <a:off x="1169071" y="2590803"/>
+            <a:ext cx="2025315" cy="1255292"/>
+          </a:xfrm>
+          <a:prstGeom prst="bentConnector3">
+            <a:avLst>
+              <a:gd name="adj1" fmla="val 50000"/>
+            </a:avLst>
+          </a:prstGeom>
+          <a:ln w="25400">
+            <a:solidFill>
+              <a:schemeClr val="tx1"/>
+            </a:solidFill>
+            <a:tailEnd type="triangle"/>
+          </a:ln>
+        </p:spPr>
+        <p:style>
+          <a:lnRef idx="1">
+            <a:schemeClr val="accent1"/>
+          </a:lnRef>
+          <a:fillRef idx="0">
+            <a:schemeClr val="accent1"/>
+          </a:fillRef>
+          <a:effectRef idx="0">
+            <a:schemeClr val="accent1"/>
+          </a:effectRef>
+          <a:fontRef idx="minor">
+            <a:schemeClr val="tx1"/>
+          </a:fontRef>
+        </p:style>
+      </p:cxnSp>
+      <p:grpSp>
+        <p:nvGrpSpPr>
+          <p:cNvPr id="29" name="Group 28"/>
+          <p:cNvGrpSpPr/>
+          <p:nvPr/>
+        </p:nvGrpSpPr>
+        <p:grpSpPr>
+          <a:xfrm>
+            <a:off x="6220535" y="1064872"/>
+            <a:ext cx="3659574" cy="4186787"/>
+            <a:chOff x="6220535" y="1064872"/>
+            <a:chExt cx="3659574" cy="4186787"/>
+          </a:xfrm>
+        </p:grpSpPr>
+        <p:cxnSp>
+          <p:nvCxnSpPr>
+            <p:cNvPr id="14" name="Straight Connector 13"/>
+            <p:cNvCxnSpPr/>
+            <p:nvPr/>
+          </p:nvCxnSpPr>
+          <p:spPr>
+            <a:xfrm flipH="1">
+              <a:off x="8050321" y="2426685"/>
+              <a:ext cx="4" cy="698177"/>
+            </a:xfrm>
+            <a:prstGeom prst="line">
+              <a:avLst/>
+            </a:prstGeom>
+            <a:ln w="101600">
+              <a:solidFill>
+                <a:schemeClr val="tx1"/>
+              </a:solidFill>
+            </a:ln>
+          </p:spPr>
+          <p:style>
+            <a:lnRef idx="1">
+              <a:schemeClr val="accent1"/>
+            </a:lnRef>
+            <a:fillRef idx="0">
+              <a:schemeClr val="accent1"/>
+            </a:fillRef>
+            <a:effectRef idx="0">
+              <a:schemeClr val="accent1"/>
+            </a:effectRef>
+            <a:fontRef idx="minor">
+              <a:schemeClr val="tx1"/>
+            </a:fontRef>
+          </p:style>
+        </p:cxnSp>
+        <p:cxnSp>
+          <p:nvCxnSpPr>
+            <p:cNvPr id="15" name="Elbow Connector 14"/>
+            <p:cNvCxnSpPr>
+              <a:stCxn id="17" idx="2"/>
+              <a:endCxn id="20" idx="0"/>
+            </p:cNvCxnSpPr>
+            <p:nvPr/>
+          </p:nvCxnSpPr>
+          <p:spPr>
+            <a:xfrm rot="16200000" flipH="1">
+              <a:off x="7915191" y="2588963"/>
+              <a:ext cx="1342061" cy="1071798"/>
+            </a:xfrm>
+            <a:prstGeom prst="bentConnector3">
+              <a:avLst>
+                <a:gd name="adj1" fmla="val 50000"/>
+              </a:avLst>
+            </a:prstGeom>
+            <a:ln w="25400">
+              <a:solidFill>
+                <a:schemeClr val="tx1"/>
+              </a:solidFill>
+              <a:tailEnd type="triangle"/>
+            </a:ln>
+          </p:spPr>
+          <p:style>
+            <a:lnRef idx="1">
+              <a:schemeClr val="accent1"/>
+            </a:lnRef>
+            <a:fillRef idx="0">
+              <a:schemeClr val="accent1"/>
+            </a:fillRef>
+            <a:effectRef idx="0">
+              <a:schemeClr val="accent1"/>
+            </a:effectRef>
+            <a:fontRef idx="minor">
+              <a:schemeClr val="tx1"/>
+            </a:fontRef>
+          </p:style>
+        </p:cxnSp>
+        <p:cxnSp>
+          <p:nvCxnSpPr>
+            <p:cNvPr id="16" name="Elbow Connector 15"/>
+            <p:cNvCxnSpPr>
+              <a:stCxn id="17" idx="2"/>
+              <a:endCxn id="18" idx="0"/>
+            </p:cNvCxnSpPr>
+            <p:nvPr/>
+          </p:nvCxnSpPr>
+          <p:spPr>
+            <a:xfrm rot="5400000">
+              <a:off x="6843394" y="2588964"/>
+              <a:ext cx="1342061" cy="1071796"/>
+            </a:xfrm>
+            <a:prstGeom prst="bentConnector3">
+              <a:avLst>
+                <a:gd name="adj1" fmla="val 50000"/>
+              </a:avLst>
+            </a:prstGeom>
+            <a:ln w="25400">
+              <a:solidFill>
+                <a:schemeClr val="tx1"/>
+              </a:solidFill>
+              <a:tailEnd type="triangle"/>
+            </a:ln>
+          </p:spPr>
+          <p:style>
+            <a:lnRef idx="1">
+              <a:schemeClr val="accent1"/>
+            </a:lnRef>
+            <a:fillRef idx="0">
+              <a:schemeClr val="accent1"/>
+            </a:fillRef>
+            <a:effectRef idx="0">
+              <a:schemeClr val="accent1"/>
+            </a:effectRef>
+            <a:fontRef idx="minor">
+              <a:schemeClr val="tx1"/>
+            </a:fontRef>
+          </p:style>
+        </p:cxnSp>
+        <p:grpSp>
+          <p:nvGrpSpPr>
+            <p:cNvPr id="7" name="Group 6"/>
+            <p:cNvGrpSpPr/>
+            <p:nvPr/>
+          </p:nvGrpSpPr>
+          <p:grpSpPr>
+            <a:xfrm>
+              <a:off x="7292332" y="1064872"/>
+              <a:ext cx="1515980" cy="1388960"/>
+              <a:chOff x="7365581" y="1064872"/>
+              <a:chExt cx="1515980" cy="1388960"/>
+            </a:xfrm>
+          </p:grpSpPr>
+          <p:sp>
+            <p:nvSpPr>
+              <p:cNvPr id="8" name="Rectangle 7"/>
+              <p:cNvSpPr/>
+              <p:nvPr/>
+            </p:nvSpPr>
+            <p:spPr>
+              <a:xfrm>
+                <a:off x="7365582" y="1064872"/>
+                <a:ext cx="1515979" cy="479184"/>
+              </a:xfrm>
+              <a:prstGeom prst="rect">
+                <a:avLst/>
+              </a:prstGeom>
+              <a:noFill/>
+              <a:ln w="25400">
+                <a:solidFill>
+                  <a:schemeClr val="tx1"/>
+                </a:solidFill>
+              </a:ln>
+            </p:spPr>
+            <p:style>
+              <a:lnRef idx="2">
+                <a:schemeClr val="accent1">
+                  <a:shade val="50000"/>
+                </a:schemeClr>
+              </a:lnRef>
+              <a:fillRef idx="1">
+                <a:schemeClr val="accent1"/>
+              </a:fillRef>
+              <a:effectRef idx="0">
+                <a:schemeClr val="accent1"/>
+              </a:effectRef>
+              <a:fontRef idx="minor">
+                <a:schemeClr val="lt1"/>
+              </a:fontRef>
+            </p:style>
+            <p:txBody>
+              <a:bodyPr rtlCol="0" anchor="ctr"/>
+              <a:lstStyle/>
+              <a:p>
+                <a:pPr algn="ctr"/>
+                <a:r>
+                  <a:rPr kumimoji="1" lang="en-US" altLang="zh-CN" sz="2800" dirty="0" smtClean="0">
+                    <a:solidFill>
+                      <a:schemeClr val="tx1"/>
+                    </a:solidFill>
+                  </a:rPr>
+                  <a:t>Server</a:t>
+                </a:r>
+                <a:endParaRPr kumimoji="1" lang="zh-CN" altLang="en-US" sz="2800" dirty="0">
+                  <a:solidFill>
+                    <a:schemeClr val="tx1"/>
+                  </a:solidFill>
+                </a:endParaRPr>
+              </a:p>
+            </p:txBody>
+          </p:sp>
+          <p:sp>
+            <p:nvSpPr>
+              <p:cNvPr id="17" name="Rectangle 16"/>
+              <p:cNvSpPr/>
+              <p:nvPr/>
+            </p:nvSpPr>
+            <p:spPr>
+              <a:xfrm>
+                <a:off x="7365581" y="1544053"/>
+                <a:ext cx="1515979" cy="909779"/>
+              </a:xfrm>
+              <a:prstGeom prst="rect">
+                <a:avLst/>
+              </a:prstGeom>
+              <a:noFill/>
+              <a:ln w="25400">
+                <a:solidFill>
+                  <a:schemeClr val="tx1"/>
+                </a:solidFill>
+              </a:ln>
+            </p:spPr>
+            <p:style>
+              <a:lnRef idx="2">
+                <a:schemeClr val="accent1">
+                  <a:shade val="50000"/>
+                </a:schemeClr>
+              </a:lnRef>
+              <a:fillRef idx="1">
+                <a:schemeClr val="accent1"/>
+              </a:fillRef>
+              <a:effectRef idx="0">
+                <a:schemeClr val="accent1"/>
+              </a:effectRef>
+              <a:fontRef idx="minor">
+                <a:schemeClr val="lt1"/>
+              </a:fontRef>
+            </p:style>
+            <p:txBody>
+              <a:bodyPr rtlCol="0" anchor="ctr"/>
+              <a:lstStyle/>
+              <a:p>
+                <a:pPr algn="ctr"/>
+                <a:r>
+                  <a:rPr kumimoji="1" lang="en-US" altLang="zh-CN" sz="2800" dirty="0" smtClean="0">
+                    <a:solidFill>
+                      <a:schemeClr val="tx1"/>
+                    </a:solidFill>
+                  </a:rPr>
+                  <a:t>A</a:t>
+                </a:r>
+                <a:r>
+                  <a:rPr kumimoji="1" lang="en-US" altLang="zh-CN" sz="2800" baseline="-25000" dirty="0" smtClean="0">
+                    <a:solidFill>
+                      <a:schemeClr val="tx1"/>
+                    </a:solidFill>
+                  </a:rPr>
+                  <a:t>1</a:t>
+                </a:r>
+                <a:r>
+                  <a:rPr kumimoji="1" lang="en-US" altLang="zh-CN" sz="2800" dirty="0" smtClean="0">
+                    <a:solidFill>
+                      <a:schemeClr val="tx1"/>
+                    </a:solidFill>
+                  </a:rPr>
+                  <a:t> A</a:t>
+                </a:r>
+                <a:r>
+                  <a:rPr kumimoji="1" lang="en-US" altLang="zh-CN" sz="2800" baseline="-25000" dirty="0" smtClean="0">
+                    <a:solidFill>
+                      <a:schemeClr val="tx1"/>
+                    </a:solidFill>
+                  </a:rPr>
+                  <a:t>2</a:t>
+                </a:r>
+              </a:p>
+              <a:p>
+                <a:pPr algn="ctr"/>
+                <a:r>
+                  <a:rPr kumimoji="1" lang="en-US" altLang="zh-CN" sz="2800" dirty="0" smtClean="0">
+                    <a:solidFill>
+                      <a:schemeClr val="tx1"/>
+                    </a:solidFill>
+                  </a:rPr>
+                  <a:t>B</a:t>
+                </a:r>
+                <a:r>
+                  <a:rPr kumimoji="1" lang="en-US" altLang="zh-CN" sz="2800" baseline="-25000" dirty="0" smtClean="0">
+                    <a:solidFill>
+                      <a:schemeClr val="tx1"/>
+                    </a:solidFill>
+                  </a:rPr>
+                  <a:t>1</a:t>
+                </a:r>
+                <a:r>
+                  <a:rPr kumimoji="1" lang="en-US" altLang="zh-CN" sz="2800" dirty="0" smtClean="0">
+                    <a:solidFill>
+                      <a:schemeClr val="tx1"/>
+                    </a:solidFill>
+                  </a:rPr>
+                  <a:t> B</a:t>
+                </a:r>
+                <a:r>
+                  <a:rPr kumimoji="1" lang="en-US" altLang="zh-CN" sz="2800" baseline="-25000" dirty="0" smtClean="0">
+                    <a:solidFill>
+                      <a:schemeClr val="tx1"/>
+                    </a:solidFill>
+                  </a:rPr>
+                  <a:t>2</a:t>
+                </a:r>
+                <a:endParaRPr kumimoji="1" lang="zh-CN" altLang="en-US" sz="2800" baseline="-25000" dirty="0">
+                  <a:solidFill>
+                    <a:schemeClr val="tx1"/>
+                  </a:solidFill>
+                </a:endParaRPr>
+              </a:p>
+            </p:txBody>
+          </p:sp>
+        </p:grpSp>
+        <p:grpSp>
+          <p:nvGrpSpPr>
+            <p:cNvPr id="22" name="Group 21"/>
+            <p:cNvGrpSpPr/>
+            <p:nvPr/>
+          </p:nvGrpSpPr>
+          <p:grpSpPr>
+            <a:xfrm>
+              <a:off x="6220535" y="3795893"/>
+              <a:ext cx="1515980" cy="1455766"/>
+              <a:chOff x="6220535" y="3795893"/>
+              <a:chExt cx="1515980" cy="1455766"/>
+            </a:xfrm>
+          </p:grpSpPr>
+          <p:sp>
+            <p:nvSpPr>
+              <p:cNvPr id="18" name="Rectangle 17"/>
+              <p:cNvSpPr/>
+              <p:nvPr/>
+            </p:nvSpPr>
+            <p:spPr>
+              <a:xfrm>
+                <a:off x="6220536" y="3795893"/>
+                <a:ext cx="1515979" cy="545989"/>
+              </a:xfrm>
+              <a:prstGeom prst="rect">
+                <a:avLst/>
+              </a:prstGeom>
+              <a:noFill/>
+              <a:ln w="25400">
+                <a:solidFill>
+                  <a:schemeClr val="tx1"/>
+                </a:solidFill>
+              </a:ln>
+            </p:spPr>
+            <p:style>
+              <a:lnRef idx="2">
+                <a:schemeClr val="accent1">
+                  <a:shade val="50000"/>
+                </a:schemeClr>
+              </a:lnRef>
+              <a:fillRef idx="1">
+                <a:schemeClr val="accent1"/>
+              </a:fillRef>
+              <a:effectRef idx="0">
+                <a:schemeClr val="accent1"/>
+              </a:effectRef>
+              <a:fontRef idx="minor">
+                <a:schemeClr val="lt1"/>
+              </a:fontRef>
+            </p:style>
+            <p:txBody>
+              <a:bodyPr rtlCol="0" anchor="ctr"/>
+              <a:lstStyle/>
+              <a:p>
+                <a:pPr algn="ctr"/>
+                <a:r>
+                  <a:rPr kumimoji="1" lang="en-US" altLang="zh-CN" sz="2800" dirty="0" smtClean="0">
+                    <a:solidFill>
+                      <a:schemeClr val="tx1"/>
+                    </a:solidFill>
+                  </a:rPr>
+                  <a:t>U</a:t>
+                </a:r>
+                <a:r>
+                  <a:rPr kumimoji="1" lang="en-US" altLang="zh-CN" sz="2800" baseline="-25000" dirty="0" smtClean="0">
+                    <a:solidFill>
+                      <a:schemeClr val="tx1"/>
+                    </a:solidFill>
+                  </a:rPr>
+                  <a:t>1</a:t>
+                </a:r>
+                <a:endParaRPr kumimoji="1" lang="zh-CN" altLang="en-US" sz="2800" baseline="-25000" dirty="0">
+                  <a:solidFill>
+                    <a:schemeClr val="tx1"/>
+                  </a:solidFill>
+                </a:endParaRPr>
+              </a:p>
+            </p:txBody>
+          </p:sp>
+          <p:sp>
+            <p:nvSpPr>
+              <p:cNvPr id="19" name="Rectangle 18"/>
+              <p:cNvSpPr/>
+              <p:nvPr/>
+            </p:nvSpPr>
+            <p:spPr>
+              <a:xfrm>
+                <a:off x="6220535" y="4341880"/>
+                <a:ext cx="1515979" cy="909779"/>
+              </a:xfrm>
+              <a:prstGeom prst="rect">
+                <a:avLst/>
+              </a:prstGeom>
+              <a:noFill/>
+              <a:ln w="25400">
+                <a:solidFill>
+                  <a:schemeClr val="tx1"/>
+                </a:solidFill>
+              </a:ln>
+            </p:spPr>
+            <p:style>
+              <a:lnRef idx="2">
+                <a:schemeClr val="accent1">
+                  <a:shade val="50000"/>
+                </a:schemeClr>
+              </a:lnRef>
+              <a:fillRef idx="1">
+                <a:schemeClr val="accent1"/>
+              </a:fillRef>
+              <a:effectRef idx="0">
+                <a:schemeClr val="accent1"/>
+              </a:effectRef>
+              <a:fontRef idx="minor">
+                <a:schemeClr val="lt1"/>
+              </a:fontRef>
+            </p:style>
+            <p:txBody>
+              <a:bodyPr rtlCol="0" anchor="ctr"/>
+              <a:lstStyle/>
+              <a:p>
+                <a:pPr algn="ctr"/>
+                <a:r>
+                  <a:rPr kumimoji="1" lang="en-US" altLang="zh-CN" sz="2800" dirty="0" smtClean="0">
+                    <a:solidFill>
+                      <a:schemeClr val="tx1"/>
+                    </a:solidFill>
+                  </a:rPr>
+                  <a:t>A</a:t>
+                </a:r>
+                <a:r>
+                  <a:rPr kumimoji="1" lang="en-US" altLang="zh-CN" sz="2800" baseline="-25000" dirty="0" smtClean="0">
+                    <a:solidFill>
+                      <a:schemeClr val="tx1"/>
+                    </a:solidFill>
+                  </a:rPr>
+                  <a:t>1</a:t>
+                </a:r>
+                <a:r>
+                  <a:rPr kumimoji="1" lang="en-US" altLang="zh-CN" sz="2800" dirty="0" smtClean="0">
+                    <a:solidFill>
+                      <a:schemeClr val="tx1"/>
+                    </a:solidFill>
+                  </a:rPr>
+                  <a:t> B</a:t>
+                </a:r>
+                <a:r>
+                  <a:rPr kumimoji="1" lang="en-US" altLang="zh-CN" sz="2800" baseline="-25000" dirty="0" smtClean="0">
+                    <a:solidFill>
+                      <a:schemeClr val="tx1"/>
+                    </a:solidFill>
+                  </a:rPr>
+                  <a:t>1</a:t>
+                </a:r>
+                <a:endParaRPr kumimoji="1" lang="zh-CN" altLang="en-US" sz="2800" baseline="-25000" dirty="0">
+                  <a:solidFill>
+                    <a:schemeClr val="tx1"/>
+                  </a:solidFill>
+                </a:endParaRPr>
+              </a:p>
+            </p:txBody>
+          </p:sp>
+        </p:grpSp>
+        <p:grpSp>
+          <p:nvGrpSpPr>
+            <p:cNvPr id="23" name="Group 22"/>
+            <p:cNvGrpSpPr/>
+            <p:nvPr/>
+          </p:nvGrpSpPr>
+          <p:grpSpPr>
+            <a:xfrm>
+              <a:off x="8364129" y="3795893"/>
+              <a:ext cx="1515980" cy="1455766"/>
+              <a:chOff x="8364129" y="3795893"/>
+              <a:chExt cx="1515980" cy="1455766"/>
+            </a:xfrm>
+          </p:grpSpPr>
+          <p:sp>
+            <p:nvSpPr>
+              <p:cNvPr id="20" name="Rectangle 19"/>
+              <p:cNvSpPr/>
+              <p:nvPr/>
+            </p:nvSpPr>
+            <p:spPr>
+              <a:xfrm>
+                <a:off x="8364130" y="3795893"/>
+                <a:ext cx="1515979" cy="545989"/>
+              </a:xfrm>
+              <a:prstGeom prst="rect">
+                <a:avLst/>
+              </a:prstGeom>
+              <a:noFill/>
+              <a:ln w="25400">
+                <a:solidFill>
+                  <a:schemeClr val="tx1"/>
+                </a:solidFill>
+              </a:ln>
+            </p:spPr>
+            <p:style>
+              <a:lnRef idx="2">
+                <a:schemeClr val="accent1">
+                  <a:shade val="50000"/>
+                </a:schemeClr>
+              </a:lnRef>
+              <a:fillRef idx="1">
+                <a:schemeClr val="accent1"/>
+              </a:fillRef>
+              <a:effectRef idx="0">
+                <a:schemeClr val="accent1"/>
+              </a:effectRef>
+              <a:fontRef idx="minor">
+                <a:schemeClr val="lt1"/>
+              </a:fontRef>
+            </p:style>
+            <p:txBody>
+              <a:bodyPr rtlCol="0" anchor="ctr"/>
+              <a:lstStyle/>
+              <a:p>
+                <a:pPr algn="ctr"/>
+                <a:r>
+                  <a:rPr kumimoji="1" lang="en-US" altLang="zh-CN" sz="2800" dirty="0" smtClean="0">
+                    <a:solidFill>
+                      <a:schemeClr val="tx1"/>
+                    </a:solidFill>
+                  </a:rPr>
+                  <a:t>U</a:t>
+                </a:r>
+                <a:r>
+                  <a:rPr kumimoji="1" lang="en-US" altLang="zh-CN" sz="2800" baseline="-25000" dirty="0" smtClean="0">
+                    <a:solidFill>
+                      <a:schemeClr val="tx1"/>
+                    </a:solidFill>
+                  </a:rPr>
+                  <a:t>2</a:t>
+                </a:r>
+                <a:endParaRPr kumimoji="1" lang="zh-CN" altLang="en-US" sz="2800" baseline="-25000" dirty="0">
+                  <a:solidFill>
+                    <a:schemeClr val="tx1"/>
+                  </a:solidFill>
+                </a:endParaRPr>
+              </a:p>
+            </p:txBody>
+          </p:sp>
+          <p:sp>
+            <p:nvSpPr>
+              <p:cNvPr id="21" name="Rectangle 20"/>
+              <p:cNvSpPr/>
+              <p:nvPr/>
+            </p:nvSpPr>
+            <p:spPr>
+              <a:xfrm>
+                <a:off x="8364129" y="4341880"/>
+                <a:ext cx="1515979" cy="909779"/>
+              </a:xfrm>
+              <a:prstGeom prst="rect">
+                <a:avLst/>
+              </a:prstGeom>
+              <a:noFill/>
+              <a:ln w="25400">
+                <a:solidFill>
+                  <a:schemeClr val="tx1"/>
+                </a:solidFill>
+              </a:ln>
+            </p:spPr>
+            <p:style>
+              <a:lnRef idx="2">
+                <a:schemeClr val="accent1">
+                  <a:shade val="50000"/>
+                </a:schemeClr>
+              </a:lnRef>
+              <a:fillRef idx="1">
+                <a:schemeClr val="accent1"/>
+              </a:fillRef>
+              <a:effectRef idx="0">
+                <a:schemeClr val="accent1"/>
+              </a:effectRef>
+              <a:fontRef idx="minor">
+                <a:schemeClr val="lt1"/>
+              </a:fontRef>
+            </p:style>
+            <p:txBody>
+              <a:bodyPr rtlCol="0" anchor="ctr"/>
+              <a:lstStyle/>
+              <a:p>
+                <a:pPr algn="ctr"/>
+                <a:r>
+                  <a:rPr kumimoji="1" lang="en-US" altLang="zh-CN" sz="2800" dirty="0" smtClean="0">
+                    <a:solidFill>
+                      <a:schemeClr val="tx1"/>
+                    </a:solidFill>
+                  </a:rPr>
+                  <a:t>A</a:t>
+                </a:r>
+                <a:r>
+                  <a:rPr kumimoji="1" lang="en-US" altLang="zh-CN" sz="2800" baseline="-25000" dirty="0" smtClean="0">
+                    <a:solidFill>
+                      <a:schemeClr val="tx1"/>
+                    </a:solidFill>
+                  </a:rPr>
+                  <a:t>2</a:t>
+                </a:r>
+                <a:r>
+                  <a:rPr kumimoji="1" lang="en-US" altLang="zh-CN" sz="2800" baseline="-25000" dirty="0">
+                    <a:solidFill>
+                      <a:schemeClr val="tx1"/>
+                    </a:solidFill>
+                  </a:rPr>
+                  <a:t> </a:t>
+                </a:r>
+                <a:r>
+                  <a:rPr kumimoji="1" lang="en-US" altLang="zh-CN" sz="2800" dirty="0" smtClean="0">
+                    <a:solidFill>
+                      <a:schemeClr val="tx1"/>
+                    </a:solidFill>
+                  </a:rPr>
+                  <a:t>B</a:t>
+                </a:r>
+                <a:r>
+                  <a:rPr kumimoji="1" lang="en-US" altLang="zh-CN" sz="2800" baseline="-25000" dirty="0" smtClean="0">
+                    <a:solidFill>
+                      <a:schemeClr val="tx1"/>
+                    </a:solidFill>
+                  </a:rPr>
+                  <a:t>2</a:t>
+                </a:r>
+                <a:endParaRPr kumimoji="1" lang="zh-CN" altLang="en-US" sz="2800" baseline="-25000" dirty="0">
+                  <a:solidFill>
+                    <a:schemeClr val="tx1"/>
+                  </a:solidFill>
+                </a:endParaRPr>
+              </a:p>
+            </p:txBody>
+          </p:sp>
+        </p:grpSp>
+      </p:grpSp>
+    </p:spTree>
+    <p:extLst>
+      <p:ext uri="{BB962C8B-B14F-4D97-AF65-F5344CB8AC3E}">
+        <p14:creationId xmlns:p14="http://schemas.microsoft.com/office/powerpoint/2010/main" val="294777747"/>
+      </p:ext>
+    </p:extLst>
+  </p:cSld>
+  <p:clrMapOvr>
+    <a:masterClrMapping/>
+  </p:clrMapOvr>
+  <p:timing>
+    <p:tnLst>
+      <p:par>
+        <p:cTn id="1" dur="indefinite" restart="never" nodeType="tmRoot"/>
+      </p:par>
+    </p:tnLst>
+  </p:timing>
 </p:sld>
 </file>
 

</xml_diff>